<commit_message>
3 Tier Web Application
</commit_message>
<xml_diff>
--- a/going-serverless-2017.pptx
+++ b/going-serverless-2017.pptx
@@ -3193,25 +3193,668 @@
           </a:p>
         </p:txBody>
       </p:sp>
-      <p:sp>
-        <p:nvSpPr>
-          <p:cNvPr id="3" name="Content Placeholder 2"/>
-          <p:cNvSpPr>
-            <a:spLocks noGrp="1"/>
-          </p:cNvSpPr>
-          <p:nvPr>
-            <p:ph idx="1"/>
-          </p:nvPr>
-        </p:nvSpPr>
-        <p:spPr/>
-        <p:txBody>
-          <a:bodyPr/>
-          <a:lstStyle/>
-          <a:p>
-            <a:endParaRPr lang="en-US"/>
-          </a:p>
-        </p:txBody>
-      </p:sp>
+      <p:grpSp>
+        <p:nvGrpSpPr>
+          <p:cNvPr id="7" name="Group 6"/>
+          <p:cNvGrpSpPr/>
+          <p:nvPr/>
+        </p:nvGrpSpPr>
+        <p:grpSpPr>
+          <a:xfrm>
+            <a:off x="3671458" y="1690688"/>
+            <a:ext cx="731520" cy="835564"/>
+            <a:chOff x="444164" y="680288"/>
+            <a:chExt cx="731520" cy="835564"/>
+          </a:xfrm>
+        </p:grpSpPr>
+        <p:pic>
+          <p:nvPicPr>
+            <p:cNvPr id="5" name="Picture 4"/>
+            <p:cNvPicPr>
+              <a:picLocks noChangeAspect="1"/>
+            </p:cNvPicPr>
+            <p:nvPr/>
+          </p:nvPicPr>
+          <p:blipFill>
+            <a:blip r:embed="rId2">
+              <a:extLst>
+                <a:ext uri="{28A0092B-C50C-407E-A947-70E740481C1C}">
+                  <a14:useLocalDpi xmlns:a14="http://schemas.microsoft.com/office/drawing/2010/main" val="0"/>
+                </a:ext>
+              </a:extLst>
+            </a:blip>
+            <a:stretch>
+              <a:fillRect/>
+            </a:stretch>
+          </p:blipFill>
+          <p:spPr>
+            <a:xfrm>
+              <a:off x="537534" y="680288"/>
+              <a:ext cx="544780" cy="653098"/>
+            </a:xfrm>
+            <a:prstGeom prst="rect">
+              <a:avLst/>
+            </a:prstGeom>
+          </p:spPr>
+        </p:pic>
+        <p:sp>
+          <p:nvSpPr>
+            <p:cNvPr id="6" name="TextBox 5"/>
+            <p:cNvSpPr txBox="1"/>
+            <p:nvPr/>
+          </p:nvSpPr>
+          <p:spPr>
+            <a:xfrm>
+              <a:off x="444164" y="1360220"/>
+              <a:ext cx="731520" cy="155632"/>
+            </a:xfrm>
+            <a:prstGeom prst="rect">
+              <a:avLst/>
+            </a:prstGeom>
+            <a:noFill/>
+          </p:spPr>
+          <p:txBody>
+            <a:bodyPr wrap="square" lIns="0" tIns="0" rIns="0" bIns="0" rtlCol="0" anchor="t">
+              <a:noAutofit/>
+            </a:bodyPr>
+            <a:lstStyle/>
+            <a:p>
+              <a:pPr algn="ctr"/>
+              <a:r>
+                <a:rPr lang="en-US" sz="1000" b="1" dirty="0" smtClean="0"/>
+                <a:t>Amazon </a:t>
+              </a:r>
+              <a:r>
+                <a:rPr lang="en-US" sz="1000" b="1" dirty="0" err="1" smtClean="0"/>
+                <a:t>CloudFront</a:t>
+              </a:r>
+              <a:endParaRPr lang="en-US" b="1" dirty="0"/>
+            </a:p>
+          </p:txBody>
+        </p:sp>
+      </p:grpSp>
+      <p:grpSp>
+        <p:nvGrpSpPr>
+          <p:cNvPr id="10" name="Group 9"/>
+          <p:cNvGrpSpPr/>
+          <p:nvPr/>
+        </p:nvGrpSpPr>
+        <p:grpSpPr>
+          <a:xfrm>
+            <a:off x="5916580" y="3488884"/>
+            <a:ext cx="825006" cy="836556"/>
+            <a:chOff x="6022353" y="781542"/>
+            <a:chExt cx="825006" cy="836556"/>
+          </a:xfrm>
+        </p:grpSpPr>
+        <p:pic>
+          <p:nvPicPr>
+            <p:cNvPr id="8" name="Picture 7"/>
+            <p:cNvPicPr>
+              <a:picLocks noChangeAspect="1"/>
+            </p:cNvPicPr>
+            <p:nvPr/>
+          </p:nvPicPr>
+          <p:blipFill>
+            <a:blip r:embed="rId3">
+              <a:extLst>
+                <a:ext uri="{28A0092B-C50C-407E-A947-70E740481C1C}">
+                  <a14:useLocalDpi xmlns:a14="http://schemas.microsoft.com/office/drawing/2010/main" val="0"/>
+                </a:ext>
+              </a:extLst>
+            </a:blip>
+            <a:stretch>
+              <a:fillRect/>
+            </a:stretch>
+          </p:blipFill>
+          <p:spPr>
+            <a:xfrm>
+              <a:off x="6162466" y="781542"/>
+              <a:ext cx="544781" cy="653737"/>
+            </a:xfrm>
+            <a:prstGeom prst="rect">
+              <a:avLst/>
+            </a:prstGeom>
+          </p:spPr>
+        </p:pic>
+        <p:sp>
+          <p:nvSpPr>
+            <p:cNvPr id="9" name="TextBox 8"/>
+            <p:cNvSpPr txBox="1"/>
+            <p:nvPr/>
+          </p:nvSpPr>
+          <p:spPr>
+            <a:xfrm>
+              <a:off x="6022353" y="1462466"/>
+              <a:ext cx="825006" cy="155632"/>
+            </a:xfrm>
+            <a:prstGeom prst="rect">
+              <a:avLst/>
+            </a:prstGeom>
+            <a:noFill/>
+          </p:spPr>
+          <p:txBody>
+            <a:bodyPr wrap="square" lIns="0" tIns="0" rIns="0" bIns="0" rtlCol="0" anchor="t">
+              <a:noAutofit/>
+            </a:bodyPr>
+            <a:lstStyle/>
+            <a:p>
+              <a:pPr algn="ctr"/>
+              <a:r>
+                <a:rPr lang="en-US" sz="1000" b="1" dirty="0" smtClean="0"/>
+                <a:t>AWS</a:t>
+              </a:r>
+            </a:p>
+            <a:p>
+              <a:pPr algn="ctr"/>
+              <a:r>
+                <a:rPr lang="en-US" sz="1000" b="1" dirty="0" smtClean="0"/>
+                <a:t>Lambda</a:t>
+              </a:r>
+              <a:endParaRPr lang="en-US" sz="1000" b="1" dirty="0"/>
+            </a:p>
+          </p:txBody>
+        </p:sp>
+      </p:grpSp>
+      <p:grpSp>
+        <p:nvGrpSpPr>
+          <p:cNvPr id="13" name="Group 12"/>
+          <p:cNvGrpSpPr/>
+          <p:nvPr/>
+        </p:nvGrpSpPr>
+        <p:grpSpPr>
+          <a:xfrm>
+            <a:off x="8074844" y="3519405"/>
+            <a:ext cx="894752" cy="806035"/>
+            <a:chOff x="365197" y="709817"/>
+            <a:chExt cx="894752" cy="806035"/>
+          </a:xfrm>
+        </p:grpSpPr>
+        <p:pic>
+          <p:nvPicPr>
+            <p:cNvPr id="11" name="Picture 10"/>
+            <p:cNvPicPr>
+              <a:picLocks noChangeAspect="1"/>
+            </p:cNvPicPr>
+            <p:nvPr/>
+          </p:nvPicPr>
+          <p:blipFill>
+            <a:blip r:embed="rId4">
+              <a:extLst>
+                <a:ext uri="{28A0092B-C50C-407E-A947-70E740481C1C}">
+                  <a14:useLocalDpi xmlns:a14="http://schemas.microsoft.com/office/drawing/2010/main" val="0"/>
+                </a:ext>
+              </a:extLst>
+            </a:blip>
+            <a:stretch>
+              <a:fillRect/>
+            </a:stretch>
+          </p:blipFill>
+          <p:spPr>
+            <a:xfrm>
+              <a:off x="540839" y="709817"/>
+              <a:ext cx="543466" cy="601994"/>
+            </a:xfrm>
+            <a:prstGeom prst="rect">
+              <a:avLst/>
+            </a:prstGeom>
+          </p:spPr>
+        </p:pic>
+        <p:sp>
+          <p:nvSpPr>
+            <p:cNvPr id="12" name="TextBox 11"/>
+            <p:cNvSpPr txBox="1"/>
+            <p:nvPr/>
+          </p:nvSpPr>
+          <p:spPr>
+            <a:xfrm>
+              <a:off x="365197" y="1360220"/>
+              <a:ext cx="894752" cy="155632"/>
+            </a:xfrm>
+            <a:prstGeom prst="rect">
+              <a:avLst/>
+            </a:prstGeom>
+            <a:noFill/>
+          </p:spPr>
+          <p:txBody>
+            <a:bodyPr wrap="square" lIns="0" tIns="0" rIns="0" bIns="0" rtlCol="0" anchor="t">
+              <a:noAutofit/>
+            </a:bodyPr>
+            <a:lstStyle/>
+            <a:p>
+              <a:pPr algn="ctr"/>
+              <a:r>
+                <a:rPr lang="en-US" sz="1000" b="1" dirty="0" smtClean="0"/>
+                <a:t>Amazon</a:t>
+              </a:r>
+              <a:br>
+                <a:rPr lang="en-US" sz="1000" b="1" dirty="0" smtClean="0"/>
+              </a:br>
+              <a:r>
+                <a:rPr lang="en-US" sz="1000" b="1" dirty="0" err="1" smtClean="0"/>
+                <a:t>DynamoDB</a:t>
+              </a:r>
+              <a:endParaRPr lang="en-US" b="1" dirty="0"/>
+            </a:p>
+          </p:txBody>
+        </p:sp>
+      </p:grpSp>
+      <p:grpSp>
+        <p:nvGrpSpPr>
+          <p:cNvPr id="16" name="Group 15"/>
+          <p:cNvGrpSpPr/>
+          <p:nvPr/>
+        </p:nvGrpSpPr>
+        <p:grpSpPr>
+          <a:xfrm>
+            <a:off x="5963323" y="1690688"/>
+            <a:ext cx="731520" cy="806494"/>
+            <a:chOff x="2586020" y="709358"/>
+            <a:chExt cx="731520" cy="806494"/>
+          </a:xfrm>
+        </p:grpSpPr>
+        <p:pic>
+          <p:nvPicPr>
+            <p:cNvPr id="14" name="Picture 13"/>
+            <p:cNvPicPr>
+              <a:picLocks noChangeAspect="1"/>
+            </p:cNvPicPr>
+            <p:nvPr/>
+          </p:nvPicPr>
+          <p:blipFill>
+            <a:blip r:embed="rId5">
+              <a:extLst>
+                <a:ext uri="{28A0092B-C50C-407E-A947-70E740481C1C}">
+                  <a14:useLocalDpi xmlns:a14="http://schemas.microsoft.com/office/drawing/2010/main" val="0"/>
+                </a:ext>
+              </a:extLst>
+            </a:blip>
+            <a:stretch>
+              <a:fillRect/>
+            </a:stretch>
+          </p:blipFill>
+          <p:spPr>
+            <a:xfrm>
+              <a:off x="2689579" y="709358"/>
+              <a:ext cx="521367" cy="625640"/>
+            </a:xfrm>
+            <a:prstGeom prst="rect">
+              <a:avLst/>
+            </a:prstGeom>
+          </p:spPr>
+        </p:pic>
+        <p:sp>
+          <p:nvSpPr>
+            <p:cNvPr id="15" name="TextBox 14"/>
+            <p:cNvSpPr txBox="1"/>
+            <p:nvPr/>
+          </p:nvSpPr>
+          <p:spPr>
+            <a:xfrm>
+              <a:off x="2586020" y="1360220"/>
+              <a:ext cx="731520" cy="155632"/>
+            </a:xfrm>
+            <a:prstGeom prst="rect">
+              <a:avLst/>
+            </a:prstGeom>
+            <a:noFill/>
+          </p:spPr>
+          <p:txBody>
+            <a:bodyPr wrap="square" lIns="0" tIns="0" rIns="0" bIns="0" rtlCol="0" anchor="t">
+              <a:noAutofit/>
+            </a:bodyPr>
+            <a:lstStyle/>
+            <a:p>
+              <a:pPr algn="ctr"/>
+              <a:r>
+                <a:rPr lang="en-US" sz="1000" b="1" dirty="0" smtClean="0"/>
+                <a:t>Amazon</a:t>
+              </a:r>
+              <a:br>
+                <a:rPr lang="en-US" sz="1000" b="1" dirty="0" smtClean="0"/>
+              </a:br>
+              <a:r>
+                <a:rPr lang="en-US" sz="1000" b="1" dirty="0" smtClean="0"/>
+                <a:t>S3</a:t>
+              </a:r>
+              <a:endParaRPr lang="en-US" b="1" dirty="0"/>
+            </a:p>
+          </p:txBody>
+        </p:sp>
+      </p:grpSp>
+      <p:grpSp>
+        <p:nvGrpSpPr>
+          <p:cNvPr id="19" name="Group 18"/>
+          <p:cNvGrpSpPr/>
+          <p:nvPr/>
+        </p:nvGrpSpPr>
+        <p:grpSpPr>
+          <a:xfrm>
+            <a:off x="3589842" y="3499009"/>
+            <a:ext cx="894752" cy="826431"/>
+            <a:chOff x="362197" y="689421"/>
+            <a:chExt cx="894752" cy="826431"/>
+          </a:xfrm>
+        </p:grpSpPr>
+        <p:pic>
+          <p:nvPicPr>
+            <p:cNvPr id="17" name="Picture 16"/>
+            <p:cNvPicPr>
+              <a:picLocks noChangeAspect="1"/>
+            </p:cNvPicPr>
+            <p:nvPr/>
+          </p:nvPicPr>
+          <p:blipFill>
+            <a:blip r:embed="rId6">
+              <a:extLst>
+                <a:ext uri="{28A0092B-C50C-407E-A947-70E740481C1C}">
+                  <a14:useLocalDpi xmlns:a14="http://schemas.microsoft.com/office/drawing/2010/main" val="0"/>
+                </a:ext>
+              </a:extLst>
+            </a:blip>
+            <a:stretch>
+              <a:fillRect/>
+            </a:stretch>
+          </p:blipFill>
+          <p:spPr>
+            <a:xfrm>
+              <a:off x="549398" y="689421"/>
+              <a:ext cx="521366" cy="625640"/>
+            </a:xfrm>
+            <a:prstGeom prst="rect">
+              <a:avLst/>
+            </a:prstGeom>
+          </p:spPr>
+        </p:pic>
+        <p:sp>
+          <p:nvSpPr>
+            <p:cNvPr id="18" name="TextBox 17"/>
+            <p:cNvSpPr txBox="1"/>
+            <p:nvPr/>
+          </p:nvSpPr>
+          <p:spPr>
+            <a:xfrm>
+              <a:off x="362197" y="1360220"/>
+              <a:ext cx="894752" cy="155632"/>
+            </a:xfrm>
+            <a:prstGeom prst="rect">
+              <a:avLst/>
+            </a:prstGeom>
+            <a:noFill/>
+          </p:spPr>
+          <p:txBody>
+            <a:bodyPr wrap="square" lIns="0" tIns="0" rIns="0" bIns="0" rtlCol="0" anchor="t">
+              <a:noAutofit/>
+            </a:bodyPr>
+            <a:lstStyle/>
+            <a:p>
+              <a:pPr algn="ctr"/>
+              <a:r>
+                <a:rPr lang="en-US" sz="1000" b="1" dirty="0" smtClean="0"/>
+                <a:t>Amazon API Gateway*</a:t>
+              </a:r>
+              <a:endParaRPr lang="en-US" b="1" dirty="0"/>
+            </a:p>
+          </p:txBody>
+        </p:sp>
+      </p:grpSp>
+      <p:pic>
+        <p:nvPicPr>
+          <p:cNvPr id="20" name="Picture 19"/>
+          <p:cNvPicPr>
+            <a:picLocks noChangeAspect="1"/>
+          </p:cNvPicPr>
+          <p:nvPr/>
+        </p:nvPicPr>
+        <p:blipFill>
+          <a:blip r:embed="rId7">
+            <a:extLst>
+              <a:ext uri="{28A0092B-C50C-407E-A947-70E740481C1C}">
+                <a14:useLocalDpi xmlns:a14="http://schemas.microsoft.com/office/drawing/2010/main" val="0"/>
+              </a:ext>
+            </a:extLst>
+          </a:blip>
+          <a:stretch>
+            <a:fillRect/>
+          </a:stretch>
+        </p:blipFill>
+        <p:spPr>
+          <a:xfrm>
+            <a:off x="1287239" y="2757364"/>
+            <a:ext cx="731520" cy="731520"/>
+          </a:xfrm>
+          <a:prstGeom prst="rect">
+            <a:avLst/>
+          </a:prstGeom>
+        </p:spPr>
+      </p:pic>
+      <p:sp>
+        <p:nvSpPr>
+          <p:cNvPr id="21" name="TextBox 20"/>
+          <p:cNvSpPr txBox="1"/>
+          <p:nvPr/>
+        </p:nvSpPr>
+        <p:spPr>
+          <a:xfrm>
+            <a:off x="1104001" y="3589775"/>
+            <a:ext cx="1078992" cy="155448"/>
+          </a:xfrm>
+          <a:prstGeom prst="rect">
+            <a:avLst/>
+          </a:prstGeom>
+          <a:noFill/>
+        </p:spPr>
+        <p:txBody>
+          <a:bodyPr wrap="square" lIns="0" tIns="0" rIns="0" bIns="0" rtlCol="0">
+            <a:noAutofit/>
+          </a:bodyPr>
+          <a:lstStyle/>
+          <a:p>
+            <a:pPr algn="ctr"/>
+            <a:r>
+              <a:rPr lang="en-US" sz="1000" dirty="0" smtClean="0">
+                <a:latin typeface="Helvetica Neue"/>
+                <a:cs typeface="Helvetica Neue"/>
+              </a:rPr>
+              <a:t>Browser</a:t>
+            </a:r>
+            <a:endParaRPr lang="en-US" sz="1000" dirty="0">
+              <a:latin typeface="Helvetica Neue"/>
+              <a:cs typeface="Helvetica Neue"/>
+            </a:endParaRPr>
+          </a:p>
+        </p:txBody>
+      </p:sp>
+      <p:cxnSp>
+        <p:nvCxnSpPr>
+          <p:cNvPr id="22" name="Straight Connector 21"/>
+          <p:cNvCxnSpPr>
+            <a:stCxn id="5" idx="1"/>
+          </p:cNvCxnSpPr>
+          <p:nvPr/>
+        </p:nvCxnSpPr>
+        <p:spPr>
+          <a:xfrm flipH="1">
+            <a:off x="2034993" y="2017237"/>
+            <a:ext cx="1729835" cy="1101254"/>
+          </a:xfrm>
+          <a:prstGeom prst="line">
+            <a:avLst/>
+          </a:prstGeom>
+          <a:ln>
+            <a:solidFill>
+              <a:srgbClr val="414042"/>
+            </a:solidFill>
+          </a:ln>
+          <a:effectLst/>
+        </p:spPr>
+        <p:style>
+          <a:lnRef idx="2">
+            <a:schemeClr val="accent1"/>
+          </a:lnRef>
+          <a:fillRef idx="0">
+            <a:schemeClr val="accent1"/>
+          </a:fillRef>
+          <a:effectRef idx="1">
+            <a:schemeClr val="accent1"/>
+          </a:effectRef>
+          <a:fontRef idx="minor">
+            <a:schemeClr val="tx1"/>
+          </a:fontRef>
+        </p:style>
+      </p:cxnSp>
+      <p:cxnSp>
+        <p:nvCxnSpPr>
+          <p:cNvPr id="23" name="Straight Connector 22"/>
+          <p:cNvCxnSpPr>
+            <a:stCxn id="14" idx="1"/>
+          </p:cNvCxnSpPr>
+          <p:nvPr/>
+        </p:nvCxnSpPr>
+        <p:spPr>
+          <a:xfrm flipH="1" flipV="1">
+            <a:off x="4298409" y="1988167"/>
+            <a:ext cx="1768473" cy="15341"/>
+          </a:xfrm>
+          <a:prstGeom prst="line">
+            <a:avLst/>
+          </a:prstGeom>
+          <a:ln>
+            <a:solidFill>
+              <a:srgbClr val="414042"/>
+            </a:solidFill>
+          </a:ln>
+          <a:effectLst/>
+        </p:spPr>
+        <p:style>
+          <a:lnRef idx="2">
+            <a:schemeClr val="accent1"/>
+          </a:lnRef>
+          <a:fillRef idx="0">
+            <a:schemeClr val="accent1"/>
+          </a:fillRef>
+          <a:effectRef idx="1">
+            <a:schemeClr val="accent1"/>
+          </a:effectRef>
+          <a:fontRef idx="minor">
+            <a:schemeClr val="tx1"/>
+          </a:fontRef>
+        </p:style>
+      </p:cxnSp>
+      <p:cxnSp>
+        <p:nvCxnSpPr>
+          <p:cNvPr id="24" name="Straight Connector 23"/>
+          <p:cNvCxnSpPr>
+            <a:stCxn id="11" idx="1"/>
+          </p:cNvCxnSpPr>
+          <p:nvPr/>
+        </p:nvCxnSpPr>
+        <p:spPr>
+          <a:xfrm flipH="1" flipV="1">
+            <a:off x="6588249" y="3811829"/>
+            <a:ext cx="1662237" cy="8573"/>
+          </a:xfrm>
+          <a:prstGeom prst="line">
+            <a:avLst/>
+          </a:prstGeom>
+          <a:ln>
+            <a:solidFill>
+              <a:srgbClr val="414042"/>
+            </a:solidFill>
+          </a:ln>
+          <a:effectLst/>
+        </p:spPr>
+        <p:style>
+          <a:lnRef idx="2">
+            <a:schemeClr val="accent1"/>
+          </a:lnRef>
+          <a:fillRef idx="0">
+            <a:schemeClr val="accent1"/>
+          </a:fillRef>
+          <a:effectRef idx="1">
+            <a:schemeClr val="accent1"/>
+          </a:effectRef>
+          <a:fontRef idx="minor">
+            <a:schemeClr val="tx1"/>
+          </a:fontRef>
+        </p:style>
+      </p:cxnSp>
+      <p:cxnSp>
+        <p:nvCxnSpPr>
+          <p:cNvPr id="25" name="Straight Connector 24"/>
+          <p:cNvCxnSpPr>
+            <a:stCxn id="8" idx="1"/>
+          </p:cNvCxnSpPr>
+          <p:nvPr/>
+        </p:nvCxnSpPr>
+        <p:spPr>
+          <a:xfrm flipH="1" flipV="1">
+            <a:off x="4309608" y="3811829"/>
+            <a:ext cx="1747085" cy="3924"/>
+          </a:xfrm>
+          <a:prstGeom prst="line">
+            <a:avLst/>
+          </a:prstGeom>
+          <a:ln>
+            <a:solidFill>
+              <a:srgbClr val="414042"/>
+            </a:solidFill>
+          </a:ln>
+          <a:effectLst/>
+        </p:spPr>
+        <p:style>
+          <a:lnRef idx="2">
+            <a:schemeClr val="accent1"/>
+          </a:lnRef>
+          <a:fillRef idx="0">
+            <a:schemeClr val="accent1"/>
+          </a:fillRef>
+          <a:effectRef idx="1">
+            <a:schemeClr val="accent1"/>
+          </a:effectRef>
+          <a:fontRef idx="minor">
+            <a:schemeClr val="tx1"/>
+          </a:fontRef>
+        </p:style>
+      </p:cxnSp>
+      <p:cxnSp>
+        <p:nvCxnSpPr>
+          <p:cNvPr id="26" name="Straight Connector 25"/>
+          <p:cNvCxnSpPr>
+            <a:stCxn id="17" idx="1"/>
+          </p:cNvCxnSpPr>
+          <p:nvPr/>
+        </p:nvCxnSpPr>
+        <p:spPr>
+          <a:xfrm flipH="1" flipV="1">
+            <a:off x="2018759" y="3123124"/>
+            <a:ext cx="1758284" cy="688705"/>
+          </a:xfrm>
+          <a:prstGeom prst="line">
+            <a:avLst/>
+          </a:prstGeom>
+          <a:ln>
+            <a:solidFill>
+              <a:srgbClr val="414042"/>
+            </a:solidFill>
+          </a:ln>
+          <a:effectLst/>
+        </p:spPr>
+        <p:style>
+          <a:lnRef idx="2">
+            <a:schemeClr val="accent1"/>
+          </a:lnRef>
+          <a:fillRef idx="0">
+            <a:schemeClr val="accent1"/>
+          </a:fillRef>
+          <a:effectRef idx="1">
+            <a:schemeClr val="accent1"/>
+          </a:effectRef>
+          <a:fontRef idx="minor">
+            <a:schemeClr val="tx1"/>
+          </a:fontRef>
+        </p:style>
+      </p:cxnSp>
     </p:spTree>
     <p:extLst>
       <p:ext uri="{BB962C8B-B14F-4D97-AF65-F5344CB8AC3E}">

</xml_diff>

<commit_message>
added batch processing diagram
</commit_message>
<xml_diff>
--- a/going-serverless-2017.pptx
+++ b/going-serverless-2017.pptx
@@ -3195,21 +3195,756 @@
       </p:sp>
       <p:grpSp>
         <p:nvGrpSpPr>
+          <p:cNvPr id="32" name="Group 31"/>
+          <p:cNvGrpSpPr/>
+          <p:nvPr/>
+        </p:nvGrpSpPr>
+        <p:grpSpPr>
+          <a:xfrm>
+            <a:off x="2163202" y="2524405"/>
+            <a:ext cx="7865595" cy="2634752"/>
+            <a:chOff x="1104001" y="1690688"/>
+            <a:chExt cx="7865595" cy="2634752"/>
+          </a:xfrm>
+        </p:grpSpPr>
+        <p:grpSp>
+          <p:nvGrpSpPr>
+            <p:cNvPr id="7" name="Group 6"/>
+            <p:cNvGrpSpPr/>
+            <p:nvPr/>
+          </p:nvGrpSpPr>
+          <p:grpSpPr>
+            <a:xfrm>
+              <a:off x="3671458" y="1690688"/>
+              <a:ext cx="731520" cy="835564"/>
+              <a:chOff x="444164" y="680288"/>
+              <a:chExt cx="731520" cy="835564"/>
+            </a:xfrm>
+          </p:grpSpPr>
+          <p:pic>
+            <p:nvPicPr>
+              <p:cNvPr id="5" name="Picture 4"/>
+              <p:cNvPicPr>
+                <a:picLocks noChangeAspect="1"/>
+              </p:cNvPicPr>
+              <p:nvPr/>
+            </p:nvPicPr>
+            <p:blipFill>
+              <a:blip r:embed="rId2">
+                <a:extLst>
+                  <a:ext uri="{28A0092B-C50C-407E-A947-70E740481C1C}">
+                    <a14:useLocalDpi xmlns:a14="http://schemas.microsoft.com/office/drawing/2010/main" val="0"/>
+                  </a:ext>
+                </a:extLst>
+              </a:blip>
+              <a:stretch>
+                <a:fillRect/>
+              </a:stretch>
+            </p:blipFill>
+            <p:spPr>
+              <a:xfrm>
+                <a:off x="537534" y="680288"/>
+                <a:ext cx="544780" cy="653098"/>
+              </a:xfrm>
+              <a:prstGeom prst="rect">
+                <a:avLst/>
+              </a:prstGeom>
+            </p:spPr>
+          </p:pic>
+          <p:sp>
+            <p:nvSpPr>
+              <p:cNvPr id="6" name="TextBox 5"/>
+              <p:cNvSpPr txBox="1"/>
+              <p:nvPr/>
+            </p:nvSpPr>
+            <p:spPr>
+              <a:xfrm>
+                <a:off x="444164" y="1360220"/>
+                <a:ext cx="731520" cy="155632"/>
+              </a:xfrm>
+              <a:prstGeom prst="rect">
+                <a:avLst/>
+              </a:prstGeom>
+              <a:noFill/>
+            </p:spPr>
+            <p:txBody>
+              <a:bodyPr wrap="square" lIns="0" tIns="0" rIns="0" bIns="0" rtlCol="0" anchor="t">
+                <a:noAutofit/>
+              </a:bodyPr>
+              <a:lstStyle/>
+              <a:p>
+                <a:pPr algn="ctr"/>
+                <a:r>
+                  <a:rPr lang="en-US" sz="1000" b="1" dirty="0" smtClean="0"/>
+                  <a:t>Amazon </a:t>
+                </a:r>
+                <a:r>
+                  <a:rPr lang="en-US" sz="1000" b="1" dirty="0" err="1" smtClean="0"/>
+                  <a:t>CloudFront</a:t>
+                </a:r>
+                <a:endParaRPr lang="en-US" b="1" dirty="0"/>
+              </a:p>
+            </p:txBody>
+          </p:sp>
+        </p:grpSp>
+        <p:grpSp>
+          <p:nvGrpSpPr>
+            <p:cNvPr id="10" name="Group 9"/>
+            <p:cNvGrpSpPr/>
+            <p:nvPr/>
+          </p:nvGrpSpPr>
+          <p:grpSpPr>
+            <a:xfrm>
+              <a:off x="5916580" y="3488884"/>
+              <a:ext cx="825006" cy="836556"/>
+              <a:chOff x="6022353" y="781542"/>
+              <a:chExt cx="825006" cy="836556"/>
+            </a:xfrm>
+          </p:grpSpPr>
+          <p:pic>
+            <p:nvPicPr>
+              <p:cNvPr id="8" name="Picture 7"/>
+              <p:cNvPicPr>
+                <a:picLocks noChangeAspect="1"/>
+              </p:cNvPicPr>
+              <p:nvPr/>
+            </p:nvPicPr>
+            <p:blipFill>
+              <a:blip r:embed="rId3">
+                <a:extLst>
+                  <a:ext uri="{28A0092B-C50C-407E-A947-70E740481C1C}">
+                    <a14:useLocalDpi xmlns:a14="http://schemas.microsoft.com/office/drawing/2010/main" val="0"/>
+                  </a:ext>
+                </a:extLst>
+              </a:blip>
+              <a:stretch>
+                <a:fillRect/>
+              </a:stretch>
+            </p:blipFill>
+            <p:spPr>
+              <a:xfrm>
+                <a:off x="6162466" y="781542"/>
+                <a:ext cx="544781" cy="653737"/>
+              </a:xfrm>
+              <a:prstGeom prst="rect">
+                <a:avLst/>
+              </a:prstGeom>
+            </p:spPr>
+          </p:pic>
+          <p:sp>
+            <p:nvSpPr>
+              <p:cNvPr id="9" name="TextBox 8"/>
+              <p:cNvSpPr txBox="1"/>
+              <p:nvPr/>
+            </p:nvSpPr>
+            <p:spPr>
+              <a:xfrm>
+                <a:off x="6022353" y="1462466"/>
+                <a:ext cx="825006" cy="155632"/>
+              </a:xfrm>
+              <a:prstGeom prst="rect">
+                <a:avLst/>
+              </a:prstGeom>
+              <a:noFill/>
+            </p:spPr>
+            <p:txBody>
+              <a:bodyPr wrap="square" lIns="0" tIns="0" rIns="0" bIns="0" rtlCol="0" anchor="t">
+                <a:noAutofit/>
+              </a:bodyPr>
+              <a:lstStyle/>
+              <a:p>
+                <a:pPr algn="ctr"/>
+                <a:r>
+                  <a:rPr lang="en-US" sz="1000" b="1" dirty="0" smtClean="0"/>
+                  <a:t>AWS</a:t>
+                </a:r>
+              </a:p>
+              <a:p>
+                <a:pPr algn="ctr"/>
+                <a:r>
+                  <a:rPr lang="en-US" sz="1000" b="1" dirty="0" smtClean="0"/>
+                  <a:t>Lambda</a:t>
+                </a:r>
+                <a:endParaRPr lang="en-US" sz="1000" b="1" dirty="0"/>
+              </a:p>
+            </p:txBody>
+          </p:sp>
+        </p:grpSp>
+        <p:grpSp>
+          <p:nvGrpSpPr>
+            <p:cNvPr id="13" name="Group 12"/>
+            <p:cNvGrpSpPr/>
+            <p:nvPr/>
+          </p:nvGrpSpPr>
+          <p:grpSpPr>
+            <a:xfrm>
+              <a:off x="8074844" y="3519405"/>
+              <a:ext cx="894752" cy="806035"/>
+              <a:chOff x="365197" y="709817"/>
+              <a:chExt cx="894752" cy="806035"/>
+            </a:xfrm>
+          </p:grpSpPr>
+          <p:pic>
+            <p:nvPicPr>
+              <p:cNvPr id="11" name="Picture 10"/>
+              <p:cNvPicPr>
+                <a:picLocks noChangeAspect="1"/>
+              </p:cNvPicPr>
+              <p:nvPr/>
+            </p:nvPicPr>
+            <p:blipFill>
+              <a:blip r:embed="rId4">
+                <a:extLst>
+                  <a:ext uri="{28A0092B-C50C-407E-A947-70E740481C1C}">
+                    <a14:useLocalDpi xmlns:a14="http://schemas.microsoft.com/office/drawing/2010/main" val="0"/>
+                  </a:ext>
+                </a:extLst>
+              </a:blip>
+              <a:stretch>
+                <a:fillRect/>
+              </a:stretch>
+            </p:blipFill>
+            <p:spPr>
+              <a:xfrm>
+                <a:off x="540839" y="709817"/>
+                <a:ext cx="543466" cy="601994"/>
+              </a:xfrm>
+              <a:prstGeom prst="rect">
+                <a:avLst/>
+              </a:prstGeom>
+            </p:spPr>
+          </p:pic>
+          <p:sp>
+            <p:nvSpPr>
+              <p:cNvPr id="12" name="TextBox 11"/>
+              <p:cNvSpPr txBox="1"/>
+              <p:nvPr/>
+            </p:nvSpPr>
+            <p:spPr>
+              <a:xfrm>
+                <a:off x="365197" y="1360220"/>
+                <a:ext cx="894752" cy="155632"/>
+              </a:xfrm>
+              <a:prstGeom prst="rect">
+                <a:avLst/>
+              </a:prstGeom>
+              <a:noFill/>
+            </p:spPr>
+            <p:txBody>
+              <a:bodyPr wrap="square" lIns="0" tIns="0" rIns="0" bIns="0" rtlCol="0" anchor="t">
+                <a:noAutofit/>
+              </a:bodyPr>
+              <a:lstStyle/>
+              <a:p>
+                <a:pPr algn="ctr"/>
+                <a:r>
+                  <a:rPr lang="en-US" sz="1000" b="1" dirty="0" smtClean="0"/>
+                  <a:t>Amazon</a:t>
+                </a:r>
+                <a:br>
+                  <a:rPr lang="en-US" sz="1000" b="1" dirty="0" smtClean="0"/>
+                </a:br>
+                <a:r>
+                  <a:rPr lang="en-US" sz="1000" b="1" dirty="0" err="1" smtClean="0"/>
+                  <a:t>DynamoDB</a:t>
+                </a:r>
+                <a:endParaRPr lang="en-US" b="1" dirty="0"/>
+              </a:p>
+            </p:txBody>
+          </p:sp>
+        </p:grpSp>
+        <p:grpSp>
+          <p:nvGrpSpPr>
+            <p:cNvPr id="16" name="Group 15"/>
+            <p:cNvGrpSpPr/>
+            <p:nvPr/>
+          </p:nvGrpSpPr>
+          <p:grpSpPr>
+            <a:xfrm>
+              <a:off x="5963323" y="1690688"/>
+              <a:ext cx="731520" cy="806494"/>
+              <a:chOff x="2586020" y="709358"/>
+              <a:chExt cx="731520" cy="806494"/>
+            </a:xfrm>
+          </p:grpSpPr>
+          <p:pic>
+            <p:nvPicPr>
+              <p:cNvPr id="14" name="Picture 13"/>
+              <p:cNvPicPr>
+                <a:picLocks noChangeAspect="1"/>
+              </p:cNvPicPr>
+              <p:nvPr/>
+            </p:nvPicPr>
+            <p:blipFill>
+              <a:blip r:embed="rId5">
+                <a:extLst>
+                  <a:ext uri="{28A0092B-C50C-407E-A947-70E740481C1C}">
+                    <a14:useLocalDpi xmlns:a14="http://schemas.microsoft.com/office/drawing/2010/main" val="0"/>
+                  </a:ext>
+                </a:extLst>
+              </a:blip>
+              <a:stretch>
+                <a:fillRect/>
+              </a:stretch>
+            </p:blipFill>
+            <p:spPr>
+              <a:xfrm>
+                <a:off x="2689579" y="709358"/>
+                <a:ext cx="521367" cy="625640"/>
+              </a:xfrm>
+              <a:prstGeom prst="rect">
+                <a:avLst/>
+              </a:prstGeom>
+            </p:spPr>
+          </p:pic>
+          <p:sp>
+            <p:nvSpPr>
+              <p:cNvPr id="15" name="TextBox 14"/>
+              <p:cNvSpPr txBox="1"/>
+              <p:nvPr/>
+            </p:nvSpPr>
+            <p:spPr>
+              <a:xfrm>
+                <a:off x="2586020" y="1360220"/>
+                <a:ext cx="731520" cy="155632"/>
+              </a:xfrm>
+              <a:prstGeom prst="rect">
+                <a:avLst/>
+              </a:prstGeom>
+              <a:noFill/>
+            </p:spPr>
+            <p:txBody>
+              <a:bodyPr wrap="square" lIns="0" tIns="0" rIns="0" bIns="0" rtlCol="0" anchor="t">
+                <a:noAutofit/>
+              </a:bodyPr>
+              <a:lstStyle/>
+              <a:p>
+                <a:pPr algn="ctr"/>
+                <a:r>
+                  <a:rPr lang="en-US" sz="1000" b="1" dirty="0" smtClean="0"/>
+                  <a:t>Amazon</a:t>
+                </a:r>
+                <a:br>
+                  <a:rPr lang="en-US" sz="1000" b="1" dirty="0" smtClean="0"/>
+                </a:br>
+                <a:r>
+                  <a:rPr lang="en-US" sz="1000" b="1" dirty="0" smtClean="0"/>
+                  <a:t>S3</a:t>
+                </a:r>
+                <a:endParaRPr lang="en-US" b="1" dirty="0"/>
+              </a:p>
+            </p:txBody>
+          </p:sp>
+        </p:grpSp>
+        <p:grpSp>
+          <p:nvGrpSpPr>
+            <p:cNvPr id="19" name="Group 18"/>
+            <p:cNvGrpSpPr/>
+            <p:nvPr/>
+          </p:nvGrpSpPr>
+          <p:grpSpPr>
+            <a:xfrm>
+              <a:off x="3589842" y="3499009"/>
+              <a:ext cx="894752" cy="826431"/>
+              <a:chOff x="362197" y="689421"/>
+              <a:chExt cx="894752" cy="826431"/>
+            </a:xfrm>
+          </p:grpSpPr>
+          <p:pic>
+            <p:nvPicPr>
+              <p:cNvPr id="17" name="Picture 16"/>
+              <p:cNvPicPr>
+                <a:picLocks noChangeAspect="1"/>
+              </p:cNvPicPr>
+              <p:nvPr/>
+            </p:nvPicPr>
+            <p:blipFill>
+              <a:blip r:embed="rId6">
+                <a:extLst>
+                  <a:ext uri="{28A0092B-C50C-407E-A947-70E740481C1C}">
+                    <a14:useLocalDpi xmlns:a14="http://schemas.microsoft.com/office/drawing/2010/main" val="0"/>
+                  </a:ext>
+                </a:extLst>
+              </a:blip>
+              <a:stretch>
+                <a:fillRect/>
+              </a:stretch>
+            </p:blipFill>
+            <p:spPr>
+              <a:xfrm>
+                <a:off x="549398" y="689421"/>
+                <a:ext cx="521366" cy="625640"/>
+              </a:xfrm>
+              <a:prstGeom prst="rect">
+                <a:avLst/>
+              </a:prstGeom>
+            </p:spPr>
+          </p:pic>
+          <p:sp>
+            <p:nvSpPr>
+              <p:cNvPr id="18" name="TextBox 17"/>
+              <p:cNvSpPr txBox="1"/>
+              <p:nvPr/>
+            </p:nvSpPr>
+            <p:spPr>
+              <a:xfrm>
+                <a:off x="362197" y="1360220"/>
+                <a:ext cx="894752" cy="155632"/>
+              </a:xfrm>
+              <a:prstGeom prst="rect">
+                <a:avLst/>
+              </a:prstGeom>
+              <a:noFill/>
+            </p:spPr>
+            <p:txBody>
+              <a:bodyPr wrap="square" lIns="0" tIns="0" rIns="0" bIns="0" rtlCol="0" anchor="t">
+                <a:noAutofit/>
+              </a:bodyPr>
+              <a:lstStyle/>
+              <a:p>
+                <a:pPr algn="ctr"/>
+                <a:r>
+                  <a:rPr lang="en-US" sz="1000" b="1" dirty="0" smtClean="0"/>
+                  <a:t>Amazon API Gateway*</a:t>
+                </a:r>
+                <a:endParaRPr lang="en-US" b="1" dirty="0"/>
+              </a:p>
+            </p:txBody>
+          </p:sp>
+        </p:grpSp>
+        <p:pic>
+          <p:nvPicPr>
+            <p:cNvPr id="20" name="Picture 19"/>
+            <p:cNvPicPr>
+              <a:picLocks noChangeAspect="1"/>
+            </p:cNvPicPr>
+            <p:nvPr/>
+          </p:nvPicPr>
+          <p:blipFill>
+            <a:blip r:embed="rId7">
+              <a:extLst>
+                <a:ext uri="{28A0092B-C50C-407E-A947-70E740481C1C}">
+                  <a14:useLocalDpi xmlns:a14="http://schemas.microsoft.com/office/drawing/2010/main" val="0"/>
+                </a:ext>
+              </a:extLst>
+            </a:blip>
+            <a:stretch>
+              <a:fillRect/>
+            </a:stretch>
+          </p:blipFill>
+          <p:spPr>
+            <a:xfrm>
+              <a:off x="1287239" y="2757364"/>
+              <a:ext cx="731520" cy="731520"/>
+            </a:xfrm>
+            <a:prstGeom prst="rect">
+              <a:avLst/>
+            </a:prstGeom>
+          </p:spPr>
+        </p:pic>
+        <p:sp>
+          <p:nvSpPr>
+            <p:cNvPr id="21" name="TextBox 20"/>
+            <p:cNvSpPr txBox="1"/>
+            <p:nvPr/>
+          </p:nvSpPr>
+          <p:spPr>
+            <a:xfrm>
+              <a:off x="1104001" y="3589775"/>
+              <a:ext cx="1078992" cy="155448"/>
+            </a:xfrm>
+            <a:prstGeom prst="rect">
+              <a:avLst/>
+            </a:prstGeom>
+            <a:noFill/>
+          </p:spPr>
+          <p:txBody>
+            <a:bodyPr wrap="square" lIns="0" tIns="0" rIns="0" bIns="0" rtlCol="0">
+              <a:noAutofit/>
+            </a:bodyPr>
+            <a:lstStyle/>
+            <a:p>
+              <a:pPr algn="ctr"/>
+              <a:r>
+                <a:rPr lang="en-US" sz="1000" dirty="0" smtClean="0">
+                  <a:latin typeface="Helvetica Neue"/>
+                  <a:cs typeface="Helvetica Neue"/>
+                </a:rPr>
+                <a:t>Browser</a:t>
+              </a:r>
+              <a:endParaRPr lang="en-US" sz="1000" dirty="0">
+                <a:latin typeface="Helvetica Neue"/>
+                <a:cs typeface="Helvetica Neue"/>
+              </a:endParaRPr>
+            </a:p>
+          </p:txBody>
+        </p:sp>
+        <p:cxnSp>
+          <p:nvCxnSpPr>
+            <p:cNvPr id="22" name="Straight Connector 21"/>
+            <p:cNvCxnSpPr>
+              <a:stCxn id="5" idx="1"/>
+            </p:cNvCxnSpPr>
+            <p:nvPr/>
+          </p:nvCxnSpPr>
+          <p:spPr>
+            <a:xfrm flipH="1">
+              <a:off x="2034993" y="2017237"/>
+              <a:ext cx="1729835" cy="1101254"/>
+            </a:xfrm>
+            <a:prstGeom prst="line">
+              <a:avLst/>
+            </a:prstGeom>
+            <a:ln>
+              <a:solidFill>
+                <a:srgbClr val="414042"/>
+              </a:solidFill>
+            </a:ln>
+            <a:effectLst/>
+          </p:spPr>
+          <p:style>
+            <a:lnRef idx="2">
+              <a:schemeClr val="accent1"/>
+            </a:lnRef>
+            <a:fillRef idx="0">
+              <a:schemeClr val="accent1"/>
+            </a:fillRef>
+            <a:effectRef idx="1">
+              <a:schemeClr val="accent1"/>
+            </a:effectRef>
+            <a:fontRef idx="minor">
+              <a:schemeClr val="tx1"/>
+            </a:fontRef>
+          </p:style>
+        </p:cxnSp>
+        <p:cxnSp>
+          <p:nvCxnSpPr>
+            <p:cNvPr id="23" name="Straight Connector 22"/>
+            <p:cNvCxnSpPr>
+              <a:stCxn id="14" idx="1"/>
+            </p:cNvCxnSpPr>
+            <p:nvPr/>
+          </p:nvCxnSpPr>
+          <p:spPr>
+            <a:xfrm flipH="1" flipV="1">
+              <a:off x="4298409" y="1988167"/>
+              <a:ext cx="1768473" cy="15341"/>
+            </a:xfrm>
+            <a:prstGeom prst="line">
+              <a:avLst/>
+            </a:prstGeom>
+            <a:ln>
+              <a:solidFill>
+                <a:srgbClr val="414042"/>
+              </a:solidFill>
+            </a:ln>
+            <a:effectLst/>
+          </p:spPr>
+          <p:style>
+            <a:lnRef idx="2">
+              <a:schemeClr val="accent1"/>
+            </a:lnRef>
+            <a:fillRef idx="0">
+              <a:schemeClr val="accent1"/>
+            </a:fillRef>
+            <a:effectRef idx="1">
+              <a:schemeClr val="accent1"/>
+            </a:effectRef>
+            <a:fontRef idx="minor">
+              <a:schemeClr val="tx1"/>
+            </a:fontRef>
+          </p:style>
+        </p:cxnSp>
+        <p:cxnSp>
+          <p:nvCxnSpPr>
+            <p:cNvPr id="24" name="Straight Connector 23"/>
+            <p:cNvCxnSpPr>
+              <a:stCxn id="11" idx="1"/>
+            </p:cNvCxnSpPr>
+            <p:nvPr/>
+          </p:nvCxnSpPr>
+          <p:spPr>
+            <a:xfrm flipH="1" flipV="1">
+              <a:off x="6588249" y="3811829"/>
+              <a:ext cx="1662237" cy="8573"/>
+            </a:xfrm>
+            <a:prstGeom prst="line">
+              <a:avLst/>
+            </a:prstGeom>
+            <a:ln>
+              <a:solidFill>
+                <a:srgbClr val="414042"/>
+              </a:solidFill>
+            </a:ln>
+            <a:effectLst/>
+          </p:spPr>
+          <p:style>
+            <a:lnRef idx="2">
+              <a:schemeClr val="accent1"/>
+            </a:lnRef>
+            <a:fillRef idx="0">
+              <a:schemeClr val="accent1"/>
+            </a:fillRef>
+            <a:effectRef idx="1">
+              <a:schemeClr val="accent1"/>
+            </a:effectRef>
+            <a:fontRef idx="minor">
+              <a:schemeClr val="tx1"/>
+            </a:fontRef>
+          </p:style>
+        </p:cxnSp>
+        <p:cxnSp>
+          <p:nvCxnSpPr>
+            <p:cNvPr id="25" name="Straight Connector 24"/>
+            <p:cNvCxnSpPr>
+              <a:stCxn id="8" idx="1"/>
+            </p:cNvCxnSpPr>
+            <p:nvPr/>
+          </p:nvCxnSpPr>
+          <p:spPr>
+            <a:xfrm flipH="1" flipV="1">
+              <a:off x="4309608" y="3811829"/>
+              <a:ext cx="1747085" cy="3924"/>
+            </a:xfrm>
+            <a:prstGeom prst="line">
+              <a:avLst/>
+            </a:prstGeom>
+            <a:ln>
+              <a:solidFill>
+                <a:srgbClr val="414042"/>
+              </a:solidFill>
+            </a:ln>
+            <a:effectLst/>
+          </p:spPr>
+          <p:style>
+            <a:lnRef idx="2">
+              <a:schemeClr val="accent1"/>
+            </a:lnRef>
+            <a:fillRef idx="0">
+              <a:schemeClr val="accent1"/>
+            </a:fillRef>
+            <a:effectRef idx="1">
+              <a:schemeClr val="accent1"/>
+            </a:effectRef>
+            <a:fontRef idx="minor">
+              <a:schemeClr val="tx1"/>
+            </a:fontRef>
+          </p:style>
+        </p:cxnSp>
+        <p:cxnSp>
+          <p:nvCxnSpPr>
+            <p:cNvPr id="26" name="Straight Connector 25"/>
+            <p:cNvCxnSpPr>
+              <a:stCxn id="17" idx="1"/>
+            </p:cNvCxnSpPr>
+            <p:nvPr/>
+          </p:nvCxnSpPr>
+          <p:spPr>
+            <a:xfrm flipH="1" flipV="1">
+              <a:off x="2018759" y="3123124"/>
+              <a:ext cx="1758284" cy="688705"/>
+            </a:xfrm>
+            <a:prstGeom prst="line">
+              <a:avLst/>
+            </a:prstGeom>
+            <a:ln>
+              <a:solidFill>
+                <a:srgbClr val="414042"/>
+              </a:solidFill>
+            </a:ln>
+            <a:effectLst/>
+          </p:spPr>
+          <p:style>
+            <a:lnRef idx="2">
+              <a:schemeClr val="accent1"/>
+            </a:lnRef>
+            <a:fillRef idx="0">
+              <a:schemeClr val="accent1"/>
+            </a:fillRef>
+            <a:effectRef idx="1">
+              <a:schemeClr val="accent1"/>
+            </a:effectRef>
+            <a:fontRef idx="minor">
+              <a:schemeClr val="tx1"/>
+            </a:fontRef>
+          </p:style>
+        </p:cxnSp>
+      </p:grpSp>
+    </p:spTree>
+    <p:extLst>
+      <p:ext uri="{BB962C8B-B14F-4D97-AF65-F5344CB8AC3E}">
+        <p14:creationId xmlns:p14="http://schemas.microsoft.com/office/powerpoint/2010/main" val="469415979"/>
+      </p:ext>
+    </p:extLst>
+  </p:cSld>
+  <p:clrMapOvr>
+    <a:masterClrMapping/>
+  </p:clrMapOvr>
+</p:sld>
+</file>
+
+<file path=ppt/slides/slide12.xml><?xml version="1.0" encoding="utf-8"?>
+<p:sld xmlns:a="http://schemas.openxmlformats.org/drawingml/2006/main" xmlns:r="http://schemas.openxmlformats.org/officeDocument/2006/relationships" xmlns:p="http://schemas.openxmlformats.org/presentationml/2006/main">
+  <p:cSld>
+    <p:spTree>
+      <p:nvGrpSpPr>
+        <p:cNvPr id="1" name=""/>
+        <p:cNvGrpSpPr/>
+        <p:nvPr/>
+      </p:nvGrpSpPr>
+      <p:grpSpPr>
+        <a:xfrm>
+          <a:off x="0" y="0"/>
+          <a:ext cx="0" cy="0"/>
+          <a:chOff x="0" y="0"/>
+          <a:chExt cx="0" cy="0"/>
+        </a:xfrm>
+      </p:grpSpPr>
+      <p:sp>
+        <p:nvSpPr>
+          <p:cNvPr id="2" name="Title 1"/>
+          <p:cNvSpPr>
+            <a:spLocks noGrp="1"/>
+          </p:cNvSpPr>
+          <p:nvPr>
+            <p:ph type="title"/>
+          </p:nvPr>
+        </p:nvSpPr>
+        <p:spPr>
+          <a:xfrm>
+            <a:off x="838200" y="218673"/>
+            <a:ext cx="10515600" cy="1325563"/>
+          </a:xfrm>
+        </p:spPr>
+        <p:txBody>
+          <a:bodyPr/>
+          <a:lstStyle/>
+          <a:p>
+            <a:r>
+              <a:rPr lang="en-US" dirty="0" smtClean="0"/>
+              <a:t>Batch Processing</a:t>
+            </a:r>
+            <a:endParaRPr lang="en-US" dirty="0"/>
+          </a:p>
+        </p:txBody>
+      </p:sp>
+      <p:grpSp>
+        <p:nvGrpSpPr>
           <p:cNvPr id="7" name="Group 6"/>
           <p:cNvGrpSpPr/>
           <p:nvPr/>
         </p:nvGrpSpPr>
         <p:grpSpPr>
           <a:xfrm>
-            <a:off x="3671458" y="1690688"/>
-            <a:ext cx="731520" cy="835564"/>
-            <a:chOff x="444164" y="680288"/>
-            <a:chExt cx="731520" cy="835564"/>
+            <a:off x="6652303" y="3383911"/>
+            <a:ext cx="894752" cy="806035"/>
+            <a:chOff x="365197" y="709817"/>
+            <a:chExt cx="894752" cy="806035"/>
           </a:xfrm>
         </p:grpSpPr>
         <p:pic>
           <p:nvPicPr>
-            <p:cNvPr id="5" name="Picture 4"/>
+            <p:cNvPr id="21" name="Picture 20"/>
             <p:cNvPicPr>
               <a:picLocks noChangeAspect="1"/>
             </p:cNvPicPr>
@@ -3229,8 +3964,8 @@
           </p:blipFill>
           <p:spPr>
             <a:xfrm>
-              <a:off x="537534" y="680288"/>
-              <a:ext cx="544780" cy="653098"/>
+              <a:off x="540839" y="709817"/>
+              <a:ext cx="543466" cy="601994"/>
             </a:xfrm>
             <a:prstGeom prst="rect">
               <a:avLst/>
@@ -3239,14 +3974,14 @@
         </p:pic>
         <p:sp>
           <p:nvSpPr>
-            <p:cNvPr id="6" name="TextBox 5"/>
+            <p:cNvPr id="22" name="TextBox 21"/>
             <p:cNvSpPr txBox="1"/>
             <p:nvPr/>
           </p:nvSpPr>
           <p:spPr>
             <a:xfrm>
-              <a:off x="444164" y="1360220"/>
-              <a:ext cx="731520" cy="155632"/>
+              <a:off x="365197" y="1360220"/>
+              <a:ext cx="894752" cy="155632"/>
             </a:xfrm>
             <a:prstGeom prst="rect">
               <a:avLst/>
@@ -3262,26 +3997,375 @@
               <a:pPr algn="ctr"/>
               <a:r>
                 <a:rPr lang="en-US" sz="1000" b="1" dirty="0" smtClean="0"/>
-                <a:t>Amazon </a:t>
+                <a:t>Amazon</a:t>
               </a:r>
+              <a:br>
+                <a:rPr lang="en-US" sz="1000" b="1" dirty="0" smtClean="0"/>
+              </a:br>
               <a:r>
                 <a:rPr lang="en-US" sz="1000" b="1" dirty="0" err="1" smtClean="0"/>
-                <a:t>CloudFront</a:t>
+                <a:t>DynamoDB</a:t>
               </a:r>
               <a:endParaRPr lang="en-US" b="1" dirty="0"/>
             </a:p>
           </p:txBody>
         </p:sp>
       </p:grpSp>
+      <p:cxnSp>
+        <p:nvCxnSpPr>
+          <p:cNvPr id="13" name="Straight Connector 12"/>
+          <p:cNvCxnSpPr/>
+          <p:nvPr/>
+        </p:nvCxnSpPr>
+        <p:spPr>
+          <a:xfrm flipH="1" flipV="1">
+            <a:off x="3375367" y="3634529"/>
+            <a:ext cx="1122055" cy="18950"/>
+          </a:xfrm>
+          <a:prstGeom prst="line">
+            <a:avLst/>
+          </a:prstGeom>
+          <a:ln>
+            <a:solidFill>
+              <a:srgbClr val="414042"/>
+            </a:solidFill>
+          </a:ln>
+          <a:effectLst/>
+        </p:spPr>
+        <p:style>
+          <a:lnRef idx="2">
+            <a:schemeClr val="accent1"/>
+          </a:lnRef>
+          <a:fillRef idx="0">
+            <a:schemeClr val="accent1"/>
+          </a:fillRef>
+          <a:effectRef idx="1">
+            <a:schemeClr val="accent1"/>
+          </a:effectRef>
+          <a:fontRef idx="minor">
+            <a:schemeClr val="tx1"/>
+          </a:fontRef>
+        </p:style>
+      </p:cxnSp>
+      <p:cxnSp>
+        <p:nvCxnSpPr>
+          <p:cNvPr id="15" name="Straight Connector 14"/>
+          <p:cNvCxnSpPr>
+            <a:stCxn id="23" idx="1"/>
+          </p:cNvCxnSpPr>
+          <p:nvPr/>
+        </p:nvCxnSpPr>
+        <p:spPr>
+          <a:xfrm flipH="1">
+            <a:off x="2202129" y="3641106"/>
+            <a:ext cx="850764" cy="9377"/>
+          </a:xfrm>
+          <a:prstGeom prst="line">
+            <a:avLst/>
+          </a:prstGeom>
+          <a:ln>
+            <a:solidFill>
+              <a:srgbClr val="414042"/>
+            </a:solidFill>
+          </a:ln>
+          <a:effectLst/>
+        </p:spPr>
+        <p:style>
+          <a:lnRef idx="2">
+            <a:schemeClr val="accent1"/>
+          </a:lnRef>
+          <a:fillRef idx="0">
+            <a:schemeClr val="accent1"/>
+          </a:fillRef>
+          <a:effectRef idx="1">
+            <a:schemeClr val="accent1"/>
+          </a:effectRef>
+          <a:fontRef idx="minor">
+            <a:schemeClr val="tx1"/>
+          </a:fontRef>
+        </p:style>
+      </p:cxnSp>
+      <p:pic>
+        <p:nvPicPr>
+          <p:cNvPr id="28" name="Picture 27"/>
+          <p:cNvPicPr>
+            <a:picLocks noChangeAspect="1"/>
+          </p:cNvPicPr>
+          <p:nvPr/>
+        </p:nvPicPr>
+        <p:blipFill>
+          <a:blip r:embed="rId3">
+            <a:extLst>
+              <a:ext uri="{28A0092B-C50C-407E-A947-70E740481C1C}">
+                <a14:useLocalDpi xmlns:a14="http://schemas.microsoft.com/office/drawing/2010/main" val="0"/>
+              </a:ext>
+            </a:extLst>
+          </a:blip>
+          <a:stretch>
+            <a:fillRect/>
+          </a:stretch>
+        </p:blipFill>
+        <p:spPr>
+          <a:xfrm>
+            <a:off x="1680761" y="3314237"/>
+            <a:ext cx="521367" cy="625640"/>
+          </a:xfrm>
+          <a:prstGeom prst="rect">
+            <a:avLst/>
+          </a:prstGeom>
+        </p:spPr>
+      </p:pic>
+      <p:sp>
+        <p:nvSpPr>
+          <p:cNvPr id="29" name="TextBox 28"/>
+          <p:cNvSpPr txBox="1"/>
+          <p:nvPr/>
+        </p:nvSpPr>
+        <p:spPr>
+          <a:xfrm>
+            <a:off x="1575684" y="3832300"/>
+            <a:ext cx="731520" cy="215153"/>
+          </a:xfrm>
+          <a:prstGeom prst="rect">
+            <a:avLst/>
+          </a:prstGeom>
+          <a:noFill/>
+        </p:spPr>
+        <p:txBody>
+          <a:bodyPr wrap="square" lIns="0" tIns="0" rIns="0" bIns="0" rtlCol="0" anchor="t">
+            <a:noAutofit/>
+          </a:bodyPr>
+          <a:lstStyle/>
+          <a:p>
+            <a:pPr algn="ctr"/>
+            <a:r>
+              <a:rPr lang="en-US" sz="1000" b="1" smtClean="0"/>
+              <a:t/>
+            </a:r>
+            <a:br>
+              <a:rPr lang="en-US" sz="1000" b="1" smtClean="0"/>
+            </a:br>
+            <a:r>
+              <a:rPr lang="en-US" sz="1000" b="1" smtClean="0"/>
+              <a:t>S3</a:t>
+            </a:r>
+            <a:br>
+              <a:rPr lang="en-US" sz="1000" b="1" smtClean="0"/>
+            </a:br>
+            <a:r>
+              <a:rPr lang="en-US" sz="1000" b="1" smtClean="0"/>
+              <a:t>Object</a:t>
+            </a:r>
+            <a:endParaRPr lang="en-US" b="1" dirty="0"/>
+          </a:p>
+        </p:txBody>
+      </p:sp>
+      <p:pic>
+        <p:nvPicPr>
+          <p:cNvPr id="31" name="Picture 30"/>
+          <p:cNvPicPr>
+            <a:picLocks noChangeAspect="1"/>
+          </p:cNvPicPr>
+          <p:nvPr/>
+        </p:nvPicPr>
+        <p:blipFill>
+          <a:blip r:embed="rId4">
+            <a:extLst>
+              <a:ext uri="{28A0092B-C50C-407E-A947-70E740481C1C}">
+                <a14:useLocalDpi xmlns:a14="http://schemas.microsoft.com/office/drawing/2010/main" val="0"/>
+              </a:ext>
+            </a:extLst>
+          </a:blip>
+          <a:stretch>
+            <a:fillRect/>
+          </a:stretch>
+        </p:blipFill>
+        <p:spPr>
+          <a:xfrm>
+            <a:off x="8408268" y="3375362"/>
+            <a:ext cx="543639" cy="564959"/>
+          </a:xfrm>
+          <a:prstGeom prst="rect">
+            <a:avLst/>
+          </a:prstGeom>
+        </p:spPr>
+      </p:pic>
+      <p:sp>
+        <p:nvSpPr>
+          <p:cNvPr id="33" name="Rounded Rectangle 32"/>
+          <p:cNvSpPr/>
+          <p:nvPr/>
+        </p:nvSpPr>
+        <p:spPr>
+          <a:xfrm>
+            <a:off x="4483475" y="3111145"/>
+            <a:ext cx="1300228" cy="1296825"/>
+          </a:xfrm>
+          <a:prstGeom prst="roundRect">
+            <a:avLst>
+              <a:gd name="adj" fmla="val 9818"/>
+            </a:avLst>
+          </a:prstGeom>
+          <a:noFill/>
+          <a:ln w="19050">
+            <a:solidFill>
+              <a:srgbClr val="F7981F"/>
+            </a:solidFill>
+            <a:prstDash val="lgDash"/>
+          </a:ln>
+          <a:effectLst/>
+        </p:spPr>
+        <p:style>
+          <a:lnRef idx="1">
+            <a:schemeClr val="accent1"/>
+          </a:lnRef>
+          <a:fillRef idx="3">
+            <a:schemeClr val="accent1"/>
+          </a:fillRef>
+          <a:effectRef idx="2">
+            <a:schemeClr val="accent1"/>
+          </a:effectRef>
+          <a:fontRef idx="minor">
+            <a:schemeClr val="lt1"/>
+          </a:fontRef>
+        </p:style>
+        <p:txBody>
+          <a:bodyPr anchor="ctr"/>
+          <a:lstStyle/>
+          <a:p>
+            <a:pPr algn="ctr" fontAlgn="auto">
+              <a:spcBef>
+                <a:spcPts val="0"/>
+              </a:spcBef>
+              <a:spcAft>
+                <a:spcPts val="0"/>
+              </a:spcAft>
+              <a:defRPr/>
+            </a:pPr>
+            <a:endParaRPr lang="en-US" dirty="0">
+              <a:solidFill>
+                <a:schemeClr val="tx1"/>
+              </a:solidFill>
+              <a:latin typeface="Helvetica Neue"/>
+              <a:cs typeface="Helvetica Neue"/>
+            </a:endParaRPr>
+          </a:p>
+        </p:txBody>
+      </p:sp>
       <p:grpSp>
         <p:nvGrpSpPr>
-          <p:cNvPr id="10" name="Group 9"/>
+          <p:cNvPr id="38" name="Group 37"/>
           <p:cNvGrpSpPr/>
           <p:nvPr/>
         </p:nvGrpSpPr>
         <p:grpSpPr>
           <a:xfrm>
-            <a:off x="5916580" y="3488884"/>
+            <a:off x="4719730" y="3352050"/>
+            <a:ext cx="848439" cy="869759"/>
+            <a:chOff x="6162466" y="1999436"/>
+            <a:chExt cx="848439" cy="869759"/>
+          </a:xfrm>
+        </p:grpSpPr>
+        <p:pic>
+          <p:nvPicPr>
+            <p:cNvPr id="34" name="Picture 33"/>
+            <p:cNvPicPr>
+              <a:picLocks noChangeAspect="1"/>
+            </p:cNvPicPr>
+            <p:nvPr/>
+          </p:nvPicPr>
+          <p:blipFill>
+            <a:blip r:embed="rId4">
+              <a:extLst>
+                <a:ext uri="{28A0092B-C50C-407E-A947-70E740481C1C}">
+                  <a14:useLocalDpi xmlns:a14="http://schemas.microsoft.com/office/drawing/2010/main" val="0"/>
+                </a:ext>
+              </a:extLst>
+            </a:blip>
+            <a:stretch>
+              <a:fillRect/>
+            </a:stretch>
+          </p:blipFill>
+          <p:spPr>
+            <a:xfrm>
+              <a:off x="6162466" y="1999436"/>
+              <a:ext cx="543639" cy="564959"/>
+            </a:xfrm>
+            <a:prstGeom prst="rect">
+              <a:avLst/>
+            </a:prstGeom>
+          </p:spPr>
+        </p:pic>
+        <p:pic>
+          <p:nvPicPr>
+            <p:cNvPr id="35" name="Picture 34"/>
+            <p:cNvPicPr>
+              <a:picLocks noChangeAspect="1"/>
+            </p:cNvPicPr>
+            <p:nvPr/>
+          </p:nvPicPr>
+          <p:blipFill>
+            <a:blip r:embed="rId4">
+              <a:extLst>
+                <a:ext uri="{28A0092B-C50C-407E-A947-70E740481C1C}">
+                  <a14:useLocalDpi xmlns:a14="http://schemas.microsoft.com/office/drawing/2010/main" val="0"/>
+                </a:ext>
+              </a:extLst>
+            </a:blip>
+            <a:stretch>
+              <a:fillRect/>
+            </a:stretch>
+          </p:blipFill>
+          <p:spPr>
+            <a:xfrm>
+              <a:off x="6314866" y="2151836"/>
+              <a:ext cx="543639" cy="564959"/>
+            </a:xfrm>
+            <a:prstGeom prst="rect">
+              <a:avLst/>
+            </a:prstGeom>
+          </p:spPr>
+        </p:pic>
+        <p:pic>
+          <p:nvPicPr>
+            <p:cNvPr id="36" name="Picture 35"/>
+            <p:cNvPicPr>
+              <a:picLocks noChangeAspect="1"/>
+            </p:cNvPicPr>
+            <p:nvPr/>
+          </p:nvPicPr>
+          <p:blipFill>
+            <a:blip r:embed="rId4">
+              <a:extLst>
+                <a:ext uri="{28A0092B-C50C-407E-A947-70E740481C1C}">
+                  <a14:useLocalDpi xmlns:a14="http://schemas.microsoft.com/office/drawing/2010/main" val="0"/>
+                </a:ext>
+              </a:extLst>
+            </a:blip>
+            <a:stretch>
+              <a:fillRect/>
+            </a:stretch>
+          </p:blipFill>
+          <p:spPr>
+            <a:xfrm>
+              <a:off x="6467266" y="2304236"/>
+              <a:ext cx="543639" cy="564959"/>
+            </a:xfrm>
+            <a:prstGeom prst="rect">
+              <a:avLst/>
+            </a:prstGeom>
+          </p:spPr>
+        </p:pic>
+      </p:grpSp>
+      <p:grpSp>
+        <p:nvGrpSpPr>
+          <p:cNvPr id="6" name="Group 5"/>
+          <p:cNvGrpSpPr/>
+          <p:nvPr/>
+        </p:nvGrpSpPr>
+        <p:grpSpPr>
+          <a:xfrm>
+            <a:off x="2912780" y="3314237"/>
             <a:ext cx="825006" cy="836556"/>
             <a:chOff x="6022353" y="781542"/>
             <a:chExt cx="825006" cy="836556"/>
@@ -3289,14 +4373,14 @@
         </p:grpSpPr>
         <p:pic>
           <p:nvPicPr>
-            <p:cNvPr id="8" name="Picture 7"/>
+            <p:cNvPr id="23" name="Picture 22"/>
             <p:cNvPicPr>
               <a:picLocks noChangeAspect="1"/>
             </p:cNvPicPr>
             <p:nvPr/>
           </p:nvPicPr>
           <p:blipFill>
-            <a:blip r:embed="rId3">
+            <a:blip r:embed="rId5">
               <a:extLst>
                 <a:ext uri="{28A0092B-C50C-407E-A947-70E740481C1C}">
                   <a14:useLocalDpi xmlns:a14="http://schemas.microsoft.com/office/drawing/2010/main" val="0"/>
@@ -3319,7 +4403,7 @@
         </p:pic>
         <p:sp>
           <p:nvSpPr>
-            <p:cNvPr id="9" name="TextBox 8"/>
+            <p:cNvPr id="24" name="TextBox 23"/>
             <p:cNvSpPr txBox="1"/>
             <p:nvPr/>
           </p:nvSpPr>
@@ -3356,98 +4440,203 @@
           </p:txBody>
         </p:sp>
       </p:grpSp>
+      <p:cxnSp>
+        <p:nvCxnSpPr>
+          <p:cNvPr id="567" name="Straight Connector 566"/>
+          <p:cNvCxnSpPr>
+            <a:stCxn id="21" idx="1"/>
+          </p:cNvCxnSpPr>
+          <p:nvPr/>
+        </p:nvCxnSpPr>
+        <p:spPr>
+          <a:xfrm flipH="1" flipV="1">
+            <a:off x="5791088" y="3656850"/>
+            <a:ext cx="1036857" cy="28058"/>
+          </a:xfrm>
+          <a:prstGeom prst="line">
+            <a:avLst/>
+          </a:prstGeom>
+          <a:ln>
+            <a:solidFill>
+              <a:srgbClr val="414042"/>
+            </a:solidFill>
+          </a:ln>
+          <a:effectLst/>
+        </p:spPr>
+        <p:style>
+          <a:lnRef idx="2">
+            <a:schemeClr val="accent1"/>
+          </a:lnRef>
+          <a:fillRef idx="0">
+            <a:schemeClr val="accent1"/>
+          </a:fillRef>
+          <a:effectRef idx="1">
+            <a:schemeClr val="accent1"/>
+          </a:effectRef>
+          <a:fontRef idx="minor">
+            <a:schemeClr val="tx1"/>
+          </a:fontRef>
+        </p:style>
+      </p:cxnSp>
+      <p:cxnSp>
+        <p:nvCxnSpPr>
+          <p:cNvPr id="568" name="Straight Connector 567"/>
+          <p:cNvCxnSpPr>
+            <a:stCxn id="21" idx="1"/>
+          </p:cNvCxnSpPr>
+          <p:nvPr/>
+        </p:nvCxnSpPr>
+        <p:spPr>
+          <a:xfrm flipH="1">
+            <a:off x="5780058" y="3684908"/>
+            <a:ext cx="1047887" cy="222626"/>
+          </a:xfrm>
+          <a:prstGeom prst="line">
+            <a:avLst/>
+          </a:prstGeom>
+          <a:ln>
+            <a:solidFill>
+              <a:srgbClr val="414042"/>
+            </a:solidFill>
+          </a:ln>
+          <a:effectLst/>
+        </p:spPr>
+        <p:style>
+          <a:lnRef idx="2">
+            <a:schemeClr val="accent1"/>
+          </a:lnRef>
+          <a:fillRef idx="0">
+            <a:schemeClr val="accent1"/>
+          </a:fillRef>
+          <a:effectRef idx="1">
+            <a:schemeClr val="accent1"/>
+          </a:effectRef>
+          <a:fontRef idx="minor">
+            <a:schemeClr val="tx1"/>
+          </a:fontRef>
+        </p:style>
+      </p:cxnSp>
+      <p:cxnSp>
+        <p:nvCxnSpPr>
+          <p:cNvPr id="569" name="Straight Connector 568"/>
+          <p:cNvCxnSpPr>
+            <a:stCxn id="21" idx="1"/>
+          </p:cNvCxnSpPr>
+          <p:nvPr/>
+        </p:nvCxnSpPr>
+        <p:spPr>
+          <a:xfrm flipH="1" flipV="1">
+            <a:off x="5783704" y="3372452"/>
+            <a:ext cx="1044241" cy="312456"/>
+          </a:xfrm>
+          <a:prstGeom prst="line">
+            <a:avLst/>
+          </a:prstGeom>
+          <a:ln>
+            <a:solidFill>
+              <a:srgbClr val="414042"/>
+            </a:solidFill>
+          </a:ln>
+          <a:effectLst/>
+        </p:spPr>
+        <p:style>
+          <a:lnRef idx="2">
+            <a:schemeClr val="accent1"/>
+          </a:lnRef>
+          <a:fillRef idx="0">
+            <a:schemeClr val="accent1"/>
+          </a:fillRef>
+          <a:effectRef idx="1">
+            <a:schemeClr val="accent1"/>
+          </a:effectRef>
+          <a:fontRef idx="minor">
+            <a:schemeClr val="tx1"/>
+          </a:fontRef>
+        </p:style>
+      </p:cxnSp>
+      <p:cxnSp>
+        <p:nvCxnSpPr>
+          <p:cNvPr id="573" name="Straight Connector 572"/>
+          <p:cNvCxnSpPr/>
+          <p:nvPr/>
+        </p:nvCxnSpPr>
+        <p:spPr>
+          <a:xfrm flipH="1" flipV="1">
+            <a:off x="8951264" y="3675433"/>
+            <a:ext cx="1122055" cy="18950"/>
+          </a:xfrm>
+          <a:prstGeom prst="line">
+            <a:avLst/>
+          </a:prstGeom>
+          <a:ln>
+            <a:solidFill>
+              <a:srgbClr val="414042"/>
+            </a:solidFill>
+          </a:ln>
+          <a:effectLst/>
+        </p:spPr>
+        <p:style>
+          <a:lnRef idx="2">
+            <a:schemeClr val="accent1"/>
+          </a:lnRef>
+          <a:fillRef idx="0">
+            <a:schemeClr val="accent1"/>
+          </a:fillRef>
+          <a:effectRef idx="1">
+            <a:schemeClr val="accent1"/>
+          </a:effectRef>
+          <a:fontRef idx="minor">
+            <a:schemeClr val="tx1"/>
+          </a:fontRef>
+        </p:style>
+      </p:cxnSp>
+      <p:cxnSp>
+        <p:nvCxnSpPr>
+          <p:cNvPr id="574" name="Straight Connector 573"/>
+          <p:cNvCxnSpPr>
+            <a:endCxn id="21" idx="3"/>
+          </p:cNvCxnSpPr>
+          <p:nvPr/>
+        </p:nvCxnSpPr>
+        <p:spPr>
+          <a:xfrm flipH="1">
+            <a:off x="7371411" y="3684908"/>
+            <a:ext cx="1018497" cy="0"/>
+          </a:xfrm>
+          <a:prstGeom prst="line">
+            <a:avLst/>
+          </a:prstGeom>
+          <a:ln>
+            <a:solidFill>
+              <a:srgbClr val="414042"/>
+            </a:solidFill>
+          </a:ln>
+          <a:effectLst/>
+        </p:spPr>
+        <p:style>
+          <a:lnRef idx="2">
+            <a:schemeClr val="accent1"/>
+          </a:lnRef>
+          <a:fillRef idx="0">
+            <a:schemeClr val="accent1"/>
+          </a:fillRef>
+          <a:effectRef idx="1">
+            <a:schemeClr val="accent1"/>
+          </a:effectRef>
+          <a:fontRef idx="minor">
+            <a:schemeClr val="tx1"/>
+          </a:fontRef>
+        </p:style>
+      </p:cxnSp>
       <p:grpSp>
         <p:nvGrpSpPr>
-          <p:cNvPr id="13" name="Group 12"/>
+          <p:cNvPr id="8" name="Group 7"/>
           <p:cNvGrpSpPr/>
           <p:nvPr/>
         </p:nvGrpSpPr>
         <p:grpSpPr>
           <a:xfrm>
-            <a:off x="8074844" y="3519405"/>
-            <a:ext cx="894752" cy="806035"/>
-            <a:chOff x="365197" y="709817"/>
-            <a:chExt cx="894752" cy="806035"/>
-          </a:xfrm>
-        </p:grpSpPr>
-        <p:pic>
-          <p:nvPicPr>
-            <p:cNvPr id="11" name="Picture 10"/>
-            <p:cNvPicPr>
-              <a:picLocks noChangeAspect="1"/>
-            </p:cNvPicPr>
-            <p:nvPr/>
-          </p:nvPicPr>
-          <p:blipFill>
-            <a:blip r:embed="rId4">
-              <a:extLst>
-                <a:ext uri="{28A0092B-C50C-407E-A947-70E740481C1C}">
-                  <a14:useLocalDpi xmlns:a14="http://schemas.microsoft.com/office/drawing/2010/main" val="0"/>
-                </a:ext>
-              </a:extLst>
-            </a:blip>
-            <a:stretch>
-              <a:fillRect/>
-            </a:stretch>
-          </p:blipFill>
-          <p:spPr>
-            <a:xfrm>
-              <a:off x="540839" y="709817"/>
-              <a:ext cx="543466" cy="601994"/>
-            </a:xfrm>
-            <a:prstGeom prst="rect">
-              <a:avLst/>
-            </a:prstGeom>
-          </p:spPr>
-        </p:pic>
-        <p:sp>
-          <p:nvSpPr>
-            <p:cNvPr id="12" name="TextBox 11"/>
-            <p:cNvSpPr txBox="1"/>
-            <p:nvPr/>
-          </p:nvSpPr>
-          <p:spPr>
-            <a:xfrm>
-              <a:off x="365197" y="1360220"/>
-              <a:ext cx="894752" cy="155632"/>
-            </a:xfrm>
-            <a:prstGeom prst="rect">
-              <a:avLst/>
-            </a:prstGeom>
-            <a:noFill/>
-          </p:spPr>
-          <p:txBody>
-            <a:bodyPr wrap="square" lIns="0" tIns="0" rIns="0" bIns="0" rtlCol="0" anchor="t">
-              <a:noAutofit/>
-            </a:bodyPr>
-            <a:lstStyle/>
-            <a:p>
-              <a:pPr algn="ctr"/>
-              <a:r>
-                <a:rPr lang="en-US" sz="1000" b="1" dirty="0" smtClean="0"/>
-                <a:t>Amazon</a:t>
-              </a:r>
-              <a:br>
-                <a:rPr lang="en-US" sz="1000" b="1" dirty="0" smtClean="0"/>
-              </a:br>
-              <a:r>
-                <a:rPr lang="en-US" sz="1000" b="1" dirty="0" err="1" smtClean="0"/>
-                <a:t>DynamoDB</a:t>
-              </a:r>
-              <a:endParaRPr lang="en-US" b="1" dirty="0"/>
-            </a:p>
-          </p:txBody>
-        </p:sp>
-      </p:grpSp>
-      <p:grpSp>
-        <p:nvGrpSpPr>
-          <p:cNvPr id="16" name="Group 15"/>
-          <p:cNvGrpSpPr/>
-          <p:nvPr/>
-        </p:nvGrpSpPr>
-        <p:grpSpPr>
-          <a:xfrm>
-            <a:off x="5963323" y="1690688"/>
+            <a:off x="9884795" y="3372452"/>
             <a:ext cx="731520" cy="806494"/>
             <a:chOff x="2586020" y="709358"/>
             <a:chExt cx="731520" cy="806494"/>
@@ -3455,14 +4644,14 @@
         </p:grpSpPr>
         <p:pic>
           <p:nvPicPr>
-            <p:cNvPr id="14" name="Picture 13"/>
+            <p:cNvPr id="19" name="Picture 18"/>
             <p:cNvPicPr>
               <a:picLocks noChangeAspect="1"/>
             </p:cNvPicPr>
             <p:nvPr/>
           </p:nvPicPr>
           <p:blipFill>
-            <a:blip r:embed="rId5">
+            <a:blip r:embed="rId3">
               <a:extLst>
                 <a:ext uri="{28A0092B-C50C-407E-A947-70E740481C1C}">
                   <a14:useLocalDpi xmlns:a14="http://schemas.microsoft.com/office/drawing/2010/main" val="0"/>
@@ -3485,7 +4674,7 @@
         </p:pic>
         <p:sp>
           <p:nvSpPr>
-            <p:cNvPr id="15" name="TextBox 14"/>
+            <p:cNvPr id="20" name="TextBox 19"/>
             <p:cNvSpPr txBox="1"/>
             <p:nvPr/>
           </p:nvSpPr>
@@ -3522,161 +4711,18 @@
           </p:txBody>
         </p:sp>
       </p:grpSp>
-      <p:grpSp>
-        <p:nvGrpSpPr>
-          <p:cNvPr id="19" name="Group 18"/>
-          <p:cNvGrpSpPr/>
-          <p:nvPr/>
-        </p:nvGrpSpPr>
-        <p:grpSpPr>
-          <a:xfrm>
-            <a:off x="3589842" y="3499009"/>
-            <a:ext cx="894752" cy="826431"/>
-            <a:chOff x="362197" y="689421"/>
-            <a:chExt cx="894752" cy="826431"/>
-          </a:xfrm>
-        </p:grpSpPr>
-        <p:pic>
-          <p:nvPicPr>
-            <p:cNvPr id="17" name="Picture 16"/>
-            <p:cNvPicPr>
-              <a:picLocks noChangeAspect="1"/>
-            </p:cNvPicPr>
-            <p:nvPr/>
-          </p:nvPicPr>
-          <p:blipFill>
-            <a:blip r:embed="rId6">
-              <a:extLst>
-                <a:ext uri="{28A0092B-C50C-407E-A947-70E740481C1C}">
-                  <a14:useLocalDpi xmlns:a14="http://schemas.microsoft.com/office/drawing/2010/main" val="0"/>
-                </a:ext>
-              </a:extLst>
-            </a:blip>
-            <a:stretch>
-              <a:fillRect/>
-            </a:stretch>
-          </p:blipFill>
-          <p:spPr>
-            <a:xfrm>
-              <a:off x="549398" y="689421"/>
-              <a:ext cx="521366" cy="625640"/>
-            </a:xfrm>
-            <a:prstGeom prst="rect">
-              <a:avLst/>
-            </a:prstGeom>
-          </p:spPr>
-        </p:pic>
-        <p:sp>
-          <p:nvSpPr>
-            <p:cNvPr id="18" name="TextBox 17"/>
-            <p:cNvSpPr txBox="1"/>
-            <p:nvPr/>
-          </p:nvSpPr>
-          <p:spPr>
-            <a:xfrm>
-              <a:off x="362197" y="1360220"/>
-              <a:ext cx="894752" cy="155632"/>
-            </a:xfrm>
-            <a:prstGeom prst="rect">
-              <a:avLst/>
-            </a:prstGeom>
-            <a:noFill/>
-          </p:spPr>
-          <p:txBody>
-            <a:bodyPr wrap="square" lIns="0" tIns="0" rIns="0" bIns="0" rtlCol="0" anchor="t">
-              <a:noAutofit/>
-            </a:bodyPr>
-            <a:lstStyle/>
-            <a:p>
-              <a:pPr algn="ctr"/>
-              <a:r>
-                <a:rPr lang="en-US" sz="1000" b="1" dirty="0" smtClean="0"/>
-                <a:t>Amazon API Gateway*</a:t>
-              </a:r>
-              <a:endParaRPr lang="en-US" b="1" dirty="0"/>
-            </a:p>
-          </p:txBody>
-        </p:sp>
-      </p:grpSp>
-      <p:pic>
-        <p:nvPicPr>
-          <p:cNvPr id="20" name="Picture 19"/>
-          <p:cNvPicPr>
-            <a:picLocks noChangeAspect="1"/>
-          </p:cNvPicPr>
-          <p:nvPr/>
-        </p:nvPicPr>
-        <p:blipFill>
-          <a:blip r:embed="rId7">
-            <a:extLst>
-              <a:ext uri="{28A0092B-C50C-407E-A947-70E740481C1C}">
-                <a14:useLocalDpi xmlns:a14="http://schemas.microsoft.com/office/drawing/2010/main" val="0"/>
-              </a:ext>
-            </a:extLst>
-          </a:blip>
-          <a:stretch>
-            <a:fillRect/>
-          </a:stretch>
-        </p:blipFill>
-        <p:spPr>
-          <a:xfrm>
-            <a:off x="1287239" y="2757364"/>
-            <a:ext cx="731520" cy="731520"/>
-          </a:xfrm>
-          <a:prstGeom prst="rect">
-            <a:avLst/>
-          </a:prstGeom>
-        </p:spPr>
-      </p:pic>
-      <p:sp>
-        <p:nvSpPr>
-          <p:cNvPr id="21" name="TextBox 20"/>
-          <p:cNvSpPr txBox="1"/>
-          <p:nvPr/>
-        </p:nvSpPr>
-        <p:spPr>
-          <a:xfrm>
-            <a:off x="1104001" y="3589775"/>
-            <a:ext cx="1078992" cy="155448"/>
-          </a:xfrm>
-          <a:prstGeom prst="rect">
-            <a:avLst/>
-          </a:prstGeom>
-          <a:noFill/>
-        </p:spPr>
-        <p:txBody>
-          <a:bodyPr wrap="square" lIns="0" tIns="0" rIns="0" bIns="0" rtlCol="0">
-            <a:noAutofit/>
-          </a:bodyPr>
-          <a:lstStyle/>
-          <a:p>
-            <a:pPr algn="ctr"/>
-            <a:r>
-              <a:rPr lang="en-US" sz="1000" dirty="0" smtClean="0">
-                <a:latin typeface="Helvetica Neue"/>
-                <a:cs typeface="Helvetica Neue"/>
-              </a:rPr>
-              <a:t>Browser</a:t>
-            </a:r>
-            <a:endParaRPr lang="en-US" sz="1000" dirty="0">
-              <a:latin typeface="Helvetica Neue"/>
-              <a:cs typeface="Helvetica Neue"/>
-            </a:endParaRPr>
-          </a:p>
-        </p:txBody>
-      </p:sp>
       <p:cxnSp>
         <p:nvCxnSpPr>
-          <p:cNvPr id="22" name="Straight Connector 21"/>
+          <p:cNvPr id="577" name="Straight Connector 576"/>
           <p:cNvCxnSpPr>
-            <a:stCxn id="5" idx="1"/>
+            <a:endCxn id="23" idx="3"/>
           </p:cNvCxnSpPr>
           <p:nvPr/>
         </p:nvCxnSpPr>
         <p:spPr>
-          <a:xfrm flipH="1">
-            <a:off x="2034993" y="2017237"/>
-            <a:ext cx="1729835" cy="1101254"/>
+          <a:xfrm flipH="1" flipV="1">
+            <a:off x="3597674" y="3641106"/>
+            <a:ext cx="848206" cy="320292"/>
           </a:xfrm>
           <a:prstGeom prst="line">
             <a:avLst/>
@@ -3705,16 +4751,16 @@
       </p:cxnSp>
       <p:cxnSp>
         <p:nvCxnSpPr>
-          <p:cNvPr id="23" name="Straight Connector 22"/>
+          <p:cNvPr id="578" name="Straight Connector 577"/>
           <p:cNvCxnSpPr>
-            <a:stCxn id="14" idx="1"/>
+            <a:endCxn id="23" idx="3"/>
           </p:cNvCxnSpPr>
           <p:nvPr/>
         </p:nvCxnSpPr>
         <p:spPr>
-          <a:xfrm flipH="1" flipV="1">
-            <a:off x="4298409" y="1988167"/>
-            <a:ext cx="1768473" cy="15341"/>
+          <a:xfrm flipH="1">
+            <a:off x="3597674" y="3372452"/>
+            <a:ext cx="850764" cy="268654"/>
           </a:xfrm>
           <a:prstGeom prst="line">
             <a:avLst/>
@@ -3741,192 +4787,6 @@
           </a:fontRef>
         </p:style>
       </p:cxnSp>
-      <p:cxnSp>
-        <p:nvCxnSpPr>
-          <p:cNvPr id="24" name="Straight Connector 23"/>
-          <p:cNvCxnSpPr>
-            <a:stCxn id="11" idx="1"/>
-          </p:cNvCxnSpPr>
-          <p:nvPr/>
-        </p:nvCxnSpPr>
-        <p:spPr>
-          <a:xfrm flipH="1" flipV="1">
-            <a:off x="6588249" y="3811829"/>
-            <a:ext cx="1662237" cy="8573"/>
-          </a:xfrm>
-          <a:prstGeom prst="line">
-            <a:avLst/>
-          </a:prstGeom>
-          <a:ln>
-            <a:solidFill>
-              <a:srgbClr val="414042"/>
-            </a:solidFill>
-          </a:ln>
-          <a:effectLst/>
-        </p:spPr>
-        <p:style>
-          <a:lnRef idx="2">
-            <a:schemeClr val="accent1"/>
-          </a:lnRef>
-          <a:fillRef idx="0">
-            <a:schemeClr val="accent1"/>
-          </a:fillRef>
-          <a:effectRef idx="1">
-            <a:schemeClr val="accent1"/>
-          </a:effectRef>
-          <a:fontRef idx="minor">
-            <a:schemeClr val="tx1"/>
-          </a:fontRef>
-        </p:style>
-      </p:cxnSp>
-      <p:cxnSp>
-        <p:nvCxnSpPr>
-          <p:cNvPr id="25" name="Straight Connector 24"/>
-          <p:cNvCxnSpPr>
-            <a:stCxn id="8" idx="1"/>
-          </p:cNvCxnSpPr>
-          <p:nvPr/>
-        </p:nvCxnSpPr>
-        <p:spPr>
-          <a:xfrm flipH="1" flipV="1">
-            <a:off x="4309608" y="3811829"/>
-            <a:ext cx="1747085" cy="3924"/>
-          </a:xfrm>
-          <a:prstGeom prst="line">
-            <a:avLst/>
-          </a:prstGeom>
-          <a:ln>
-            <a:solidFill>
-              <a:srgbClr val="414042"/>
-            </a:solidFill>
-          </a:ln>
-          <a:effectLst/>
-        </p:spPr>
-        <p:style>
-          <a:lnRef idx="2">
-            <a:schemeClr val="accent1"/>
-          </a:lnRef>
-          <a:fillRef idx="0">
-            <a:schemeClr val="accent1"/>
-          </a:fillRef>
-          <a:effectRef idx="1">
-            <a:schemeClr val="accent1"/>
-          </a:effectRef>
-          <a:fontRef idx="minor">
-            <a:schemeClr val="tx1"/>
-          </a:fontRef>
-        </p:style>
-      </p:cxnSp>
-      <p:cxnSp>
-        <p:nvCxnSpPr>
-          <p:cNvPr id="26" name="Straight Connector 25"/>
-          <p:cNvCxnSpPr>
-            <a:stCxn id="17" idx="1"/>
-          </p:cNvCxnSpPr>
-          <p:nvPr/>
-        </p:nvCxnSpPr>
-        <p:spPr>
-          <a:xfrm flipH="1" flipV="1">
-            <a:off x="2018759" y="3123124"/>
-            <a:ext cx="1758284" cy="688705"/>
-          </a:xfrm>
-          <a:prstGeom prst="line">
-            <a:avLst/>
-          </a:prstGeom>
-          <a:ln>
-            <a:solidFill>
-              <a:srgbClr val="414042"/>
-            </a:solidFill>
-          </a:ln>
-          <a:effectLst/>
-        </p:spPr>
-        <p:style>
-          <a:lnRef idx="2">
-            <a:schemeClr val="accent1"/>
-          </a:lnRef>
-          <a:fillRef idx="0">
-            <a:schemeClr val="accent1"/>
-          </a:fillRef>
-          <a:effectRef idx="1">
-            <a:schemeClr val="accent1"/>
-          </a:effectRef>
-          <a:fontRef idx="minor">
-            <a:schemeClr val="tx1"/>
-          </a:fontRef>
-        </p:style>
-      </p:cxnSp>
-    </p:spTree>
-    <p:extLst>
-      <p:ext uri="{BB962C8B-B14F-4D97-AF65-F5344CB8AC3E}">
-        <p14:creationId xmlns:p14="http://schemas.microsoft.com/office/powerpoint/2010/main" val="469415979"/>
-      </p:ext>
-    </p:extLst>
-  </p:cSld>
-  <p:clrMapOvr>
-    <a:masterClrMapping/>
-  </p:clrMapOvr>
-</p:sld>
-</file>
-
-<file path=ppt/slides/slide12.xml><?xml version="1.0" encoding="utf-8"?>
-<p:sld xmlns:a="http://schemas.openxmlformats.org/drawingml/2006/main" xmlns:r="http://schemas.openxmlformats.org/officeDocument/2006/relationships" xmlns:p="http://schemas.openxmlformats.org/presentationml/2006/main">
-  <p:cSld>
-    <p:spTree>
-      <p:nvGrpSpPr>
-        <p:cNvPr id="1" name=""/>
-        <p:cNvGrpSpPr/>
-        <p:nvPr/>
-      </p:nvGrpSpPr>
-      <p:grpSpPr>
-        <a:xfrm>
-          <a:off x="0" y="0"/>
-          <a:ext cx="0" cy="0"/>
-          <a:chOff x="0" y="0"/>
-          <a:chExt cx="0" cy="0"/>
-        </a:xfrm>
-      </p:grpSpPr>
-      <p:sp>
-        <p:nvSpPr>
-          <p:cNvPr id="2" name="Title 1"/>
-          <p:cNvSpPr>
-            <a:spLocks noGrp="1"/>
-          </p:cNvSpPr>
-          <p:nvPr>
-            <p:ph type="title"/>
-          </p:nvPr>
-        </p:nvSpPr>
-        <p:spPr/>
-        <p:txBody>
-          <a:bodyPr/>
-          <a:lstStyle/>
-          <a:p>
-            <a:r>
-              <a:rPr lang="en-US" dirty="0" smtClean="0"/>
-              <a:t>Batch Processing</a:t>
-            </a:r>
-            <a:endParaRPr lang="en-US" dirty="0"/>
-          </a:p>
-        </p:txBody>
-      </p:sp>
-      <p:sp>
-        <p:nvSpPr>
-          <p:cNvPr id="3" name="Content Placeholder 2"/>
-          <p:cNvSpPr>
-            <a:spLocks noGrp="1"/>
-          </p:cNvSpPr>
-          <p:nvPr>
-            <p:ph idx="1"/>
-          </p:nvPr>
-        </p:nvSpPr>
-        <p:spPr/>
-        <p:txBody>
-          <a:bodyPr/>
-          <a:lstStyle/>
-          <a:p>
-            <a:endParaRPr lang="en-US"/>
-          </a:p>
-        </p:txBody>
-      </p:sp>
     </p:spTree>
     <p:extLst>
       <p:ext uri="{BB962C8B-B14F-4D97-AF65-F5344CB8AC3E}">

</xml_diff>

<commit_message>
added screens for console and manual
</commit_message>
<xml_diff>
--- a/going-serverless-2017.pptx
+++ b/going-serverless-2017.pptx
@@ -135,7 +135,7 @@
   </p:defaultTextStyle>
   <p:extLst>
     <p:ext uri="{EFAFB233-063F-42B5-8137-9DF3F51BA10A}">
-      <p15:sldGuideLst xmlns:p15="http://schemas.microsoft.com/office/powerpoint/2012/main"/>
+      <p15:sldGuideLst xmlns:p15="http://schemas.microsoft.com/office/powerpoint/2012/main" xmlns=""/>
     </p:ext>
   </p:extLst>
 </p:presentation>
@@ -974,7 +974,7 @@
   </p:clrMapOvr>
   <p:extLst mod="1">
     <p:ext uri="{DCECCB84-F9BA-43D5-87BE-67443E8EF086}">
-      <p15:sldGuideLst xmlns:p15="http://schemas.microsoft.com/office/powerpoint/2012/main">
+      <p15:sldGuideLst xmlns:p15="http://schemas.microsoft.com/office/powerpoint/2012/main" xmlns="">
         <p15:guide id="1" orient="horz" pos="792">
           <p15:clr>
             <a:srgbClr val="FBAE40"/>
@@ -1584,7 +1584,7 @@
   </p:clrMapOvr>
   <p:extLst mod="1">
     <p:ext uri="{DCECCB84-F9BA-43D5-87BE-67443E8EF086}">
-      <p15:sldGuideLst xmlns:p15="http://schemas.microsoft.com/office/powerpoint/2012/main">
+      <p15:sldGuideLst xmlns:p15="http://schemas.microsoft.com/office/powerpoint/2012/main" xmlns="">
         <p15:guide id="1" pos="6456">
           <p15:clr>
             <a:srgbClr val="FBAE40"/>
@@ -2313,7 +2313,7 @@
   </p:clrMapOvr>
   <p:extLst mod="1">
     <p:ext uri="{DCECCB84-F9BA-43D5-87BE-67443E8EF086}">
-      <p15:sldGuideLst xmlns:p15="http://schemas.microsoft.com/office/powerpoint/2012/main">
+      <p15:sldGuideLst xmlns:p15="http://schemas.microsoft.com/office/powerpoint/2012/main" xmlns="">
         <p15:guide id="1" pos="6456">
           <p15:clr>
             <a:srgbClr val="FBAE40"/>
@@ -2551,7 +2551,7 @@
   </p:clrMapOvr>
   <p:extLst>
     <p:ext uri="{DCECCB84-F9BA-43D5-87BE-67443E8EF086}">
-      <p15:sldGuideLst xmlns:p15="http://schemas.microsoft.com/office/powerpoint/2012/main"/>
+      <p15:sldGuideLst xmlns:p15="http://schemas.microsoft.com/office/powerpoint/2012/main" xmlns=""/>
     </p:ext>
   </p:extLst>
 </p:sldLayout>
@@ -2942,7 +2942,7 @@
   </p:clrMapOvr>
   <p:extLst>
     <p:ext uri="{DCECCB84-F9BA-43D5-87BE-67443E8EF086}">
-      <p15:sldGuideLst xmlns:p15="http://schemas.microsoft.com/office/powerpoint/2012/main"/>
+      <p15:sldGuideLst xmlns:p15="http://schemas.microsoft.com/office/powerpoint/2012/main" xmlns=""/>
     </p:ext>
   </p:extLst>
 </p:sldLayout>
@@ -3150,7 +3150,7 @@
   </p:clrMapOvr>
   <p:extLst>
     <p:ext uri="{DCECCB84-F9BA-43D5-87BE-67443E8EF086}">
-      <p15:sldGuideLst xmlns:p15="http://schemas.microsoft.com/office/powerpoint/2012/main"/>
+      <p15:sldGuideLst xmlns:p15="http://schemas.microsoft.com/office/powerpoint/2012/main" xmlns=""/>
     </p:ext>
   </p:extLst>
 </p:sldLayout>
@@ -3450,7 +3450,7 @@
   </p:clrMapOvr>
   <p:extLst>
     <p:ext uri="{DCECCB84-F9BA-43D5-87BE-67443E8EF086}">
-      <p15:sldGuideLst xmlns:p15="http://schemas.microsoft.com/office/powerpoint/2012/main"/>
+      <p15:sldGuideLst xmlns:p15="http://schemas.microsoft.com/office/powerpoint/2012/main" xmlns=""/>
     </p:ext>
   </p:extLst>
 </p:sldLayout>
@@ -4529,7 +4529,7 @@
   </p:txStyles>
   <p:extLst mod="1">
     <p:ext uri="{27BBF7A9-308A-43DC-89C8-2F10F3537804}">
-      <p15:sldGuideLst xmlns:p15="http://schemas.microsoft.com/office/powerpoint/2012/main">
+      <p15:sldGuideLst xmlns:p15="http://schemas.microsoft.com/office/powerpoint/2012/main" xmlns="">
         <p15:guide id="1" pos="2832">
           <p15:clr>
             <a:srgbClr val="F26B43"/>
@@ -4785,10 +4785,6 @@
             <a:r>
               <a:rPr lang="en-US" dirty="0" smtClean="0"/>
               <a:t>a closer look</a:t>
-            </a:r>
-            <a:r>
-              <a:rPr lang="en-US" dirty="0" smtClean="0"/>
-              <a:t/>
             </a:r>
             <a:br>
               <a:rPr lang="en-US" dirty="0" smtClean="0"/>
@@ -7398,7 +7394,7 @@
   <p:timing>
     <p:tnLst>
       <p:par>
-        <p:cTn id="1" dur="indefinite" restart="never" nodeType="tmRoot">
+        <p:cTn xmlns:p14="http://schemas.microsoft.com/office/powerpoint/2010/main" id="1" dur="indefinite" restart="never" nodeType="tmRoot">
           <p:childTnLst>
             <p:seq concurrent="1" nextAc="seek">
               <p:cTn id="2" dur="indefinite" nodeType="mainSeq">
@@ -7658,7 +7654,7 @@
   <p:timing>
     <p:tnLst>
       <p:par>
-        <p:cTn id="1" dur="indefinite" restart="never" nodeType="tmRoot"/>
+        <p:cTn xmlns:p14="http://schemas.microsoft.com/office/powerpoint/2010/main" id="1" dur="indefinite" restart="never" nodeType="tmRoot"/>
       </p:par>
     </p:tnLst>
   </p:timing>
@@ -7930,7 +7926,7 @@
   <p:timing>
     <p:tnLst>
       <p:par>
-        <p:cTn id="1" dur="indefinite" restart="never" nodeType="tmRoot"/>
+        <p:cTn xmlns:p14="http://schemas.microsoft.com/office/powerpoint/2010/main" id="1" dur="indefinite" restart="never" nodeType="tmRoot"/>
       </p:par>
     </p:tnLst>
   </p:timing>
@@ -8162,33 +8158,47 @@
               <a:rPr lang="en-US" dirty="0" smtClean="0"/>
               <a:t>Console</a:t>
             </a:r>
-            <a:endParaRPr lang="en-US" dirty="0"/>
-          </a:p>
-        </p:txBody>
-      </p:sp>
-      <p:sp>
-        <p:nvSpPr>
-          <p:cNvPr id="3" name="Content Placeholder 2"/>
-          <p:cNvSpPr>
-            <a:spLocks noGrp="1"/>
-          </p:cNvSpPr>
-          <p:nvPr>
-            <p:ph idx="1"/>
-          </p:nvPr>
-        </p:nvSpPr>
-        <p:spPr/>
-        <p:txBody>
-          <a:bodyPr/>
-          <a:lstStyle/>
-          <a:p>
-            <a:r>
-              <a:rPr lang="en-US" dirty="0" smtClean="0"/>
-              <a:t>STOP right now</a:t>
-            </a:r>
-            <a:endParaRPr lang="en-US" dirty="0"/>
-          </a:p>
-        </p:txBody>
-      </p:sp>
+            <a:br>
+              <a:rPr lang="en-US" dirty="0" smtClean="0"/>
+            </a:br>
+            <a:r>
+              <a:rPr lang="en-US" sz="2800" dirty="0" smtClean="0"/>
+              <a:t>just don’t</a:t>
+            </a:r>
+            <a:endParaRPr lang="en-US" sz="2800" dirty="0"/>
+          </a:p>
+        </p:txBody>
+      </p:sp>
+      <p:pic>
+        <p:nvPicPr>
+          <p:cNvPr id="5" name="Picture 4" descr="Screen Shot 2017-10-04 at 7.43.05 PM.png"/>
+          <p:cNvPicPr>
+            <a:picLocks noChangeAspect="1"/>
+          </p:cNvPicPr>
+          <p:nvPr/>
+        </p:nvPicPr>
+        <p:blipFill>
+          <a:blip r:embed="rId2">
+            <a:extLst>
+              <a:ext uri="{28A0092B-C50C-407E-A947-70E740481C1C}">
+                <a14:useLocalDpi xmlns:a14="http://schemas.microsoft.com/office/drawing/2010/main" val="0"/>
+              </a:ext>
+            </a:extLst>
+          </a:blip>
+          <a:stretch>
+            <a:fillRect/>
+          </a:stretch>
+        </p:blipFill>
+        <p:spPr>
+          <a:xfrm>
+            <a:off x="5303728" y="781420"/>
+            <a:ext cx="6364395" cy="4222750"/>
+          </a:xfrm>
+          <a:prstGeom prst="rect">
+            <a:avLst/>
+          </a:prstGeom>
+        </p:spPr>
+      </p:pic>
     </p:spTree>
     <p:extLst>
       <p:ext uri="{BB962C8B-B14F-4D97-AF65-F5344CB8AC3E}">
@@ -8238,33 +8248,41 @@
               <a:rPr lang="en-US" dirty="0" smtClean="0"/>
               <a:t>Manual</a:t>
             </a:r>
-            <a:endParaRPr lang="en-US" dirty="0"/>
-          </a:p>
-        </p:txBody>
-      </p:sp>
-      <p:sp>
-        <p:nvSpPr>
-          <p:cNvPr id="3" name="Content Placeholder 2"/>
-          <p:cNvSpPr>
-            <a:spLocks noGrp="1"/>
-          </p:cNvSpPr>
-          <p:nvPr>
-            <p:ph idx="1"/>
-          </p:nvPr>
-        </p:nvSpPr>
-        <p:spPr/>
-        <p:txBody>
-          <a:bodyPr/>
-          <a:lstStyle/>
-          <a:p>
-            <a:r>
-              <a:rPr lang="en-US" dirty="0" smtClean="0"/>
-              <a:t>Here’s an anchor to swim with</a:t>
-            </a:r>
-            <a:endParaRPr lang="en-US" dirty="0"/>
-          </a:p>
-        </p:txBody>
-      </p:sp>
+            <a:br>
+              <a:rPr lang="en-US" dirty="0" smtClean="0"/>
+            </a:br>
+            <a:r>
+              <a:rPr lang="en-US" sz="2400" dirty="0" smtClean="0"/>
+              <a:t>oh joy!</a:t>
+            </a:r>
+            <a:endParaRPr lang="en-US" sz="2400" dirty="0"/>
+          </a:p>
+        </p:txBody>
+      </p:sp>
+      <p:pic>
+        <p:nvPicPr>
+          <p:cNvPr id="5" name="Picture 4"/>
+          <p:cNvPicPr>
+            <a:picLocks noChangeAspect="1"/>
+          </p:cNvPicPr>
+          <p:nvPr/>
+        </p:nvPicPr>
+        <p:blipFill>
+          <a:blip r:embed="rId2"/>
+          <a:stretch>
+            <a:fillRect/>
+          </a:stretch>
+        </p:blipFill>
+        <p:spPr>
+          <a:xfrm>
+            <a:off x="4841875" y="559678"/>
+            <a:ext cx="7127875" cy="4750170"/>
+          </a:xfrm>
+          <a:prstGeom prst="rect">
+            <a:avLst/>
+          </a:prstGeom>
+        </p:spPr>
+      </p:pic>
     </p:spTree>
     <p:extLst>
       <p:ext uri="{BB962C8B-B14F-4D97-AF65-F5344CB8AC3E}">
@@ -8314,7 +8332,14 @@
               <a:rPr lang="en-US" dirty="0" smtClean="0"/>
               <a:t>Frameworks</a:t>
             </a:r>
-            <a:endParaRPr lang="en-US" dirty="0"/>
+            <a:br>
+              <a:rPr lang="en-US" dirty="0" smtClean="0"/>
+            </a:br>
+            <a:r>
+              <a:rPr lang="en-US" sz="2400" dirty="0" smtClean="0"/>
+              <a:t>now we’re getting somewhere</a:t>
+            </a:r>
+            <a:endParaRPr lang="en-US" sz="2400" dirty="0"/>
           </a:p>
         </p:txBody>
       </p:sp>
@@ -9273,7 +9298,6 @@
               <a:rPr lang="en-US" dirty="0" smtClean="0"/>
               <a:t>No servers to provision</a:t>
             </a:r>
-            <a:endParaRPr lang="en-US" dirty="0" smtClean="0"/>
           </a:p>
           <a:p>
             <a:r>
@@ -9323,7 +9347,7 @@
   <p:timing>
     <p:tnLst>
       <p:par>
-        <p:cTn id="1" dur="indefinite" restart="never" nodeType="tmRoot"/>
+        <p:cTn xmlns:p14="http://schemas.microsoft.com/office/powerpoint/2010/main" id="1" dur="indefinite" restart="never" nodeType="tmRoot"/>
       </p:par>
     </p:tnLst>
   </p:timing>
@@ -9373,12 +9397,12 @@
     </a:clrScheme>
     <a:fontScheme name="Headlines">
       <a:majorFont>
-        <a:latin typeface="Century Schoolbook" panose="02040604050505020304"/>
+        <a:latin typeface="Century Schoolbook"/>
         <a:ea typeface=""/>
         <a:cs typeface=""/>
       </a:majorFont>
       <a:minorFont>
-        <a:latin typeface="Corbel" panose="020B0503020204020204"/>
+        <a:latin typeface="Corbel"/>
         <a:ea typeface=""/>
         <a:cs typeface=""/>
       </a:minorFont>
@@ -9511,7 +9535,7 @@
   <a:extraClrSchemeLst/>
   <a:extLst>
     <a:ext uri="{05A4C25C-085E-4340-85A3-A5531E510DB2}">
-      <thm15:themeFamily xmlns:thm15="http://schemas.microsoft.com/office/thememl/2012/main" name="Headlines" id="{3841520A-25F2-4EB8-BE4C-611DB5ABEED9}" vid="{ECD25A4C-D97E-4C12-84B1-63580BFFAEEB}"/>
+      <thm15:themeFamily xmlns:thm15="http://schemas.microsoft.com/office/thememl/2012/main" xmlns="" name="Headlines" id="{3841520A-25F2-4EB8-BE4C-611DB5ABEED9}" vid="{ECD25A4C-D97E-4C12-84B1-63580BFFAEEB}"/>
     </a:ext>
   </a:extLst>
 </a:theme>
@@ -9560,7 +9584,7 @@
     </a:clrScheme>
     <a:fontScheme name="Office">
       <a:majorFont>
-        <a:latin typeface="Calibri Light" panose="020F0302020204030204"/>
+        <a:latin typeface="Calibri Light"/>
         <a:ea typeface=""/>
         <a:cs typeface=""/>
         <a:font script="Jpan" typeface="Yu Gothic Light"/>
@@ -9595,7 +9619,7 @@
         <a:font script="Geor" typeface="Sylfaen"/>
       </a:majorFont>
       <a:minorFont>
-        <a:latin typeface="Calibri" panose="020F0502020204030204"/>
+        <a:latin typeface="Calibri"/>
         <a:ea typeface=""/>
         <a:cs typeface=""/>
         <a:font script="Jpan" typeface="Yu Gothic"/>
@@ -9772,7 +9796,7 @@
   <a:extraClrSchemeLst/>
   <a:extLst>
     <a:ext uri="{05A4C25C-085E-4340-85A3-A5531E510DB2}">
-      <thm15:themeFamily xmlns:thm15="http://schemas.microsoft.com/office/thememl/2012/main" name="Office Theme" id="{62F939B6-93AF-4DB8-9C6B-D6C7DFDC589F}" vid="{4A3C46E8-61CC-4603-A589-7422A47A8E4A}"/>
+      <thm15:themeFamily xmlns:thm15="http://schemas.microsoft.com/office/thememl/2012/main" xmlns="" name="Office Theme" id="{62F939B6-93AF-4DB8-9C6B-D6C7DFDC589F}" vid="{4A3C46E8-61CC-4603-A589-7422A47A8E4A}"/>
     </a:ext>
   </a:extLst>
 </a:theme>

</xml_diff>

<commit_message>
rearranged cost and patterns, added fix to lambda container screen.
</commit_message>
<xml_diff>
--- a/going-serverless-2017.pptx
+++ b/going-serverless-2017.pptx
@@ -5,7 +5,7 @@
     <p:sldMasterId id="2147484390" r:id="rId1"/>
   </p:sldMasterIdLst>
   <p:notesMasterIdLst>
-    <p:notesMasterId r:id="rId30"/>
+    <p:notesMasterId r:id="rId31"/>
   </p:notesMasterIdLst>
   <p:sldIdLst>
     <p:sldId id="256" r:id="rId2"/>
@@ -13,29 +13,30 @@
     <p:sldId id="258" r:id="rId4"/>
     <p:sldId id="261" r:id="rId5"/>
     <p:sldId id="259" r:id="rId6"/>
-    <p:sldId id="260" r:id="rId7"/>
-    <p:sldId id="279" r:id="rId8"/>
-    <p:sldId id="280" r:id="rId9"/>
-    <p:sldId id="274" r:id="rId10"/>
-    <p:sldId id="290" r:id="rId11"/>
-    <p:sldId id="288" r:id="rId12"/>
+    <p:sldId id="292" r:id="rId7"/>
+    <p:sldId id="260" r:id="rId8"/>
+    <p:sldId id="279" r:id="rId9"/>
+    <p:sldId id="280" r:id="rId10"/>
+    <p:sldId id="274" r:id="rId11"/>
+    <p:sldId id="290" r:id="rId12"/>
     <p:sldId id="276" r:id="rId13"/>
     <p:sldId id="283" r:id="rId14"/>
     <p:sldId id="284" r:id="rId15"/>
     <p:sldId id="285" r:id="rId16"/>
     <p:sldId id="286" r:id="rId17"/>
     <p:sldId id="287" r:id="rId18"/>
-    <p:sldId id="277" r:id="rId19"/>
-    <p:sldId id="278" r:id="rId20"/>
-    <p:sldId id="273" r:id="rId21"/>
-    <p:sldId id="275" r:id="rId22"/>
-    <p:sldId id="263" r:id="rId23"/>
-    <p:sldId id="269" r:id="rId24"/>
-    <p:sldId id="270" r:id="rId25"/>
-    <p:sldId id="271" r:id="rId26"/>
-    <p:sldId id="291" r:id="rId27"/>
-    <p:sldId id="289" r:id="rId28"/>
-    <p:sldId id="272" r:id="rId29"/>
+    <p:sldId id="288" r:id="rId19"/>
+    <p:sldId id="277" r:id="rId20"/>
+    <p:sldId id="278" r:id="rId21"/>
+    <p:sldId id="273" r:id="rId22"/>
+    <p:sldId id="275" r:id="rId23"/>
+    <p:sldId id="263" r:id="rId24"/>
+    <p:sldId id="269" r:id="rId25"/>
+    <p:sldId id="270" r:id="rId26"/>
+    <p:sldId id="271" r:id="rId27"/>
+    <p:sldId id="291" r:id="rId28"/>
+    <p:sldId id="289" r:id="rId29"/>
+    <p:sldId id="272" r:id="rId30"/>
   </p:sldIdLst>
   <p:sldSz cx="12192000" cy="6858000"/>
   <p:notesSz cx="6858000" cy="9144000"/>
@@ -136,7 +137,18 @@
   </p:defaultTextStyle>
   <p:extLst>
     <p:ext uri="{EFAFB233-063F-42B5-8137-9DF3F51BA10A}">
-      <p15:sldGuideLst xmlns:p15="http://schemas.microsoft.com/office/powerpoint/2012/main" xmlns=""/>
+      <p15:sldGuideLst xmlns:p15="http://schemas.microsoft.com/office/powerpoint/2012/main">
+        <p15:guide id="1" orient="horz" pos="2160">
+          <p15:clr>
+            <a:srgbClr val="A4A3A4"/>
+          </p15:clr>
+        </p15:guide>
+        <p15:guide id="2" pos="3840">
+          <p15:clr>
+            <a:srgbClr val="A4A3A4"/>
+          </p15:clr>
+        </p15:guide>
+      </p15:sldGuideLst>
     </p:ext>
   </p:extLst>
 </p:presentation>
@@ -224,7 +236,7 @@
           <a:p>
             <a:fld id="{B2C8C884-D63D-5646-A586-52C29EA0F3E1}" type="datetimeFigureOut">
               <a:rPr lang="en-US" smtClean="0"/>
-              <a:t>10/4/17</a:t>
+              <a:t>10/5/17</a:t>
             </a:fld>
             <a:endParaRPr lang="en-US"/>
           </a:p>
@@ -859,7 +871,7 @@
           <a:p>
             <a:fld id="{5163F177-63D5-7643-99DD-EE07EEE1E644}" type="datetimeFigureOut">
               <a:rPr lang="en-US" smtClean="0"/>
-              <a:t>10/4/17</a:t>
+              <a:t>10/5/17</a:t>
             </a:fld>
             <a:endParaRPr lang="en-US"/>
           </a:p>
@@ -975,7 +987,7 @@
   </p:clrMapOvr>
   <p:extLst mod="1">
     <p:ext uri="{DCECCB84-F9BA-43D5-87BE-67443E8EF086}">
-      <p15:sldGuideLst xmlns:p15="http://schemas.microsoft.com/office/powerpoint/2012/main" xmlns="">
+      <p15:sldGuideLst xmlns:p15="http://schemas.microsoft.com/office/powerpoint/2012/main">
         <p15:guide id="1" orient="horz" pos="792">
           <p15:clr>
             <a:srgbClr val="FBAE40"/>
@@ -1101,7 +1113,7 @@
           <a:p>
             <a:fld id="{5163F177-63D5-7643-99DD-EE07EEE1E644}" type="datetimeFigureOut">
               <a:rPr lang="en-US" smtClean="0"/>
-              <a:t>10/4/17</a:t>
+              <a:t>10/5/17</a:t>
             </a:fld>
             <a:endParaRPr lang="en-US"/>
           </a:p>
@@ -1482,7 +1494,7 @@
           <a:p>
             <a:fld id="{5163F177-63D5-7643-99DD-EE07EEE1E644}" type="datetimeFigureOut">
               <a:rPr lang="en-US" smtClean="0"/>
-              <a:t>10/4/17</a:t>
+              <a:t>10/5/17</a:t>
             </a:fld>
             <a:endParaRPr lang="en-US"/>
           </a:p>
@@ -1585,7 +1597,7 @@
   </p:clrMapOvr>
   <p:extLst mod="1">
     <p:ext uri="{DCECCB84-F9BA-43D5-87BE-67443E8EF086}">
-      <p15:sldGuideLst xmlns:p15="http://schemas.microsoft.com/office/powerpoint/2012/main" xmlns="">
+      <p15:sldGuideLst xmlns:p15="http://schemas.microsoft.com/office/powerpoint/2012/main">
         <p15:guide id="1" pos="6456">
           <p15:clr>
             <a:srgbClr val="FBAE40"/>
@@ -1706,7 +1718,7 @@
           <a:p>
             <a:fld id="{5163F177-63D5-7643-99DD-EE07EEE1E644}" type="datetimeFigureOut">
               <a:rPr lang="en-US" smtClean="0"/>
-              <a:t>10/4/17</a:t>
+              <a:t>10/5/17</a:t>
             </a:fld>
             <a:endParaRPr lang="en-US"/>
           </a:p>
@@ -2192,7 +2204,7 @@
           <a:p>
             <a:fld id="{5163F177-63D5-7643-99DD-EE07EEE1E644}" type="datetimeFigureOut">
               <a:rPr lang="en-US" smtClean="0"/>
-              <a:t>10/4/17</a:t>
+              <a:t>10/5/17</a:t>
             </a:fld>
             <a:endParaRPr lang="en-US"/>
           </a:p>
@@ -2314,7 +2326,7 @@
   </p:clrMapOvr>
   <p:extLst mod="1">
     <p:ext uri="{DCECCB84-F9BA-43D5-87BE-67443E8EF086}">
-      <p15:sldGuideLst xmlns:p15="http://schemas.microsoft.com/office/powerpoint/2012/main" xmlns="">
+      <p15:sldGuideLst xmlns:p15="http://schemas.microsoft.com/office/powerpoint/2012/main">
         <p15:guide id="1" pos="6456">
           <p15:clr>
             <a:srgbClr val="FBAE40"/>
@@ -2497,7 +2509,7 @@
           <a:p>
             <a:fld id="{5163F177-63D5-7643-99DD-EE07EEE1E644}" type="datetimeFigureOut">
               <a:rPr lang="en-US" smtClean="0"/>
-              <a:t>10/4/17</a:t>
+              <a:t>10/5/17</a:t>
             </a:fld>
             <a:endParaRPr lang="en-US"/>
           </a:p>
@@ -2552,7 +2564,7 @@
   </p:clrMapOvr>
   <p:extLst>
     <p:ext uri="{DCECCB84-F9BA-43D5-87BE-67443E8EF086}">
-      <p15:sldGuideLst xmlns:p15="http://schemas.microsoft.com/office/powerpoint/2012/main" xmlns=""/>
+      <p15:sldGuideLst xmlns:p15="http://schemas.microsoft.com/office/powerpoint/2012/main"/>
     </p:ext>
   </p:extLst>
 </p:sldLayout>
@@ -2888,7 +2900,7 @@
           <a:p>
             <a:fld id="{5163F177-63D5-7643-99DD-EE07EEE1E644}" type="datetimeFigureOut">
               <a:rPr lang="en-US" smtClean="0"/>
-              <a:t>10/4/17</a:t>
+              <a:t>10/5/17</a:t>
             </a:fld>
             <a:endParaRPr lang="en-US"/>
           </a:p>
@@ -2943,7 +2955,7 @@
   </p:clrMapOvr>
   <p:extLst>
     <p:ext uri="{DCECCB84-F9BA-43D5-87BE-67443E8EF086}">
-      <p15:sldGuideLst xmlns:p15="http://schemas.microsoft.com/office/powerpoint/2012/main" xmlns=""/>
+      <p15:sldGuideLst xmlns:p15="http://schemas.microsoft.com/office/powerpoint/2012/main"/>
     </p:ext>
   </p:extLst>
 </p:sldLayout>
@@ -3006,7 +3018,7 @@
           <a:p>
             <a:fld id="{5163F177-63D5-7643-99DD-EE07EEE1E644}" type="datetimeFigureOut">
               <a:rPr lang="en-US" smtClean="0"/>
-              <a:t>10/4/17</a:t>
+              <a:t>10/5/17</a:t>
             </a:fld>
             <a:endParaRPr lang="en-US"/>
           </a:p>
@@ -3096,7 +3108,7 @@
           <a:p>
             <a:fld id="{5163F177-63D5-7643-99DD-EE07EEE1E644}" type="datetimeFigureOut">
               <a:rPr lang="en-US" smtClean="0"/>
-              <a:t>10/4/17</a:t>
+              <a:t>10/5/17</a:t>
             </a:fld>
             <a:endParaRPr lang="en-US"/>
           </a:p>
@@ -3151,7 +3163,7 @@
   </p:clrMapOvr>
   <p:extLst>
     <p:ext uri="{DCECCB84-F9BA-43D5-87BE-67443E8EF086}">
-      <p15:sldGuideLst xmlns:p15="http://schemas.microsoft.com/office/powerpoint/2012/main" xmlns=""/>
+      <p15:sldGuideLst xmlns:p15="http://schemas.microsoft.com/office/powerpoint/2012/main"/>
     </p:ext>
   </p:extLst>
 </p:sldLayout>
@@ -3396,7 +3408,7 @@
           <a:p>
             <a:fld id="{5163F177-63D5-7643-99DD-EE07EEE1E644}" type="datetimeFigureOut">
               <a:rPr lang="en-US" smtClean="0"/>
-              <a:t>10/4/17</a:t>
+              <a:t>10/5/17</a:t>
             </a:fld>
             <a:endParaRPr lang="en-US"/>
           </a:p>
@@ -3451,7 +3463,7 @@
   </p:clrMapOvr>
   <p:extLst>
     <p:ext uri="{DCECCB84-F9BA-43D5-87BE-67443E8EF086}">
-      <p15:sldGuideLst xmlns:p15="http://schemas.microsoft.com/office/powerpoint/2012/main" xmlns=""/>
+      <p15:sldGuideLst xmlns:p15="http://schemas.microsoft.com/office/powerpoint/2012/main"/>
     </p:ext>
   </p:extLst>
 </p:sldLayout>
@@ -3661,7 +3673,7 @@
           <a:p>
             <a:fld id="{5163F177-63D5-7643-99DD-EE07EEE1E644}" type="datetimeFigureOut">
               <a:rPr lang="en-US" smtClean="0"/>
-              <a:t>10/4/17</a:t>
+              <a:t>10/5/17</a:t>
             </a:fld>
             <a:endParaRPr lang="en-US"/>
           </a:p>
@@ -4074,7 +4086,7 @@
           <a:p>
             <a:fld id="{5163F177-63D5-7643-99DD-EE07EEE1E644}" type="datetimeFigureOut">
               <a:rPr lang="en-US" smtClean="0"/>
-              <a:t>10/4/17</a:t>
+              <a:t>10/5/17</a:t>
             </a:fld>
             <a:endParaRPr lang="en-US"/>
           </a:p>
@@ -4530,7 +4542,7 @@
   </p:txStyles>
   <p:extLst mod="1">
     <p:ext uri="{27BBF7A9-308A-43DC-89C8-2F10F3537804}">
-      <p15:sldGuideLst xmlns:p15="http://schemas.microsoft.com/office/powerpoint/2012/main" xmlns="">
+      <p15:sldGuideLst xmlns:p15="http://schemas.microsoft.com/office/powerpoint/2012/main">
         <p15:guide id="1" pos="2832">
           <p15:clr>
             <a:srgbClr val="F26B43"/>
@@ -4681,11 +4693,8 @@
           <a:p>
             <a:r>
               <a:rPr lang="en-US" dirty="0" smtClean="0"/>
-              <a:t>Cost</a:t>
-            </a:r>
-            <a:br>
-              <a:rPr lang="en-US" dirty="0" smtClean="0"/>
-            </a:br>
+              <a:t>Managed</a:t>
+            </a:r>
             <a:endParaRPr lang="en-US" dirty="0"/>
           </a:p>
         </p:txBody>
@@ -4702,30 +4711,50 @@
         </p:nvSpPr>
         <p:spPr/>
         <p:txBody>
-          <a:bodyPr>
-            <a:normAutofit/>
-          </a:bodyPr>
+          <a:bodyPr/>
           <a:lstStyle/>
           <a:p>
             <a:r>
               <a:rPr lang="en-US" dirty="0" smtClean="0"/>
-              <a:t>Pay for usage</a:t>
-            </a:r>
-          </a:p>
-          <a:p>
-            <a:r>
-              <a:rPr lang="en-US" dirty="0" smtClean="0"/>
-              <a:t>Pay for capacity</a:t>
-            </a:r>
-          </a:p>
-          <a:p>
-            <a:r>
-              <a:rPr lang="en-US" dirty="0" smtClean="0"/>
-              <a:t>No need </a:t>
-            </a:r>
-            <a:r>
-              <a:rPr lang="en-US" smtClean="0"/>
-              <a:t>to over-provision</a:t>
+              <a:t>No runtimes to install</a:t>
+            </a:r>
+          </a:p>
+          <a:p>
+            <a:r>
+              <a:rPr lang="en-US" dirty="0" smtClean="0"/>
+              <a:t>No servers to provision</a:t>
+            </a:r>
+          </a:p>
+          <a:p>
+            <a:r>
+              <a:rPr lang="en-US" dirty="0" smtClean="0"/>
+              <a:t>No “</a:t>
+            </a:r>
+            <a:r>
+              <a:rPr lang="en-US" dirty="0" err="1" smtClean="0"/>
+              <a:t>INFRAopps</a:t>
+            </a:r>
+            <a:r>
+              <a:rPr lang="en-US" dirty="0" smtClean="0"/>
+              <a:t>”</a:t>
+            </a:r>
+          </a:p>
+          <a:p>
+            <a:r>
+              <a:rPr lang="en-US" dirty="0" smtClean="0"/>
+              <a:t>No logging setup</a:t>
+            </a:r>
+          </a:p>
+          <a:p>
+            <a:r>
+              <a:rPr lang="en-US" dirty="0" smtClean="0"/>
+              <a:t>Data replication</a:t>
+            </a:r>
+          </a:p>
+          <a:p>
+            <a:r>
+              <a:rPr lang="en-US" dirty="0" smtClean="0"/>
+              <a:t>Etc.</a:t>
             </a:r>
             <a:endParaRPr lang="en-US" dirty="0"/>
           </a:p>
@@ -4734,13 +4763,20 @@
     </p:spTree>
     <p:extLst>
       <p:ext uri="{BB962C8B-B14F-4D97-AF65-F5344CB8AC3E}">
-        <p14:creationId xmlns:p14="http://schemas.microsoft.com/office/powerpoint/2010/main" val="712143592"/>
+        <p14:creationId xmlns:p14="http://schemas.microsoft.com/office/powerpoint/2010/main" val="902979938"/>
       </p:ext>
     </p:extLst>
   </p:cSld>
   <p:clrMapOvr>
     <a:masterClrMapping/>
   </p:clrMapOvr>
+  <p:timing>
+    <p:tnLst>
+      <p:par>
+        <p:cTn id="1" dur="indefinite" restart="never" nodeType="tmRoot"/>
+      </p:par>
+    </p:tnLst>
+  </p:timing>
 </p:sld>
 </file>
 
@@ -4783,13 +4819,6 @@
             <a:br>
               <a:rPr lang="en-US" dirty="0" smtClean="0"/>
             </a:br>
-            <a:r>
-              <a:rPr lang="en-US" dirty="0" smtClean="0"/>
-              <a:t>a closer look</a:t>
-            </a:r>
-            <a:br>
-              <a:rPr lang="en-US" dirty="0" smtClean="0"/>
-            </a:br>
             <a:endParaRPr lang="en-US" dirty="0"/>
           </a:p>
         </p:txBody>
@@ -4807,143 +4836,30 @@
         <p:spPr/>
         <p:txBody>
           <a:bodyPr>
-            <a:normAutofit fontScale="92500" lnSpcReduction="10000"/>
+            <a:normAutofit/>
           </a:bodyPr>
           <a:lstStyle/>
           <a:p>
             <a:r>
               <a:rPr lang="en-US" dirty="0" smtClean="0"/>
-              <a:t>Lambda</a:t>
-            </a:r>
-          </a:p>
-          <a:p>
-            <a:pPr lvl="1"/>
-            <a:r>
-              <a:rPr lang="en-US" dirty="0" smtClean="0"/>
-              <a:t>Free tier (1 million requests)</a:t>
-            </a:r>
-          </a:p>
-          <a:p>
-            <a:pPr lvl="1"/>
-            <a:r>
-              <a:rPr lang="en-US" dirty="0">
-                <a:hlinkClick r:id="rId2"/>
-              </a:rPr>
-              <a:t>https://aws.amazon.com/lambda/pricing</a:t>
-            </a:r>
-            <a:r>
-              <a:rPr lang="en-US" dirty="0" smtClean="0">
-                <a:hlinkClick r:id="rId2"/>
-              </a:rPr>
-              <a:t>/</a:t>
-            </a:r>
-            <a:endParaRPr lang="en-US" dirty="0" smtClean="0"/>
-          </a:p>
-          <a:p>
-            <a:r>
-              <a:rPr lang="en-US" dirty="0" smtClean="0"/>
-              <a:t>API Gateway</a:t>
-            </a:r>
-          </a:p>
-          <a:p>
-            <a:pPr lvl="1"/>
-            <a:r>
-              <a:rPr lang="en-US" dirty="0" smtClean="0"/>
-              <a:t>$3.50 per million API calls + data transfer</a:t>
-            </a:r>
-          </a:p>
-          <a:p>
-            <a:pPr lvl="1"/>
-            <a:r>
-              <a:rPr lang="en-US" dirty="0" smtClean="0"/>
-              <a:t>$0.09 / GB for the first 10 TB</a:t>
-            </a:r>
-          </a:p>
-          <a:p>
-            <a:pPr lvl="1"/>
-            <a:r>
-              <a:rPr lang="en-US" dirty="0">
-                <a:hlinkClick r:id="rId3"/>
-              </a:rPr>
-              <a:t>https://aws.amazon.com/api-gateway/pricing</a:t>
-            </a:r>
-            <a:r>
-              <a:rPr lang="en-US" dirty="0" smtClean="0">
-                <a:hlinkClick r:id="rId3"/>
-              </a:rPr>
-              <a:t>/</a:t>
-            </a:r>
-            <a:endParaRPr lang="en-US" dirty="0" smtClean="0"/>
-          </a:p>
-          <a:p>
-            <a:r>
-              <a:rPr lang="en-US" dirty="0" smtClean="0"/>
-              <a:t>S3</a:t>
-            </a:r>
-          </a:p>
-          <a:p>
-            <a:pPr lvl="1"/>
-            <a:r>
-              <a:rPr lang="en-US" dirty="0" smtClean="0"/>
-              <a:t>$0.023 / GB for the first 50TB per month</a:t>
-            </a:r>
-          </a:p>
-          <a:p>
-            <a:pPr lvl="1"/>
-            <a:r>
-              <a:rPr lang="en-US" dirty="0">
-                <a:hlinkClick r:id="rId4"/>
-              </a:rPr>
-              <a:t>https://aws.amazon.com/s3/pricing</a:t>
-            </a:r>
-            <a:r>
-              <a:rPr lang="en-US" dirty="0" smtClean="0">
-                <a:hlinkClick r:id="rId4"/>
-              </a:rPr>
-              <a:t>/</a:t>
-            </a:r>
-            <a:endParaRPr lang="en-US" dirty="0" smtClean="0"/>
-          </a:p>
-          <a:p>
-            <a:r>
-              <a:rPr lang="en-US" dirty="0" err="1" smtClean="0"/>
-              <a:t>DynamoDB</a:t>
-            </a:r>
-            <a:endParaRPr lang="en-US" dirty="0" smtClean="0"/>
-          </a:p>
-          <a:p>
-            <a:pPr lvl="1"/>
-            <a:r>
-              <a:rPr lang="en-US" dirty="0" smtClean="0"/>
-              <a:t>Free tier (200 million requests per month: 25 read/25 write, 25GB of storage)</a:t>
-            </a:r>
-          </a:p>
-          <a:p>
-            <a:pPr lvl="1"/>
-            <a:r>
-              <a:rPr lang="en-US" dirty="0"/>
-              <a:t>https://</a:t>
-            </a:r>
-            <a:r>
-              <a:rPr lang="en-US" dirty="0" err="1"/>
-              <a:t>aws.amazon.com</a:t>
-            </a:r>
-            <a:r>
-              <a:rPr lang="en-US" dirty="0"/>
-              <a:t>/</a:t>
-            </a:r>
-            <a:r>
-              <a:rPr lang="en-US" dirty="0" err="1"/>
-              <a:t>dynamodb</a:t>
-            </a:r>
-            <a:r>
-              <a:rPr lang="en-US" dirty="0"/>
-              <a:t>/pricing/</a:t>
-            </a:r>
-            <a:endParaRPr lang="en-US" dirty="0" smtClean="0"/>
-          </a:p>
-          <a:p>
-            <a:pPr lvl="1"/>
+              <a:t>Pay for usage</a:t>
+            </a:r>
+          </a:p>
+          <a:p>
+            <a:r>
+              <a:rPr lang="en-US" dirty="0" smtClean="0"/>
+              <a:t>Pay for capacity</a:t>
+            </a:r>
+          </a:p>
+          <a:p>
+            <a:r>
+              <a:rPr lang="en-US" dirty="0" smtClean="0"/>
+              <a:t>No need </a:t>
+            </a:r>
+            <a:r>
+              <a:rPr lang="en-US" smtClean="0"/>
+              <a:t>to over-provision</a:t>
+            </a:r>
             <a:endParaRPr lang="en-US" dirty="0"/>
           </a:p>
         </p:txBody>
@@ -4951,7 +4867,7 @@
     </p:spTree>
     <p:extLst>
       <p:ext uri="{BB962C8B-B14F-4D97-AF65-F5344CB8AC3E}">
-        <p14:creationId xmlns:p14="http://schemas.microsoft.com/office/powerpoint/2010/main" val="460504530"/>
+        <p14:creationId xmlns:p14="http://schemas.microsoft.com/office/powerpoint/2010/main" val="712143592"/>
       </p:ext>
     </p:extLst>
   </p:cSld>
@@ -6966,18 +6882,246 @@
           <a:lstStyle/>
           <a:p>
             <a:r>
-              <a:rPr lang="en-US" dirty="0" smtClean="0"/>
-              <a:t>Lambda </a:t>
-            </a:r>
-            <a:r>
-              <a:rPr lang="mr-IN" dirty="0" smtClean="0"/>
-              <a:t>–</a:t>
-            </a:r>
-            <a:r>
-              <a:rPr lang="en-US" dirty="0" smtClean="0"/>
-              <a:t> what it really looks like</a:t>
-            </a:r>
+              <a:rPr lang="en-US" smtClean="0"/>
+              <a:t>AWS Cost</a:t>
+            </a:r>
+            <a:r>
+              <a:rPr lang="en-US" dirty="0" smtClean="0"/>
+              <a:t/>
+            </a:r>
+            <a:br>
+              <a:rPr lang="en-US" dirty="0" smtClean="0"/>
+            </a:br>
+            <a:r>
+              <a:rPr lang="en-US" sz="2400" dirty="0" smtClean="0"/>
+              <a:t>a closer look</a:t>
+            </a:r>
+            <a:r>
+              <a:rPr lang="en-US" dirty="0" smtClean="0"/>
+              <a:t/>
+            </a:r>
+            <a:br>
+              <a:rPr lang="en-US" dirty="0" smtClean="0"/>
+            </a:br>
             <a:endParaRPr lang="en-US" dirty="0"/>
+          </a:p>
+        </p:txBody>
+      </p:sp>
+      <p:sp>
+        <p:nvSpPr>
+          <p:cNvPr id="3" name="Content Placeholder 2"/>
+          <p:cNvSpPr>
+            <a:spLocks noGrp="1"/>
+          </p:cNvSpPr>
+          <p:nvPr>
+            <p:ph idx="1"/>
+          </p:nvPr>
+        </p:nvSpPr>
+        <p:spPr/>
+        <p:txBody>
+          <a:bodyPr>
+            <a:normAutofit fontScale="92500" lnSpcReduction="10000"/>
+          </a:bodyPr>
+          <a:lstStyle/>
+          <a:p>
+            <a:r>
+              <a:rPr lang="en-US" dirty="0" smtClean="0"/>
+              <a:t>Lambda</a:t>
+            </a:r>
+          </a:p>
+          <a:p>
+            <a:pPr lvl="1"/>
+            <a:r>
+              <a:rPr lang="en-US" dirty="0" smtClean="0"/>
+              <a:t>Free tier (1 million requests)</a:t>
+            </a:r>
+          </a:p>
+          <a:p>
+            <a:pPr lvl="1"/>
+            <a:r>
+              <a:rPr lang="en-US" dirty="0">
+                <a:hlinkClick r:id="rId2"/>
+              </a:rPr>
+              <a:t>https://aws.amazon.com/lambda/pricing</a:t>
+            </a:r>
+            <a:r>
+              <a:rPr lang="en-US" dirty="0" smtClean="0">
+                <a:hlinkClick r:id="rId2"/>
+              </a:rPr>
+              <a:t>/</a:t>
+            </a:r>
+            <a:endParaRPr lang="en-US" dirty="0" smtClean="0"/>
+          </a:p>
+          <a:p>
+            <a:r>
+              <a:rPr lang="en-US" dirty="0" smtClean="0"/>
+              <a:t>API Gateway</a:t>
+            </a:r>
+          </a:p>
+          <a:p>
+            <a:pPr lvl="1"/>
+            <a:r>
+              <a:rPr lang="en-US" dirty="0" smtClean="0"/>
+              <a:t>$3.50 per million API calls + data transfer</a:t>
+            </a:r>
+          </a:p>
+          <a:p>
+            <a:pPr lvl="1"/>
+            <a:r>
+              <a:rPr lang="en-US" dirty="0" smtClean="0"/>
+              <a:t>$0.09 / GB for the first 10 TB</a:t>
+            </a:r>
+          </a:p>
+          <a:p>
+            <a:pPr lvl="1"/>
+            <a:r>
+              <a:rPr lang="en-US" dirty="0">
+                <a:hlinkClick r:id="rId3"/>
+              </a:rPr>
+              <a:t>https://aws.amazon.com/api-gateway/pricing</a:t>
+            </a:r>
+            <a:r>
+              <a:rPr lang="en-US" dirty="0" smtClean="0">
+                <a:hlinkClick r:id="rId3"/>
+              </a:rPr>
+              <a:t>/</a:t>
+            </a:r>
+            <a:endParaRPr lang="en-US" dirty="0" smtClean="0"/>
+          </a:p>
+          <a:p>
+            <a:r>
+              <a:rPr lang="en-US" dirty="0" smtClean="0"/>
+              <a:t>S3</a:t>
+            </a:r>
+          </a:p>
+          <a:p>
+            <a:pPr lvl="1"/>
+            <a:r>
+              <a:rPr lang="en-US" dirty="0" smtClean="0"/>
+              <a:t>$0.023 / GB for the first 50TB per month</a:t>
+            </a:r>
+          </a:p>
+          <a:p>
+            <a:pPr lvl="1"/>
+            <a:r>
+              <a:rPr lang="en-US" dirty="0">
+                <a:hlinkClick r:id="rId4"/>
+              </a:rPr>
+              <a:t>https://aws.amazon.com/s3/pricing</a:t>
+            </a:r>
+            <a:r>
+              <a:rPr lang="en-US" dirty="0" smtClean="0">
+                <a:hlinkClick r:id="rId4"/>
+              </a:rPr>
+              <a:t>/</a:t>
+            </a:r>
+            <a:endParaRPr lang="en-US" dirty="0" smtClean="0"/>
+          </a:p>
+          <a:p>
+            <a:r>
+              <a:rPr lang="en-US" dirty="0" err="1" smtClean="0"/>
+              <a:t>DynamoDB</a:t>
+            </a:r>
+            <a:endParaRPr lang="en-US" dirty="0" smtClean="0"/>
+          </a:p>
+          <a:p>
+            <a:pPr lvl="1"/>
+            <a:r>
+              <a:rPr lang="en-US" dirty="0" smtClean="0"/>
+              <a:t>Free tier (200 million requests per month: 25 read/25 write, 25GB of storage)</a:t>
+            </a:r>
+          </a:p>
+          <a:p>
+            <a:pPr lvl="1"/>
+            <a:r>
+              <a:rPr lang="en-US" dirty="0"/>
+              <a:t>https://</a:t>
+            </a:r>
+            <a:r>
+              <a:rPr lang="en-US" dirty="0" err="1"/>
+              <a:t>aws.amazon.com</a:t>
+            </a:r>
+            <a:r>
+              <a:rPr lang="en-US" dirty="0"/>
+              <a:t>/</a:t>
+            </a:r>
+            <a:r>
+              <a:rPr lang="en-US" dirty="0" err="1"/>
+              <a:t>dynamodb</a:t>
+            </a:r>
+            <a:r>
+              <a:rPr lang="en-US" dirty="0"/>
+              <a:t>/pricing/</a:t>
+            </a:r>
+            <a:endParaRPr lang="en-US" dirty="0" smtClean="0"/>
+          </a:p>
+          <a:p>
+            <a:pPr lvl="1"/>
+            <a:endParaRPr lang="en-US" dirty="0"/>
+          </a:p>
+        </p:txBody>
+      </p:sp>
+    </p:spTree>
+    <p:extLst>
+      <p:ext uri="{BB962C8B-B14F-4D97-AF65-F5344CB8AC3E}">
+        <p14:creationId xmlns:p14="http://schemas.microsoft.com/office/powerpoint/2010/main" val="460504530"/>
+      </p:ext>
+    </p:extLst>
+  </p:cSld>
+  <p:clrMapOvr>
+    <a:masterClrMapping/>
+  </p:clrMapOvr>
+</p:sld>
+</file>
+
+<file path=ppt/slides/slide19.xml><?xml version="1.0" encoding="utf-8"?>
+<p:sld xmlns:a="http://schemas.openxmlformats.org/drawingml/2006/main" xmlns:r="http://schemas.openxmlformats.org/officeDocument/2006/relationships" xmlns:p="http://schemas.openxmlformats.org/presentationml/2006/main">
+  <p:cSld>
+    <p:spTree>
+      <p:nvGrpSpPr>
+        <p:cNvPr id="1" name=""/>
+        <p:cNvGrpSpPr/>
+        <p:nvPr/>
+      </p:nvGrpSpPr>
+      <p:grpSpPr>
+        <a:xfrm>
+          <a:off x="0" y="0"/>
+          <a:ext cx="0" cy="0"/>
+          <a:chOff x="0" y="0"/>
+          <a:chExt cx="0" cy="0"/>
+        </a:xfrm>
+      </p:grpSpPr>
+      <p:sp>
+        <p:nvSpPr>
+          <p:cNvPr id="2" name="Title 1"/>
+          <p:cNvSpPr>
+            <a:spLocks noGrp="1"/>
+          </p:cNvSpPr>
+          <p:nvPr>
+            <p:ph type="title"/>
+          </p:nvPr>
+        </p:nvSpPr>
+        <p:spPr/>
+        <p:txBody>
+          <a:bodyPr/>
+          <a:lstStyle/>
+          <a:p>
+            <a:r>
+              <a:rPr lang="en-US" dirty="0" smtClean="0"/>
+              <a:t>Lambda</a:t>
+            </a:r>
+            <a:br>
+              <a:rPr lang="en-US" dirty="0" smtClean="0"/>
+            </a:br>
+            <a:r>
+              <a:rPr lang="en-US" sz="2400" dirty="0" smtClean="0"/>
+              <a:t>what </a:t>
+            </a:r>
+            <a:r>
+              <a:rPr lang="en-US" sz="2400" dirty="0" smtClean="0"/>
+              <a:t>it really looks like</a:t>
+            </a:r>
+            <a:endParaRPr lang="en-US" sz="2400" dirty="0"/>
           </a:p>
         </p:txBody>
       </p:sp>
@@ -7395,7 +7539,7 @@
   <p:timing>
     <p:tnLst>
       <p:par>
-        <p:cTn xmlns:p14="http://schemas.microsoft.com/office/powerpoint/2010/main" id="1" dur="indefinite" restart="never" nodeType="tmRoot">
+        <p:cTn id="1" dur="indefinite" restart="never" nodeType="tmRoot">
           <p:childTnLst>
             <p:seq concurrent="1" nextAc="seek">
               <p:cTn id="2" dur="indefinite" nodeType="mainSeq">
@@ -7560,108 +7704,6 @@
 </p:sld>
 </file>
 
-<file path=ppt/slides/slide19.xml><?xml version="1.0" encoding="utf-8"?>
-<p:sld xmlns:a="http://schemas.openxmlformats.org/drawingml/2006/main" xmlns:r="http://schemas.openxmlformats.org/officeDocument/2006/relationships" xmlns:p="http://schemas.openxmlformats.org/presentationml/2006/main">
-  <p:cSld>
-    <p:spTree>
-      <p:nvGrpSpPr>
-        <p:cNvPr id="1" name=""/>
-        <p:cNvGrpSpPr/>
-        <p:nvPr/>
-      </p:nvGrpSpPr>
-      <p:grpSpPr>
-        <a:xfrm>
-          <a:off x="0" y="0"/>
-          <a:ext cx="0" cy="0"/>
-          <a:chOff x="0" y="0"/>
-          <a:chExt cx="0" cy="0"/>
-        </a:xfrm>
-      </p:grpSpPr>
-      <p:sp>
-        <p:nvSpPr>
-          <p:cNvPr id="2" name="Title 1"/>
-          <p:cNvSpPr>
-            <a:spLocks noGrp="1"/>
-          </p:cNvSpPr>
-          <p:nvPr>
-            <p:ph type="title"/>
-          </p:nvPr>
-        </p:nvSpPr>
-        <p:spPr/>
-        <p:txBody>
-          <a:bodyPr/>
-          <a:lstStyle/>
-          <a:p>
-            <a:r>
-              <a:rPr lang="en-US" dirty="0" smtClean="0"/>
-              <a:t>Versioning</a:t>
-            </a:r>
-            <a:endParaRPr lang="en-US" dirty="0"/>
-          </a:p>
-        </p:txBody>
-      </p:sp>
-      <p:sp>
-        <p:nvSpPr>
-          <p:cNvPr id="3" name="Content Placeholder 2"/>
-          <p:cNvSpPr>
-            <a:spLocks noGrp="1"/>
-          </p:cNvSpPr>
-          <p:nvPr>
-            <p:ph idx="1"/>
-          </p:nvPr>
-        </p:nvSpPr>
-        <p:spPr/>
-        <p:txBody>
-          <a:bodyPr/>
-          <a:lstStyle/>
-          <a:p>
-            <a:r>
-              <a:rPr lang="en-US" dirty="0" smtClean="0"/>
-              <a:t>Lambda </a:t>
-            </a:r>
-            <a:r>
-              <a:rPr lang="mr-IN" dirty="0" smtClean="0"/>
-              <a:t>–</a:t>
-            </a:r>
-            <a:r>
-              <a:rPr lang="en-US" dirty="0" smtClean="0"/>
-              <a:t> different versions of a function</a:t>
-            </a:r>
-          </a:p>
-          <a:p>
-            <a:pPr lvl="1"/>
-            <a:r>
-              <a:rPr lang="en-US" dirty="0" smtClean="0"/>
-              <a:t>Think A/B testing, </a:t>
-            </a:r>
-            <a:r>
-              <a:rPr lang="en-US" smtClean="0"/>
-              <a:t>or Blue/Green deployment</a:t>
-            </a:r>
-            <a:endParaRPr lang="en-US" dirty="0"/>
-          </a:p>
-        </p:txBody>
-      </p:sp>
-    </p:spTree>
-    <p:extLst>
-      <p:ext uri="{BB962C8B-B14F-4D97-AF65-F5344CB8AC3E}">
-        <p14:creationId xmlns:p14="http://schemas.microsoft.com/office/powerpoint/2010/main" val="1532791319"/>
-      </p:ext>
-    </p:extLst>
-  </p:cSld>
-  <p:clrMapOvr>
-    <a:masterClrMapping/>
-  </p:clrMapOvr>
-  <p:timing>
-    <p:tnLst>
-      <p:par>
-        <p:cTn xmlns:p14="http://schemas.microsoft.com/office/powerpoint/2010/main" id="1" dur="indefinite" restart="never" nodeType="tmRoot"/>
-      </p:par>
-    </p:tnLst>
-  </p:timing>
-</p:sld>
-</file>
-
 <file path=ppt/slides/slide2.xml><?xml version="1.0" encoding="utf-8"?>
 <p:sld xmlns:a="http://schemas.openxmlformats.org/drawingml/2006/main" xmlns:r="http://schemas.openxmlformats.org/officeDocument/2006/relationships" xmlns:p="http://schemas.openxmlformats.org/presentationml/2006/main">
   <p:cSld>
@@ -7812,7 +7854,7 @@
           <a:p>
             <a:r>
               <a:rPr lang="en-US" dirty="0" smtClean="0"/>
-              <a:t>Lambda scaling</a:t>
+              <a:t>Versioning</a:t>
             </a:r>
             <a:endParaRPr lang="en-US" dirty="0"/>
           </a:p>
@@ -7830,9 +7872,7 @@
         </p:nvSpPr>
         <p:spPr/>
         <p:txBody>
-          <a:bodyPr>
-            <a:normAutofit/>
-          </a:bodyPr>
+          <a:bodyPr/>
           <a:lstStyle/>
           <a:p>
             <a:r>
@@ -7845,70 +7885,18 @@
             </a:r>
             <a:r>
               <a:rPr lang="en-US" dirty="0" smtClean="0"/>
-              <a:t> on a unit of work</a:t>
+              <a:t> different versions of a function</a:t>
             </a:r>
           </a:p>
           <a:p>
             <a:pPr lvl="1"/>
             <a:r>
               <a:rPr lang="en-US" dirty="0" smtClean="0"/>
-              <a:t>Streaming source types</a:t>
-            </a:r>
-          </a:p>
-          <a:p>
-            <a:pPr lvl="1"/>
-            <a:r>
-              <a:rPr lang="en-US" dirty="0" smtClean="0"/>
-              <a:t>Synchronous source types</a:t>
-            </a:r>
-          </a:p>
-          <a:p>
-            <a:pPr lvl="1"/>
-            <a:r>
-              <a:rPr lang="en-US" dirty="0" smtClean="0"/>
-              <a:t>(</a:t>
-            </a:r>
-            <a:r>
-              <a:rPr lang="en-US" dirty="0" smtClean="0">
-                <a:hlinkClick r:id="rId2"/>
-              </a:rPr>
-              <a:t>https://cloudncode.blog/2017/03/02/best-practices-aws-lambda-function/)</a:t>
-            </a:r>
-            <a:endParaRPr lang="en-US" dirty="0" smtClean="0"/>
-          </a:p>
-          <a:p>
-            <a:pPr lvl="1"/>
-            <a:r>
-              <a:rPr lang="en-US" dirty="0" smtClean="0"/>
-              <a:t>Concurrent Invocations = events (or requests) per second * function duration (in secs)</a:t>
-            </a:r>
-          </a:p>
-          <a:p>
-            <a:pPr lvl="1"/>
-            <a:r>
-              <a:rPr lang="en-US" dirty="0" smtClean="0"/>
-              <a:t>(</a:t>
-            </a:r>
-            <a:r>
-              <a:rPr lang="en-US" dirty="0" smtClean="0">
-                <a:hlinkClick r:id="rId3"/>
-              </a:rPr>
-              <a:t>http://docs.aws.amazon.com/lambda/latest/dg/concurrent-executions.html)</a:t>
-            </a:r>
-            <a:endParaRPr lang="en-US" dirty="0" smtClean="0"/>
-          </a:p>
-          <a:p>
-            <a:pPr lvl="1"/>
-            <a:r>
-              <a:rPr lang="en-US" dirty="0" smtClean="0"/>
-              <a:t>1000 concurrent limit</a:t>
-            </a:r>
-          </a:p>
-          <a:p>
-            <a:pPr lvl="1"/>
-            <a:r>
-              <a:rPr lang="en-US" dirty="0" smtClean="0"/>
-              <a:t>Kinesis work around (pricey)</a:t>
+              <a:t>Think A/B testing, </a:t>
+            </a:r>
+            <a:r>
+              <a:rPr lang="en-US" smtClean="0"/>
+              <a:t>or Blue/Green deployment</a:t>
             </a:r>
             <a:endParaRPr lang="en-US" dirty="0"/>
           </a:p>
@@ -7917,7 +7905,7 @@
     </p:spTree>
     <p:extLst>
       <p:ext uri="{BB962C8B-B14F-4D97-AF65-F5344CB8AC3E}">
-        <p14:creationId xmlns:p14="http://schemas.microsoft.com/office/powerpoint/2010/main" val="1998115011"/>
+        <p14:creationId xmlns:p14="http://schemas.microsoft.com/office/powerpoint/2010/main" val="1532791319"/>
       </p:ext>
     </p:extLst>
   </p:cSld>
@@ -7927,7 +7915,7 @@
   <p:timing>
     <p:tnLst>
       <p:par>
-        <p:cTn xmlns:p14="http://schemas.microsoft.com/office/powerpoint/2010/main" id="1" dur="indefinite" restart="never" nodeType="tmRoot"/>
+        <p:cTn id="1" dur="indefinite" restart="never" nodeType="tmRoot"/>
       </p:par>
     </p:tnLst>
   </p:timing>
@@ -7968,7 +7956,7 @@
           <a:p>
             <a:r>
               <a:rPr lang="en-US" dirty="0" smtClean="0"/>
-              <a:t>Services</a:t>
+              <a:t>Lambda scaling</a:t>
             </a:r>
             <a:endParaRPr lang="en-US" dirty="0"/>
           </a:p>
@@ -7986,38 +7974,85 @@
         </p:nvSpPr>
         <p:spPr/>
         <p:txBody>
-          <a:bodyPr/>
+          <a:bodyPr>
+            <a:normAutofit/>
+          </a:bodyPr>
           <a:lstStyle/>
           <a:p>
             <a:r>
-              <a:rPr lang="en-US" dirty="0" err="1" smtClean="0"/>
-              <a:t>Cognito</a:t>
+              <a:rPr lang="en-US" dirty="0" smtClean="0"/>
+              <a:t>Lambda </a:t>
+            </a:r>
+            <a:r>
+              <a:rPr lang="mr-IN" dirty="0" smtClean="0"/>
+              <a:t>–</a:t>
+            </a:r>
+            <a:r>
+              <a:rPr lang="en-US" dirty="0" smtClean="0"/>
+              <a:t> on a unit of work</a:t>
+            </a:r>
+          </a:p>
+          <a:p>
+            <a:pPr lvl="1"/>
+            <a:r>
+              <a:rPr lang="en-US" dirty="0" smtClean="0"/>
+              <a:t>Streaming source types</a:t>
+            </a:r>
+          </a:p>
+          <a:p>
+            <a:pPr lvl="1"/>
+            <a:r>
+              <a:rPr lang="en-US" dirty="0" smtClean="0"/>
+              <a:t>Synchronous source types</a:t>
+            </a:r>
+          </a:p>
+          <a:p>
+            <a:pPr lvl="1"/>
+            <a:r>
+              <a:rPr lang="en-US" dirty="0" smtClean="0"/>
+              <a:t>(</a:t>
+            </a:r>
+            <a:r>
+              <a:rPr lang="en-US" dirty="0" smtClean="0">
+                <a:hlinkClick r:id="rId2"/>
+              </a:rPr>
+              <a:t>https://cloudncode.blog/2017/03/02/best-practices-aws-lambda-function/)</a:t>
             </a:r>
             <a:endParaRPr lang="en-US" dirty="0" smtClean="0"/>
           </a:p>
           <a:p>
-            <a:r>
-              <a:rPr lang="en-US" dirty="0" smtClean="0"/>
-              <a:t>S3</a:t>
-            </a:r>
-          </a:p>
-          <a:p>
-            <a:r>
-              <a:rPr lang="en-US" dirty="0" smtClean="0"/>
-              <a:t>SNS</a:t>
-            </a:r>
-          </a:p>
-          <a:p>
-            <a:r>
-              <a:rPr lang="en-US" dirty="0" err="1" smtClean="0"/>
-              <a:t>Kinises</a:t>
+            <a:pPr lvl="1"/>
+            <a:r>
+              <a:rPr lang="en-US" dirty="0" smtClean="0"/>
+              <a:t>Concurrent Invocations = events (or requests) per second * function duration (in secs)</a:t>
+            </a:r>
+          </a:p>
+          <a:p>
+            <a:pPr lvl="1"/>
+            <a:r>
+              <a:rPr lang="en-US" dirty="0" smtClean="0"/>
+              <a:t>(</a:t>
+            </a:r>
+            <a:r>
+              <a:rPr lang="en-US" dirty="0" smtClean="0">
+                <a:hlinkClick r:id="rId3"/>
+              </a:rPr>
+              <a:t>http://docs.aws.amazon.com/lambda/latest/dg/concurrent-executions.html)</a:t>
             </a:r>
             <a:endParaRPr lang="en-US" dirty="0" smtClean="0"/>
           </a:p>
           <a:p>
-            <a:r>
-              <a:rPr lang="en-US" dirty="0" smtClean="0"/>
-              <a:t>Etc..</a:t>
+            <a:pPr lvl="1"/>
+            <a:r>
+              <a:rPr lang="en-US" dirty="0" smtClean="0"/>
+              <a:t>1000 concurrent limit</a:t>
+            </a:r>
+          </a:p>
+          <a:p>
+            <a:pPr lvl="1"/>
+            <a:r>
+              <a:rPr lang="en-US" dirty="0" smtClean="0"/>
+              <a:t>Kinesis work around (pricey)</a:t>
             </a:r>
             <a:endParaRPr lang="en-US" dirty="0"/>
           </a:p>
@@ -8026,13 +8061,20 @@
     </p:spTree>
     <p:extLst>
       <p:ext uri="{BB962C8B-B14F-4D97-AF65-F5344CB8AC3E}">
-        <p14:creationId xmlns:p14="http://schemas.microsoft.com/office/powerpoint/2010/main" val="2036119871"/>
+        <p14:creationId xmlns:p14="http://schemas.microsoft.com/office/powerpoint/2010/main" val="1998115011"/>
       </p:ext>
     </p:extLst>
   </p:cSld>
   <p:clrMapOvr>
     <a:masterClrMapping/>
   </p:clrMapOvr>
+  <p:timing>
+    <p:tnLst>
+      <p:par>
+        <p:cTn id="1" dur="indefinite" restart="never" nodeType="tmRoot"/>
+      </p:par>
+    </p:tnLst>
+  </p:timing>
 </p:sld>
 </file>
 
@@ -8070,6 +8112,108 @@
           <a:p>
             <a:r>
               <a:rPr lang="en-US" dirty="0" smtClean="0"/>
+              <a:t>Services</a:t>
+            </a:r>
+            <a:endParaRPr lang="en-US" dirty="0"/>
+          </a:p>
+        </p:txBody>
+      </p:sp>
+      <p:sp>
+        <p:nvSpPr>
+          <p:cNvPr id="3" name="Content Placeholder 2"/>
+          <p:cNvSpPr>
+            <a:spLocks noGrp="1"/>
+          </p:cNvSpPr>
+          <p:nvPr>
+            <p:ph idx="1"/>
+          </p:nvPr>
+        </p:nvSpPr>
+        <p:spPr/>
+        <p:txBody>
+          <a:bodyPr/>
+          <a:lstStyle/>
+          <a:p>
+            <a:r>
+              <a:rPr lang="en-US" dirty="0" err="1" smtClean="0"/>
+              <a:t>Cognito</a:t>
+            </a:r>
+            <a:endParaRPr lang="en-US" dirty="0" smtClean="0"/>
+          </a:p>
+          <a:p>
+            <a:r>
+              <a:rPr lang="en-US" dirty="0" smtClean="0"/>
+              <a:t>S3</a:t>
+            </a:r>
+          </a:p>
+          <a:p>
+            <a:r>
+              <a:rPr lang="en-US" dirty="0" smtClean="0"/>
+              <a:t>SNS</a:t>
+            </a:r>
+          </a:p>
+          <a:p>
+            <a:r>
+              <a:rPr lang="en-US" dirty="0" err="1" smtClean="0"/>
+              <a:t>Kinises</a:t>
+            </a:r>
+            <a:endParaRPr lang="en-US" dirty="0" smtClean="0"/>
+          </a:p>
+          <a:p>
+            <a:r>
+              <a:rPr lang="en-US" dirty="0" smtClean="0"/>
+              <a:t>Etc..</a:t>
+            </a:r>
+            <a:endParaRPr lang="en-US" dirty="0"/>
+          </a:p>
+        </p:txBody>
+      </p:sp>
+    </p:spTree>
+    <p:extLst>
+      <p:ext uri="{BB962C8B-B14F-4D97-AF65-F5344CB8AC3E}">
+        <p14:creationId xmlns:p14="http://schemas.microsoft.com/office/powerpoint/2010/main" val="2036119871"/>
+      </p:ext>
+    </p:extLst>
+  </p:cSld>
+  <p:clrMapOvr>
+    <a:masterClrMapping/>
+  </p:clrMapOvr>
+</p:sld>
+</file>
+
+<file path=ppt/slides/slide23.xml><?xml version="1.0" encoding="utf-8"?>
+<p:sld xmlns:a="http://schemas.openxmlformats.org/drawingml/2006/main" xmlns:r="http://schemas.openxmlformats.org/officeDocument/2006/relationships" xmlns:p="http://schemas.openxmlformats.org/presentationml/2006/main">
+  <p:cSld>
+    <p:spTree>
+      <p:nvGrpSpPr>
+        <p:cNvPr id="1" name=""/>
+        <p:cNvGrpSpPr/>
+        <p:nvPr/>
+      </p:nvGrpSpPr>
+      <p:grpSpPr>
+        <a:xfrm>
+          <a:off x="0" y="0"/>
+          <a:ext cx="0" cy="0"/>
+          <a:chOff x="0" y="0"/>
+          <a:chExt cx="0" cy="0"/>
+        </a:xfrm>
+      </p:grpSpPr>
+      <p:sp>
+        <p:nvSpPr>
+          <p:cNvPr id="2" name="Title 1"/>
+          <p:cNvSpPr>
+            <a:spLocks noGrp="1"/>
+          </p:cNvSpPr>
+          <p:nvPr>
+            <p:ph type="title"/>
+          </p:nvPr>
+        </p:nvSpPr>
+        <p:spPr/>
+        <p:txBody>
+          <a:bodyPr/>
+          <a:lstStyle/>
+          <a:p>
+            <a:r>
+              <a:rPr lang="en-US" dirty="0" smtClean="0"/>
               <a:t>How to</a:t>
             </a:r>
             <a:endParaRPr lang="en-US" dirty="0"/>
@@ -8123,7 +8267,7 @@
 </p:sld>
 </file>
 
-<file path=ppt/slides/slide23.xml><?xml version="1.0" encoding="utf-8"?>
+<file path=ppt/slides/slide24.xml><?xml version="1.0" encoding="utf-8"?>
 <p:sld xmlns:a="http://schemas.openxmlformats.org/drawingml/2006/main" xmlns:r="http://schemas.openxmlformats.org/officeDocument/2006/relationships" xmlns:p="http://schemas.openxmlformats.org/presentationml/2006/main">
   <p:cSld>
     <p:spTree>
@@ -8213,7 +8357,7 @@
 </p:sld>
 </file>
 
-<file path=ppt/slides/slide24.xml><?xml version="1.0" encoding="utf-8"?>
+<file path=ppt/slides/slide25.xml><?xml version="1.0" encoding="utf-8"?>
 <p:sld xmlns:a="http://schemas.openxmlformats.org/drawingml/2006/main" xmlns:r="http://schemas.openxmlformats.org/officeDocument/2006/relationships" xmlns:p="http://schemas.openxmlformats.org/presentationml/2006/main">
   <p:cSld>
     <p:spTree>
@@ -8297,101 +8441,6 @@
 </p:sld>
 </file>
 
-<file path=ppt/slides/slide25.xml><?xml version="1.0" encoding="utf-8"?>
-<p:sld xmlns:a="http://schemas.openxmlformats.org/drawingml/2006/main" xmlns:r="http://schemas.openxmlformats.org/officeDocument/2006/relationships" xmlns:p="http://schemas.openxmlformats.org/presentationml/2006/main">
-  <p:cSld>
-    <p:spTree>
-      <p:nvGrpSpPr>
-        <p:cNvPr id="1" name=""/>
-        <p:cNvGrpSpPr/>
-        <p:nvPr/>
-      </p:nvGrpSpPr>
-      <p:grpSpPr>
-        <a:xfrm>
-          <a:off x="0" y="0"/>
-          <a:ext cx="0" cy="0"/>
-          <a:chOff x="0" y="0"/>
-          <a:chExt cx="0" cy="0"/>
-        </a:xfrm>
-      </p:grpSpPr>
-      <p:sp>
-        <p:nvSpPr>
-          <p:cNvPr id="2" name="Title 1"/>
-          <p:cNvSpPr>
-            <a:spLocks noGrp="1"/>
-          </p:cNvSpPr>
-          <p:nvPr>
-            <p:ph type="title"/>
-          </p:nvPr>
-        </p:nvSpPr>
-        <p:spPr/>
-        <p:txBody>
-          <a:bodyPr/>
-          <a:lstStyle/>
-          <a:p>
-            <a:r>
-              <a:rPr lang="en-US" dirty="0" smtClean="0"/>
-              <a:t>Frameworks</a:t>
-            </a:r>
-            <a:br>
-              <a:rPr lang="en-US" dirty="0" smtClean="0"/>
-            </a:br>
-            <a:r>
-              <a:rPr lang="en-US" sz="2400" dirty="0" smtClean="0"/>
-              <a:t>now we’re getting somewhere</a:t>
-            </a:r>
-            <a:endParaRPr lang="en-US" sz="2400" dirty="0"/>
-          </a:p>
-        </p:txBody>
-      </p:sp>
-      <p:sp>
-        <p:nvSpPr>
-          <p:cNvPr id="3" name="Content Placeholder 2"/>
-          <p:cNvSpPr>
-            <a:spLocks noGrp="1"/>
-          </p:cNvSpPr>
-          <p:nvPr>
-            <p:ph idx="1"/>
-          </p:nvPr>
-        </p:nvSpPr>
-        <p:spPr/>
-        <p:txBody>
-          <a:bodyPr/>
-          <a:lstStyle/>
-          <a:p>
-            <a:r>
-              <a:rPr lang="en-US" dirty="0" smtClean="0"/>
-              <a:t>Apex</a:t>
-            </a:r>
-          </a:p>
-          <a:p>
-            <a:r>
-              <a:rPr lang="en-US" dirty="0" smtClean="0"/>
-              <a:t>AWS Sam</a:t>
-            </a:r>
-          </a:p>
-          <a:p>
-            <a:r>
-              <a:rPr lang="en-US" dirty="0" err="1" smtClean="0"/>
-              <a:t>Serverless</a:t>
-            </a:r>
-            <a:endParaRPr lang="en-US" dirty="0" smtClean="0"/>
-          </a:p>
-        </p:txBody>
-      </p:sp>
-    </p:spTree>
-    <p:extLst>
-      <p:ext uri="{BB962C8B-B14F-4D97-AF65-F5344CB8AC3E}">
-        <p14:creationId xmlns:p14="http://schemas.microsoft.com/office/powerpoint/2010/main" val="1115277555"/>
-      </p:ext>
-    </p:extLst>
-  </p:cSld>
-  <p:clrMapOvr>
-    <a:masterClrMapping/>
-  </p:clrMapOvr>
-</p:sld>
-</file>
-
 <file path=ppt/slides/slide26.xml><?xml version="1.0" encoding="utf-8"?>
 <p:sld xmlns:a="http://schemas.openxmlformats.org/drawingml/2006/main" xmlns:r="http://schemas.openxmlformats.org/officeDocument/2006/relationships" xmlns:p="http://schemas.openxmlformats.org/presentationml/2006/main">
   <p:cSld>
@@ -8425,100 +8474,59 @@
           <a:lstStyle/>
           <a:p>
             <a:r>
+              <a:rPr lang="en-US" dirty="0" smtClean="0"/>
+              <a:t>Frameworks</a:t>
+            </a:r>
+            <a:br>
+              <a:rPr lang="en-US" dirty="0" smtClean="0"/>
+            </a:br>
+            <a:r>
+              <a:rPr lang="en-US" sz="2400" dirty="0" smtClean="0"/>
+              <a:t>now we’re getting somewhere</a:t>
+            </a:r>
+            <a:endParaRPr lang="en-US" sz="2400" dirty="0"/>
+          </a:p>
+        </p:txBody>
+      </p:sp>
+      <p:sp>
+        <p:nvSpPr>
+          <p:cNvPr id="3" name="Content Placeholder 2"/>
+          <p:cNvSpPr>
+            <a:spLocks noGrp="1"/>
+          </p:cNvSpPr>
+          <p:nvPr>
+            <p:ph idx="1"/>
+          </p:nvPr>
+        </p:nvSpPr>
+        <p:spPr/>
+        <p:txBody>
+          <a:bodyPr/>
+          <a:lstStyle/>
+          <a:p>
+            <a:r>
+              <a:rPr lang="en-US" dirty="0" smtClean="0"/>
+              <a:t>Apex</a:t>
+            </a:r>
+          </a:p>
+          <a:p>
+            <a:r>
+              <a:rPr lang="en-US" dirty="0" smtClean="0"/>
+              <a:t>AWS Sam</a:t>
+            </a:r>
+          </a:p>
+          <a:p>
+            <a:r>
               <a:rPr lang="en-US" dirty="0" err="1" smtClean="0"/>
               <a:t>Serverless</a:t>
             </a:r>
-            <a:r>
-              <a:rPr lang="en-US" dirty="0" smtClean="0"/>
-              <a:t/>
-            </a:r>
-            <a:br>
-              <a:rPr lang="en-US" dirty="0" smtClean="0"/>
-            </a:br>
-            <a:r>
-              <a:rPr lang="en-US" sz="2400" dirty="0" smtClean="0"/>
-              <a:t>the framework</a:t>
-            </a:r>
-            <a:endParaRPr lang="en-US" sz="2400" dirty="0"/>
-          </a:p>
-        </p:txBody>
-      </p:sp>
-      <p:sp>
-        <p:nvSpPr>
-          <p:cNvPr id="3" name="Content Placeholder 2"/>
-          <p:cNvSpPr>
-            <a:spLocks noGrp="1"/>
-          </p:cNvSpPr>
-          <p:nvPr>
-            <p:ph idx="1"/>
-          </p:nvPr>
-        </p:nvSpPr>
-        <p:spPr/>
-        <p:txBody>
-          <a:bodyPr/>
-          <a:lstStyle/>
-          <a:p>
-            <a:r>
-              <a:rPr lang="en-US" dirty="0" err="1" smtClean="0"/>
-              <a:t>Serverless</a:t>
-            </a:r>
-            <a:r>
-              <a:rPr lang="en-US" dirty="0"/>
-              <a:t>: </a:t>
-            </a:r>
-            <a:r>
-              <a:rPr lang="en-US" dirty="0">
-                <a:hlinkClick r:id="rId2"/>
-              </a:rPr>
-              <a:t>https://</a:t>
-            </a:r>
-            <a:r>
-              <a:rPr lang="en-US" dirty="0" err="1">
-                <a:hlinkClick r:id="rId2"/>
-              </a:rPr>
-              <a:t>serverless.com</a:t>
-            </a:r>
             <a:endParaRPr lang="en-US" dirty="0" smtClean="0"/>
-          </a:p>
-          <a:p>
-            <a:r>
-              <a:rPr lang="en-US" dirty="0" smtClean="0"/>
-              <a:t>Works for multiple providers</a:t>
-            </a:r>
-          </a:p>
-          <a:p>
-            <a:r>
-              <a:rPr lang="en-US" dirty="0" smtClean="0"/>
-              <a:t>Works with multiple templates</a:t>
-            </a:r>
-          </a:p>
-          <a:p>
-            <a:r>
-              <a:rPr lang="en-US" dirty="0" smtClean="0"/>
-              <a:t>Very similar to cloud formation templates</a:t>
-            </a:r>
-          </a:p>
-          <a:p>
-            <a:r>
-              <a:rPr lang="en-US" dirty="0" smtClean="0"/>
-              <a:t>Sanity for the developers</a:t>
-            </a:r>
-          </a:p>
-          <a:p>
-            <a:pPr marL="0" indent="0">
-              <a:buNone/>
-            </a:pPr>
-            <a:endParaRPr lang="en-US" dirty="0" smtClean="0"/>
-          </a:p>
-          <a:p>
-            <a:endParaRPr lang="en-US" dirty="0"/>
           </a:p>
         </p:txBody>
       </p:sp>
     </p:spTree>
     <p:extLst>
       <p:ext uri="{BB962C8B-B14F-4D97-AF65-F5344CB8AC3E}">
-        <p14:creationId xmlns:p14="http://schemas.microsoft.com/office/powerpoint/2010/main" val="1124419550"/>
+        <p14:creationId xmlns:p14="http://schemas.microsoft.com/office/powerpoint/2010/main" val="1115277555"/>
       </p:ext>
     </p:extLst>
   </p:cSld>
@@ -8561,6 +8569,142 @@
           <a:lstStyle/>
           <a:p>
             <a:r>
+              <a:rPr lang="en-US" dirty="0" err="1" smtClean="0"/>
+              <a:t>Serverless</a:t>
+            </a:r>
+            <a:r>
+              <a:rPr lang="en-US" dirty="0" smtClean="0"/>
+              <a:t/>
+            </a:r>
+            <a:br>
+              <a:rPr lang="en-US" dirty="0" smtClean="0"/>
+            </a:br>
+            <a:r>
+              <a:rPr lang="en-US" sz="2400" dirty="0" smtClean="0"/>
+              <a:t>the framework</a:t>
+            </a:r>
+            <a:endParaRPr lang="en-US" sz="2400" dirty="0"/>
+          </a:p>
+        </p:txBody>
+      </p:sp>
+      <p:sp>
+        <p:nvSpPr>
+          <p:cNvPr id="3" name="Content Placeholder 2"/>
+          <p:cNvSpPr>
+            <a:spLocks noGrp="1"/>
+          </p:cNvSpPr>
+          <p:nvPr>
+            <p:ph idx="1"/>
+          </p:nvPr>
+        </p:nvSpPr>
+        <p:spPr/>
+        <p:txBody>
+          <a:bodyPr/>
+          <a:lstStyle/>
+          <a:p>
+            <a:r>
+              <a:rPr lang="en-US" dirty="0" err="1" smtClean="0"/>
+              <a:t>Serverless</a:t>
+            </a:r>
+            <a:r>
+              <a:rPr lang="en-US" dirty="0"/>
+              <a:t>: </a:t>
+            </a:r>
+            <a:r>
+              <a:rPr lang="en-US" dirty="0">
+                <a:hlinkClick r:id="rId2"/>
+              </a:rPr>
+              <a:t>https://</a:t>
+            </a:r>
+            <a:r>
+              <a:rPr lang="en-US" dirty="0" err="1">
+                <a:hlinkClick r:id="rId2"/>
+              </a:rPr>
+              <a:t>serverless.com</a:t>
+            </a:r>
+            <a:endParaRPr lang="en-US" dirty="0" smtClean="0"/>
+          </a:p>
+          <a:p>
+            <a:r>
+              <a:rPr lang="en-US" dirty="0" smtClean="0"/>
+              <a:t>Works for multiple providers</a:t>
+            </a:r>
+          </a:p>
+          <a:p>
+            <a:r>
+              <a:rPr lang="en-US" dirty="0" smtClean="0"/>
+              <a:t>Works with multiple templates</a:t>
+            </a:r>
+          </a:p>
+          <a:p>
+            <a:r>
+              <a:rPr lang="en-US" dirty="0" smtClean="0"/>
+              <a:t>Very similar to cloud formation templates</a:t>
+            </a:r>
+          </a:p>
+          <a:p>
+            <a:r>
+              <a:rPr lang="en-US" dirty="0" smtClean="0"/>
+              <a:t>Sanity for the developers</a:t>
+            </a:r>
+          </a:p>
+          <a:p>
+            <a:pPr marL="0" indent="0">
+              <a:buNone/>
+            </a:pPr>
+            <a:endParaRPr lang="en-US" dirty="0" smtClean="0"/>
+          </a:p>
+          <a:p>
+            <a:endParaRPr lang="en-US" dirty="0"/>
+          </a:p>
+        </p:txBody>
+      </p:sp>
+    </p:spTree>
+    <p:extLst>
+      <p:ext uri="{BB962C8B-B14F-4D97-AF65-F5344CB8AC3E}">
+        <p14:creationId xmlns:p14="http://schemas.microsoft.com/office/powerpoint/2010/main" val="1124419550"/>
+      </p:ext>
+    </p:extLst>
+  </p:cSld>
+  <p:clrMapOvr>
+    <a:masterClrMapping/>
+  </p:clrMapOvr>
+</p:sld>
+</file>
+
+<file path=ppt/slides/slide28.xml><?xml version="1.0" encoding="utf-8"?>
+<p:sld xmlns:a="http://schemas.openxmlformats.org/drawingml/2006/main" xmlns:r="http://schemas.openxmlformats.org/officeDocument/2006/relationships" xmlns:p="http://schemas.openxmlformats.org/presentationml/2006/main">
+  <p:cSld>
+    <p:spTree>
+      <p:nvGrpSpPr>
+        <p:cNvPr id="1" name=""/>
+        <p:cNvGrpSpPr/>
+        <p:nvPr/>
+      </p:nvGrpSpPr>
+      <p:grpSpPr>
+        <a:xfrm>
+          <a:off x="0" y="0"/>
+          <a:ext cx="0" cy="0"/>
+          <a:chOff x="0" y="0"/>
+          <a:chExt cx="0" cy="0"/>
+        </a:xfrm>
+      </p:grpSpPr>
+      <p:sp>
+        <p:nvSpPr>
+          <p:cNvPr id="2" name="Title 1"/>
+          <p:cNvSpPr>
+            <a:spLocks noGrp="1"/>
+          </p:cNvSpPr>
+          <p:nvPr>
+            <p:ph type="title"/>
+          </p:nvPr>
+        </p:nvSpPr>
+        <p:spPr/>
+        <p:txBody>
+          <a:bodyPr/>
+          <a:lstStyle/>
+          <a:p>
+            <a:r>
               <a:rPr lang="en-US" dirty="0" smtClean="0"/>
               <a:t>Additional resources</a:t>
             </a:r>
@@ -8691,7 +8835,7 @@
 </p:sld>
 </file>
 
-<file path=ppt/slides/slide28.xml><?xml version="1.0" encoding="utf-8"?>
+<file path=ppt/slides/slide29.xml><?xml version="1.0" encoding="utf-8"?>
 <p:sld xmlns:a="http://schemas.openxmlformats.org/drawingml/2006/main" xmlns:r="http://schemas.openxmlformats.org/officeDocument/2006/relationships" xmlns:p="http://schemas.openxmlformats.org/presentationml/2006/main">
   <p:cSld>
     <p:spTree>
@@ -9127,17 +9271,16 @@
           <a:p>
             <a:r>
               <a:rPr lang="en-US" dirty="0" smtClean="0"/>
-              <a:t>Why </a:t>
-            </a:r>
-            <a:r>
-              <a:rPr lang="en-US" dirty="0" err="1" smtClean="0"/>
-              <a:t>Serverless</a:t>
-            </a:r>
-            <a:r>
-              <a:rPr lang="en-US" dirty="0" smtClean="0"/>
-              <a:t> </a:t>
-            </a:r>
-            <a:endParaRPr lang="en-US" dirty="0"/>
+              <a:t>Patterns</a:t>
+            </a:r>
+            <a:br>
+              <a:rPr lang="en-US" dirty="0" smtClean="0"/>
+            </a:br>
+            <a:r>
+              <a:rPr lang="en-US" sz="2400" dirty="0" smtClean="0"/>
+              <a:t>we will see this again</a:t>
+            </a:r>
+            <a:endParaRPr lang="en-US" sz="2400" dirty="0"/>
           </a:p>
         </p:txBody>
       </p:sp>
@@ -9158,33 +9301,47 @@
           <a:p>
             <a:r>
               <a:rPr lang="en-US" dirty="0" smtClean="0"/>
-              <a:t>Scalable</a:t>
-            </a:r>
-          </a:p>
-          <a:p>
-            <a:r>
-              <a:rPr lang="en-US" dirty="0" smtClean="0"/>
-              <a:t>Managed</a:t>
-            </a:r>
-          </a:p>
-          <a:p>
-            <a:r>
-              <a:rPr lang="en-US" dirty="0" smtClean="0"/>
-              <a:t>Services</a:t>
-            </a:r>
-          </a:p>
-          <a:p>
-            <a:r>
-              <a:rPr lang="en-US" dirty="0" smtClean="0"/>
-              <a:t>Cost</a:t>
-            </a:r>
+              <a:t>3 Tier Web Application</a:t>
+            </a:r>
+          </a:p>
+          <a:p>
+            <a:r>
+              <a:rPr lang="en-US" dirty="0" smtClean="0"/>
+              <a:t>Batch Processing</a:t>
+            </a:r>
+          </a:p>
+          <a:p>
+            <a:r>
+              <a:rPr lang="en-US" dirty="0" smtClean="0"/>
+              <a:t>Stream Processing</a:t>
+            </a:r>
+          </a:p>
+          <a:p>
+            <a:r>
+              <a:rPr lang="en-US" dirty="0" smtClean="0"/>
+              <a:t>Automation</a:t>
+            </a:r>
+          </a:p>
+          <a:p>
+            <a:r>
+              <a:rPr lang="en-US" dirty="0" smtClean="0"/>
+              <a:t>And more</a:t>
+            </a:r>
+            <a:r>
+              <a:rPr lang="mr-IN" dirty="0" smtClean="0"/>
+              <a:t>…</a:t>
+            </a:r>
+            <a:endParaRPr lang="en-US" dirty="0" smtClean="0"/>
+          </a:p>
+          <a:p>
+            <a:endParaRPr lang="en-US" dirty="0"/>
           </a:p>
         </p:txBody>
       </p:sp>
     </p:spTree>
     <p:extLst>
       <p:ext uri="{BB962C8B-B14F-4D97-AF65-F5344CB8AC3E}">
-        <p14:creationId xmlns:p14="http://schemas.microsoft.com/office/powerpoint/2010/main" val="634894413"/>
+        <p14:creationId xmlns:p14="http://schemas.microsoft.com/office/powerpoint/2010/main" val="1361616562"/>
       </p:ext>
     </p:extLst>
   </p:cSld>
@@ -9228,7 +9385,15 @@
           <a:p>
             <a:r>
               <a:rPr lang="en-US" dirty="0" smtClean="0"/>
-              <a:t>What about</a:t>
+              <a:t>Why </a:t>
+            </a:r>
+            <a:r>
+              <a:rPr lang="en-US" dirty="0" err="1" smtClean="0"/>
+              <a:t>Serverless</a:t>
+            </a:r>
+            <a:r>
+              <a:rPr lang="en-US" dirty="0" smtClean="0"/>
+              <a:t> </a:t>
             </a:r>
             <a:endParaRPr lang="en-US" dirty="0"/>
           </a:p>
@@ -9251,22 +9416,33 @@
           <a:p>
             <a:r>
               <a:rPr lang="en-US" dirty="0" smtClean="0"/>
-              <a:t>Containers</a:t>
-            </a:r>
-          </a:p>
-          <a:p>
-            <a:r>
-              <a:rPr lang="en-US" dirty="0" smtClean="0"/>
-              <a:t>Micro-services</a:t>
-            </a:r>
-            <a:endParaRPr lang="en-US" dirty="0"/>
+              <a:t>Scalable</a:t>
+            </a:r>
+          </a:p>
+          <a:p>
+            <a:r>
+              <a:rPr lang="en-US" dirty="0" smtClean="0"/>
+              <a:t>Managed</a:t>
+            </a:r>
+          </a:p>
+          <a:p>
+            <a:r>
+              <a:rPr lang="en-US" dirty="0" smtClean="0"/>
+              <a:t>Services</a:t>
+            </a:r>
+          </a:p>
+          <a:p>
+            <a:r>
+              <a:rPr lang="en-US" dirty="0" smtClean="0"/>
+              <a:t>Cost</a:t>
+            </a:r>
           </a:p>
         </p:txBody>
       </p:sp>
     </p:spTree>
     <p:extLst>
       <p:ext uri="{BB962C8B-B14F-4D97-AF65-F5344CB8AC3E}">
-        <p14:creationId xmlns:p14="http://schemas.microsoft.com/office/powerpoint/2010/main" val="268825360"/>
+        <p14:creationId xmlns:p14="http://schemas.microsoft.com/office/powerpoint/2010/main" val="634894413"/>
       </p:ext>
     </p:extLst>
   </p:cSld>
@@ -9310,7 +9486,7 @@
           <a:p>
             <a:r>
               <a:rPr lang="en-US" dirty="0" smtClean="0"/>
-              <a:t>Scalable</a:t>
+              <a:t>What about</a:t>
             </a:r>
             <a:endParaRPr lang="en-US" dirty="0"/>
           </a:p>
@@ -9333,25 +9509,13 @@
           <a:p>
             <a:r>
               <a:rPr lang="en-US" dirty="0" smtClean="0"/>
-              <a:t>Auto scaling based on calls</a:t>
-            </a:r>
-          </a:p>
-          <a:p>
-            <a:r>
-              <a:rPr lang="en-US" dirty="0" smtClean="0"/>
-              <a:t>Manually scale with settings</a:t>
-            </a:r>
-          </a:p>
-          <a:p>
-            <a:r>
-              <a:rPr lang="en-US" dirty="0" smtClean="0"/>
-              <a:t>Scale units of computing instead of servers</a:t>
-            </a:r>
-          </a:p>
-          <a:p>
-            <a:r>
-              <a:rPr lang="en-US" dirty="0" smtClean="0"/>
-              <a:t>Scales back down</a:t>
+              <a:t>Containers</a:t>
+            </a:r>
+          </a:p>
+          <a:p>
+            <a:r>
+              <a:rPr lang="en-US" dirty="0" smtClean="0"/>
+              <a:t>Micro-services</a:t>
             </a:r>
             <a:endParaRPr lang="en-US" dirty="0"/>
           </a:p>
@@ -9360,7 +9524,7 @@
     </p:spTree>
     <p:extLst>
       <p:ext uri="{BB962C8B-B14F-4D97-AF65-F5344CB8AC3E}">
-        <p14:creationId xmlns:p14="http://schemas.microsoft.com/office/powerpoint/2010/main" val="498775429"/>
+        <p14:creationId xmlns:p14="http://schemas.microsoft.com/office/powerpoint/2010/main" val="268825360"/>
       </p:ext>
     </p:extLst>
   </p:cSld>
@@ -9404,7 +9568,7 @@
           <a:p>
             <a:r>
               <a:rPr lang="en-US" dirty="0" smtClean="0"/>
-              <a:t>Managed</a:t>
+              <a:t>Scalable</a:t>
             </a:r>
             <a:endParaRPr lang="en-US" dirty="0"/>
           </a:p>
@@ -9427,45 +9591,25 @@
           <a:p>
             <a:r>
               <a:rPr lang="en-US" dirty="0" smtClean="0"/>
-              <a:t>No runtimes to install</a:t>
-            </a:r>
-          </a:p>
-          <a:p>
-            <a:r>
-              <a:rPr lang="en-US" dirty="0" smtClean="0"/>
-              <a:t>No servers to provision</a:t>
-            </a:r>
-          </a:p>
-          <a:p>
-            <a:r>
-              <a:rPr lang="en-US" dirty="0" smtClean="0"/>
-              <a:t>No “</a:t>
-            </a:r>
-            <a:r>
-              <a:rPr lang="en-US" dirty="0" err="1" smtClean="0"/>
-              <a:t>INFRAopps</a:t>
-            </a:r>
-            <a:r>
-              <a:rPr lang="en-US" dirty="0" smtClean="0"/>
-              <a:t>”</a:t>
-            </a:r>
-          </a:p>
-          <a:p>
-            <a:r>
-              <a:rPr lang="en-US" dirty="0" smtClean="0"/>
-              <a:t>No logging setup</a:t>
-            </a:r>
-          </a:p>
-          <a:p>
-            <a:r>
-              <a:rPr lang="en-US" dirty="0" smtClean="0"/>
-              <a:t>Data replication</a:t>
-            </a:r>
-          </a:p>
-          <a:p>
-            <a:r>
-              <a:rPr lang="en-US" dirty="0" smtClean="0"/>
-              <a:t>Etc.</a:t>
+              <a:t>Auto scaling based on calls</a:t>
+            </a:r>
+          </a:p>
+          <a:p>
+            <a:r>
+              <a:rPr lang="en-US" dirty="0" smtClean="0"/>
+              <a:t>Manually scale with settings</a:t>
+            </a:r>
+          </a:p>
+          <a:p>
+            <a:r>
+              <a:rPr lang="en-US" dirty="0" smtClean="0"/>
+              <a:t>Scale units of computing instead of servers</a:t>
+            </a:r>
+          </a:p>
+          <a:p>
+            <a:r>
+              <a:rPr lang="en-US" dirty="0" smtClean="0"/>
+              <a:t>Scales back down</a:t>
             </a:r>
             <a:endParaRPr lang="en-US" dirty="0"/>
           </a:p>
@@ -9474,20 +9618,13 @@
     </p:spTree>
     <p:extLst>
       <p:ext uri="{BB962C8B-B14F-4D97-AF65-F5344CB8AC3E}">
-        <p14:creationId xmlns:p14="http://schemas.microsoft.com/office/powerpoint/2010/main" val="902979938"/>
+        <p14:creationId xmlns:p14="http://schemas.microsoft.com/office/powerpoint/2010/main" val="498775429"/>
       </p:ext>
     </p:extLst>
   </p:cSld>
   <p:clrMapOvr>
     <a:masterClrMapping/>
   </p:clrMapOvr>
-  <p:timing>
-    <p:tnLst>
-      <p:par>
-        <p:cTn xmlns:p14="http://schemas.microsoft.com/office/powerpoint/2010/main" id="1" dur="indefinite" restart="never" nodeType="tmRoot"/>
-      </p:par>
-    </p:tnLst>
-  </p:timing>
 </p:sld>
 </file>
 
@@ -9672,7 +9809,7 @@
   <a:extraClrSchemeLst/>
   <a:extLst>
     <a:ext uri="{05A4C25C-085E-4340-85A3-A5531E510DB2}">
-      <thm15:themeFamily xmlns:thm15="http://schemas.microsoft.com/office/thememl/2012/main" xmlns="" name="Headlines" id="{3841520A-25F2-4EB8-BE4C-611DB5ABEED9}" vid="{ECD25A4C-D97E-4C12-84B1-63580BFFAEEB}"/>
+      <thm15:themeFamily xmlns:thm15="http://schemas.microsoft.com/office/thememl/2012/main" name="Headlines" id="{3841520A-25F2-4EB8-BE4C-611DB5ABEED9}" vid="{ECD25A4C-D97E-4C12-84B1-63580BFFAEEB}"/>
     </a:ext>
   </a:extLst>
 </a:theme>
@@ -9933,7 +10070,7 @@
   <a:extraClrSchemeLst/>
   <a:extLst>
     <a:ext uri="{05A4C25C-085E-4340-85A3-A5531E510DB2}">
-      <thm15:themeFamily xmlns:thm15="http://schemas.microsoft.com/office/thememl/2012/main" xmlns="" name="Office Theme" id="{62F939B6-93AF-4DB8-9C6B-D6C7DFDC589F}" vid="{4A3C46E8-61CC-4603-A589-7422A47A8E4A}"/>
+      <thm15:themeFamily xmlns:thm15="http://schemas.microsoft.com/office/thememl/2012/main" name="Office Theme" id="{62F939B6-93AF-4DB8-9C6B-D6C7DFDC589F}" vid="{4A3C46E8-61CC-4603-A589-7422A47A8E4A}"/>
     </a:ext>
   </a:extLst>
 </a:theme>

</xml_diff>

<commit_message>
adding lambda details, red pill, rabbit hole
</commit_message>
<xml_diff>
--- a/going-serverless-2017.pptx
+++ b/going-serverless-2017.pptx
@@ -5,7 +5,7 @@
     <p:sldMasterId id="2147484390" r:id="rId1"/>
   </p:sldMasterIdLst>
   <p:notesMasterIdLst>
-    <p:notesMasterId r:id="rId31"/>
+    <p:notesMasterId r:id="rId32"/>
   </p:notesMasterIdLst>
   <p:sldIdLst>
     <p:sldId id="256" r:id="rId2"/>
@@ -26,17 +26,18 @@
     <p:sldId id="286" r:id="rId17"/>
     <p:sldId id="287" r:id="rId18"/>
     <p:sldId id="288" r:id="rId19"/>
-    <p:sldId id="277" r:id="rId20"/>
-    <p:sldId id="278" r:id="rId21"/>
-    <p:sldId id="273" r:id="rId22"/>
-    <p:sldId id="275" r:id="rId23"/>
-    <p:sldId id="263" r:id="rId24"/>
-    <p:sldId id="269" r:id="rId25"/>
-    <p:sldId id="270" r:id="rId26"/>
-    <p:sldId id="271" r:id="rId27"/>
-    <p:sldId id="291" r:id="rId28"/>
-    <p:sldId id="289" r:id="rId29"/>
-    <p:sldId id="272" r:id="rId30"/>
+    <p:sldId id="293" r:id="rId20"/>
+    <p:sldId id="277" r:id="rId21"/>
+    <p:sldId id="278" r:id="rId22"/>
+    <p:sldId id="273" r:id="rId23"/>
+    <p:sldId id="275" r:id="rId24"/>
+    <p:sldId id="263" r:id="rId25"/>
+    <p:sldId id="269" r:id="rId26"/>
+    <p:sldId id="270" r:id="rId27"/>
+    <p:sldId id="271" r:id="rId28"/>
+    <p:sldId id="291" r:id="rId29"/>
+    <p:sldId id="289" r:id="rId30"/>
+    <p:sldId id="272" r:id="rId31"/>
   </p:sldIdLst>
   <p:sldSz cx="12192000" cy="6858000"/>
   <p:notesSz cx="6858000" cy="9144000"/>
@@ -6882,7 +6883,7 @@
           <a:lstStyle/>
           <a:p>
             <a:r>
-              <a:rPr lang="en-US" smtClean="0"/>
+              <a:rPr lang="en-US" dirty="0" smtClean="0"/>
               <a:t>AWS Cost</a:t>
             </a:r>
             <a:r>
@@ -7075,6 +7076,208 @@
 </file>
 
 <file path=ppt/slides/slide19.xml><?xml version="1.0" encoding="utf-8"?>
+<p:sld xmlns:a="http://schemas.openxmlformats.org/drawingml/2006/main" xmlns:r="http://schemas.openxmlformats.org/officeDocument/2006/relationships" xmlns:p="http://schemas.openxmlformats.org/presentationml/2006/main">
+  <p:cSld>
+    <p:spTree>
+      <p:nvGrpSpPr>
+        <p:cNvPr id="1" name=""/>
+        <p:cNvGrpSpPr/>
+        <p:nvPr/>
+      </p:nvGrpSpPr>
+      <p:grpSpPr>
+        <a:xfrm>
+          <a:off x="0" y="0"/>
+          <a:ext cx="0" cy="0"/>
+          <a:chOff x="0" y="0"/>
+          <a:chExt cx="0" cy="0"/>
+        </a:xfrm>
+      </p:grpSpPr>
+      <p:sp>
+        <p:nvSpPr>
+          <p:cNvPr id="2" name="Title 1"/>
+          <p:cNvSpPr>
+            <a:spLocks noGrp="1"/>
+          </p:cNvSpPr>
+          <p:nvPr>
+            <p:ph type="title"/>
+          </p:nvPr>
+        </p:nvSpPr>
+        <p:spPr/>
+        <p:txBody>
+          <a:bodyPr/>
+          <a:lstStyle/>
+          <a:p>
+            <a:r>
+              <a:rPr lang="en-US" dirty="0" smtClean="0"/>
+              <a:t>Lambda</a:t>
+            </a:r>
+            <a:br>
+              <a:rPr lang="en-US" dirty="0" smtClean="0"/>
+            </a:br>
+            <a:r>
+              <a:rPr lang="en-US" sz="2400" dirty="0" smtClean="0"/>
+              <a:t>the rabbit hole</a:t>
+            </a:r>
+            <a:endParaRPr lang="en-US" sz="2400" dirty="0"/>
+          </a:p>
+        </p:txBody>
+      </p:sp>
+      <p:pic>
+        <p:nvPicPr>
+          <p:cNvPr id="4" name="Content Placeholder 3"/>
+          <p:cNvPicPr>
+            <a:picLocks noGrp="1" noChangeAspect="1"/>
+          </p:cNvPicPr>
+          <p:nvPr>
+            <p:ph idx="1"/>
+          </p:nvPr>
+        </p:nvPicPr>
+        <p:blipFill>
+          <a:blip r:embed="rId2"/>
+          <a:stretch>
+            <a:fillRect/>
+          </a:stretch>
+        </p:blipFill>
+        <p:spPr>
+          <a:xfrm>
+            <a:off x="5181600" y="1865598"/>
+            <a:ext cx="6248400" cy="3061716"/>
+          </a:xfrm>
+          <a:prstGeom prst="rect">
+            <a:avLst/>
+          </a:prstGeom>
+        </p:spPr>
+      </p:pic>
+    </p:spTree>
+    <p:extLst>
+      <p:ext uri="{BB962C8B-B14F-4D97-AF65-F5344CB8AC3E}">
+        <p14:creationId xmlns:p14="http://schemas.microsoft.com/office/powerpoint/2010/main" val="405133803"/>
+      </p:ext>
+    </p:extLst>
+  </p:cSld>
+  <p:clrMapOvr>
+    <a:masterClrMapping/>
+  </p:clrMapOvr>
+</p:sld>
+</file>
+
+<file path=ppt/slides/slide2.xml><?xml version="1.0" encoding="utf-8"?>
+<p:sld xmlns:a="http://schemas.openxmlformats.org/drawingml/2006/main" xmlns:r="http://schemas.openxmlformats.org/officeDocument/2006/relationships" xmlns:p="http://schemas.openxmlformats.org/presentationml/2006/main">
+  <p:cSld>
+    <p:spTree>
+      <p:nvGrpSpPr>
+        <p:cNvPr id="1" name=""/>
+        <p:cNvGrpSpPr/>
+        <p:nvPr/>
+      </p:nvGrpSpPr>
+      <p:grpSpPr>
+        <a:xfrm>
+          <a:off x="0" y="0"/>
+          <a:ext cx="0" cy="0"/>
+          <a:chOff x="0" y="0"/>
+          <a:chExt cx="0" cy="0"/>
+        </a:xfrm>
+      </p:grpSpPr>
+      <p:sp>
+        <p:nvSpPr>
+          <p:cNvPr id="2" name="Title 1"/>
+          <p:cNvSpPr>
+            <a:spLocks noGrp="1"/>
+          </p:cNvSpPr>
+          <p:nvPr>
+            <p:ph type="title"/>
+          </p:nvPr>
+        </p:nvSpPr>
+        <p:spPr/>
+        <p:txBody>
+          <a:bodyPr/>
+          <a:lstStyle/>
+          <a:p>
+            <a:r>
+              <a:rPr lang="en-US" dirty="0" smtClean="0"/>
+              <a:t>bio</a:t>
+            </a:r>
+            <a:endParaRPr lang="en-US" dirty="0"/>
+          </a:p>
+        </p:txBody>
+      </p:sp>
+      <p:sp>
+        <p:nvSpPr>
+          <p:cNvPr id="3" name="Content Placeholder 2"/>
+          <p:cNvSpPr>
+            <a:spLocks noGrp="1"/>
+          </p:cNvSpPr>
+          <p:nvPr>
+            <p:ph idx="1"/>
+          </p:nvPr>
+        </p:nvSpPr>
+        <p:spPr/>
+        <p:txBody>
+          <a:bodyPr/>
+          <a:lstStyle/>
+          <a:p>
+            <a:r>
+              <a:rPr lang="en-US" dirty="0" smtClean="0"/>
+              <a:t>Adrian Pomilio</a:t>
+            </a:r>
+          </a:p>
+          <a:p>
+            <a:r>
+              <a:rPr lang="en-US" dirty="0" err="1" smtClean="0"/>
+              <a:t>Github</a:t>
+            </a:r>
+            <a:r>
+              <a:rPr lang="en-US" dirty="0" smtClean="0"/>
+              <a:t>/Twitter : </a:t>
+            </a:r>
+            <a:r>
+              <a:rPr lang="en-US" dirty="0" err="1" smtClean="0"/>
+              <a:t>adrianpomilio</a:t>
+            </a:r>
+            <a:endParaRPr lang="en-US" dirty="0" smtClean="0"/>
+          </a:p>
+          <a:p>
+            <a:r>
+              <a:rPr lang="en-US" dirty="0" smtClean="0"/>
+              <a:t>Sr. Manager Platform Services </a:t>
+            </a:r>
+            <a:r>
+              <a:rPr lang="mr-IN" dirty="0" smtClean="0"/>
+              <a:t>–</a:t>
+            </a:r>
+            <a:r>
+              <a:rPr lang="en-US" dirty="0" smtClean="0"/>
+              <a:t> Mapp Digital</a:t>
+            </a:r>
+          </a:p>
+          <a:p>
+            <a:r>
+              <a:rPr lang="en-US" dirty="0" smtClean="0"/>
+              <a:t>20+ years of application development and design</a:t>
+            </a:r>
+          </a:p>
+          <a:p>
+            <a:r>
+              <a:rPr lang="en-US" dirty="0" smtClean="0"/>
+              <a:t>“Learn it by doing it”</a:t>
+            </a:r>
+          </a:p>
+        </p:txBody>
+      </p:sp>
+    </p:spTree>
+    <p:extLst>
+      <p:ext uri="{BB962C8B-B14F-4D97-AF65-F5344CB8AC3E}">
+        <p14:creationId xmlns:p14="http://schemas.microsoft.com/office/powerpoint/2010/main" val="1780265973"/>
+      </p:ext>
+    </p:extLst>
+  </p:cSld>
+  <p:clrMapOvr>
+    <a:masterClrMapping/>
+  </p:clrMapOvr>
+</p:sld>
+</file>
+
+<file path=ppt/slides/slide20.xml><?xml version="1.0" encoding="utf-8"?>
 <p:sld xmlns:a="http://schemas.openxmlformats.org/drawingml/2006/main" xmlns:r="http://schemas.openxmlformats.org/officeDocument/2006/relationships" xmlns:p="http://schemas.openxmlformats.org/presentationml/2006/main">
   <p:cSld>
     <p:spTree>
@@ -7704,224 +7907,6 @@
 </p:sld>
 </file>
 
-<file path=ppt/slides/slide2.xml><?xml version="1.0" encoding="utf-8"?>
-<p:sld xmlns:a="http://schemas.openxmlformats.org/drawingml/2006/main" xmlns:r="http://schemas.openxmlformats.org/officeDocument/2006/relationships" xmlns:p="http://schemas.openxmlformats.org/presentationml/2006/main">
-  <p:cSld>
-    <p:spTree>
-      <p:nvGrpSpPr>
-        <p:cNvPr id="1" name=""/>
-        <p:cNvGrpSpPr/>
-        <p:nvPr/>
-      </p:nvGrpSpPr>
-      <p:grpSpPr>
-        <a:xfrm>
-          <a:off x="0" y="0"/>
-          <a:ext cx="0" cy="0"/>
-          <a:chOff x="0" y="0"/>
-          <a:chExt cx="0" cy="0"/>
-        </a:xfrm>
-      </p:grpSpPr>
-      <p:sp>
-        <p:nvSpPr>
-          <p:cNvPr id="2" name="Title 1"/>
-          <p:cNvSpPr>
-            <a:spLocks noGrp="1"/>
-          </p:cNvSpPr>
-          <p:nvPr>
-            <p:ph type="title"/>
-          </p:nvPr>
-        </p:nvSpPr>
-        <p:spPr/>
-        <p:txBody>
-          <a:bodyPr/>
-          <a:lstStyle/>
-          <a:p>
-            <a:r>
-              <a:rPr lang="en-US" dirty="0" smtClean="0"/>
-              <a:t>bio</a:t>
-            </a:r>
-            <a:endParaRPr lang="en-US" dirty="0"/>
-          </a:p>
-        </p:txBody>
-      </p:sp>
-      <p:sp>
-        <p:nvSpPr>
-          <p:cNvPr id="3" name="Content Placeholder 2"/>
-          <p:cNvSpPr>
-            <a:spLocks noGrp="1"/>
-          </p:cNvSpPr>
-          <p:nvPr>
-            <p:ph idx="1"/>
-          </p:nvPr>
-        </p:nvSpPr>
-        <p:spPr/>
-        <p:txBody>
-          <a:bodyPr/>
-          <a:lstStyle/>
-          <a:p>
-            <a:r>
-              <a:rPr lang="en-US" dirty="0" smtClean="0"/>
-              <a:t>Adrian Pomilio</a:t>
-            </a:r>
-          </a:p>
-          <a:p>
-            <a:r>
-              <a:rPr lang="en-US" dirty="0" err="1" smtClean="0"/>
-              <a:t>Github</a:t>
-            </a:r>
-            <a:r>
-              <a:rPr lang="en-US" dirty="0" smtClean="0"/>
-              <a:t>/Twitter : </a:t>
-            </a:r>
-            <a:r>
-              <a:rPr lang="en-US" dirty="0" err="1" smtClean="0"/>
-              <a:t>adrianpomilio</a:t>
-            </a:r>
-            <a:endParaRPr lang="en-US" dirty="0" smtClean="0"/>
-          </a:p>
-          <a:p>
-            <a:r>
-              <a:rPr lang="en-US" dirty="0" smtClean="0"/>
-              <a:t>Sr. Manager Platform Services </a:t>
-            </a:r>
-            <a:r>
-              <a:rPr lang="mr-IN" dirty="0" smtClean="0"/>
-              <a:t>–</a:t>
-            </a:r>
-            <a:r>
-              <a:rPr lang="en-US" dirty="0" smtClean="0"/>
-              <a:t> Mapp Digital</a:t>
-            </a:r>
-          </a:p>
-          <a:p>
-            <a:r>
-              <a:rPr lang="en-US" dirty="0" smtClean="0"/>
-              <a:t>20+ years of application development and design</a:t>
-            </a:r>
-          </a:p>
-          <a:p>
-            <a:r>
-              <a:rPr lang="en-US" dirty="0" smtClean="0"/>
-              <a:t>“Learn it by doing it”</a:t>
-            </a:r>
-          </a:p>
-        </p:txBody>
-      </p:sp>
-    </p:spTree>
-    <p:extLst>
-      <p:ext uri="{BB962C8B-B14F-4D97-AF65-F5344CB8AC3E}">
-        <p14:creationId xmlns:p14="http://schemas.microsoft.com/office/powerpoint/2010/main" val="1780265973"/>
-      </p:ext>
-    </p:extLst>
-  </p:cSld>
-  <p:clrMapOvr>
-    <a:masterClrMapping/>
-  </p:clrMapOvr>
-</p:sld>
-</file>
-
-<file path=ppt/slides/slide20.xml><?xml version="1.0" encoding="utf-8"?>
-<p:sld xmlns:a="http://schemas.openxmlformats.org/drawingml/2006/main" xmlns:r="http://schemas.openxmlformats.org/officeDocument/2006/relationships" xmlns:p="http://schemas.openxmlformats.org/presentationml/2006/main">
-  <p:cSld>
-    <p:spTree>
-      <p:nvGrpSpPr>
-        <p:cNvPr id="1" name=""/>
-        <p:cNvGrpSpPr/>
-        <p:nvPr/>
-      </p:nvGrpSpPr>
-      <p:grpSpPr>
-        <a:xfrm>
-          <a:off x="0" y="0"/>
-          <a:ext cx="0" cy="0"/>
-          <a:chOff x="0" y="0"/>
-          <a:chExt cx="0" cy="0"/>
-        </a:xfrm>
-      </p:grpSpPr>
-      <p:sp>
-        <p:nvSpPr>
-          <p:cNvPr id="2" name="Title 1"/>
-          <p:cNvSpPr>
-            <a:spLocks noGrp="1"/>
-          </p:cNvSpPr>
-          <p:nvPr>
-            <p:ph type="title"/>
-          </p:nvPr>
-        </p:nvSpPr>
-        <p:spPr/>
-        <p:txBody>
-          <a:bodyPr/>
-          <a:lstStyle/>
-          <a:p>
-            <a:r>
-              <a:rPr lang="en-US" dirty="0" smtClean="0"/>
-              <a:t>Versioning</a:t>
-            </a:r>
-            <a:endParaRPr lang="en-US" dirty="0"/>
-          </a:p>
-        </p:txBody>
-      </p:sp>
-      <p:sp>
-        <p:nvSpPr>
-          <p:cNvPr id="3" name="Content Placeholder 2"/>
-          <p:cNvSpPr>
-            <a:spLocks noGrp="1"/>
-          </p:cNvSpPr>
-          <p:nvPr>
-            <p:ph idx="1"/>
-          </p:nvPr>
-        </p:nvSpPr>
-        <p:spPr/>
-        <p:txBody>
-          <a:bodyPr/>
-          <a:lstStyle/>
-          <a:p>
-            <a:r>
-              <a:rPr lang="en-US" dirty="0" smtClean="0"/>
-              <a:t>Lambda </a:t>
-            </a:r>
-            <a:r>
-              <a:rPr lang="mr-IN" dirty="0" smtClean="0"/>
-              <a:t>–</a:t>
-            </a:r>
-            <a:r>
-              <a:rPr lang="en-US" dirty="0" smtClean="0"/>
-              <a:t> different versions of a function</a:t>
-            </a:r>
-          </a:p>
-          <a:p>
-            <a:pPr lvl="1"/>
-            <a:r>
-              <a:rPr lang="en-US" dirty="0" smtClean="0"/>
-              <a:t>Think A/B testing, </a:t>
-            </a:r>
-            <a:r>
-              <a:rPr lang="en-US" smtClean="0"/>
-              <a:t>or Blue/Green deployment</a:t>
-            </a:r>
-            <a:endParaRPr lang="en-US" dirty="0"/>
-          </a:p>
-        </p:txBody>
-      </p:sp>
-    </p:spTree>
-    <p:extLst>
-      <p:ext uri="{BB962C8B-B14F-4D97-AF65-F5344CB8AC3E}">
-        <p14:creationId xmlns:p14="http://schemas.microsoft.com/office/powerpoint/2010/main" val="1532791319"/>
-      </p:ext>
-    </p:extLst>
-  </p:cSld>
-  <p:clrMapOvr>
-    <a:masterClrMapping/>
-  </p:clrMapOvr>
-  <p:timing>
-    <p:tnLst>
-      <p:par>
-        <p:cTn id="1" dur="indefinite" restart="never" nodeType="tmRoot"/>
-      </p:par>
-    </p:tnLst>
-  </p:timing>
-</p:sld>
-</file>
-
 <file path=ppt/slides/slide21.xml><?xml version="1.0" encoding="utf-8"?>
 <p:sld xmlns:a="http://schemas.openxmlformats.org/drawingml/2006/main" xmlns:r="http://schemas.openxmlformats.org/officeDocument/2006/relationships" xmlns:p="http://schemas.openxmlformats.org/presentationml/2006/main">
   <p:cSld>
@@ -7956,112 +7941,138 @@
           <a:p>
             <a:r>
               <a:rPr lang="en-US" dirty="0" smtClean="0"/>
-              <a:t>Lambda scaling</a:t>
+              <a:t>Lambda</a:t>
+            </a:r>
+            <a:br>
+              <a:rPr lang="en-US" dirty="0" smtClean="0"/>
+            </a:br>
+            <a:r>
+              <a:rPr lang="en-US" sz="2400" dirty="0" smtClean="0"/>
+              <a:t>language/runtime support</a:t>
+            </a:r>
+            <a:endParaRPr lang="en-US" sz="2400" dirty="0"/>
+          </a:p>
+        </p:txBody>
+      </p:sp>
+      <p:sp>
+        <p:nvSpPr>
+          <p:cNvPr id="3" name="Content Placeholder 2"/>
+          <p:cNvSpPr>
+            <a:spLocks noGrp="1"/>
+          </p:cNvSpPr>
+          <p:nvPr>
+            <p:ph idx="1"/>
+          </p:nvPr>
+        </p:nvSpPr>
+        <p:spPr/>
+        <p:txBody>
+          <a:bodyPr/>
+          <a:lstStyle/>
+          <a:p>
+            <a:r>
+              <a:rPr lang="en-US" dirty="0" err="1" smtClean="0"/>
+              <a:t>NodeJS</a:t>
+            </a:r>
+            <a:endParaRPr lang="en-US" dirty="0" smtClean="0"/>
+          </a:p>
+          <a:p>
+            <a:r>
+              <a:rPr lang="en-US" dirty="0" smtClean="0"/>
+              <a:t>Python</a:t>
+            </a:r>
+          </a:p>
+          <a:p>
+            <a:r>
+              <a:rPr lang="en-US" dirty="0" smtClean="0"/>
+              <a:t>C#</a:t>
+            </a:r>
+          </a:p>
+          <a:p>
+            <a:pPr lvl="1"/>
+            <a:r>
+              <a:rPr lang="en-US" dirty="0" smtClean="0"/>
+              <a:t>DLLs too </a:t>
+            </a:r>
+            <a:endParaRPr lang="en-US" dirty="0" smtClean="0"/>
+          </a:p>
+          <a:p>
+            <a:r>
+              <a:rPr lang="en-US" dirty="0" smtClean="0"/>
+              <a:t>Java</a:t>
+            </a:r>
+            <a:endParaRPr lang="en-US" dirty="0" smtClean="0"/>
+          </a:p>
+          <a:p>
+            <a:pPr lvl="1"/>
+            <a:r>
+              <a:rPr lang="en-US" dirty="0" smtClean="0"/>
+              <a:t>This includes JVM languages</a:t>
+            </a:r>
+            <a:r>
+              <a:rPr lang="mr-IN" dirty="0" smtClean="0"/>
+              <a:t>…</a:t>
+            </a:r>
+            <a:r>
+              <a:rPr lang="en-US" dirty="0" smtClean="0"/>
+              <a:t> Scala, </a:t>
+            </a:r>
+            <a:r>
+              <a:rPr lang="en-US" dirty="0" err="1" smtClean="0"/>
+              <a:t>Kotlin</a:t>
+            </a:r>
+            <a:r>
+              <a:rPr lang="en-US" dirty="0" smtClean="0"/>
+              <a:t>, etc.</a:t>
             </a:r>
             <a:endParaRPr lang="en-US" dirty="0"/>
           </a:p>
-        </p:txBody>
-      </p:sp>
-      <p:sp>
-        <p:nvSpPr>
-          <p:cNvPr id="3" name="Content Placeholder 2"/>
-          <p:cNvSpPr>
-            <a:spLocks noGrp="1"/>
-          </p:cNvSpPr>
-          <p:nvPr>
-            <p:ph idx="1"/>
-          </p:nvPr>
-        </p:nvSpPr>
-        <p:spPr/>
-        <p:txBody>
-          <a:bodyPr>
-            <a:normAutofit/>
-          </a:bodyPr>
-          <a:lstStyle/>
-          <a:p>
-            <a:r>
-              <a:rPr lang="en-US" dirty="0" smtClean="0"/>
-              <a:t>Lambda </a:t>
-            </a:r>
-            <a:r>
-              <a:rPr lang="mr-IN" dirty="0" smtClean="0"/>
-              <a:t>–</a:t>
-            </a:r>
-            <a:r>
-              <a:rPr lang="en-US" dirty="0" smtClean="0"/>
-              <a:t> on a unit of work</a:t>
+          <a:p>
+            <a:r>
+              <a:rPr lang="en-US" dirty="0" smtClean="0"/>
+              <a:t>Shell scripts</a:t>
+            </a:r>
+          </a:p>
+          <a:p>
+            <a:r>
+              <a:rPr lang="en-US" dirty="0" smtClean="0"/>
+              <a:t>Executables</a:t>
+            </a:r>
+          </a:p>
+          <a:p>
+            <a:r>
+              <a:rPr lang="en-US" dirty="0" smtClean="0"/>
+              <a:t>Pretty much anything*</a:t>
             </a:r>
           </a:p>
           <a:p>
             <a:pPr lvl="1"/>
             <a:r>
-              <a:rPr lang="en-US" dirty="0" smtClean="0"/>
-              <a:t>Streaming source types</a:t>
-            </a:r>
-          </a:p>
-          <a:p>
-            <a:pPr lvl="1"/>
-            <a:r>
-              <a:rPr lang="en-US" dirty="0" smtClean="0"/>
-              <a:t>Synchronous source types</a:t>
-            </a:r>
-          </a:p>
-          <a:p>
-            <a:pPr lvl="1"/>
-            <a:r>
-              <a:rPr lang="en-US" dirty="0" smtClean="0"/>
-              <a:t>(</a:t>
-            </a:r>
-            <a:r>
-              <a:rPr lang="en-US" dirty="0" smtClean="0">
-                <a:hlinkClick r:id="rId2"/>
-              </a:rPr>
-              <a:t>https://cloudncode.blog/2017/03/02/best-practices-aws-lambda-function/)</a:t>
-            </a:r>
-            <a:endParaRPr lang="en-US" dirty="0" smtClean="0"/>
-          </a:p>
-          <a:p>
-            <a:pPr lvl="1"/>
-            <a:r>
-              <a:rPr lang="en-US" dirty="0" smtClean="0"/>
-              <a:t>Concurrent Invocations = events (or requests) per second * function duration (in secs)</a:t>
-            </a:r>
-          </a:p>
-          <a:p>
-            <a:pPr lvl="1"/>
-            <a:r>
-              <a:rPr lang="en-US" dirty="0" smtClean="0"/>
-              <a:t>(</a:t>
-            </a:r>
-            <a:r>
-              <a:rPr lang="en-US" dirty="0" smtClean="0">
-                <a:hlinkClick r:id="rId3"/>
-              </a:rPr>
-              <a:t>http://docs.aws.amazon.com/lambda/latest/dg/concurrent-executions.html)</a:t>
-            </a:r>
-            <a:endParaRPr lang="en-US" dirty="0" smtClean="0"/>
-          </a:p>
-          <a:p>
-            <a:pPr lvl="1"/>
-            <a:r>
-              <a:rPr lang="en-US" dirty="0" smtClean="0"/>
-              <a:t>1000 concurrent limit</a:t>
-            </a:r>
-          </a:p>
-          <a:p>
-            <a:pPr lvl="1"/>
-            <a:r>
-              <a:rPr lang="en-US" dirty="0" smtClean="0"/>
-              <a:t>Kinesis work around (pricey)</a:t>
-            </a:r>
-            <a:endParaRPr lang="en-US" dirty="0"/>
+              <a:rPr lang="en-US" dirty="0"/>
+              <a:t>https://</a:t>
+            </a:r>
+            <a:r>
+              <a:rPr lang="en-US" dirty="0" err="1"/>
+              <a:t>aws.amazon.com</a:t>
+            </a:r>
+            <a:r>
+              <a:rPr lang="en-US" dirty="0"/>
+              <a:t>/blogs/compute/running-executables-in-</a:t>
+            </a:r>
+            <a:r>
+              <a:rPr lang="en-US" dirty="0" err="1"/>
+              <a:t>aws</a:t>
+            </a:r>
+            <a:r>
+              <a:rPr lang="en-US" dirty="0"/>
+              <a:t>-lambda/</a:t>
+            </a:r>
           </a:p>
         </p:txBody>
       </p:sp>
     </p:spTree>
     <p:extLst>
       <p:ext uri="{BB962C8B-B14F-4D97-AF65-F5344CB8AC3E}">
-        <p14:creationId xmlns:p14="http://schemas.microsoft.com/office/powerpoint/2010/main" val="1998115011"/>
+        <p14:creationId xmlns:p14="http://schemas.microsoft.com/office/powerpoint/2010/main" val="1532791319"/>
       </p:ext>
     </p:extLst>
   </p:cSld>
@@ -8112,7 +8123,7 @@
           <a:p>
             <a:r>
               <a:rPr lang="en-US" dirty="0" smtClean="0"/>
-              <a:t>Services</a:t>
+              <a:t>Lambda scaling</a:t>
             </a:r>
             <a:endParaRPr lang="en-US" dirty="0"/>
           </a:p>
@@ -8130,38 +8141,85 @@
         </p:nvSpPr>
         <p:spPr/>
         <p:txBody>
-          <a:bodyPr/>
+          <a:bodyPr>
+            <a:normAutofit/>
+          </a:bodyPr>
           <a:lstStyle/>
           <a:p>
             <a:r>
-              <a:rPr lang="en-US" dirty="0" err="1" smtClean="0"/>
-              <a:t>Cognito</a:t>
+              <a:rPr lang="en-US" dirty="0" smtClean="0"/>
+              <a:t>Lambda </a:t>
+            </a:r>
+            <a:r>
+              <a:rPr lang="mr-IN" dirty="0" smtClean="0"/>
+              <a:t>–</a:t>
+            </a:r>
+            <a:r>
+              <a:rPr lang="en-US" dirty="0" smtClean="0"/>
+              <a:t> on a unit of work</a:t>
+            </a:r>
+          </a:p>
+          <a:p>
+            <a:pPr lvl="1"/>
+            <a:r>
+              <a:rPr lang="en-US" dirty="0" smtClean="0"/>
+              <a:t>Streaming source types</a:t>
+            </a:r>
+          </a:p>
+          <a:p>
+            <a:pPr lvl="1"/>
+            <a:r>
+              <a:rPr lang="en-US" dirty="0" smtClean="0"/>
+              <a:t>Synchronous source types</a:t>
+            </a:r>
+          </a:p>
+          <a:p>
+            <a:pPr lvl="1"/>
+            <a:r>
+              <a:rPr lang="en-US" dirty="0" smtClean="0"/>
+              <a:t>(</a:t>
+            </a:r>
+            <a:r>
+              <a:rPr lang="en-US" dirty="0" smtClean="0">
+                <a:hlinkClick r:id="rId2"/>
+              </a:rPr>
+              <a:t>https://cloudncode.blog/2017/03/02/best-practices-aws-lambda-function/)</a:t>
             </a:r>
             <a:endParaRPr lang="en-US" dirty="0" smtClean="0"/>
           </a:p>
           <a:p>
-            <a:r>
-              <a:rPr lang="en-US" dirty="0" smtClean="0"/>
-              <a:t>S3</a:t>
-            </a:r>
-          </a:p>
-          <a:p>
-            <a:r>
-              <a:rPr lang="en-US" dirty="0" smtClean="0"/>
-              <a:t>SNS</a:t>
-            </a:r>
-          </a:p>
-          <a:p>
-            <a:r>
-              <a:rPr lang="en-US" dirty="0" err="1" smtClean="0"/>
-              <a:t>Kinises</a:t>
+            <a:pPr lvl="1"/>
+            <a:r>
+              <a:rPr lang="en-US" dirty="0" smtClean="0"/>
+              <a:t>Concurrent Invocations = events (or requests) per second * function duration (in secs)</a:t>
+            </a:r>
+          </a:p>
+          <a:p>
+            <a:pPr lvl="1"/>
+            <a:r>
+              <a:rPr lang="en-US" dirty="0" smtClean="0"/>
+              <a:t>(</a:t>
+            </a:r>
+            <a:r>
+              <a:rPr lang="en-US" dirty="0" smtClean="0">
+                <a:hlinkClick r:id="rId3"/>
+              </a:rPr>
+              <a:t>http://docs.aws.amazon.com/lambda/latest/dg/concurrent-executions.html)</a:t>
             </a:r>
             <a:endParaRPr lang="en-US" dirty="0" smtClean="0"/>
           </a:p>
           <a:p>
-            <a:r>
-              <a:rPr lang="en-US" dirty="0" smtClean="0"/>
-              <a:t>Etc..</a:t>
+            <a:pPr lvl="1"/>
+            <a:r>
+              <a:rPr lang="en-US" dirty="0" smtClean="0"/>
+              <a:t>1000 concurrent limit</a:t>
+            </a:r>
+          </a:p>
+          <a:p>
+            <a:pPr lvl="1"/>
+            <a:r>
+              <a:rPr lang="en-US" dirty="0" smtClean="0"/>
+              <a:t>Kinesis work around (pricey)</a:t>
             </a:r>
             <a:endParaRPr lang="en-US" dirty="0"/>
           </a:p>
@@ -8170,13 +8228,20 @@
     </p:spTree>
     <p:extLst>
       <p:ext uri="{BB962C8B-B14F-4D97-AF65-F5344CB8AC3E}">
-        <p14:creationId xmlns:p14="http://schemas.microsoft.com/office/powerpoint/2010/main" val="2036119871"/>
+        <p14:creationId xmlns:p14="http://schemas.microsoft.com/office/powerpoint/2010/main" val="1998115011"/>
       </p:ext>
     </p:extLst>
   </p:cSld>
   <p:clrMapOvr>
     <a:masterClrMapping/>
   </p:clrMapOvr>
+  <p:timing>
+    <p:tnLst>
+      <p:par>
+        <p:cTn id="1" dur="indefinite" restart="never" nodeType="tmRoot"/>
+      </p:par>
+    </p:tnLst>
+  </p:timing>
 </p:sld>
 </file>
 
@@ -8214,6 +8279,108 @@
           <a:p>
             <a:r>
               <a:rPr lang="en-US" dirty="0" smtClean="0"/>
+              <a:t>Services</a:t>
+            </a:r>
+            <a:endParaRPr lang="en-US" dirty="0"/>
+          </a:p>
+        </p:txBody>
+      </p:sp>
+      <p:sp>
+        <p:nvSpPr>
+          <p:cNvPr id="3" name="Content Placeholder 2"/>
+          <p:cNvSpPr>
+            <a:spLocks noGrp="1"/>
+          </p:cNvSpPr>
+          <p:nvPr>
+            <p:ph idx="1"/>
+          </p:nvPr>
+        </p:nvSpPr>
+        <p:spPr/>
+        <p:txBody>
+          <a:bodyPr/>
+          <a:lstStyle/>
+          <a:p>
+            <a:r>
+              <a:rPr lang="en-US" dirty="0" err="1" smtClean="0"/>
+              <a:t>Cognito</a:t>
+            </a:r>
+            <a:endParaRPr lang="en-US" dirty="0" smtClean="0"/>
+          </a:p>
+          <a:p>
+            <a:r>
+              <a:rPr lang="en-US" dirty="0" smtClean="0"/>
+              <a:t>S3</a:t>
+            </a:r>
+          </a:p>
+          <a:p>
+            <a:r>
+              <a:rPr lang="en-US" dirty="0" smtClean="0"/>
+              <a:t>SNS</a:t>
+            </a:r>
+          </a:p>
+          <a:p>
+            <a:r>
+              <a:rPr lang="en-US" dirty="0" err="1" smtClean="0"/>
+              <a:t>Kinises</a:t>
+            </a:r>
+            <a:endParaRPr lang="en-US" dirty="0" smtClean="0"/>
+          </a:p>
+          <a:p>
+            <a:r>
+              <a:rPr lang="en-US" dirty="0" smtClean="0"/>
+              <a:t>Etc..</a:t>
+            </a:r>
+            <a:endParaRPr lang="en-US" dirty="0"/>
+          </a:p>
+        </p:txBody>
+      </p:sp>
+    </p:spTree>
+    <p:extLst>
+      <p:ext uri="{BB962C8B-B14F-4D97-AF65-F5344CB8AC3E}">
+        <p14:creationId xmlns:p14="http://schemas.microsoft.com/office/powerpoint/2010/main" val="2036119871"/>
+      </p:ext>
+    </p:extLst>
+  </p:cSld>
+  <p:clrMapOvr>
+    <a:masterClrMapping/>
+  </p:clrMapOvr>
+</p:sld>
+</file>
+
+<file path=ppt/slides/slide24.xml><?xml version="1.0" encoding="utf-8"?>
+<p:sld xmlns:a="http://schemas.openxmlformats.org/drawingml/2006/main" xmlns:r="http://schemas.openxmlformats.org/officeDocument/2006/relationships" xmlns:p="http://schemas.openxmlformats.org/presentationml/2006/main">
+  <p:cSld>
+    <p:spTree>
+      <p:nvGrpSpPr>
+        <p:cNvPr id="1" name=""/>
+        <p:cNvGrpSpPr/>
+        <p:nvPr/>
+      </p:nvGrpSpPr>
+      <p:grpSpPr>
+        <a:xfrm>
+          <a:off x="0" y="0"/>
+          <a:ext cx="0" cy="0"/>
+          <a:chOff x="0" y="0"/>
+          <a:chExt cx="0" cy="0"/>
+        </a:xfrm>
+      </p:grpSpPr>
+      <p:sp>
+        <p:nvSpPr>
+          <p:cNvPr id="2" name="Title 1"/>
+          <p:cNvSpPr>
+            <a:spLocks noGrp="1"/>
+          </p:cNvSpPr>
+          <p:nvPr>
+            <p:ph type="title"/>
+          </p:nvPr>
+        </p:nvSpPr>
+        <p:spPr/>
+        <p:txBody>
+          <a:bodyPr/>
+          <a:lstStyle/>
+          <a:p>
+            <a:r>
+              <a:rPr lang="en-US" dirty="0" smtClean="0"/>
               <a:t>How to</a:t>
             </a:r>
             <a:endParaRPr lang="en-US" dirty="0"/>
@@ -8267,7 +8434,7 @@
 </p:sld>
 </file>
 
-<file path=ppt/slides/slide24.xml><?xml version="1.0" encoding="utf-8"?>
+<file path=ppt/slides/slide25.xml><?xml version="1.0" encoding="utf-8"?>
 <p:sld xmlns:a="http://schemas.openxmlformats.org/drawingml/2006/main" xmlns:r="http://schemas.openxmlformats.org/officeDocument/2006/relationships" xmlns:p="http://schemas.openxmlformats.org/presentationml/2006/main">
   <p:cSld>
     <p:spTree>
@@ -8357,7 +8524,7 @@
 </p:sld>
 </file>
 
-<file path=ppt/slides/slide25.xml><?xml version="1.0" encoding="utf-8"?>
+<file path=ppt/slides/slide26.xml><?xml version="1.0" encoding="utf-8"?>
 <p:sld xmlns:a="http://schemas.openxmlformats.org/drawingml/2006/main" xmlns:r="http://schemas.openxmlformats.org/officeDocument/2006/relationships" xmlns:p="http://schemas.openxmlformats.org/presentationml/2006/main">
   <p:cSld>
     <p:spTree>
@@ -8441,101 +8608,6 @@
 </p:sld>
 </file>
 
-<file path=ppt/slides/slide26.xml><?xml version="1.0" encoding="utf-8"?>
-<p:sld xmlns:a="http://schemas.openxmlformats.org/drawingml/2006/main" xmlns:r="http://schemas.openxmlformats.org/officeDocument/2006/relationships" xmlns:p="http://schemas.openxmlformats.org/presentationml/2006/main">
-  <p:cSld>
-    <p:spTree>
-      <p:nvGrpSpPr>
-        <p:cNvPr id="1" name=""/>
-        <p:cNvGrpSpPr/>
-        <p:nvPr/>
-      </p:nvGrpSpPr>
-      <p:grpSpPr>
-        <a:xfrm>
-          <a:off x="0" y="0"/>
-          <a:ext cx="0" cy="0"/>
-          <a:chOff x="0" y="0"/>
-          <a:chExt cx="0" cy="0"/>
-        </a:xfrm>
-      </p:grpSpPr>
-      <p:sp>
-        <p:nvSpPr>
-          <p:cNvPr id="2" name="Title 1"/>
-          <p:cNvSpPr>
-            <a:spLocks noGrp="1"/>
-          </p:cNvSpPr>
-          <p:nvPr>
-            <p:ph type="title"/>
-          </p:nvPr>
-        </p:nvSpPr>
-        <p:spPr/>
-        <p:txBody>
-          <a:bodyPr/>
-          <a:lstStyle/>
-          <a:p>
-            <a:r>
-              <a:rPr lang="en-US" dirty="0" smtClean="0"/>
-              <a:t>Frameworks</a:t>
-            </a:r>
-            <a:br>
-              <a:rPr lang="en-US" dirty="0" smtClean="0"/>
-            </a:br>
-            <a:r>
-              <a:rPr lang="en-US" sz="2400" dirty="0" smtClean="0"/>
-              <a:t>now we’re getting somewhere</a:t>
-            </a:r>
-            <a:endParaRPr lang="en-US" sz="2400" dirty="0"/>
-          </a:p>
-        </p:txBody>
-      </p:sp>
-      <p:sp>
-        <p:nvSpPr>
-          <p:cNvPr id="3" name="Content Placeholder 2"/>
-          <p:cNvSpPr>
-            <a:spLocks noGrp="1"/>
-          </p:cNvSpPr>
-          <p:nvPr>
-            <p:ph idx="1"/>
-          </p:nvPr>
-        </p:nvSpPr>
-        <p:spPr/>
-        <p:txBody>
-          <a:bodyPr/>
-          <a:lstStyle/>
-          <a:p>
-            <a:r>
-              <a:rPr lang="en-US" dirty="0" smtClean="0"/>
-              <a:t>Apex</a:t>
-            </a:r>
-          </a:p>
-          <a:p>
-            <a:r>
-              <a:rPr lang="en-US" dirty="0" smtClean="0"/>
-              <a:t>AWS Sam</a:t>
-            </a:r>
-          </a:p>
-          <a:p>
-            <a:r>
-              <a:rPr lang="en-US" dirty="0" err="1" smtClean="0"/>
-              <a:t>Serverless</a:t>
-            </a:r>
-            <a:endParaRPr lang="en-US" dirty="0" smtClean="0"/>
-          </a:p>
-        </p:txBody>
-      </p:sp>
-    </p:spTree>
-    <p:extLst>
-      <p:ext uri="{BB962C8B-B14F-4D97-AF65-F5344CB8AC3E}">
-        <p14:creationId xmlns:p14="http://schemas.microsoft.com/office/powerpoint/2010/main" val="1115277555"/>
-      </p:ext>
-    </p:extLst>
-  </p:cSld>
-  <p:clrMapOvr>
-    <a:masterClrMapping/>
-  </p:clrMapOvr>
-</p:sld>
-</file>
-
 <file path=ppt/slides/slide27.xml><?xml version="1.0" encoding="utf-8"?>
 <p:sld xmlns:a="http://schemas.openxmlformats.org/drawingml/2006/main" xmlns:r="http://schemas.openxmlformats.org/officeDocument/2006/relationships" xmlns:p="http://schemas.openxmlformats.org/presentationml/2006/main">
   <p:cSld>
@@ -8569,100 +8641,59 @@
           <a:lstStyle/>
           <a:p>
             <a:r>
+              <a:rPr lang="en-US" dirty="0" smtClean="0"/>
+              <a:t>Frameworks</a:t>
+            </a:r>
+            <a:br>
+              <a:rPr lang="en-US" dirty="0" smtClean="0"/>
+            </a:br>
+            <a:r>
+              <a:rPr lang="en-US" sz="2400" dirty="0" smtClean="0"/>
+              <a:t>now we’re getting somewhere</a:t>
+            </a:r>
+            <a:endParaRPr lang="en-US" sz="2400" dirty="0"/>
+          </a:p>
+        </p:txBody>
+      </p:sp>
+      <p:sp>
+        <p:nvSpPr>
+          <p:cNvPr id="3" name="Content Placeholder 2"/>
+          <p:cNvSpPr>
+            <a:spLocks noGrp="1"/>
+          </p:cNvSpPr>
+          <p:nvPr>
+            <p:ph idx="1"/>
+          </p:nvPr>
+        </p:nvSpPr>
+        <p:spPr/>
+        <p:txBody>
+          <a:bodyPr/>
+          <a:lstStyle/>
+          <a:p>
+            <a:r>
+              <a:rPr lang="en-US" dirty="0" smtClean="0"/>
+              <a:t>Apex</a:t>
+            </a:r>
+          </a:p>
+          <a:p>
+            <a:r>
+              <a:rPr lang="en-US" dirty="0" smtClean="0"/>
+              <a:t>AWS Sam</a:t>
+            </a:r>
+          </a:p>
+          <a:p>
+            <a:r>
               <a:rPr lang="en-US" dirty="0" err="1" smtClean="0"/>
               <a:t>Serverless</a:t>
             </a:r>
-            <a:r>
-              <a:rPr lang="en-US" dirty="0" smtClean="0"/>
-              <a:t/>
-            </a:r>
-            <a:br>
-              <a:rPr lang="en-US" dirty="0" smtClean="0"/>
-            </a:br>
-            <a:r>
-              <a:rPr lang="en-US" sz="2400" dirty="0" smtClean="0"/>
-              <a:t>the framework</a:t>
-            </a:r>
-            <a:endParaRPr lang="en-US" sz="2400" dirty="0"/>
-          </a:p>
-        </p:txBody>
-      </p:sp>
-      <p:sp>
-        <p:nvSpPr>
-          <p:cNvPr id="3" name="Content Placeholder 2"/>
-          <p:cNvSpPr>
-            <a:spLocks noGrp="1"/>
-          </p:cNvSpPr>
-          <p:nvPr>
-            <p:ph idx="1"/>
-          </p:nvPr>
-        </p:nvSpPr>
-        <p:spPr/>
-        <p:txBody>
-          <a:bodyPr/>
-          <a:lstStyle/>
-          <a:p>
-            <a:r>
-              <a:rPr lang="en-US" dirty="0" err="1" smtClean="0"/>
-              <a:t>Serverless</a:t>
-            </a:r>
-            <a:r>
-              <a:rPr lang="en-US" dirty="0"/>
-              <a:t>: </a:t>
-            </a:r>
-            <a:r>
-              <a:rPr lang="en-US" dirty="0">
-                <a:hlinkClick r:id="rId2"/>
-              </a:rPr>
-              <a:t>https://</a:t>
-            </a:r>
-            <a:r>
-              <a:rPr lang="en-US" dirty="0" err="1">
-                <a:hlinkClick r:id="rId2"/>
-              </a:rPr>
-              <a:t>serverless.com</a:t>
-            </a:r>
             <a:endParaRPr lang="en-US" dirty="0" smtClean="0"/>
-          </a:p>
-          <a:p>
-            <a:r>
-              <a:rPr lang="en-US" dirty="0" smtClean="0"/>
-              <a:t>Works for multiple providers</a:t>
-            </a:r>
-          </a:p>
-          <a:p>
-            <a:r>
-              <a:rPr lang="en-US" dirty="0" smtClean="0"/>
-              <a:t>Works with multiple templates</a:t>
-            </a:r>
-          </a:p>
-          <a:p>
-            <a:r>
-              <a:rPr lang="en-US" dirty="0" smtClean="0"/>
-              <a:t>Very similar to cloud formation templates</a:t>
-            </a:r>
-          </a:p>
-          <a:p>
-            <a:r>
-              <a:rPr lang="en-US" dirty="0" smtClean="0"/>
-              <a:t>Sanity for the developers</a:t>
-            </a:r>
-          </a:p>
-          <a:p>
-            <a:pPr marL="0" indent="0">
-              <a:buNone/>
-            </a:pPr>
-            <a:endParaRPr lang="en-US" dirty="0" smtClean="0"/>
-          </a:p>
-          <a:p>
-            <a:endParaRPr lang="en-US" dirty="0"/>
           </a:p>
         </p:txBody>
       </p:sp>
     </p:spTree>
     <p:extLst>
       <p:ext uri="{BB962C8B-B14F-4D97-AF65-F5344CB8AC3E}">
-        <p14:creationId xmlns:p14="http://schemas.microsoft.com/office/powerpoint/2010/main" val="1124419550"/>
+        <p14:creationId xmlns:p14="http://schemas.microsoft.com/office/powerpoint/2010/main" val="1115277555"/>
       </p:ext>
     </p:extLst>
   </p:cSld>
@@ -8705,10 +8736,21 @@
           <a:lstStyle/>
           <a:p>
             <a:r>
-              <a:rPr lang="en-US" dirty="0" smtClean="0"/>
-              <a:t>Additional resources</a:t>
-            </a:r>
-            <a:endParaRPr lang="en-US" dirty="0"/>
+              <a:rPr lang="en-US" dirty="0" err="1" smtClean="0"/>
+              <a:t>Serverless</a:t>
+            </a:r>
+            <a:r>
+              <a:rPr lang="en-US" dirty="0" smtClean="0"/>
+              <a:t/>
+            </a:r>
+            <a:br>
+              <a:rPr lang="en-US" dirty="0" smtClean="0"/>
+            </a:br>
+            <a:r>
+              <a:rPr lang="en-US" sz="2400" dirty="0" smtClean="0"/>
+              <a:t>the framework</a:t>
+            </a:r>
+            <a:endParaRPr lang="en-US" sz="2400" dirty="0"/>
           </a:p>
         </p:txBody>
       </p:sp>
@@ -8728,93 +8770,55 @@
           <a:lstStyle/>
           <a:p>
             <a:r>
+              <a:rPr lang="en-US" dirty="0" err="1" smtClean="0"/>
+              <a:t>Serverless</a:t>
+            </a:r>
+            <a:r>
               <a:rPr lang="en-US" dirty="0"/>
-              <a:t>Pricing example: </a:t>
+              <a:t>: </a:t>
             </a:r>
             <a:r>
               <a:rPr lang="en-US" dirty="0">
                 <a:hlinkClick r:id="rId2"/>
               </a:rPr>
-              <a:t>https://alestic.com/2016/12/aws-invoice-example</a:t>
-            </a:r>
-            <a:r>
-              <a:rPr lang="en-US" dirty="0" smtClean="0">
+              <a:t>https://</a:t>
+            </a:r>
+            <a:r>
+              <a:rPr lang="en-US" dirty="0" err="1">
                 <a:hlinkClick r:id="rId2"/>
               </a:rPr>
-              <a:t>/</a:t>
+              <a:t>serverless.com</a:t>
             </a:r>
             <a:endParaRPr lang="en-US" dirty="0" smtClean="0"/>
           </a:p>
           <a:p>
             <a:r>
-              <a:rPr lang="en-US" dirty="0"/>
-              <a:t>A Cloud Guru: </a:t>
-            </a:r>
-            <a:r>
-              <a:rPr lang="en-US" dirty="0">
-                <a:hlinkClick r:id="rId3"/>
-              </a:rPr>
-              <a:t>https://acloud.guru</a:t>
-            </a:r>
-            <a:r>
-              <a:rPr lang="en-US" dirty="0" smtClean="0">
-                <a:hlinkClick r:id="rId3"/>
-              </a:rPr>
-              <a:t>/</a:t>
-            </a:r>
-            <a:endParaRPr lang="en-US" dirty="0" smtClean="0"/>
-          </a:p>
-          <a:p>
-            <a:r>
-              <a:rPr lang="en-US" dirty="0" err="1" smtClean="0"/>
-              <a:t>Serverless</a:t>
-            </a:r>
-            <a:r>
-              <a:rPr lang="en-US" dirty="0"/>
-              <a:t>: </a:t>
-            </a:r>
-            <a:r>
-              <a:rPr lang="en-US" dirty="0">
-                <a:hlinkClick r:id="rId4"/>
-              </a:rPr>
-              <a:t>https://serverless.com</a:t>
-            </a:r>
-            <a:r>
-              <a:rPr lang="en-US" dirty="0" smtClean="0">
-                <a:hlinkClick r:id="rId4"/>
-              </a:rPr>
-              <a:t>/</a:t>
-            </a:r>
-            <a:endParaRPr lang="en-US" dirty="0" smtClean="0"/>
-          </a:p>
-          <a:p>
-            <a:r>
-              <a:rPr lang="en-US" dirty="0"/>
-              <a:t>AWS </a:t>
-            </a:r>
-            <a:r>
-              <a:rPr lang="en-US" dirty="0" err="1"/>
-              <a:t>Serverless</a:t>
-            </a:r>
-            <a:r>
-              <a:rPr lang="en-US" dirty="0"/>
-              <a:t>: </a:t>
-            </a:r>
-            <a:r>
-              <a:rPr lang="en-US" dirty="0">
-                <a:hlinkClick r:id="rId5"/>
-              </a:rPr>
-              <a:t>https://aws.amazon.com/serverless</a:t>
-            </a:r>
-            <a:r>
-              <a:rPr lang="en-US" dirty="0" smtClean="0">
-                <a:hlinkClick r:id="rId5"/>
-              </a:rPr>
-              <a:t>/</a:t>
-            </a:r>
-            <a:endParaRPr lang="en-US" dirty="0" smtClean="0"/>
-          </a:p>
-          <a:p>
+              <a:rPr lang="en-US" dirty="0" smtClean="0"/>
+              <a:t>Works for multiple providers</a:t>
+            </a:r>
+          </a:p>
+          <a:p>
+            <a:r>
+              <a:rPr lang="en-US" dirty="0" smtClean="0"/>
+              <a:t>Works with multiple templates</a:t>
+            </a:r>
+          </a:p>
+          <a:p>
+            <a:r>
+              <a:rPr lang="en-US" dirty="0" smtClean="0"/>
+              <a:t>Very similar to cloud formation templates</a:t>
+            </a:r>
+          </a:p>
+          <a:p>
+            <a:r>
+              <a:rPr lang="en-US" dirty="0" smtClean="0"/>
+              <a:t>Sanity for the developers</a:t>
+            </a:r>
+          </a:p>
+          <a:p>
+            <a:pPr marL="0" indent="0">
+              <a:buNone/>
+            </a:pPr>
             <a:endParaRPr lang="en-US" dirty="0" smtClean="0"/>
           </a:p>
           <a:p>
@@ -8825,7 +8829,7 @@
     </p:spTree>
     <p:extLst>
       <p:ext uri="{BB962C8B-B14F-4D97-AF65-F5344CB8AC3E}">
-        <p14:creationId xmlns:p14="http://schemas.microsoft.com/office/powerpoint/2010/main" val="722583454"/>
+        <p14:creationId xmlns:p14="http://schemas.microsoft.com/office/powerpoint/2010/main" val="1124419550"/>
       </p:ext>
     </p:extLst>
   </p:cSld>
@@ -8869,7 +8873,7 @@
           <a:p>
             <a:r>
               <a:rPr lang="en-US" dirty="0" smtClean="0"/>
-              <a:t>Questions</a:t>
+              <a:t>Additional resources</a:t>
             </a:r>
             <a:endParaRPr lang="en-US" dirty="0"/>
           </a:p>
@@ -8890,14 +8894,105 @@
           <a:bodyPr/>
           <a:lstStyle/>
           <a:p>
-            <a:endParaRPr lang="en-US"/>
+            <a:r>
+              <a:rPr lang="en-US" dirty="0"/>
+              <a:t>Pricing example: </a:t>
+            </a:r>
+            <a:r>
+              <a:rPr lang="en-US" dirty="0">
+                <a:hlinkClick r:id="rId2"/>
+              </a:rPr>
+              <a:t>https://alestic.com/2016/12/aws-invoice-example</a:t>
+            </a:r>
+            <a:r>
+              <a:rPr lang="en-US" dirty="0" smtClean="0">
+                <a:hlinkClick r:id="rId2"/>
+              </a:rPr>
+              <a:t>/</a:t>
+            </a:r>
+            <a:endParaRPr lang="en-US" dirty="0" smtClean="0"/>
+          </a:p>
+          <a:p>
+            <a:r>
+              <a:rPr lang="en-US" dirty="0"/>
+              <a:t>A Cloud Guru: </a:t>
+            </a:r>
+            <a:r>
+              <a:rPr lang="en-US" dirty="0">
+                <a:hlinkClick r:id="rId3"/>
+              </a:rPr>
+              <a:t>https://acloud.guru</a:t>
+            </a:r>
+            <a:r>
+              <a:rPr lang="en-US" dirty="0" smtClean="0">
+                <a:hlinkClick r:id="rId3"/>
+              </a:rPr>
+              <a:t>/</a:t>
+            </a:r>
+            <a:endParaRPr lang="en-US" dirty="0" smtClean="0"/>
+          </a:p>
+          <a:p>
+            <a:r>
+              <a:rPr lang="en-US" dirty="0" err="1" smtClean="0"/>
+              <a:t>Serverless</a:t>
+            </a:r>
+            <a:r>
+              <a:rPr lang="en-US" dirty="0"/>
+              <a:t>: </a:t>
+            </a:r>
+            <a:r>
+              <a:rPr lang="en-US" dirty="0">
+                <a:hlinkClick r:id="rId4"/>
+              </a:rPr>
+              <a:t>https://serverless.com</a:t>
+            </a:r>
+            <a:r>
+              <a:rPr lang="en-US" dirty="0" smtClean="0">
+                <a:hlinkClick r:id="rId4"/>
+              </a:rPr>
+              <a:t>/</a:t>
+            </a:r>
+            <a:endParaRPr lang="en-US" dirty="0" smtClean="0"/>
+          </a:p>
+          <a:p>
+            <a:r>
+              <a:rPr lang="en-US" dirty="0"/>
+              <a:t>AWS </a:t>
+            </a:r>
+            <a:r>
+              <a:rPr lang="en-US" dirty="0" err="1"/>
+              <a:t>Serverless</a:t>
+            </a:r>
+            <a:r>
+              <a:rPr lang="en-US" dirty="0"/>
+              <a:t>: </a:t>
+            </a:r>
+            <a:r>
+              <a:rPr lang="en-US" dirty="0">
+                <a:hlinkClick r:id="rId5"/>
+              </a:rPr>
+              <a:t>https://aws.amazon.com/serverless</a:t>
+            </a:r>
+            <a:r>
+              <a:rPr lang="en-US" dirty="0" smtClean="0">
+                <a:hlinkClick r:id="rId5"/>
+              </a:rPr>
+              <a:t>/</a:t>
+            </a:r>
+            <a:endParaRPr lang="en-US" dirty="0" smtClean="0"/>
+          </a:p>
+          <a:p>
+            <a:endParaRPr lang="en-US" dirty="0" smtClean="0"/>
+          </a:p>
+          <a:p>
+            <a:endParaRPr lang="en-US" dirty="0"/>
           </a:p>
         </p:txBody>
       </p:sp>
     </p:spTree>
     <p:extLst>
       <p:ext uri="{BB962C8B-B14F-4D97-AF65-F5344CB8AC3E}">
-        <p14:creationId xmlns:p14="http://schemas.microsoft.com/office/powerpoint/2010/main" val="1541502691"/>
+        <p14:creationId xmlns:p14="http://schemas.microsoft.com/office/powerpoint/2010/main" val="722583454"/>
       </p:ext>
     </p:extLst>
   </p:cSld>
@@ -8985,6 +9080,78 @@
     <p:extLst>
       <p:ext uri="{BB962C8B-B14F-4D97-AF65-F5344CB8AC3E}">
         <p14:creationId xmlns:p14="http://schemas.microsoft.com/office/powerpoint/2010/main" val="805902953"/>
+      </p:ext>
+    </p:extLst>
+  </p:cSld>
+  <p:clrMapOvr>
+    <a:masterClrMapping/>
+  </p:clrMapOvr>
+</p:sld>
+</file>
+
+<file path=ppt/slides/slide30.xml><?xml version="1.0" encoding="utf-8"?>
+<p:sld xmlns:a="http://schemas.openxmlformats.org/drawingml/2006/main" xmlns:r="http://schemas.openxmlformats.org/officeDocument/2006/relationships" xmlns:p="http://schemas.openxmlformats.org/presentationml/2006/main">
+  <p:cSld>
+    <p:spTree>
+      <p:nvGrpSpPr>
+        <p:cNvPr id="1" name=""/>
+        <p:cNvGrpSpPr/>
+        <p:nvPr/>
+      </p:nvGrpSpPr>
+      <p:grpSpPr>
+        <a:xfrm>
+          <a:off x="0" y="0"/>
+          <a:ext cx="0" cy="0"/>
+          <a:chOff x="0" y="0"/>
+          <a:chExt cx="0" cy="0"/>
+        </a:xfrm>
+      </p:grpSpPr>
+      <p:sp>
+        <p:nvSpPr>
+          <p:cNvPr id="2" name="Title 1"/>
+          <p:cNvSpPr>
+            <a:spLocks noGrp="1"/>
+          </p:cNvSpPr>
+          <p:nvPr>
+            <p:ph type="title"/>
+          </p:nvPr>
+        </p:nvSpPr>
+        <p:spPr/>
+        <p:txBody>
+          <a:bodyPr/>
+          <a:lstStyle/>
+          <a:p>
+            <a:r>
+              <a:rPr lang="en-US" dirty="0" smtClean="0"/>
+              <a:t>Questions</a:t>
+            </a:r>
+            <a:endParaRPr lang="en-US" dirty="0"/>
+          </a:p>
+        </p:txBody>
+      </p:sp>
+      <p:sp>
+        <p:nvSpPr>
+          <p:cNvPr id="3" name="Content Placeholder 2"/>
+          <p:cNvSpPr>
+            <a:spLocks noGrp="1"/>
+          </p:cNvSpPr>
+          <p:nvPr>
+            <p:ph idx="1"/>
+          </p:nvPr>
+        </p:nvSpPr>
+        <p:spPr/>
+        <p:txBody>
+          <a:bodyPr/>
+          <a:lstStyle/>
+          <a:p>
+            <a:endParaRPr lang="en-US"/>
+          </a:p>
+        </p:txBody>
+      </p:sp>
+    </p:spTree>
+    <p:extLst>
+      <p:ext uri="{BB962C8B-B14F-4D97-AF65-F5344CB8AC3E}">
+        <p14:creationId xmlns:p14="http://schemas.microsoft.com/office/powerpoint/2010/main" val="1541502691"/>
       </p:ext>
     </p:extLst>
   </p:cSld>

</xml_diff>

<commit_message>
added matrix pills to title page
</commit_message>
<xml_diff>
--- a/going-serverless-2017.pptx
+++ b/going-serverless-2017.pptx
@@ -4592,32 +4592,325 @@
           <a:chExt cx="0" cy="0"/>
         </a:xfrm>
       </p:grpSpPr>
-      <p:sp>
-        <p:nvSpPr>
-          <p:cNvPr id="2" name="Title 1"/>
-          <p:cNvSpPr>
-            <a:spLocks noGrp="1"/>
-          </p:cNvSpPr>
-          <p:nvPr>
-            <p:ph type="ctrTitle"/>
-          </p:nvPr>
-        </p:nvSpPr>
+      <p:sp useBgFill="1">
+        <p:nvSpPr>
+          <p:cNvPr id="10" name="Rectangle 9">
+            <a:extLst>
+              <a:ext uri="{FF2B5EF4-FFF2-40B4-BE49-F238E27FC236}">
+                <a16:creationId xmlns:a16="http://schemas.microsoft.com/office/drawing/2014/main" xmlns="" id="{544C1FFD-8D6A-4A12-997F-ECA8F3321524}"/>
+              </a:ext>
+            </a:extLst>
+          </p:cNvPr>
+          <p:cNvSpPr>
+            <a:spLocks noGrp="1" noRot="1" noChangeAspect="1" noMove="1" noResize="1" noEditPoints="1" noAdjustHandles="1" noChangeArrowheads="1" noChangeShapeType="1" noTextEdit="1"/>
+          </p:cNvSpPr>
+          <p:nvPr>
+            <p:extLst>
+              <p:ext uri="{386F3935-93C4-4BCD-93E2-E3B085C9AB24}">
+                <p16:designElem xmlns:p16="http://schemas.microsoft.com/office/powerpoint/2015/main" val="1"/>
+              </p:ext>
+            </p:extLst>
+          </p:nvPr>
+        </p:nvSpPr>
+        <p:spPr bwMode="grayWhite">
+          <a:xfrm>
+            <a:off x="0" y="-32638"/>
+            <a:ext cx="12191999" cy="6890638"/>
+          </a:xfrm>
+          <a:prstGeom prst="rect">
+            <a:avLst/>
+          </a:prstGeom>
+          <a:ln>
+            <a:noFill/>
+          </a:ln>
+        </p:spPr>
+        <p:style>
+          <a:lnRef idx="2">
+            <a:schemeClr val="accent1">
+              <a:shade val="50000"/>
+            </a:schemeClr>
+          </a:lnRef>
+          <a:fillRef idx="1">
+            <a:schemeClr val="accent1"/>
+          </a:fillRef>
+          <a:effectRef idx="0">
+            <a:schemeClr val="accent1"/>
+          </a:effectRef>
+          <a:fontRef idx="minor">
+            <a:schemeClr val="lt1"/>
+          </a:fontRef>
+        </p:style>
+        <p:txBody>
+          <a:bodyPr rtlCol="0" anchor="ctr"/>
+          <a:lstStyle/>
+          <a:p>
+            <a:pPr algn="ctr"/>
+            <a:endParaRPr lang="en-US"/>
+          </a:p>
+        </p:txBody>
+      </p:sp>
+      <p:pic>
+        <p:nvPicPr>
+          <p:cNvPr id="5" name="Picture 4"/>
+          <p:cNvPicPr>
+            <a:picLocks noChangeAspect="1"/>
+          </p:cNvPicPr>
+          <p:nvPr/>
+        </p:nvPicPr>
+        <p:blipFill rotWithShape="1">
+          <a:blip r:embed="rId2"/>
+          <a:srcRect t="29455" b="32058"/>
+          <a:stretch/>
+        </p:blipFill>
         <p:spPr>
           <a:xfrm>
-            <a:off x="1088912" y="1143293"/>
-            <a:ext cx="10702035" cy="4268965"/>
+            <a:off x="20" y="-32638"/>
+            <a:ext cx="12191980" cy="2346158"/>
+          </a:xfrm>
+          <a:prstGeom prst="rect">
+            <a:avLst/>
+          </a:prstGeom>
+        </p:spPr>
+      </p:pic>
+      <p:sp>
+        <p:nvSpPr>
+          <p:cNvPr id="12" name="Freeform 6" title="Page Number Shape">
+            <a:extLst>
+              <a:ext uri="{FF2B5EF4-FFF2-40B4-BE49-F238E27FC236}">
+                <a16:creationId xmlns:a16="http://schemas.microsoft.com/office/drawing/2014/main" xmlns="" id="{014B3DE6-0CA2-4818-9E10-8ACF44107B10}"/>
+              </a:ext>
+            </a:extLst>
+          </p:cNvPr>
+          <p:cNvSpPr>
+            <a:spLocks noGrp="1" noRot="1" noChangeAspect="1" noMove="1" noResize="1" noEditPoints="1" noAdjustHandles="1" noChangeArrowheads="1" noChangeShapeType="1" noTextEdit="1"/>
+          </p:cNvSpPr>
+          <p:nvPr>
+            <p:extLst>
+              <p:ext uri="{386F3935-93C4-4BCD-93E2-E3B085C9AB24}">
+                <p16:designElem xmlns:p16="http://schemas.microsoft.com/office/powerpoint/2015/main" val="1"/>
+              </p:ext>
+            </p:extLst>
+          </p:nvPr>
+        </p:nvSpPr>
+        <p:spPr bwMode="auto">
+          <a:xfrm>
+            <a:off x="11784011" y="2735609"/>
+            <a:ext cx="407988" cy="819150"/>
+          </a:xfrm>
+          <a:custGeom>
+            <a:avLst/>
+            <a:gdLst/>
+            <a:ahLst/>
+            <a:cxnLst/>
+            <a:rect l="0" t="0" r="r" b="b"/>
+            <a:pathLst>
+              <a:path w="1799" h="3612">
+                <a:moveTo>
+                  <a:pt x="1799" y="0"/>
+                </a:moveTo>
+                <a:lnTo>
+                  <a:pt x="1799" y="3612"/>
+                </a:lnTo>
+                <a:lnTo>
+                  <a:pt x="1686" y="3609"/>
+                </a:lnTo>
+                <a:lnTo>
+                  <a:pt x="1574" y="3598"/>
+                </a:lnTo>
+                <a:lnTo>
+                  <a:pt x="1464" y="3581"/>
+                </a:lnTo>
+                <a:lnTo>
+                  <a:pt x="1357" y="3557"/>
+                </a:lnTo>
+                <a:lnTo>
+                  <a:pt x="1251" y="3527"/>
+                </a:lnTo>
+                <a:lnTo>
+                  <a:pt x="1150" y="3490"/>
+                </a:lnTo>
+                <a:lnTo>
+                  <a:pt x="1050" y="3448"/>
+                </a:lnTo>
+                <a:lnTo>
+                  <a:pt x="953" y="3401"/>
+                </a:lnTo>
+                <a:lnTo>
+                  <a:pt x="860" y="3347"/>
+                </a:lnTo>
+                <a:lnTo>
+                  <a:pt x="771" y="3289"/>
+                </a:lnTo>
+                <a:lnTo>
+                  <a:pt x="686" y="3224"/>
+                </a:lnTo>
+                <a:lnTo>
+                  <a:pt x="604" y="3156"/>
+                </a:lnTo>
+                <a:lnTo>
+                  <a:pt x="527" y="3083"/>
+                </a:lnTo>
+                <a:lnTo>
+                  <a:pt x="454" y="3005"/>
+                </a:lnTo>
+                <a:lnTo>
+                  <a:pt x="386" y="2923"/>
+                </a:lnTo>
+                <a:lnTo>
+                  <a:pt x="323" y="2838"/>
+                </a:lnTo>
+                <a:lnTo>
+                  <a:pt x="265" y="2748"/>
+                </a:lnTo>
+                <a:lnTo>
+                  <a:pt x="211" y="2655"/>
+                </a:lnTo>
+                <a:lnTo>
+                  <a:pt x="163" y="2559"/>
+                </a:lnTo>
+                <a:lnTo>
+                  <a:pt x="121" y="2459"/>
+                </a:lnTo>
+                <a:lnTo>
+                  <a:pt x="85" y="2356"/>
+                </a:lnTo>
+                <a:lnTo>
+                  <a:pt x="55" y="2251"/>
+                </a:lnTo>
+                <a:lnTo>
+                  <a:pt x="32" y="2143"/>
+                </a:lnTo>
+                <a:lnTo>
+                  <a:pt x="14" y="2033"/>
+                </a:lnTo>
+                <a:lnTo>
+                  <a:pt x="4" y="1920"/>
+                </a:lnTo>
+                <a:lnTo>
+                  <a:pt x="0" y="1806"/>
+                </a:lnTo>
+                <a:lnTo>
+                  <a:pt x="4" y="1692"/>
+                </a:lnTo>
+                <a:lnTo>
+                  <a:pt x="14" y="1580"/>
+                </a:lnTo>
+                <a:lnTo>
+                  <a:pt x="32" y="1469"/>
+                </a:lnTo>
+                <a:lnTo>
+                  <a:pt x="55" y="1362"/>
+                </a:lnTo>
+                <a:lnTo>
+                  <a:pt x="85" y="1256"/>
+                </a:lnTo>
+                <a:lnTo>
+                  <a:pt x="121" y="1154"/>
+                </a:lnTo>
+                <a:lnTo>
+                  <a:pt x="163" y="1054"/>
+                </a:lnTo>
+                <a:lnTo>
+                  <a:pt x="211" y="958"/>
+                </a:lnTo>
+                <a:lnTo>
+                  <a:pt x="265" y="864"/>
+                </a:lnTo>
+                <a:lnTo>
+                  <a:pt x="323" y="774"/>
+                </a:lnTo>
+                <a:lnTo>
+                  <a:pt x="386" y="689"/>
+                </a:lnTo>
+                <a:lnTo>
+                  <a:pt x="454" y="607"/>
+                </a:lnTo>
+                <a:lnTo>
+                  <a:pt x="527" y="529"/>
+                </a:lnTo>
+                <a:lnTo>
+                  <a:pt x="604" y="456"/>
+                </a:lnTo>
+                <a:lnTo>
+                  <a:pt x="686" y="388"/>
+                </a:lnTo>
+                <a:lnTo>
+                  <a:pt x="771" y="325"/>
+                </a:lnTo>
+                <a:lnTo>
+                  <a:pt x="860" y="266"/>
+                </a:lnTo>
+                <a:lnTo>
+                  <a:pt x="953" y="212"/>
+                </a:lnTo>
+                <a:lnTo>
+                  <a:pt x="1050" y="164"/>
+                </a:lnTo>
+                <a:lnTo>
+                  <a:pt x="1150" y="122"/>
+                </a:lnTo>
+                <a:lnTo>
+                  <a:pt x="1251" y="85"/>
+                </a:lnTo>
+                <a:lnTo>
+                  <a:pt x="1357" y="55"/>
+                </a:lnTo>
+                <a:lnTo>
+                  <a:pt x="1464" y="32"/>
+                </a:lnTo>
+                <a:lnTo>
+                  <a:pt x="1574" y="14"/>
+                </a:lnTo>
+                <a:lnTo>
+                  <a:pt x="1686" y="5"/>
+                </a:lnTo>
+                <a:lnTo>
+                  <a:pt x="1799" y="0"/>
+                </a:lnTo>
+                <a:close/>
+              </a:path>
+            </a:pathLst>
+          </a:custGeom>
+          <a:solidFill>
+            <a:schemeClr val="tx2"/>
+          </a:solidFill>
+          <a:ln w="0">
+            <a:noFill/>
+            <a:prstDash val="solid"/>
+            <a:round/>
+            <a:headEnd/>
+            <a:tailEnd/>
+          </a:ln>
+        </p:spPr>
+      </p:sp>
+      <p:sp>
+        <p:nvSpPr>
+          <p:cNvPr id="2" name="Title 1"/>
+          <p:cNvSpPr>
+            <a:spLocks noGrp="1"/>
+          </p:cNvSpPr>
+          <p:nvPr>
+            <p:ph type="ctrTitle"/>
+          </p:nvPr>
+        </p:nvSpPr>
+        <p:spPr>
+          <a:xfrm>
+            <a:off x="677599" y="2686846"/>
+            <a:ext cx="7816699" cy="2177424"/>
           </a:xfrm>
         </p:spPr>
         <p:txBody>
-          <a:bodyPr/>
+          <a:bodyPr>
+            <a:normAutofit/>
+          </a:bodyPr>
           <a:lstStyle/>
           <a:p>
             <a:r>
-              <a:rPr lang="en-US" dirty="0" smtClean="0"/>
+              <a:rPr lang="en-US" dirty="0"/>
               <a:t>Going </a:t>
             </a:r>
             <a:r>
-              <a:rPr lang="en-US" dirty="0" err="1" smtClean="0"/>
+              <a:rPr lang="en-US" dirty="0" err="1"/>
               <a:t>Serverless</a:t>
             </a:r>
             <a:endParaRPr lang="en-US" dirty="0"/>
@@ -4634,23 +4927,34 @@
             <p:ph type="subTitle" idx="1"/>
           </p:nvPr>
         </p:nvSpPr>
-        <p:spPr/>
-        <p:txBody>
-          <a:bodyPr/>
+        <p:spPr>
+          <a:xfrm>
+            <a:off x="677601" y="5136290"/>
+            <a:ext cx="7034362" cy="706355"/>
+          </a:xfrm>
+        </p:spPr>
+        <p:txBody>
+          <a:bodyPr anchor="b">
+            <a:normAutofit/>
+          </a:bodyPr>
           <a:lstStyle/>
           <a:p>
-            <a:r>
-              <a:rPr lang="en-US" dirty="0" smtClean="0"/>
+            <a:pPr>
+              <a:spcAft>
+                <a:spcPts val="600"/>
+              </a:spcAft>
+            </a:pPr>
+            <a:r>
+              <a:rPr lang="en-US" dirty="0"/>
               <a:t>Adrian Pomilio</a:t>
             </a:r>
-            <a:endParaRPr lang="en-US" dirty="0"/>
           </a:p>
         </p:txBody>
       </p:sp>
     </p:spTree>
     <p:extLst>
       <p:ext uri="{BB962C8B-B14F-4D97-AF65-F5344CB8AC3E}">
-        <p14:creationId xmlns:p14="http://schemas.microsoft.com/office/powerpoint/2010/main" val="399094552"/>
+        <p14:creationId xmlns:p14="http://schemas.microsoft.com/office/powerpoint/2010/main" val="1533315147"/>
       </p:ext>
     </p:extLst>
   </p:cSld>

</xml_diff>

<commit_message>
we are all mad here addition
</commit_message>
<xml_diff>
--- a/going-serverless-2017.pptx
+++ b/going-serverless-2017.pptx
@@ -27,8 +27,8 @@
     <p:sldId id="287" r:id="rId18"/>
     <p:sldId id="288" r:id="rId19"/>
     <p:sldId id="293" r:id="rId20"/>
-    <p:sldId id="277" r:id="rId21"/>
-    <p:sldId id="278" r:id="rId22"/>
+    <p:sldId id="278" r:id="rId21"/>
+    <p:sldId id="277" r:id="rId22"/>
     <p:sldId id="273" r:id="rId23"/>
     <p:sldId id="275" r:id="rId24"/>
     <p:sldId id="263" r:id="rId25"/>
@@ -5201,6 +5201,866 @@
       </p:grpSpPr>
       <p:sp>
         <p:nvSpPr>
+          <p:cNvPr id="9" name="Rectangle 8"/>
+          <p:cNvSpPr>
+            <a:spLocks noGrp="1" noRot="1" noChangeAspect="1" noMove="1" noResize="1" noEditPoints="1" noAdjustHandles="1" noChangeArrowheads="1" noChangeShapeType="1" noTextEdit="1"/>
+          </p:cNvSpPr>
+          <p:nvPr>
+            <p:extLst>
+              <p:ext uri="{386F3935-93C4-4BCD-93E2-E3B085C9AB24}">
+                <p16:designElem xmlns:p16="http://schemas.microsoft.com/office/powerpoint/2015/main" val="1"/>
+              </p:ext>
+            </p:extLst>
+          </p:nvPr>
+        </p:nvSpPr>
+        <p:spPr bwMode="white">
+          <a:xfrm>
+            <a:off x="0" y="0"/>
+            <a:ext cx="12192000" cy="6858000"/>
+          </a:xfrm>
+          <a:prstGeom prst="rect">
+            <a:avLst/>
+          </a:prstGeom>
+          <a:solidFill>
+            <a:schemeClr val="bg2"/>
+          </a:solidFill>
+          <a:ln>
+            <a:noFill/>
+          </a:ln>
+          <a:effectLst/>
+        </p:spPr>
+      </p:sp>
+      <p:sp>
+        <p:nvSpPr>
+          <p:cNvPr id="11" name="Freeform 6" title="Page Number Shape">
+            <a:extLst>
+              <a:ext uri="{FF2B5EF4-FFF2-40B4-BE49-F238E27FC236}">
+                <a16:creationId xmlns:a16="http://schemas.microsoft.com/office/drawing/2014/main" xmlns="" id="{63293441-3B04-46DE-92BF-F6494B38EB47}"/>
+              </a:ext>
+            </a:extLst>
+          </p:cNvPr>
+          <p:cNvSpPr>
+            <a:spLocks noGrp="1" noRot="1" noChangeAspect="1" noMove="1" noResize="1" noEditPoints="1" noAdjustHandles="1" noChangeArrowheads="1" noChangeShapeType="1" noTextEdit="1"/>
+          </p:cNvSpPr>
+          <p:nvPr>
+            <p:extLst>
+              <p:ext uri="{386F3935-93C4-4BCD-93E2-E3B085C9AB24}">
+                <p16:designElem xmlns:p16="http://schemas.microsoft.com/office/powerpoint/2015/main" val="1"/>
+              </p:ext>
+            </p:extLst>
+          </p:nvPr>
+        </p:nvSpPr>
+        <p:spPr bwMode="auto">
+          <a:xfrm>
+            <a:off x="11784011" y="1189204"/>
+            <a:ext cx="407988" cy="819150"/>
+          </a:xfrm>
+          <a:custGeom>
+            <a:avLst/>
+            <a:gdLst/>
+            <a:ahLst/>
+            <a:cxnLst/>
+            <a:rect l="0" t="0" r="r" b="b"/>
+            <a:pathLst>
+              <a:path w="1799" h="3612">
+                <a:moveTo>
+                  <a:pt x="1799" y="0"/>
+                </a:moveTo>
+                <a:lnTo>
+                  <a:pt x="1799" y="3612"/>
+                </a:lnTo>
+                <a:lnTo>
+                  <a:pt x="1686" y="3609"/>
+                </a:lnTo>
+                <a:lnTo>
+                  <a:pt x="1574" y="3598"/>
+                </a:lnTo>
+                <a:lnTo>
+                  <a:pt x="1464" y="3581"/>
+                </a:lnTo>
+                <a:lnTo>
+                  <a:pt x="1357" y="3557"/>
+                </a:lnTo>
+                <a:lnTo>
+                  <a:pt x="1251" y="3527"/>
+                </a:lnTo>
+                <a:lnTo>
+                  <a:pt x="1150" y="3490"/>
+                </a:lnTo>
+                <a:lnTo>
+                  <a:pt x="1050" y="3448"/>
+                </a:lnTo>
+                <a:lnTo>
+                  <a:pt x="953" y="3401"/>
+                </a:lnTo>
+                <a:lnTo>
+                  <a:pt x="860" y="3347"/>
+                </a:lnTo>
+                <a:lnTo>
+                  <a:pt x="771" y="3289"/>
+                </a:lnTo>
+                <a:lnTo>
+                  <a:pt x="686" y="3224"/>
+                </a:lnTo>
+                <a:lnTo>
+                  <a:pt x="604" y="3156"/>
+                </a:lnTo>
+                <a:lnTo>
+                  <a:pt x="527" y="3083"/>
+                </a:lnTo>
+                <a:lnTo>
+                  <a:pt x="454" y="3005"/>
+                </a:lnTo>
+                <a:lnTo>
+                  <a:pt x="386" y="2923"/>
+                </a:lnTo>
+                <a:lnTo>
+                  <a:pt x="323" y="2838"/>
+                </a:lnTo>
+                <a:lnTo>
+                  <a:pt x="265" y="2748"/>
+                </a:lnTo>
+                <a:lnTo>
+                  <a:pt x="211" y="2655"/>
+                </a:lnTo>
+                <a:lnTo>
+                  <a:pt x="163" y="2559"/>
+                </a:lnTo>
+                <a:lnTo>
+                  <a:pt x="121" y="2459"/>
+                </a:lnTo>
+                <a:lnTo>
+                  <a:pt x="85" y="2356"/>
+                </a:lnTo>
+                <a:lnTo>
+                  <a:pt x="55" y="2251"/>
+                </a:lnTo>
+                <a:lnTo>
+                  <a:pt x="32" y="2143"/>
+                </a:lnTo>
+                <a:lnTo>
+                  <a:pt x="14" y="2033"/>
+                </a:lnTo>
+                <a:lnTo>
+                  <a:pt x="4" y="1920"/>
+                </a:lnTo>
+                <a:lnTo>
+                  <a:pt x="0" y="1806"/>
+                </a:lnTo>
+                <a:lnTo>
+                  <a:pt x="4" y="1692"/>
+                </a:lnTo>
+                <a:lnTo>
+                  <a:pt x="14" y="1580"/>
+                </a:lnTo>
+                <a:lnTo>
+                  <a:pt x="32" y="1469"/>
+                </a:lnTo>
+                <a:lnTo>
+                  <a:pt x="55" y="1362"/>
+                </a:lnTo>
+                <a:lnTo>
+                  <a:pt x="85" y="1256"/>
+                </a:lnTo>
+                <a:lnTo>
+                  <a:pt x="121" y="1154"/>
+                </a:lnTo>
+                <a:lnTo>
+                  <a:pt x="163" y="1054"/>
+                </a:lnTo>
+                <a:lnTo>
+                  <a:pt x="211" y="958"/>
+                </a:lnTo>
+                <a:lnTo>
+                  <a:pt x="265" y="864"/>
+                </a:lnTo>
+                <a:lnTo>
+                  <a:pt x="323" y="774"/>
+                </a:lnTo>
+                <a:lnTo>
+                  <a:pt x="386" y="689"/>
+                </a:lnTo>
+                <a:lnTo>
+                  <a:pt x="454" y="607"/>
+                </a:lnTo>
+                <a:lnTo>
+                  <a:pt x="527" y="529"/>
+                </a:lnTo>
+                <a:lnTo>
+                  <a:pt x="604" y="456"/>
+                </a:lnTo>
+                <a:lnTo>
+                  <a:pt x="686" y="388"/>
+                </a:lnTo>
+                <a:lnTo>
+                  <a:pt x="771" y="325"/>
+                </a:lnTo>
+                <a:lnTo>
+                  <a:pt x="860" y="266"/>
+                </a:lnTo>
+                <a:lnTo>
+                  <a:pt x="953" y="212"/>
+                </a:lnTo>
+                <a:lnTo>
+                  <a:pt x="1050" y="164"/>
+                </a:lnTo>
+                <a:lnTo>
+                  <a:pt x="1150" y="122"/>
+                </a:lnTo>
+                <a:lnTo>
+                  <a:pt x="1251" y="85"/>
+                </a:lnTo>
+                <a:lnTo>
+                  <a:pt x="1357" y="55"/>
+                </a:lnTo>
+                <a:lnTo>
+                  <a:pt x="1464" y="32"/>
+                </a:lnTo>
+                <a:lnTo>
+                  <a:pt x="1574" y="14"/>
+                </a:lnTo>
+                <a:lnTo>
+                  <a:pt x="1686" y="5"/>
+                </a:lnTo>
+                <a:lnTo>
+                  <a:pt x="1799" y="0"/>
+                </a:lnTo>
+                <a:close/>
+              </a:path>
+            </a:pathLst>
+          </a:custGeom>
+          <a:solidFill>
+            <a:schemeClr val="tx2"/>
+          </a:solidFill>
+          <a:ln w="0">
+            <a:noFill/>
+            <a:prstDash val="solid"/>
+            <a:round/>
+            <a:headEnd/>
+            <a:tailEnd/>
+          </a:ln>
+        </p:spPr>
+      </p:sp>
+      <p:cxnSp>
+        <p:nvCxnSpPr>
+          <p:cNvPr id="13" name="Straight Connector 12" title="Verticle Rule Line">
+            <a:extLst>
+              <a:ext uri="{FF2B5EF4-FFF2-40B4-BE49-F238E27FC236}">
+                <a16:creationId xmlns:a16="http://schemas.microsoft.com/office/drawing/2014/main" xmlns="" id="{77EEC01B-B858-4BAA-A85D-512B076C0E30}"/>
+              </a:ext>
+            </a:extLst>
+          </p:cNvPr>
+          <p:cNvCxnSpPr>
+            <a:cxnSpLocks noGrp="1" noRot="1" noChangeAspect="1" noMove="1" noResize="1" noEditPoints="1" noAdjustHandles="1" noChangeArrowheads="1" noChangeShapeType="1"/>
+          </p:cNvCxnSpPr>
+          <p:nvPr>
+            <p:extLst>
+              <p:ext uri="{386F3935-93C4-4BCD-93E2-E3B085C9AB24}">
+                <p16:designElem xmlns:p16="http://schemas.microsoft.com/office/powerpoint/2015/main" val="1"/>
+              </p:ext>
+            </p:extLst>
+          </p:nvPr>
+        </p:nvCxnSpPr>
+        <p:spPr>
+          <a:xfrm>
+            <a:off x="773855" y="1257300"/>
+            <a:ext cx="0" cy="5600700"/>
+          </a:xfrm>
+          <a:prstGeom prst="line">
+            <a:avLst/>
+          </a:prstGeom>
+          <a:ln w="25400">
+            <a:solidFill>
+              <a:schemeClr val="tx2"/>
+            </a:solidFill>
+          </a:ln>
+        </p:spPr>
+        <p:style>
+          <a:lnRef idx="1">
+            <a:schemeClr val="accent1"/>
+          </a:lnRef>
+          <a:fillRef idx="0">
+            <a:schemeClr val="accent1"/>
+          </a:fillRef>
+          <a:effectRef idx="0">
+            <a:schemeClr val="accent1"/>
+          </a:effectRef>
+          <a:fontRef idx="minor">
+            <a:schemeClr val="tx1"/>
+          </a:fontRef>
+        </p:style>
+      </p:cxnSp>
+      <p:sp useBgFill="1">
+        <p:nvSpPr>
+          <p:cNvPr id="15" name="Rectangle 14">
+            <a:extLst>
+              <a:ext uri="{FF2B5EF4-FFF2-40B4-BE49-F238E27FC236}">
+                <a16:creationId xmlns:a16="http://schemas.microsoft.com/office/drawing/2014/main" xmlns="" id="{238A9029-B6C8-493A-8A35-351F371FD85E}"/>
+              </a:ext>
+            </a:extLst>
+          </p:cNvPr>
+          <p:cNvSpPr>
+            <a:spLocks noGrp="1" noRot="1" noChangeAspect="1" noMove="1" noResize="1" noEditPoints="1" noAdjustHandles="1" noChangeArrowheads="1" noChangeShapeType="1" noTextEdit="1"/>
+          </p:cNvSpPr>
+          <p:nvPr>
+            <p:extLst>
+              <p:ext uri="{386F3935-93C4-4BCD-93E2-E3B085C9AB24}">
+                <p16:designElem xmlns:p16="http://schemas.microsoft.com/office/powerpoint/2015/main" val="1"/>
+              </p:ext>
+            </p:extLst>
+          </p:nvPr>
+        </p:nvSpPr>
+        <p:spPr bwMode="grayWhite">
+          <a:xfrm>
+            <a:off x="0" y="0"/>
+            <a:ext cx="12192000" cy="6858000"/>
+          </a:xfrm>
+          <a:prstGeom prst="rect">
+            <a:avLst/>
+          </a:prstGeom>
+          <a:ln>
+            <a:noFill/>
+          </a:ln>
+        </p:spPr>
+        <p:style>
+          <a:lnRef idx="2">
+            <a:schemeClr val="accent1">
+              <a:shade val="50000"/>
+            </a:schemeClr>
+          </a:lnRef>
+          <a:fillRef idx="1">
+            <a:schemeClr val="accent1"/>
+          </a:fillRef>
+          <a:effectRef idx="0">
+            <a:schemeClr val="accent1"/>
+          </a:effectRef>
+          <a:fontRef idx="minor">
+            <a:schemeClr val="lt1"/>
+          </a:fontRef>
+        </p:style>
+        <p:txBody>
+          <a:bodyPr rot="0" spcFirstLastPara="0" vert="horz" wrap="square" lIns="91440" tIns="45720" rIns="91440" bIns="45720" numCol="1" spcCol="0" rtlCol="0" fromWordArt="0" anchor="ctr" anchorCtr="0" forceAA="0" compatLnSpc="1">
+            <a:prstTxWarp prst="textNoShape">
+              <a:avLst/>
+            </a:prstTxWarp>
+            <a:noAutofit/>
+          </a:bodyPr>
+          <a:lstStyle>
+            <a:defPPr>
+              <a:defRPr lang="en-US"/>
+            </a:defPPr>
+            <a:lvl1pPr marL="0" algn="l" defTabSz="914400" rtl="0" eaLnBrk="1" latinLnBrk="0" hangingPunct="1">
+              <a:defRPr sz="1800" kern="1200">
+                <a:solidFill>
+                  <a:schemeClr val="lt1"/>
+                </a:solidFill>
+                <a:latin typeface="+mn-lt"/>
+                <a:ea typeface="+mn-ea"/>
+                <a:cs typeface="+mn-cs"/>
+              </a:defRPr>
+            </a:lvl1pPr>
+            <a:lvl2pPr marL="457200" algn="l" defTabSz="914400" rtl="0" eaLnBrk="1" latinLnBrk="0" hangingPunct="1">
+              <a:defRPr sz="1800" kern="1200">
+                <a:solidFill>
+                  <a:schemeClr val="lt1"/>
+                </a:solidFill>
+                <a:latin typeface="+mn-lt"/>
+                <a:ea typeface="+mn-ea"/>
+                <a:cs typeface="+mn-cs"/>
+              </a:defRPr>
+            </a:lvl2pPr>
+            <a:lvl3pPr marL="914400" algn="l" defTabSz="914400" rtl="0" eaLnBrk="1" latinLnBrk="0" hangingPunct="1">
+              <a:defRPr sz="1800" kern="1200">
+                <a:solidFill>
+                  <a:schemeClr val="lt1"/>
+                </a:solidFill>
+                <a:latin typeface="+mn-lt"/>
+                <a:ea typeface="+mn-ea"/>
+                <a:cs typeface="+mn-cs"/>
+              </a:defRPr>
+            </a:lvl3pPr>
+            <a:lvl4pPr marL="1371600" algn="l" defTabSz="914400" rtl="0" eaLnBrk="1" latinLnBrk="0" hangingPunct="1">
+              <a:defRPr sz="1800" kern="1200">
+                <a:solidFill>
+                  <a:schemeClr val="lt1"/>
+                </a:solidFill>
+                <a:latin typeface="+mn-lt"/>
+                <a:ea typeface="+mn-ea"/>
+                <a:cs typeface="+mn-cs"/>
+              </a:defRPr>
+            </a:lvl4pPr>
+            <a:lvl5pPr marL="1828800" algn="l" defTabSz="914400" rtl="0" eaLnBrk="1" latinLnBrk="0" hangingPunct="1">
+              <a:defRPr sz="1800" kern="1200">
+                <a:solidFill>
+                  <a:schemeClr val="lt1"/>
+                </a:solidFill>
+                <a:latin typeface="+mn-lt"/>
+                <a:ea typeface="+mn-ea"/>
+                <a:cs typeface="+mn-cs"/>
+              </a:defRPr>
+            </a:lvl5pPr>
+            <a:lvl6pPr marL="2286000" algn="l" defTabSz="914400" rtl="0" eaLnBrk="1" latinLnBrk="0" hangingPunct="1">
+              <a:defRPr sz="1800" kern="1200">
+                <a:solidFill>
+                  <a:schemeClr val="lt1"/>
+                </a:solidFill>
+                <a:latin typeface="+mn-lt"/>
+                <a:ea typeface="+mn-ea"/>
+                <a:cs typeface="+mn-cs"/>
+              </a:defRPr>
+            </a:lvl6pPr>
+            <a:lvl7pPr marL="2743200" algn="l" defTabSz="914400" rtl="0" eaLnBrk="1" latinLnBrk="0" hangingPunct="1">
+              <a:defRPr sz="1800" kern="1200">
+                <a:solidFill>
+                  <a:schemeClr val="lt1"/>
+                </a:solidFill>
+                <a:latin typeface="+mn-lt"/>
+                <a:ea typeface="+mn-ea"/>
+                <a:cs typeface="+mn-cs"/>
+              </a:defRPr>
+            </a:lvl7pPr>
+            <a:lvl8pPr marL="3200400" algn="l" defTabSz="914400" rtl="0" eaLnBrk="1" latinLnBrk="0" hangingPunct="1">
+              <a:defRPr sz="1800" kern="1200">
+                <a:solidFill>
+                  <a:schemeClr val="lt1"/>
+                </a:solidFill>
+                <a:latin typeface="+mn-lt"/>
+                <a:ea typeface="+mn-ea"/>
+                <a:cs typeface="+mn-cs"/>
+              </a:defRPr>
+            </a:lvl8pPr>
+            <a:lvl9pPr marL="3657600" algn="l" defTabSz="914400" rtl="0" eaLnBrk="1" latinLnBrk="0" hangingPunct="1">
+              <a:defRPr sz="1800" kern="1200">
+                <a:solidFill>
+                  <a:schemeClr val="lt1"/>
+                </a:solidFill>
+                <a:latin typeface="+mn-lt"/>
+                <a:ea typeface="+mn-ea"/>
+                <a:cs typeface="+mn-cs"/>
+              </a:defRPr>
+            </a:lvl9pPr>
+          </a:lstStyle>
+          <a:p>
+            <a:pPr marL="0" marR="0" lvl="0" indent="0" algn="ctr" defTabSz="914400" rtl="0" eaLnBrk="1" fontAlgn="auto" latinLnBrk="0" hangingPunct="1">
+              <a:lnSpc>
+                <a:spcPct val="100000"/>
+              </a:lnSpc>
+              <a:spcBef>
+                <a:spcPts val="0"/>
+              </a:spcBef>
+              <a:spcAft>
+                <a:spcPts val="0"/>
+              </a:spcAft>
+              <a:buClrTx/>
+              <a:buSzTx/>
+              <a:buFontTx/>
+              <a:buNone/>
+              <a:tabLst/>
+              <a:defRPr/>
+            </a:pPr>
+            <a:endParaRPr kumimoji="0" lang="en-US" sz="1800" b="0" i="0" u="none" strike="noStrike" kern="1200" cap="none" spc="0" normalizeH="0" baseline="0" noProof="0">
+              <a:ln>
+                <a:noFill/>
+              </a:ln>
+              <a:solidFill>
+                <a:prstClr val="white"/>
+              </a:solidFill>
+              <a:effectLst/>
+              <a:uLnTx/>
+              <a:uFillTx/>
+              <a:latin typeface="Corbel" panose="020B0503020204020204"/>
+              <a:ea typeface="+mn-ea"/>
+              <a:cs typeface="+mn-cs"/>
+            </a:endParaRPr>
+          </a:p>
+        </p:txBody>
+      </p:sp>
+      <p:pic>
+        <p:nvPicPr>
+          <p:cNvPr id="4" name="Content Placeholder 3"/>
+          <p:cNvPicPr>
+            <a:picLocks noGrp="1" noChangeAspect="1"/>
+          </p:cNvPicPr>
+          <p:nvPr>
+            <p:ph idx="1"/>
+          </p:nvPr>
+        </p:nvPicPr>
+        <p:blipFill rotWithShape="1">
+          <a:blip r:embed="rId2">
+            <a:duotone>
+              <a:schemeClr val="accent3">
+                <a:shade val="45000"/>
+                <a:satMod val="135000"/>
+              </a:schemeClr>
+              <a:prstClr val="white"/>
+            </a:duotone>
+          </a:blip>
+          <a:srcRect t="1640"/>
+          <a:stretch/>
+        </p:blipFill>
+        <p:spPr>
+          <a:xfrm>
+            <a:off x="5219699" y="10"/>
+            <a:ext cx="6972301" cy="6857990"/>
+          </a:xfrm>
+          <a:prstGeom prst="rect">
+            <a:avLst/>
+          </a:prstGeom>
+        </p:spPr>
+      </p:pic>
+      <p:sp>
+        <p:nvSpPr>
+          <p:cNvPr id="17" name="Rectangle 16">
+            <a:extLst>
+              <a:ext uri="{FF2B5EF4-FFF2-40B4-BE49-F238E27FC236}">
+                <a16:creationId xmlns:a16="http://schemas.microsoft.com/office/drawing/2014/main" xmlns="" id="{7227713B-C67F-4F2C-A9DA-7D4B7196E4BC}"/>
+              </a:ext>
+            </a:extLst>
+          </p:cNvPr>
+          <p:cNvSpPr>
+            <a:spLocks noGrp="1" noRot="1" noChangeAspect="1" noMove="1" noResize="1" noEditPoints="1" noAdjustHandles="1" noChangeArrowheads="1" noChangeShapeType="1" noTextEdit="1"/>
+          </p:cNvSpPr>
+          <p:nvPr>
+            <p:extLst>
+              <p:ext uri="{386F3935-93C4-4BCD-93E2-E3B085C9AB24}">
+                <p16:designElem xmlns:p16="http://schemas.microsoft.com/office/powerpoint/2015/main" val="1"/>
+              </p:ext>
+            </p:extLst>
+          </p:nvPr>
+        </p:nvSpPr>
+        <p:spPr>
+          <a:xfrm>
+            <a:off x="5219698" y="0"/>
+            <a:ext cx="6972301" cy="6858000"/>
+          </a:xfrm>
+          <a:prstGeom prst="rect">
+            <a:avLst/>
+          </a:prstGeom>
+          <a:solidFill>
+            <a:schemeClr val="accent3">
+              <a:alpha val="70000"/>
+            </a:schemeClr>
+          </a:solidFill>
+          <a:ln>
+            <a:noFill/>
+          </a:ln>
+        </p:spPr>
+        <p:style>
+          <a:lnRef idx="2">
+            <a:schemeClr val="accent1">
+              <a:shade val="50000"/>
+            </a:schemeClr>
+          </a:lnRef>
+          <a:fillRef idx="1">
+            <a:schemeClr val="accent1"/>
+          </a:fillRef>
+          <a:effectRef idx="0">
+            <a:schemeClr val="accent1"/>
+          </a:effectRef>
+          <a:fontRef idx="minor">
+            <a:schemeClr val="lt1"/>
+          </a:fontRef>
+        </p:style>
+        <p:txBody>
+          <a:bodyPr rtlCol="0" anchor="ctr"/>
+          <a:lstStyle/>
+          <a:p>
+            <a:pPr marL="0" marR="0" lvl="0" indent="0" algn="ctr" defTabSz="457200" rtl="0" eaLnBrk="1" fontAlgn="auto" latinLnBrk="0" hangingPunct="1">
+              <a:lnSpc>
+                <a:spcPct val="100000"/>
+              </a:lnSpc>
+              <a:spcBef>
+                <a:spcPts val="0"/>
+              </a:spcBef>
+              <a:spcAft>
+                <a:spcPts val="0"/>
+              </a:spcAft>
+              <a:buClrTx/>
+              <a:buSzTx/>
+              <a:buFontTx/>
+              <a:buNone/>
+              <a:tabLst/>
+              <a:defRPr/>
+            </a:pPr>
+            <a:endParaRPr kumimoji="0" lang="en-US" sz="1800" b="0" i="0" u="none" strike="noStrike" kern="1200" cap="none" spc="0" normalizeH="0" baseline="0" noProof="0" dirty="0">
+              <a:ln>
+                <a:noFill/>
+              </a:ln>
+              <a:solidFill>
+                <a:prstClr val="white"/>
+              </a:solidFill>
+              <a:effectLst/>
+              <a:uLnTx/>
+              <a:uFillTx/>
+              <a:latin typeface="Corbel" panose="020B0503020204020204"/>
+              <a:ea typeface="+mn-ea"/>
+              <a:cs typeface="+mn-cs"/>
+            </a:endParaRPr>
+          </a:p>
+        </p:txBody>
+      </p:sp>
+      <p:sp>
+        <p:nvSpPr>
+          <p:cNvPr id="19" name="Freeform 6" title="Page Number Shape">
+            <a:extLst>
+              <a:ext uri="{FF2B5EF4-FFF2-40B4-BE49-F238E27FC236}">
+                <a16:creationId xmlns:a16="http://schemas.microsoft.com/office/drawing/2014/main" xmlns="" id="{8179BED0-B0A7-403F-B9F3-72C7D450F15C}"/>
+              </a:ext>
+            </a:extLst>
+          </p:cNvPr>
+          <p:cNvSpPr>
+            <a:spLocks noGrp="1" noRot="1" noChangeAspect="1" noMove="1" noResize="1" noEditPoints="1" noAdjustHandles="1" noChangeArrowheads="1" noChangeShapeType="1" noTextEdit="1"/>
+          </p:cNvSpPr>
+          <p:nvPr>
+            <p:extLst>
+              <p:ext uri="{386F3935-93C4-4BCD-93E2-E3B085C9AB24}">
+                <p16:designElem xmlns:p16="http://schemas.microsoft.com/office/powerpoint/2015/main" val="1"/>
+              </p:ext>
+            </p:extLst>
+          </p:nvPr>
+        </p:nvSpPr>
+        <p:spPr bwMode="auto">
+          <a:xfrm>
+            <a:off x="11784012" y="0"/>
+            <a:ext cx="407988" cy="819150"/>
+          </a:xfrm>
+          <a:custGeom>
+            <a:avLst/>
+            <a:gdLst/>
+            <a:ahLst/>
+            <a:cxnLst/>
+            <a:rect l="0" t="0" r="r" b="b"/>
+            <a:pathLst>
+              <a:path w="1799" h="3612">
+                <a:moveTo>
+                  <a:pt x="1799" y="0"/>
+                </a:moveTo>
+                <a:lnTo>
+                  <a:pt x="1799" y="3612"/>
+                </a:lnTo>
+                <a:lnTo>
+                  <a:pt x="1686" y="3609"/>
+                </a:lnTo>
+                <a:lnTo>
+                  <a:pt x="1574" y="3598"/>
+                </a:lnTo>
+                <a:lnTo>
+                  <a:pt x="1464" y="3581"/>
+                </a:lnTo>
+                <a:lnTo>
+                  <a:pt x="1357" y="3557"/>
+                </a:lnTo>
+                <a:lnTo>
+                  <a:pt x="1251" y="3527"/>
+                </a:lnTo>
+                <a:lnTo>
+                  <a:pt x="1150" y="3490"/>
+                </a:lnTo>
+                <a:lnTo>
+                  <a:pt x="1050" y="3448"/>
+                </a:lnTo>
+                <a:lnTo>
+                  <a:pt x="953" y="3401"/>
+                </a:lnTo>
+                <a:lnTo>
+                  <a:pt x="860" y="3347"/>
+                </a:lnTo>
+                <a:lnTo>
+                  <a:pt x="771" y="3289"/>
+                </a:lnTo>
+                <a:lnTo>
+                  <a:pt x="686" y="3224"/>
+                </a:lnTo>
+                <a:lnTo>
+                  <a:pt x="604" y="3156"/>
+                </a:lnTo>
+                <a:lnTo>
+                  <a:pt x="527" y="3083"/>
+                </a:lnTo>
+                <a:lnTo>
+                  <a:pt x="454" y="3005"/>
+                </a:lnTo>
+                <a:lnTo>
+                  <a:pt x="386" y="2923"/>
+                </a:lnTo>
+                <a:lnTo>
+                  <a:pt x="323" y="2838"/>
+                </a:lnTo>
+                <a:lnTo>
+                  <a:pt x="265" y="2748"/>
+                </a:lnTo>
+                <a:lnTo>
+                  <a:pt x="211" y="2655"/>
+                </a:lnTo>
+                <a:lnTo>
+                  <a:pt x="163" y="2559"/>
+                </a:lnTo>
+                <a:lnTo>
+                  <a:pt x="121" y="2459"/>
+                </a:lnTo>
+                <a:lnTo>
+                  <a:pt x="85" y="2356"/>
+                </a:lnTo>
+                <a:lnTo>
+                  <a:pt x="55" y="2251"/>
+                </a:lnTo>
+                <a:lnTo>
+                  <a:pt x="32" y="2143"/>
+                </a:lnTo>
+                <a:lnTo>
+                  <a:pt x="14" y="2033"/>
+                </a:lnTo>
+                <a:lnTo>
+                  <a:pt x="4" y="1920"/>
+                </a:lnTo>
+                <a:lnTo>
+                  <a:pt x="0" y="1806"/>
+                </a:lnTo>
+                <a:lnTo>
+                  <a:pt x="4" y="1692"/>
+                </a:lnTo>
+                <a:lnTo>
+                  <a:pt x="14" y="1580"/>
+                </a:lnTo>
+                <a:lnTo>
+                  <a:pt x="32" y="1469"/>
+                </a:lnTo>
+                <a:lnTo>
+                  <a:pt x="55" y="1362"/>
+                </a:lnTo>
+                <a:lnTo>
+                  <a:pt x="85" y="1256"/>
+                </a:lnTo>
+                <a:lnTo>
+                  <a:pt x="121" y="1154"/>
+                </a:lnTo>
+                <a:lnTo>
+                  <a:pt x="163" y="1054"/>
+                </a:lnTo>
+                <a:lnTo>
+                  <a:pt x="211" y="958"/>
+                </a:lnTo>
+                <a:lnTo>
+                  <a:pt x="265" y="864"/>
+                </a:lnTo>
+                <a:lnTo>
+                  <a:pt x="323" y="774"/>
+                </a:lnTo>
+                <a:lnTo>
+                  <a:pt x="386" y="689"/>
+                </a:lnTo>
+                <a:lnTo>
+                  <a:pt x="454" y="607"/>
+                </a:lnTo>
+                <a:lnTo>
+                  <a:pt x="527" y="529"/>
+                </a:lnTo>
+                <a:lnTo>
+                  <a:pt x="604" y="456"/>
+                </a:lnTo>
+                <a:lnTo>
+                  <a:pt x="686" y="388"/>
+                </a:lnTo>
+                <a:lnTo>
+                  <a:pt x="771" y="325"/>
+                </a:lnTo>
+                <a:lnTo>
+                  <a:pt x="860" y="266"/>
+                </a:lnTo>
+                <a:lnTo>
+                  <a:pt x="953" y="212"/>
+                </a:lnTo>
+                <a:lnTo>
+                  <a:pt x="1050" y="164"/>
+                </a:lnTo>
+                <a:lnTo>
+                  <a:pt x="1150" y="122"/>
+                </a:lnTo>
+                <a:lnTo>
+                  <a:pt x="1251" y="85"/>
+                </a:lnTo>
+                <a:lnTo>
+                  <a:pt x="1357" y="55"/>
+                </a:lnTo>
+                <a:lnTo>
+                  <a:pt x="1464" y="32"/>
+                </a:lnTo>
+                <a:lnTo>
+                  <a:pt x="1574" y="14"/>
+                </a:lnTo>
+                <a:lnTo>
+                  <a:pt x="1686" y="5"/>
+                </a:lnTo>
+                <a:lnTo>
+                  <a:pt x="1799" y="0"/>
+                </a:lnTo>
+                <a:close/>
+              </a:path>
+            </a:pathLst>
+          </a:custGeom>
+          <a:solidFill>
+            <a:schemeClr val="tx2"/>
+          </a:solidFill>
+          <a:ln w="0">
+            <a:noFill/>
+            <a:prstDash val="solid"/>
+            <a:round/>
+            <a:headEnd/>
+            <a:tailEnd/>
+          </a:ln>
+        </p:spPr>
+      </p:sp>
+      <p:cxnSp>
+        <p:nvCxnSpPr>
+          <p:cNvPr id="21" name="Straight Connector 20" title="Verticle Rule Line">
+            <a:extLst>
+              <a:ext uri="{FF2B5EF4-FFF2-40B4-BE49-F238E27FC236}">
+                <a16:creationId xmlns:a16="http://schemas.microsoft.com/office/drawing/2014/main" xmlns="" id="{E0B1C946-866A-438C-82B4-5BEFCA92A355}"/>
+              </a:ext>
+            </a:extLst>
+          </p:cNvPr>
+          <p:cNvCxnSpPr>
+            <a:cxnSpLocks noGrp="1" noRot="1" noChangeAspect="1" noMove="1" noResize="1" noEditPoints="1" noAdjustHandles="1" noChangeArrowheads="1" noChangeShapeType="1"/>
+          </p:cNvCxnSpPr>
+          <p:nvPr>
+            <p:extLst>
+              <p:ext uri="{386F3935-93C4-4BCD-93E2-E3B085C9AB24}">
+                <p16:designElem xmlns:p16="http://schemas.microsoft.com/office/powerpoint/2015/main" val="1"/>
+              </p:ext>
+            </p:extLst>
+          </p:nvPr>
+        </p:nvCxnSpPr>
+        <p:spPr>
+          <a:xfrm rot="5400000">
+            <a:off x="2658231" y="3558171"/>
+            <a:ext cx="4657344" cy="0"/>
+          </a:xfrm>
+          <a:prstGeom prst="line">
+            <a:avLst/>
+          </a:prstGeom>
+          <a:ln w="25400">
+            <a:solidFill>
+              <a:schemeClr val="accent3"/>
+            </a:solidFill>
+          </a:ln>
+        </p:spPr>
+        <p:style>
+          <a:lnRef idx="1">
+            <a:schemeClr val="accent1"/>
+          </a:lnRef>
+          <a:fillRef idx="0">
+            <a:schemeClr val="accent1"/>
+          </a:fillRef>
+          <a:effectRef idx="0">
+            <a:schemeClr val="accent1"/>
+          </a:effectRef>
+          <a:fontRef idx="minor">
+            <a:schemeClr val="tx1"/>
+          </a:fontRef>
+        </p:style>
+      </p:cxnSp>
+      <p:sp>
+        <p:nvSpPr>
           <p:cNvPr id="2" name="Title 1"/>
           <p:cNvSpPr>
             <a:spLocks noGrp="1"/>
@@ -5209,42 +6069,38 @@
             <p:ph type="title"/>
           </p:nvPr>
         </p:nvSpPr>
-        <p:spPr/>
-        <p:txBody>
-          <a:bodyPr/>
+        <p:spPr>
+          <a:xfrm>
+            <a:off x="5433060" y="643467"/>
+            <a:ext cx="6079708" cy="5560026"/>
+          </a:xfrm>
+        </p:spPr>
+        <p:txBody>
+          <a:bodyPr vert="horz" lIns="91440" tIns="45720" rIns="91440" bIns="45720" rtlCol="0" anchor="ctr">
+            <a:normAutofit/>
+          </a:bodyPr>
           <a:lstStyle/>
           <a:p>
-            <a:r>
-              <a:rPr lang="en-US" dirty="0" smtClean="0"/>
+            <a:pPr algn="l">
+              <a:lnSpc>
+                <a:spcPct val="85000"/>
+              </a:lnSpc>
+            </a:pPr>
+            <a:r>
+              <a:rPr lang="en-US" sz="4400" cap="all">
+                <a:solidFill>
+                  <a:schemeClr val="tx2"/>
+                </a:solidFill>
+              </a:rPr>
               <a:t>The AWS view</a:t>
             </a:r>
-            <a:endParaRPr lang="en-US" dirty="0"/>
-          </a:p>
-        </p:txBody>
-      </p:sp>
-      <p:sp>
-        <p:nvSpPr>
-          <p:cNvPr id="3" name="Content Placeholder 2"/>
-          <p:cNvSpPr>
-            <a:spLocks noGrp="1"/>
-          </p:cNvSpPr>
-          <p:nvPr>
-            <p:ph idx="1"/>
-          </p:nvPr>
-        </p:nvSpPr>
-        <p:spPr/>
-        <p:txBody>
-          <a:bodyPr/>
-          <a:lstStyle/>
-          <a:p>
-            <a:endParaRPr lang="en-US" dirty="0"/>
           </a:p>
         </p:txBody>
       </p:sp>
     </p:spTree>
     <p:extLst>
       <p:ext uri="{BB962C8B-B14F-4D97-AF65-F5344CB8AC3E}">
-        <p14:creationId xmlns:p14="http://schemas.microsoft.com/office/powerpoint/2010/main" val="2017501127"/>
+        <p14:creationId xmlns:p14="http://schemas.microsoft.com/office/powerpoint/2010/main" val="32188555"/>
       </p:ext>
     </p:extLst>
   </p:cSld>
@@ -5290,7 +6146,14 @@
               <a:rPr lang="en-US" dirty="0" smtClean="0"/>
               <a:t>Patterns</a:t>
             </a:r>
-            <a:endParaRPr lang="en-US" dirty="0"/>
+            <a:br>
+              <a:rPr lang="en-US" dirty="0" smtClean="0"/>
+            </a:br>
+            <a:r>
+              <a:rPr lang="en-US" sz="2400" dirty="0" smtClean="0"/>
+              <a:t>again</a:t>
+            </a:r>
+            <a:endParaRPr lang="en-US" sz="2400" dirty="0"/>
           </a:p>
         </p:txBody>
       </p:sp>
@@ -7622,6 +8485,188 @@
             </a:br>
             <a:r>
               <a:rPr lang="en-US" sz="2400" dirty="0" smtClean="0"/>
+              <a:t>language/runtime support</a:t>
+            </a:r>
+            <a:endParaRPr lang="en-US" sz="2400" dirty="0"/>
+          </a:p>
+        </p:txBody>
+      </p:sp>
+      <p:sp>
+        <p:nvSpPr>
+          <p:cNvPr id="3" name="Content Placeholder 2"/>
+          <p:cNvSpPr>
+            <a:spLocks noGrp="1"/>
+          </p:cNvSpPr>
+          <p:nvPr>
+            <p:ph idx="1"/>
+          </p:nvPr>
+        </p:nvSpPr>
+        <p:spPr/>
+        <p:txBody>
+          <a:bodyPr/>
+          <a:lstStyle/>
+          <a:p>
+            <a:r>
+              <a:rPr lang="en-US" dirty="0" err="1" smtClean="0"/>
+              <a:t>NodeJS</a:t>
+            </a:r>
+            <a:endParaRPr lang="en-US" dirty="0" smtClean="0"/>
+          </a:p>
+          <a:p>
+            <a:r>
+              <a:rPr lang="en-US" dirty="0" smtClean="0"/>
+              <a:t>Python</a:t>
+            </a:r>
+          </a:p>
+          <a:p>
+            <a:r>
+              <a:rPr lang="en-US" dirty="0" smtClean="0"/>
+              <a:t>C#</a:t>
+            </a:r>
+          </a:p>
+          <a:p>
+            <a:pPr lvl="1"/>
+            <a:r>
+              <a:rPr lang="en-US" dirty="0" smtClean="0"/>
+              <a:t>DLLs too </a:t>
+            </a:r>
+            <a:endParaRPr lang="en-US" dirty="0" smtClean="0"/>
+          </a:p>
+          <a:p>
+            <a:r>
+              <a:rPr lang="en-US" dirty="0" smtClean="0"/>
+              <a:t>Java</a:t>
+            </a:r>
+            <a:endParaRPr lang="en-US" dirty="0" smtClean="0"/>
+          </a:p>
+          <a:p>
+            <a:pPr lvl="1"/>
+            <a:r>
+              <a:rPr lang="en-US" dirty="0" smtClean="0"/>
+              <a:t>This includes JVM languages</a:t>
+            </a:r>
+            <a:r>
+              <a:rPr lang="mr-IN" dirty="0" smtClean="0"/>
+              <a:t>…</a:t>
+            </a:r>
+            <a:r>
+              <a:rPr lang="en-US" dirty="0" smtClean="0"/>
+              <a:t> Scala, </a:t>
+            </a:r>
+            <a:r>
+              <a:rPr lang="en-US" dirty="0" err="1" smtClean="0"/>
+              <a:t>Kotlin</a:t>
+            </a:r>
+            <a:r>
+              <a:rPr lang="en-US" dirty="0" smtClean="0"/>
+              <a:t>, etc.</a:t>
+            </a:r>
+            <a:endParaRPr lang="en-US" dirty="0"/>
+          </a:p>
+          <a:p>
+            <a:r>
+              <a:rPr lang="en-US" dirty="0" smtClean="0"/>
+              <a:t>Shell scripts</a:t>
+            </a:r>
+          </a:p>
+          <a:p>
+            <a:r>
+              <a:rPr lang="en-US" dirty="0" smtClean="0"/>
+              <a:t>Executables</a:t>
+            </a:r>
+          </a:p>
+          <a:p>
+            <a:r>
+              <a:rPr lang="en-US" dirty="0" smtClean="0"/>
+              <a:t>Pretty much anything*</a:t>
+            </a:r>
+          </a:p>
+          <a:p>
+            <a:pPr lvl="1"/>
+            <a:r>
+              <a:rPr lang="en-US" dirty="0"/>
+              <a:t>https://</a:t>
+            </a:r>
+            <a:r>
+              <a:rPr lang="en-US" dirty="0" err="1"/>
+              <a:t>aws.amazon.com</a:t>
+            </a:r>
+            <a:r>
+              <a:rPr lang="en-US" dirty="0"/>
+              <a:t>/blogs/compute/running-executables-in-</a:t>
+            </a:r>
+            <a:r>
+              <a:rPr lang="en-US" dirty="0" err="1"/>
+              <a:t>aws</a:t>
+            </a:r>
+            <a:r>
+              <a:rPr lang="en-US" dirty="0"/>
+              <a:t>-lambda/</a:t>
+            </a:r>
+          </a:p>
+        </p:txBody>
+      </p:sp>
+    </p:spTree>
+    <p:extLst>
+      <p:ext uri="{BB962C8B-B14F-4D97-AF65-F5344CB8AC3E}">
+        <p14:creationId xmlns:p14="http://schemas.microsoft.com/office/powerpoint/2010/main" val="1532791319"/>
+      </p:ext>
+    </p:extLst>
+  </p:cSld>
+  <p:clrMapOvr>
+    <a:masterClrMapping/>
+  </p:clrMapOvr>
+  <p:timing>
+    <p:tnLst>
+      <p:par>
+        <p:cTn id="1" dur="indefinite" restart="never" nodeType="tmRoot"/>
+      </p:par>
+    </p:tnLst>
+  </p:timing>
+</p:sld>
+</file>
+
+<file path=ppt/slides/slide21.xml><?xml version="1.0" encoding="utf-8"?>
+<p:sld xmlns:a="http://schemas.openxmlformats.org/drawingml/2006/main" xmlns:r="http://schemas.openxmlformats.org/officeDocument/2006/relationships" xmlns:p="http://schemas.openxmlformats.org/presentationml/2006/main">
+  <p:cSld>
+    <p:spTree>
+      <p:nvGrpSpPr>
+        <p:cNvPr id="1" name=""/>
+        <p:cNvGrpSpPr/>
+        <p:nvPr/>
+      </p:nvGrpSpPr>
+      <p:grpSpPr>
+        <a:xfrm>
+          <a:off x="0" y="0"/>
+          <a:ext cx="0" cy="0"/>
+          <a:chOff x="0" y="0"/>
+          <a:chExt cx="0" cy="0"/>
+        </a:xfrm>
+      </p:grpSpPr>
+      <p:sp>
+        <p:nvSpPr>
+          <p:cNvPr id="2" name="Title 1"/>
+          <p:cNvSpPr>
+            <a:spLocks noGrp="1"/>
+          </p:cNvSpPr>
+          <p:nvPr>
+            <p:ph type="title"/>
+          </p:nvPr>
+        </p:nvSpPr>
+        <p:spPr/>
+        <p:txBody>
+          <a:bodyPr/>
+          <a:lstStyle/>
+          <a:p>
+            <a:r>
+              <a:rPr lang="en-US" dirty="0" smtClean="0"/>
+              <a:t>Lambda</a:t>
+            </a:r>
+            <a:br>
+              <a:rPr lang="en-US" dirty="0" smtClean="0"/>
+            </a:br>
+            <a:r>
+              <a:rPr lang="en-US" sz="2400" dirty="0" smtClean="0"/>
               <a:t>what </a:t>
             </a:r>
             <a:r>
@@ -8205,188 +9250,6 @@
             </p:seq>
           </p:childTnLst>
         </p:cTn>
-      </p:par>
-    </p:tnLst>
-  </p:timing>
-</p:sld>
-</file>
-
-<file path=ppt/slides/slide21.xml><?xml version="1.0" encoding="utf-8"?>
-<p:sld xmlns:a="http://schemas.openxmlformats.org/drawingml/2006/main" xmlns:r="http://schemas.openxmlformats.org/officeDocument/2006/relationships" xmlns:p="http://schemas.openxmlformats.org/presentationml/2006/main">
-  <p:cSld>
-    <p:spTree>
-      <p:nvGrpSpPr>
-        <p:cNvPr id="1" name=""/>
-        <p:cNvGrpSpPr/>
-        <p:nvPr/>
-      </p:nvGrpSpPr>
-      <p:grpSpPr>
-        <a:xfrm>
-          <a:off x="0" y="0"/>
-          <a:ext cx="0" cy="0"/>
-          <a:chOff x="0" y="0"/>
-          <a:chExt cx="0" cy="0"/>
-        </a:xfrm>
-      </p:grpSpPr>
-      <p:sp>
-        <p:nvSpPr>
-          <p:cNvPr id="2" name="Title 1"/>
-          <p:cNvSpPr>
-            <a:spLocks noGrp="1"/>
-          </p:cNvSpPr>
-          <p:nvPr>
-            <p:ph type="title"/>
-          </p:nvPr>
-        </p:nvSpPr>
-        <p:spPr/>
-        <p:txBody>
-          <a:bodyPr/>
-          <a:lstStyle/>
-          <a:p>
-            <a:r>
-              <a:rPr lang="en-US" dirty="0" smtClean="0"/>
-              <a:t>Lambda</a:t>
-            </a:r>
-            <a:br>
-              <a:rPr lang="en-US" dirty="0" smtClean="0"/>
-            </a:br>
-            <a:r>
-              <a:rPr lang="en-US" sz="2400" dirty="0" smtClean="0"/>
-              <a:t>language/runtime support</a:t>
-            </a:r>
-            <a:endParaRPr lang="en-US" sz="2400" dirty="0"/>
-          </a:p>
-        </p:txBody>
-      </p:sp>
-      <p:sp>
-        <p:nvSpPr>
-          <p:cNvPr id="3" name="Content Placeholder 2"/>
-          <p:cNvSpPr>
-            <a:spLocks noGrp="1"/>
-          </p:cNvSpPr>
-          <p:nvPr>
-            <p:ph idx="1"/>
-          </p:nvPr>
-        </p:nvSpPr>
-        <p:spPr/>
-        <p:txBody>
-          <a:bodyPr/>
-          <a:lstStyle/>
-          <a:p>
-            <a:r>
-              <a:rPr lang="en-US" dirty="0" err="1" smtClean="0"/>
-              <a:t>NodeJS</a:t>
-            </a:r>
-            <a:endParaRPr lang="en-US" dirty="0" smtClean="0"/>
-          </a:p>
-          <a:p>
-            <a:r>
-              <a:rPr lang="en-US" dirty="0" smtClean="0"/>
-              <a:t>Python</a:t>
-            </a:r>
-          </a:p>
-          <a:p>
-            <a:r>
-              <a:rPr lang="en-US" dirty="0" smtClean="0"/>
-              <a:t>C#</a:t>
-            </a:r>
-          </a:p>
-          <a:p>
-            <a:pPr lvl="1"/>
-            <a:r>
-              <a:rPr lang="en-US" dirty="0" smtClean="0"/>
-              <a:t>DLLs too </a:t>
-            </a:r>
-            <a:endParaRPr lang="en-US" dirty="0" smtClean="0"/>
-          </a:p>
-          <a:p>
-            <a:r>
-              <a:rPr lang="en-US" dirty="0" smtClean="0"/>
-              <a:t>Java</a:t>
-            </a:r>
-            <a:endParaRPr lang="en-US" dirty="0" smtClean="0"/>
-          </a:p>
-          <a:p>
-            <a:pPr lvl="1"/>
-            <a:r>
-              <a:rPr lang="en-US" dirty="0" smtClean="0"/>
-              <a:t>This includes JVM languages</a:t>
-            </a:r>
-            <a:r>
-              <a:rPr lang="mr-IN" dirty="0" smtClean="0"/>
-              <a:t>…</a:t>
-            </a:r>
-            <a:r>
-              <a:rPr lang="en-US" dirty="0" smtClean="0"/>
-              <a:t> Scala, </a:t>
-            </a:r>
-            <a:r>
-              <a:rPr lang="en-US" dirty="0" err="1" smtClean="0"/>
-              <a:t>Kotlin</a:t>
-            </a:r>
-            <a:r>
-              <a:rPr lang="en-US" dirty="0" smtClean="0"/>
-              <a:t>, etc.</a:t>
-            </a:r>
-            <a:endParaRPr lang="en-US" dirty="0"/>
-          </a:p>
-          <a:p>
-            <a:r>
-              <a:rPr lang="en-US" dirty="0" smtClean="0"/>
-              <a:t>Shell scripts</a:t>
-            </a:r>
-          </a:p>
-          <a:p>
-            <a:r>
-              <a:rPr lang="en-US" dirty="0" smtClean="0"/>
-              <a:t>Executables</a:t>
-            </a:r>
-          </a:p>
-          <a:p>
-            <a:r>
-              <a:rPr lang="en-US" dirty="0" smtClean="0"/>
-              <a:t>Pretty much anything*</a:t>
-            </a:r>
-          </a:p>
-          <a:p>
-            <a:pPr lvl="1"/>
-            <a:r>
-              <a:rPr lang="en-US" dirty="0"/>
-              <a:t>https://</a:t>
-            </a:r>
-            <a:r>
-              <a:rPr lang="en-US" dirty="0" err="1"/>
-              <a:t>aws.amazon.com</a:t>
-            </a:r>
-            <a:r>
-              <a:rPr lang="en-US" dirty="0"/>
-              <a:t>/blogs/compute/running-executables-in-</a:t>
-            </a:r>
-            <a:r>
-              <a:rPr lang="en-US" dirty="0" err="1"/>
-              <a:t>aws</a:t>
-            </a:r>
-            <a:r>
-              <a:rPr lang="en-US" dirty="0"/>
-              <a:t>-lambda/</a:t>
-            </a:r>
-          </a:p>
-        </p:txBody>
-      </p:sp>
-    </p:spTree>
-    <p:extLst>
-      <p:ext uri="{BB962C8B-B14F-4D97-AF65-F5344CB8AC3E}">
-        <p14:creationId xmlns:p14="http://schemas.microsoft.com/office/powerpoint/2010/main" val="1532791319"/>
-      </p:ext>
-    </p:extLst>
-  </p:cSld>
-  <p:clrMapOvr>
-    <a:masterClrMapping/>
-  </p:clrMapOvr>
-  <p:timing>
-    <p:tnLst>
-      <p:par>
-        <p:cTn id="1" dur="indefinite" restart="never" nodeType="tmRoot"/>
       </p:par>
     </p:tnLst>
   </p:timing>

</xml_diff>

<commit_message>
added api-gatewayto services list
</commit_message>
<xml_diff>
--- a/going-serverless-2017.pptx
+++ b/going-serverless-2017.pptx
@@ -8442,11 +8442,7 @@
           <a:p>
             <a:r>
               <a:rPr lang="en-US" dirty="0" smtClean="0"/>
-              <a:t>I’m </a:t>
-            </a:r>
-            <a:r>
-              <a:rPr lang="en-US" smtClean="0"/>
-              <a:t>learning everyday</a:t>
+              <a:t>I’m learning everyday</a:t>
             </a:r>
             <a:endParaRPr lang="en-US" dirty="0" smtClean="0"/>
           </a:p>
@@ -9489,7 +9485,13 @@
           <a:lstStyle/>
           <a:p>
             <a:r>
-              <a:rPr lang="en-US" dirty="0" err="1" smtClean="0"/>
+              <a:rPr lang="en-US" smtClean="0"/>
+              <a:t>API-Gateway</a:t>
+            </a:r>
+          </a:p>
+          <a:p>
+            <a:r>
+              <a:rPr lang="en-US" smtClean="0"/>
               <a:t>Cognito</a:t>
             </a:r>
             <a:endParaRPr lang="en-US" dirty="0" smtClean="0"/>

</xml_diff>

<commit_message>
fixed Lambda what it looks like slide
</commit_message>
<xml_diff>
--- a/going-serverless-2017.pptx
+++ b/going-serverless-2017.pptx
@@ -8702,7 +8702,7 @@
         </p:nvGrpSpPr>
         <p:grpSpPr>
           <a:xfrm>
-            <a:off x="2779041" y="3055870"/>
+            <a:off x="5400992" y="2841875"/>
             <a:ext cx="825006" cy="836556"/>
             <a:chOff x="6022353" y="781542"/>
             <a:chExt cx="825006" cy="836556"/>
@@ -8788,7 +8788,7 @@
         </p:nvGrpSpPr>
         <p:grpSpPr>
           <a:xfrm>
-            <a:off x="4714284" y="3013843"/>
+            <a:off x="7227406" y="2727243"/>
             <a:ext cx="894752" cy="782848"/>
             <a:chOff x="381399" y="709817"/>
             <a:chExt cx="894752" cy="782848"/>
@@ -8868,8 +8868,8 @@
         </p:nvGrpSpPr>
         <p:grpSpPr>
           <a:xfrm>
-            <a:off x="6876963" y="3055514"/>
-            <a:ext cx="903457" cy="836912"/>
+            <a:off x="8690749" y="2727243"/>
+            <a:ext cx="1279221" cy="836912"/>
             <a:chOff x="2586019" y="709358"/>
             <a:chExt cx="903457" cy="836912"/>
           </a:xfrm>
@@ -8951,7 +8951,7 @@
         </p:nvGrpSpPr>
         <p:grpSpPr>
           <a:xfrm>
-            <a:off x="8632093" y="3316444"/>
+            <a:off x="10683537" y="2841875"/>
             <a:ext cx="780865" cy="996332"/>
             <a:chOff x="4320524" y="2416928"/>
             <a:chExt cx="780865" cy="996332"/>
@@ -9041,8 +9041,8 @@
         </p:nvSpPr>
         <p:spPr>
           <a:xfrm>
-            <a:off x="4347411" y="2794279"/>
-            <a:ext cx="5454315" cy="1857932"/>
+            <a:off x="6612947" y="2385874"/>
+            <a:ext cx="5258211" cy="2121958"/>
           </a:xfrm>
           <a:prstGeom prst="roundRect">
             <a:avLst>
@@ -9485,13 +9485,13 @@
           <a:lstStyle/>
           <a:p>
             <a:r>
-              <a:rPr lang="en-US" smtClean="0"/>
+              <a:rPr lang="en-US" dirty="0" smtClean="0"/>
               <a:t>API-Gateway</a:t>
             </a:r>
           </a:p>
           <a:p>
             <a:r>
-              <a:rPr lang="en-US" smtClean="0"/>
+              <a:rPr lang="en-US" dirty="0" err="1" smtClean="0"/>
               <a:t>Cognito</a:t>
             </a:r>
             <a:endParaRPr lang="en-US" dirty="0" smtClean="0"/>

</xml_diff>

<commit_message>
fixed runtime support list
</commit_message>
<xml_diff>
--- a/going-serverless-2017.pptx
+++ b/going-serverless-2017.pptx
@@ -8595,8 +8595,19 @@
           <a:p>
             <a:r>
               <a:rPr lang="en-US" dirty="0" smtClean="0"/>
-              <a:t>Pretty much anything*</a:t>
-            </a:r>
+              <a:t>Pretty much anything </a:t>
+            </a:r>
+            <a:r>
+              <a:rPr lang="en-US" smtClean="0"/>
+              <a:t>within reason </a:t>
+            </a:r>
+            <a:r>
+              <a:rPr lang="en-US" smtClean="0">
+                <a:sym typeface="Wingdings"/>
+              </a:rPr>
+              <a:t></a:t>
+            </a:r>
+            <a:endParaRPr lang="en-US" dirty="0" smtClean="0"/>
           </a:p>
           <a:p>
             <a:pPr lvl="1"/>

</xml_diff>

<commit_message>
added aws serverless pieces slide
</commit_message>
<xml_diff>
--- a/going-serverless-2017.pptx
+++ b/going-serverless-2017.pptx
@@ -5,7 +5,7 @@
     <p:sldMasterId id="2147484390" r:id="rId1"/>
   </p:sldMasterIdLst>
   <p:notesMasterIdLst>
-    <p:notesMasterId r:id="rId32"/>
+    <p:notesMasterId r:id="rId33"/>
   </p:notesMasterIdLst>
   <p:sldIdLst>
     <p:sldId id="256" r:id="rId2"/>
@@ -20,24 +20,25 @@
     <p:sldId id="274" r:id="rId11"/>
     <p:sldId id="290" r:id="rId12"/>
     <p:sldId id="276" r:id="rId13"/>
-    <p:sldId id="283" r:id="rId14"/>
-    <p:sldId id="284" r:id="rId15"/>
-    <p:sldId id="285" r:id="rId16"/>
-    <p:sldId id="286" r:id="rId17"/>
-    <p:sldId id="287" r:id="rId18"/>
-    <p:sldId id="288" r:id="rId19"/>
-    <p:sldId id="293" r:id="rId20"/>
-    <p:sldId id="278" r:id="rId21"/>
-    <p:sldId id="277" r:id="rId22"/>
-    <p:sldId id="273" r:id="rId23"/>
-    <p:sldId id="275" r:id="rId24"/>
-    <p:sldId id="263" r:id="rId25"/>
-    <p:sldId id="269" r:id="rId26"/>
-    <p:sldId id="270" r:id="rId27"/>
-    <p:sldId id="271" r:id="rId28"/>
-    <p:sldId id="291" r:id="rId29"/>
-    <p:sldId id="289" r:id="rId30"/>
-    <p:sldId id="272" r:id="rId31"/>
+    <p:sldId id="294" r:id="rId14"/>
+    <p:sldId id="283" r:id="rId15"/>
+    <p:sldId id="284" r:id="rId16"/>
+    <p:sldId id="285" r:id="rId17"/>
+    <p:sldId id="286" r:id="rId18"/>
+    <p:sldId id="287" r:id="rId19"/>
+    <p:sldId id="288" r:id="rId20"/>
+    <p:sldId id="293" r:id="rId21"/>
+    <p:sldId id="278" r:id="rId22"/>
+    <p:sldId id="277" r:id="rId23"/>
+    <p:sldId id="273" r:id="rId24"/>
+    <p:sldId id="275" r:id="rId25"/>
+    <p:sldId id="263" r:id="rId26"/>
+    <p:sldId id="269" r:id="rId27"/>
+    <p:sldId id="270" r:id="rId28"/>
+    <p:sldId id="271" r:id="rId29"/>
+    <p:sldId id="291" r:id="rId30"/>
+    <p:sldId id="289" r:id="rId31"/>
+    <p:sldId id="272" r:id="rId32"/>
   </p:sldIdLst>
   <p:sldSz cx="12192000" cy="6858000"/>
   <p:notesSz cx="6858000" cy="9144000"/>
@@ -6144,6 +6145,799 @@
           <a:p>
             <a:r>
               <a:rPr lang="en-US" dirty="0" smtClean="0"/>
+              <a:t>AWS </a:t>
+            </a:r>
+            <a:br>
+              <a:rPr lang="en-US" dirty="0" smtClean="0"/>
+            </a:br>
+            <a:r>
+              <a:rPr lang="en-US" sz="2400" dirty="0" err="1" smtClean="0"/>
+              <a:t>Serverlesss</a:t>
+            </a:r>
+            <a:r>
+              <a:rPr lang="en-US" sz="2400" dirty="0" smtClean="0"/>
+              <a:t> pieces (some)</a:t>
+            </a:r>
+            <a:endParaRPr lang="en-US" sz="2400" dirty="0"/>
+          </a:p>
+        </p:txBody>
+      </p:sp>
+      <p:grpSp>
+        <p:nvGrpSpPr>
+          <p:cNvPr id="11" name="Group 10"/>
+          <p:cNvGrpSpPr/>
+          <p:nvPr/>
+        </p:nvGrpSpPr>
+        <p:grpSpPr>
+          <a:xfrm>
+            <a:off x="7783798" y="2506853"/>
+            <a:ext cx="825006" cy="836556"/>
+            <a:chOff x="5869953" y="629142"/>
+            <a:chExt cx="825006" cy="836556"/>
+          </a:xfrm>
+        </p:grpSpPr>
+        <p:pic>
+          <p:nvPicPr>
+            <p:cNvPr id="4" name="Picture 3"/>
+            <p:cNvPicPr>
+              <a:picLocks noChangeAspect="1"/>
+            </p:cNvPicPr>
+            <p:nvPr/>
+          </p:nvPicPr>
+          <p:blipFill>
+            <a:blip r:embed="rId2">
+              <a:extLst>
+                <a:ext uri="{28A0092B-C50C-407E-A947-70E740481C1C}">
+                  <a14:useLocalDpi xmlns:a14="http://schemas.microsoft.com/office/drawing/2010/main" val="0"/>
+                </a:ext>
+              </a:extLst>
+            </a:blip>
+            <a:stretch>
+              <a:fillRect/>
+            </a:stretch>
+          </p:blipFill>
+          <p:spPr>
+            <a:xfrm>
+              <a:off x="6010066" y="629142"/>
+              <a:ext cx="544781" cy="653737"/>
+            </a:xfrm>
+            <a:prstGeom prst="rect">
+              <a:avLst/>
+            </a:prstGeom>
+          </p:spPr>
+        </p:pic>
+        <p:sp>
+          <p:nvSpPr>
+            <p:cNvPr id="5" name="TextBox 4"/>
+            <p:cNvSpPr txBox="1"/>
+            <p:nvPr/>
+          </p:nvSpPr>
+          <p:spPr>
+            <a:xfrm>
+              <a:off x="5869953" y="1310066"/>
+              <a:ext cx="825006" cy="155632"/>
+            </a:xfrm>
+            <a:prstGeom prst="rect">
+              <a:avLst/>
+            </a:prstGeom>
+            <a:noFill/>
+          </p:spPr>
+          <p:txBody>
+            <a:bodyPr wrap="square" lIns="0" tIns="0" rIns="0" bIns="0" rtlCol="0" anchor="t">
+              <a:noAutofit/>
+            </a:bodyPr>
+            <a:lstStyle/>
+            <a:p>
+              <a:pPr algn="ctr"/>
+              <a:r>
+                <a:rPr lang="en-US" sz="1000" b="1" dirty="0" smtClean="0"/>
+                <a:t>AWS</a:t>
+              </a:r>
+            </a:p>
+            <a:p>
+              <a:pPr algn="ctr"/>
+              <a:r>
+                <a:rPr lang="en-US" sz="1000" b="1" dirty="0" smtClean="0"/>
+                <a:t>Lambda</a:t>
+              </a:r>
+              <a:endParaRPr lang="en-US" sz="1000" b="1" dirty="0"/>
+            </a:p>
+          </p:txBody>
+        </p:sp>
+      </p:grpSp>
+      <p:grpSp>
+        <p:nvGrpSpPr>
+          <p:cNvPr id="10" name="Group 9"/>
+          <p:cNvGrpSpPr/>
+          <p:nvPr/>
+        </p:nvGrpSpPr>
+        <p:grpSpPr>
+          <a:xfrm>
+            <a:off x="9050393" y="1305277"/>
+            <a:ext cx="731520" cy="806494"/>
+            <a:chOff x="7815746" y="709358"/>
+            <a:chExt cx="731520" cy="806494"/>
+          </a:xfrm>
+        </p:grpSpPr>
+        <p:pic>
+          <p:nvPicPr>
+            <p:cNvPr id="8" name="Picture 7"/>
+            <p:cNvPicPr>
+              <a:picLocks noChangeAspect="1"/>
+            </p:cNvPicPr>
+            <p:nvPr/>
+          </p:nvPicPr>
+          <p:blipFill>
+            <a:blip r:embed="rId3">
+              <a:extLst>
+                <a:ext uri="{28A0092B-C50C-407E-A947-70E740481C1C}">
+                  <a14:useLocalDpi xmlns:a14="http://schemas.microsoft.com/office/drawing/2010/main" val="0"/>
+                </a:ext>
+              </a:extLst>
+            </a:blip>
+            <a:stretch>
+              <a:fillRect/>
+            </a:stretch>
+          </p:blipFill>
+          <p:spPr>
+            <a:xfrm>
+              <a:off x="7919305" y="709358"/>
+              <a:ext cx="521367" cy="625640"/>
+            </a:xfrm>
+            <a:prstGeom prst="rect">
+              <a:avLst/>
+            </a:prstGeom>
+          </p:spPr>
+        </p:pic>
+        <p:sp>
+          <p:nvSpPr>
+            <p:cNvPr id="9" name="TextBox 8"/>
+            <p:cNvSpPr txBox="1"/>
+            <p:nvPr/>
+          </p:nvSpPr>
+          <p:spPr>
+            <a:xfrm>
+              <a:off x="7815746" y="1360220"/>
+              <a:ext cx="731520" cy="155632"/>
+            </a:xfrm>
+            <a:prstGeom prst="rect">
+              <a:avLst/>
+            </a:prstGeom>
+            <a:noFill/>
+          </p:spPr>
+          <p:txBody>
+            <a:bodyPr wrap="square" lIns="0" tIns="0" rIns="0" bIns="0" rtlCol="0" anchor="t">
+              <a:noAutofit/>
+            </a:bodyPr>
+            <a:lstStyle/>
+            <a:p>
+              <a:pPr algn="ctr"/>
+              <a:r>
+                <a:rPr lang="en-US" sz="1000" b="1" dirty="0" smtClean="0"/>
+                <a:t>Amazon</a:t>
+              </a:r>
+              <a:br>
+                <a:rPr lang="en-US" sz="1000" b="1" dirty="0" smtClean="0"/>
+              </a:br>
+              <a:r>
+                <a:rPr lang="en-US" sz="1000" b="1" dirty="0" smtClean="0"/>
+                <a:t>S3</a:t>
+              </a:r>
+              <a:endParaRPr lang="en-US" b="1" dirty="0"/>
+            </a:p>
+          </p:txBody>
+        </p:sp>
+      </p:grpSp>
+      <p:grpSp>
+        <p:nvGrpSpPr>
+          <p:cNvPr id="14" name="Group 13"/>
+          <p:cNvGrpSpPr/>
+          <p:nvPr/>
+        </p:nvGrpSpPr>
+        <p:grpSpPr>
+          <a:xfrm>
+            <a:off x="9886410" y="2539327"/>
+            <a:ext cx="894752" cy="806035"/>
+            <a:chOff x="365197" y="709817"/>
+            <a:chExt cx="894752" cy="806035"/>
+          </a:xfrm>
+        </p:grpSpPr>
+        <p:pic>
+          <p:nvPicPr>
+            <p:cNvPr id="12" name="Picture 11"/>
+            <p:cNvPicPr>
+              <a:picLocks noChangeAspect="1"/>
+            </p:cNvPicPr>
+            <p:nvPr/>
+          </p:nvPicPr>
+          <p:blipFill>
+            <a:blip r:embed="rId4">
+              <a:extLst>
+                <a:ext uri="{28A0092B-C50C-407E-A947-70E740481C1C}">
+                  <a14:useLocalDpi xmlns:a14="http://schemas.microsoft.com/office/drawing/2010/main" val="0"/>
+                </a:ext>
+              </a:extLst>
+            </a:blip>
+            <a:stretch>
+              <a:fillRect/>
+            </a:stretch>
+          </p:blipFill>
+          <p:spPr>
+            <a:xfrm>
+              <a:off x="540839" y="709817"/>
+              <a:ext cx="543466" cy="601994"/>
+            </a:xfrm>
+            <a:prstGeom prst="rect">
+              <a:avLst/>
+            </a:prstGeom>
+          </p:spPr>
+        </p:pic>
+        <p:sp>
+          <p:nvSpPr>
+            <p:cNvPr id="13" name="TextBox 12"/>
+            <p:cNvSpPr txBox="1"/>
+            <p:nvPr/>
+          </p:nvSpPr>
+          <p:spPr>
+            <a:xfrm>
+              <a:off x="365197" y="1360220"/>
+              <a:ext cx="894752" cy="155632"/>
+            </a:xfrm>
+            <a:prstGeom prst="rect">
+              <a:avLst/>
+            </a:prstGeom>
+            <a:noFill/>
+          </p:spPr>
+          <p:txBody>
+            <a:bodyPr wrap="square" lIns="0" tIns="0" rIns="0" bIns="0" rtlCol="0" anchor="t">
+              <a:noAutofit/>
+            </a:bodyPr>
+            <a:lstStyle/>
+            <a:p>
+              <a:pPr algn="ctr"/>
+              <a:r>
+                <a:rPr lang="en-US" sz="1000" b="1" dirty="0" smtClean="0"/>
+                <a:t>Amazon</a:t>
+              </a:r>
+              <a:br>
+                <a:rPr lang="en-US" sz="1000" b="1" dirty="0" smtClean="0"/>
+              </a:br>
+              <a:r>
+                <a:rPr lang="en-US" sz="1000" b="1" dirty="0" err="1" smtClean="0"/>
+                <a:t>DynamoDB</a:t>
+              </a:r>
+              <a:endParaRPr lang="en-US" b="1" dirty="0"/>
+            </a:p>
+          </p:txBody>
+        </p:sp>
+      </p:grpSp>
+      <p:grpSp>
+        <p:nvGrpSpPr>
+          <p:cNvPr id="17" name="Group 16"/>
+          <p:cNvGrpSpPr/>
+          <p:nvPr/>
+        </p:nvGrpSpPr>
+        <p:grpSpPr>
+          <a:xfrm>
+            <a:off x="8942860" y="3826848"/>
+            <a:ext cx="943550" cy="805093"/>
+            <a:chOff x="344931" y="710759"/>
+            <a:chExt cx="943550" cy="805093"/>
+          </a:xfrm>
+        </p:grpSpPr>
+        <p:pic>
+          <p:nvPicPr>
+            <p:cNvPr id="15" name="Picture 14"/>
+            <p:cNvPicPr>
+              <a:picLocks noChangeAspect="1"/>
+            </p:cNvPicPr>
+            <p:nvPr/>
+          </p:nvPicPr>
+          <p:blipFill>
+            <a:blip r:embed="rId5">
+              <a:extLst>
+                <a:ext uri="{28A0092B-C50C-407E-A947-70E740481C1C}">
+                  <a14:useLocalDpi xmlns:a14="http://schemas.microsoft.com/office/drawing/2010/main" val="0"/>
+                </a:ext>
+              </a:extLst>
+            </a:blip>
+            <a:stretch>
+              <a:fillRect/>
+            </a:stretch>
+          </p:blipFill>
+          <p:spPr>
+            <a:xfrm>
+              <a:off x="554044" y="710759"/>
+              <a:ext cx="525324" cy="596313"/>
+            </a:xfrm>
+            <a:prstGeom prst="rect">
+              <a:avLst/>
+            </a:prstGeom>
+          </p:spPr>
+        </p:pic>
+        <p:sp>
+          <p:nvSpPr>
+            <p:cNvPr id="16" name="TextBox 15"/>
+            <p:cNvSpPr txBox="1"/>
+            <p:nvPr/>
+          </p:nvSpPr>
+          <p:spPr>
+            <a:xfrm>
+              <a:off x="344931" y="1360404"/>
+              <a:ext cx="943550" cy="155448"/>
+            </a:xfrm>
+            <a:prstGeom prst="rect">
+              <a:avLst/>
+            </a:prstGeom>
+            <a:noFill/>
+          </p:spPr>
+          <p:txBody>
+            <a:bodyPr wrap="square" lIns="0" tIns="0" rIns="0" bIns="0" rtlCol="0" anchor="t">
+              <a:noAutofit/>
+            </a:bodyPr>
+            <a:lstStyle/>
+            <a:p>
+              <a:pPr algn="ctr"/>
+              <a:r>
+                <a:rPr lang="en-US" sz="1000" b="1" dirty="0"/>
+                <a:t>Amazon </a:t>
+              </a:r>
+              <a:r>
+                <a:rPr lang="en-US" sz="1000" b="1" dirty="0" err="1"/>
+                <a:t>CloudWatch</a:t>
+              </a:r>
+              <a:endParaRPr lang="en-US" sz="1000" b="1" dirty="0"/>
+            </a:p>
+          </p:txBody>
+        </p:sp>
+      </p:grpSp>
+      <p:grpSp>
+        <p:nvGrpSpPr>
+          <p:cNvPr id="20" name="Group 19"/>
+          <p:cNvGrpSpPr/>
+          <p:nvPr/>
+        </p:nvGrpSpPr>
+        <p:grpSpPr>
+          <a:xfrm>
+            <a:off x="6371019" y="1351608"/>
+            <a:ext cx="1005840" cy="823874"/>
+            <a:chOff x="2069495" y="691978"/>
+            <a:chExt cx="1005840" cy="823874"/>
+          </a:xfrm>
+        </p:grpSpPr>
+        <p:pic>
+          <p:nvPicPr>
+            <p:cNvPr id="18" name="Picture 17"/>
+            <p:cNvPicPr>
+              <a:picLocks noChangeAspect="1"/>
+            </p:cNvPicPr>
+            <p:nvPr/>
+          </p:nvPicPr>
+          <p:blipFill>
+            <a:blip r:embed="rId6">
+              <a:extLst>
+                <a:ext uri="{28A0092B-C50C-407E-A947-70E740481C1C}">
+                  <a14:useLocalDpi xmlns:a14="http://schemas.microsoft.com/office/drawing/2010/main" val="0"/>
+                </a:ext>
+              </a:extLst>
+            </a:blip>
+            <a:stretch>
+              <a:fillRect/>
+            </a:stretch>
+          </p:blipFill>
+          <p:spPr>
+            <a:xfrm>
+              <a:off x="2315368" y="691978"/>
+              <a:ext cx="514094" cy="635057"/>
+            </a:xfrm>
+            <a:prstGeom prst="rect">
+              <a:avLst/>
+            </a:prstGeom>
+          </p:spPr>
+        </p:pic>
+        <p:sp>
+          <p:nvSpPr>
+            <p:cNvPr id="19" name="TextBox 18"/>
+            <p:cNvSpPr txBox="1"/>
+            <p:nvPr/>
+          </p:nvSpPr>
+          <p:spPr>
+            <a:xfrm>
+              <a:off x="2069495" y="1360404"/>
+              <a:ext cx="1005840" cy="155448"/>
+            </a:xfrm>
+            <a:prstGeom prst="rect">
+              <a:avLst/>
+            </a:prstGeom>
+            <a:noFill/>
+          </p:spPr>
+          <p:txBody>
+            <a:bodyPr wrap="square" lIns="0" tIns="0" rIns="0" bIns="0" rtlCol="0" anchor="t">
+              <a:noAutofit/>
+            </a:bodyPr>
+            <a:lstStyle/>
+            <a:p>
+              <a:pPr algn="ctr"/>
+              <a:r>
+                <a:rPr lang="en-US" sz="1000" b="1" dirty="0" smtClean="0"/>
+                <a:t>AWS</a:t>
+              </a:r>
+              <a:br>
+                <a:rPr lang="en-US" sz="1000" b="1" dirty="0" smtClean="0"/>
+              </a:br>
+              <a:r>
+                <a:rPr lang="en-US" sz="1000" b="1" dirty="0" err="1" smtClean="0"/>
+                <a:t>CloudFormation</a:t>
+              </a:r>
+              <a:endParaRPr lang="en-US" sz="1000" b="1" dirty="0"/>
+            </a:p>
+          </p:txBody>
+        </p:sp>
+      </p:grpSp>
+      <p:grpSp>
+        <p:nvGrpSpPr>
+          <p:cNvPr id="23" name="Group 22"/>
+          <p:cNvGrpSpPr/>
+          <p:nvPr/>
+        </p:nvGrpSpPr>
+        <p:grpSpPr>
+          <a:xfrm>
+            <a:off x="5561264" y="2609508"/>
+            <a:ext cx="640080" cy="852832"/>
+            <a:chOff x="5827256" y="663020"/>
+            <a:chExt cx="640080" cy="852832"/>
+          </a:xfrm>
+        </p:grpSpPr>
+        <p:pic>
+          <p:nvPicPr>
+            <p:cNvPr id="21" name="Picture 20"/>
+            <p:cNvPicPr>
+              <a:picLocks noChangeAspect="1"/>
+            </p:cNvPicPr>
+            <p:nvPr/>
+          </p:nvPicPr>
+          <p:blipFill>
+            <a:blip r:embed="rId7">
+              <a:extLst>
+                <a:ext uri="{28A0092B-C50C-407E-A947-70E740481C1C}">
+                  <a14:useLocalDpi xmlns:a14="http://schemas.microsoft.com/office/drawing/2010/main" val="0"/>
+                </a:ext>
+              </a:extLst>
+            </a:blip>
+            <a:stretch>
+              <a:fillRect/>
+            </a:stretch>
+          </p:blipFill>
+          <p:spPr>
+            <a:xfrm>
+              <a:off x="5979445" y="663020"/>
+              <a:ext cx="335701" cy="636066"/>
+            </a:xfrm>
+            <a:prstGeom prst="rect">
+              <a:avLst/>
+            </a:prstGeom>
+          </p:spPr>
+        </p:pic>
+        <p:sp>
+          <p:nvSpPr>
+            <p:cNvPr id="22" name="TextBox 21"/>
+            <p:cNvSpPr txBox="1"/>
+            <p:nvPr/>
+          </p:nvSpPr>
+          <p:spPr>
+            <a:xfrm>
+              <a:off x="5827256" y="1360404"/>
+              <a:ext cx="640080" cy="155448"/>
+            </a:xfrm>
+            <a:prstGeom prst="rect">
+              <a:avLst/>
+            </a:prstGeom>
+            <a:noFill/>
+          </p:spPr>
+          <p:txBody>
+            <a:bodyPr wrap="square" lIns="0" tIns="0" rIns="0" bIns="0" rtlCol="0" anchor="t">
+              <a:noAutofit/>
+            </a:bodyPr>
+            <a:lstStyle/>
+            <a:p>
+              <a:pPr algn="ctr"/>
+              <a:r>
+                <a:rPr lang="en-US" sz="1000" b="1" dirty="0" smtClean="0"/>
+                <a:t>IAM</a:t>
+              </a:r>
+              <a:endParaRPr lang="en-US" sz="1000" b="1" dirty="0"/>
+            </a:p>
+          </p:txBody>
+        </p:sp>
+      </p:grpSp>
+      <p:grpSp>
+        <p:nvGrpSpPr>
+          <p:cNvPr id="28" name="Group 27"/>
+          <p:cNvGrpSpPr/>
+          <p:nvPr/>
+        </p:nvGrpSpPr>
+        <p:grpSpPr>
+          <a:xfrm>
+            <a:off x="6460356" y="3814297"/>
+            <a:ext cx="894752" cy="817644"/>
+            <a:chOff x="1415572" y="698208"/>
+            <a:chExt cx="894752" cy="817644"/>
+          </a:xfrm>
+        </p:grpSpPr>
+        <p:pic>
+          <p:nvPicPr>
+            <p:cNvPr id="24" name="Picture 23"/>
+            <p:cNvPicPr>
+              <a:picLocks noChangeAspect="1"/>
+            </p:cNvPicPr>
+            <p:nvPr/>
+          </p:nvPicPr>
+          <p:blipFill>
+            <a:blip r:embed="rId8">
+              <a:extLst>
+                <a:ext uri="{28A0092B-C50C-407E-A947-70E740481C1C}">
+                  <a14:useLocalDpi xmlns:a14="http://schemas.microsoft.com/office/drawing/2010/main" val="0"/>
+                </a:ext>
+              </a:extLst>
+            </a:blip>
+            <a:stretch>
+              <a:fillRect/>
+            </a:stretch>
+          </p:blipFill>
+          <p:spPr>
+            <a:xfrm>
+              <a:off x="1604198" y="698208"/>
+              <a:ext cx="519942" cy="623930"/>
+            </a:xfrm>
+            <a:prstGeom prst="rect">
+              <a:avLst/>
+            </a:prstGeom>
+          </p:spPr>
+        </p:pic>
+        <p:sp>
+          <p:nvSpPr>
+            <p:cNvPr id="25" name="TextBox 24"/>
+            <p:cNvSpPr txBox="1"/>
+            <p:nvPr/>
+          </p:nvSpPr>
+          <p:spPr>
+            <a:xfrm>
+              <a:off x="1415572" y="1360220"/>
+              <a:ext cx="894752" cy="155632"/>
+            </a:xfrm>
+            <a:prstGeom prst="rect">
+              <a:avLst/>
+            </a:prstGeom>
+            <a:noFill/>
+          </p:spPr>
+          <p:txBody>
+            <a:bodyPr wrap="square" lIns="0" tIns="0" rIns="0" bIns="0" rtlCol="0" anchor="t">
+              <a:noAutofit/>
+            </a:bodyPr>
+            <a:lstStyle/>
+            <a:p>
+              <a:pPr algn="ctr"/>
+              <a:r>
+                <a:rPr lang="en-US" sz="1000" b="1" dirty="0" smtClean="0"/>
+                <a:t>Amazon</a:t>
+              </a:r>
+              <a:br>
+                <a:rPr lang="en-US" sz="1000" b="1" dirty="0" smtClean="0"/>
+              </a:br>
+              <a:r>
+                <a:rPr lang="en-US" sz="1000" b="1" dirty="0" err="1" smtClean="0"/>
+                <a:t>Cognito</a:t>
+              </a:r>
+              <a:endParaRPr lang="en-US" b="1" dirty="0"/>
+            </a:p>
+          </p:txBody>
+        </p:sp>
+      </p:grpSp>
+      <p:grpSp>
+        <p:nvGrpSpPr>
+          <p:cNvPr id="29" name="Group 28"/>
+          <p:cNvGrpSpPr/>
+          <p:nvPr/>
+        </p:nvGrpSpPr>
+        <p:grpSpPr>
+          <a:xfrm>
+            <a:off x="7695093" y="559678"/>
+            <a:ext cx="894752" cy="826431"/>
+            <a:chOff x="362197" y="689421"/>
+            <a:chExt cx="894752" cy="826431"/>
+          </a:xfrm>
+        </p:grpSpPr>
+        <p:pic>
+          <p:nvPicPr>
+            <p:cNvPr id="26" name="Picture 25"/>
+            <p:cNvPicPr>
+              <a:picLocks noChangeAspect="1"/>
+            </p:cNvPicPr>
+            <p:nvPr/>
+          </p:nvPicPr>
+          <p:blipFill>
+            <a:blip r:embed="rId9">
+              <a:extLst>
+                <a:ext uri="{28A0092B-C50C-407E-A947-70E740481C1C}">
+                  <a14:useLocalDpi xmlns:a14="http://schemas.microsoft.com/office/drawing/2010/main" val="0"/>
+                </a:ext>
+              </a:extLst>
+            </a:blip>
+            <a:stretch>
+              <a:fillRect/>
+            </a:stretch>
+          </p:blipFill>
+          <p:spPr>
+            <a:xfrm>
+              <a:off x="549398" y="689421"/>
+              <a:ext cx="521366" cy="625640"/>
+            </a:xfrm>
+            <a:prstGeom prst="rect">
+              <a:avLst/>
+            </a:prstGeom>
+          </p:spPr>
+        </p:pic>
+        <p:sp>
+          <p:nvSpPr>
+            <p:cNvPr id="27" name="TextBox 26"/>
+            <p:cNvSpPr txBox="1"/>
+            <p:nvPr/>
+          </p:nvSpPr>
+          <p:spPr>
+            <a:xfrm>
+              <a:off x="362197" y="1360220"/>
+              <a:ext cx="894752" cy="155632"/>
+            </a:xfrm>
+            <a:prstGeom prst="rect">
+              <a:avLst/>
+            </a:prstGeom>
+            <a:noFill/>
+          </p:spPr>
+          <p:txBody>
+            <a:bodyPr wrap="square" lIns="0" tIns="0" rIns="0" bIns="0" rtlCol="0" anchor="t">
+              <a:noAutofit/>
+            </a:bodyPr>
+            <a:lstStyle/>
+            <a:p>
+              <a:pPr algn="ctr"/>
+              <a:r>
+                <a:rPr lang="en-US" sz="1000" b="1" dirty="0" smtClean="0"/>
+                <a:t>Amazon API Gateway*</a:t>
+              </a:r>
+              <a:endParaRPr lang="en-US" b="1" dirty="0"/>
+            </a:p>
+          </p:txBody>
+        </p:sp>
+      </p:grpSp>
+      <p:grpSp>
+        <p:nvGrpSpPr>
+          <p:cNvPr id="32" name="Group 31"/>
+          <p:cNvGrpSpPr/>
+          <p:nvPr/>
+        </p:nvGrpSpPr>
+        <p:grpSpPr>
+          <a:xfrm>
+            <a:off x="7882294" y="4962258"/>
+            <a:ext cx="822960" cy="1156941"/>
+            <a:chOff x="4170258" y="2717800"/>
+            <a:chExt cx="822960" cy="1156941"/>
+          </a:xfrm>
+        </p:grpSpPr>
+        <p:pic>
+          <p:nvPicPr>
+            <p:cNvPr id="30" name="Picture 29"/>
+            <p:cNvPicPr>
+              <a:picLocks noChangeAspect="1"/>
+            </p:cNvPicPr>
+            <p:nvPr/>
+          </p:nvPicPr>
+          <p:blipFill>
+            <a:blip r:embed="rId10">
+              <a:extLst>
+                <a:ext uri="{28A0092B-C50C-407E-A947-70E740481C1C}">
+                  <a14:useLocalDpi xmlns:a14="http://schemas.microsoft.com/office/drawing/2010/main" val="0"/>
+                </a:ext>
+              </a:extLst>
+            </a:blip>
+            <a:stretch>
+              <a:fillRect/>
+            </a:stretch>
+          </p:blipFill>
+          <p:spPr>
+            <a:xfrm>
+              <a:off x="4255520" y="2717800"/>
+              <a:ext cx="652436" cy="731519"/>
+            </a:xfrm>
+            <a:prstGeom prst="rect">
+              <a:avLst/>
+            </a:prstGeom>
+          </p:spPr>
+        </p:pic>
+        <p:sp>
+          <p:nvSpPr>
+            <p:cNvPr id="31" name="TextBox 30"/>
+            <p:cNvSpPr txBox="1"/>
+            <p:nvPr/>
+          </p:nvSpPr>
+          <p:spPr>
+            <a:xfrm>
+              <a:off x="4170258" y="3554701"/>
+              <a:ext cx="822960" cy="320040"/>
+            </a:xfrm>
+            <a:prstGeom prst="rect">
+              <a:avLst/>
+            </a:prstGeom>
+            <a:noFill/>
+          </p:spPr>
+          <p:txBody>
+            <a:bodyPr wrap="none" lIns="0" tIns="0" rIns="0" bIns="0" rtlCol="0" anchor="t">
+              <a:noAutofit/>
+            </a:bodyPr>
+            <a:lstStyle/>
+            <a:p>
+              <a:pPr algn="ctr"/>
+              <a:r>
+                <a:rPr lang="en-US" sz="1100" dirty="0" smtClean="0">
+                  <a:latin typeface="Helvetica Neue"/>
+                  <a:cs typeface="Helvetica Neue"/>
+                </a:rPr>
+                <a:t>AWS CLI</a:t>
+              </a:r>
+              <a:endParaRPr lang="en-US" sz="1100" dirty="0">
+                <a:latin typeface="Helvetica Neue"/>
+                <a:cs typeface="Helvetica Neue"/>
+              </a:endParaRPr>
+            </a:p>
+          </p:txBody>
+        </p:sp>
+      </p:grpSp>
+    </p:spTree>
+    <p:extLst>
+      <p:ext uri="{BB962C8B-B14F-4D97-AF65-F5344CB8AC3E}">
+        <p14:creationId xmlns:p14="http://schemas.microsoft.com/office/powerpoint/2010/main" val="1083892659"/>
+      </p:ext>
+    </p:extLst>
+  </p:cSld>
+  <p:clrMapOvr>
+    <a:masterClrMapping/>
+  </p:clrMapOvr>
+</p:sld>
+</file>
+
+<file path=ppt/slides/slide14.xml><?xml version="1.0" encoding="utf-8"?>
+<p:sld xmlns:a="http://schemas.openxmlformats.org/drawingml/2006/main" xmlns:r="http://schemas.openxmlformats.org/officeDocument/2006/relationships" xmlns:p="http://schemas.openxmlformats.org/presentationml/2006/main">
+  <p:cSld>
+    <p:spTree>
+      <p:nvGrpSpPr>
+        <p:cNvPr id="1" name=""/>
+        <p:cNvGrpSpPr/>
+        <p:nvPr/>
+      </p:nvGrpSpPr>
+      <p:grpSpPr>
+        <a:xfrm>
+          <a:off x="0" y="0"/>
+          <a:ext cx="0" cy="0"/>
+          <a:chOff x="0" y="0"/>
+          <a:chExt cx="0" cy="0"/>
+        </a:xfrm>
+      </p:grpSpPr>
+      <p:sp>
+        <p:nvSpPr>
+          <p:cNvPr id="2" name="Title 1"/>
+          <p:cNvSpPr>
+            <a:spLocks noGrp="1"/>
+          </p:cNvSpPr>
+          <p:nvPr>
+            <p:ph type="title"/>
+          </p:nvPr>
+        </p:nvSpPr>
+        <p:spPr/>
+        <p:txBody>
+          <a:bodyPr/>
+          <a:lstStyle/>
+          <a:p>
+            <a:r>
+              <a:rPr lang="en-US" dirty="0" smtClean="0"/>
               <a:t>Patterns</a:t>
             </a:r>
             <a:br>
@@ -6224,7 +7018,7 @@
 </p:sld>
 </file>
 
-<file path=ppt/slides/slide14.xml><?xml version="1.0" encoding="utf-8"?>
+<file path=ppt/slides/slide15.xml><?xml version="1.0" encoding="utf-8"?>
 <p:sld xmlns:a="http://schemas.openxmlformats.org/drawingml/2006/main" xmlns:r="http://schemas.openxmlformats.org/officeDocument/2006/relationships" xmlns:p="http://schemas.openxmlformats.org/presentationml/2006/main">
   <p:cSld>
     <p:spTree>
@@ -6954,7 +7748,7 @@
 </p:sld>
 </file>
 
-<file path=ppt/slides/slide15.xml><?xml version="1.0" encoding="utf-8"?>
+<file path=ppt/slides/slide16.xml><?xml version="1.0" encoding="utf-8"?>
 <p:sld xmlns:a="http://schemas.openxmlformats.org/drawingml/2006/main" xmlns:r="http://schemas.openxmlformats.org/officeDocument/2006/relationships" xmlns:p="http://schemas.openxmlformats.org/presentationml/2006/main">
   <p:cSld>
     <p:spTree>
@@ -7873,78 +8667,6 @@
 </p:sld>
 </file>
 
-<file path=ppt/slides/slide16.xml><?xml version="1.0" encoding="utf-8"?>
-<p:sld xmlns:a="http://schemas.openxmlformats.org/drawingml/2006/main" xmlns:r="http://schemas.openxmlformats.org/officeDocument/2006/relationships" xmlns:p="http://schemas.openxmlformats.org/presentationml/2006/main">
-  <p:cSld>
-    <p:spTree>
-      <p:nvGrpSpPr>
-        <p:cNvPr id="1" name=""/>
-        <p:cNvGrpSpPr/>
-        <p:nvPr/>
-      </p:nvGrpSpPr>
-      <p:grpSpPr>
-        <a:xfrm>
-          <a:off x="0" y="0"/>
-          <a:ext cx="0" cy="0"/>
-          <a:chOff x="0" y="0"/>
-          <a:chExt cx="0" cy="0"/>
-        </a:xfrm>
-      </p:grpSpPr>
-      <p:sp>
-        <p:nvSpPr>
-          <p:cNvPr id="2" name="Title 1"/>
-          <p:cNvSpPr>
-            <a:spLocks noGrp="1"/>
-          </p:cNvSpPr>
-          <p:nvPr>
-            <p:ph type="title"/>
-          </p:nvPr>
-        </p:nvSpPr>
-        <p:spPr/>
-        <p:txBody>
-          <a:bodyPr/>
-          <a:lstStyle/>
-          <a:p>
-            <a:r>
-              <a:rPr lang="en-US" dirty="0" smtClean="0"/>
-              <a:t>Stream Processing</a:t>
-            </a:r>
-            <a:endParaRPr lang="en-US" dirty="0"/>
-          </a:p>
-        </p:txBody>
-      </p:sp>
-      <p:sp>
-        <p:nvSpPr>
-          <p:cNvPr id="3" name="Content Placeholder 2"/>
-          <p:cNvSpPr>
-            <a:spLocks noGrp="1"/>
-          </p:cNvSpPr>
-          <p:nvPr>
-            <p:ph idx="1"/>
-          </p:nvPr>
-        </p:nvSpPr>
-        <p:spPr/>
-        <p:txBody>
-          <a:bodyPr/>
-          <a:lstStyle/>
-          <a:p>
-            <a:endParaRPr lang="en-US"/>
-          </a:p>
-        </p:txBody>
-      </p:sp>
-    </p:spTree>
-    <p:extLst>
-      <p:ext uri="{BB962C8B-B14F-4D97-AF65-F5344CB8AC3E}">
-        <p14:creationId xmlns:p14="http://schemas.microsoft.com/office/powerpoint/2010/main" val="1454001785"/>
-      </p:ext>
-    </p:extLst>
-  </p:cSld>
-  <p:clrMapOvr>
-    <a:masterClrMapping/>
-  </p:clrMapOvr>
-</p:sld>
-</file>
-
 <file path=ppt/slides/slide17.xml><?xml version="1.0" encoding="utf-8"?>
 <p:sld xmlns:a="http://schemas.openxmlformats.org/drawingml/2006/main" xmlns:r="http://schemas.openxmlformats.org/officeDocument/2006/relationships" xmlns:p="http://schemas.openxmlformats.org/presentationml/2006/main">
   <p:cSld>
@@ -7979,7 +8701,7 @@
           <a:p>
             <a:r>
               <a:rPr lang="en-US" dirty="0" smtClean="0"/>
-              <a:t>Automation</a:t>
+              <a:t>Stream Processing</a:t>
             </a:r>
             <a:endParaRPr lang="en-US" dirty="0"/>
           </a:p>
@@ -8007,7 +8729,7 @@
     </p:spTree>
     <p:extLst>
       <p:ext uri="{BB962C8B-B14F-4D97-AF65-F5344CB8AC3E}">
-        <p14:creationId xmlns:p14="http://schemas.microsoft.com/office/powerpoint/2010/main" val="1191581282"/>
+        <p14:creationId xmlns:p14="http://schemas.microsoft.com/office/powerpoint/2010/main" val="1454001785"/>
       </p:ext>
     </p:extLst>
   </p:cSld>
@@ -8051,6 +8773,78 @@
           <a:p>
             <a:r>
               <a:rPr lang="en-US" dirty="0" smtClean="0"/>
+              <a:t>Automation</a:t>
+            </a:r>
+            <a:endParaRPr lang="en-US" dirty="0"/>
+          </a:p>
+        </p:txBody>
+      </p:sp>
+      <p:sp>
+        <p:nvSpPr>
+          <p:cNvPr id="3" name="Content Placeholder 2"/>
+          <p:cNvSpPr>
+            <a:spLocks noGrp="1"/>
+          </p:cNvSpPr>
+          <p:nvPr>
+            <p:ph idx="1"/>
+          </p:nvPr>
+        </p:nvSpPr>
+        <p:spPr/>
+        <p:txBody>
+          <a:bodyPr/>
+          <a:lstStyle/>
+          <a:p>
+            <a:endParaRPr lang="en-US"/>
+          </a:p>
+        </p:txBody>
+      </p:sp>
+    </p:spTree>
+    <p:extLst>
+      <p:ext uri="{BB962C8B-B14F-4D97-AF65-F5344CB8AC3E}">
+        <p14:creationId xmlns:p14="http://schemas.microsoft.com/office/powerpoint/2010/main" val="1191581282"/>
+      </p:ext>
+    </p:extLst>
+  </p:cSld>
+  <p:clrMapOvr>
+    <a:masterClrMapping/>
+  </p:clrMapOvr>
+</p:sld>
+</file>
+
+<file path=ppt/slides/slide19.xml><?xml version="1.0" encoding="utf-8"?>
+<p:sld xmlns:a="http://schemas.openxmlformats.org/drawingml/2006/main" xmlns:r="http://schemas.openxmlformats.org/officeDocument/2006/relationships" xmlns:p="http://schemas.openxmlformats.org/presentationml/2006/main">
+  <p:cSld>
+    <p:spTree>
+      <p:nvGrpSpPr>
+        <p:cNvPr id="1" name=""/>
+        <p:cNvGrpSpPr/>
+        <p:nvPr/>
+      </p:nvGrpSpPr>
+      <p:grpSpPr>
+        <a:xfrm>
+          <a:off x="0" y="0"/>
+          <a:ext cx="0" cy="0"/>
+          <a:chOff x="0" y="0"/>
+          <a:chExt cx="0" cy="0"/>
+        </a:xfrm>
+      </p:grpSpPr>
+      <p:sp>
+        <p:nvSpPr>
+          <p:cNvPr id="2" name="Title 1"/>
+          <p:cNvSpPr>
+            <a:spLocks noGrp="1"/>
+          </p:cNvSpPr>
+          <p:nvPr>
+            <p:ph type="title"/>
+          </p:nvPr>
+        </p:nvSpPr>
+        <p:spPr/>
+        <p:txBody>
+          <a:bodyPr/>
+          <a:lstStyle/>
+          <a:p>
+            <a:r>
+              <a:rPr lang="en-US" dirty="0" smtClean="0"/>
               <a:t>AWS Cost</a:t>
             </a:r>
             <a:r>
@@ -8242,7 +9036,140 @@
 </p:sld>
 </file>
 
-<file path=ppt/slides/slide19.xml><?xml version="1.0" encoding="utf-8"?>
+<file path=ppt/slides/slide2.xml><?xml version="1.0" encoding="utf-8"?>
+<p:sld xmlns:a="http://schemas.openxmlformats.org/drawingml/2006/main" xmlns:r="http://schemas.openxmlformats.org/officeDocument/2006/relationships" xmlns:p="http://schemas.openxmlformats.org/presentationml/2006/main">
+  <p:cSld>
+    <p:spTree>
+      <p:nvGrpSpPr>
+        <p:cNvPr id="1" name=""/>
+        <p:cNvGrpSpPr/>
+        <p:nvPr/>
+      </p:nvGrpSpPr>
+      <p:grpSpPr>
+        <a:xfrm>
+          <a:off x="0" y="0"/>
+          <a:ext cx="0" cy="0"/>
+          <a:chOff x="0" y="0"/>
+          <a:chExt cx="0" cy="0"/>
+        </a:xfrm>
+      </p:grpSpPr>
+      <p:sp>
+        <p:nvSpPr>
+          <p:cNvPr id="2" name="Title 1"/>
+          <p:cNvSpPr>
+            <a:spLocks noGrp="1"/>
+          </p:cNvSpPr>
+          <p:nvPr>
+            <p:ph type="title"/>
+          </p:nvPr>
+        </p:nvSpPr>
+        <p:spPr/>
+        <p:txBody>
+          <a:bodyPr/>
+          <a:lstStyle/>
+          <a:p>
+            <a:r>
+              <a:rPr lang="en-US" dirty="0" smtClean="0"/>
+              <a:t>bio</a:t>
+            </a:r>
+            <a:endParaRPr lang="en-US" dirty="0"/>
+          </a:p>
+        </p:txBody>
+      </p:sp>
+      <p:sp>
+        <p:nvSpPr>
+          <p:cNvPr id="3" name="Content Placeholder 2"/>
+          <p:cNvSpPr>
+            <a:spLocks noGrp="1"/>
+          </p:cNvSpPr>
+          <p:nvPr>
+            <p:ph idx="1"/>
+          </p:nvPr>
+        </p:nvSpPr>
+        <p:spPr/>
+        <p:txBody>
+          <a:bodyPr/>
+          <a:lstStyle/>
+          <a:p>
+            <a:r>
+              <a:rPr lang="en-US" dirty="0" smtClean="0"/>
+              <a:t>Adrian Pomilio</a:t>
+            </a:r>
+          </a:p>
+          <a:p>
+            <a:r>
+              <a:rPr lang="en-US" dirty="0" err="1" smtClean="0"/>
+              <a:t>Github</a:t>
+            </a:r>
+            <a:r>
+              <a:rPr lang="en-US" dirty="0" smtClean="0"/>
+              <a:t>/Twitter : </a:t>
+            </a:r>
+            <a:r>
+              <a:rPr lang="en-US" dirty="0" err="1" smtClean="0"/>
+              <a:t>adrianpomilio</a:t>
+            </a:r>
+            <a:endParaRPr lang="en-US" dirty="0" smtClean="0"/>
+          </a:p>
+          <a:p>
+            <a:pPr lvl="1">
+              <a:buFont typeface="Arial" panose="020B0604020202020204" pitchFamily="34" charset="0"/>
+              <a:buChar char="•"/>
+            </a:pPr>
+            <a:r>
+              <a:rPr lang="en-US" dirty="0"/>
+              <a:t>20+ years of application </a:t>
+            </a:r>
+            <a:r>
+              <a:rPr lang="en-US" dirty="0" smtClean="0"/>
+              <a:t>design and development</a:t>
+            </a:r>
+            <a:endParaRPr lang="en-US" dirty="0"/>
+          </a:p>
+          <a:p>
+            <a:r>
+              <a:rPr lang="en-US" dirty="0" smtClean="0"/>
+              <a:t>Mapp Digital</a:t>
+            </a:r>
+          </a:p>
+          <a:p>
+            <a:pPr lvl="1"/>
+            <a:r>
+              <a:rPr lang="en-US" dirty="0" smtClean="0"/>
+              <a:t>Opinions and ideas</a:t>
+            </a:r>
+            <a:r>
+              <a:rPr lang="en-US" dirty="0"/>
+              <a:t> expressed are solely my own and do not express the views or opinions of </a:t>
+            </a:r>
+            <a:r>
+              <a:rPr lang="en-US" dirty="0" smtClean="0"/>
+              <a:t>my employer</a:t>
+            </a:r>
+          </a:p>
+          <a:p>
+            <a:r>
+              <a:rPr lang="en-US" dirty="0" smtClean="0"/>
+              <a:t>I’m learning everyday</a:t>
+            </a:r>
+            <a:endParaRPr lang="en-US" dirty="0" smtClean="0"/>
+          </a:p>
+        </p:txBody>
+      </p:sp>
+    </p:spTree>
+    <p:extLst>
+      <p:ext uri="{BB962C8B-B14F-4D97-AF65-F5344CB8AC3E}">
+        <p14:creationId xmlns:p14="http://schemas.microsoft.com/office/powerpoint/2010/main" val="1780265973"/>
+      </p:ext>
+    </p:extLst>
+  </p:cSld>
+  <p:clrMapOvr>
+    <a:masterClrMapping/>
+  </p:clrMapOvr>
+</p:sld>
+</file>
+
+<file path=ppt/slides/slide20.xml><?xml version="1.0" encoding="utf-8"?>
 <p:sld xmlns:a="http://schemas.openxmlformats.org/drawingml/2006/main" xmlns:r="http://schemas.openxmlformats.org/officeDocument/2006/relationships" xmlns:p="http://schemas.openxmlformats.org/presentationml/2006/main">
   <p:cSld>
     <p:spTree>
@@ -8328,7 +9255,7 @@
 </p:sld>
 </file>
 
-<file path=ppt/slides/slide2.xml><?xml version="1.0" encoding="utf-8"?>
+<file path=ppt/slides/slide21.xml><?xml version="1.0" encoding="utf-8"?>
 <p:sld xmlns:a="http://schemas.openxmlformats.org/drawingml/2006/main" xmlns:r="http://schemas.openxmlformats.org/officeDocument/2006/relationships" xmlns:p="http://schemas.openxmlformats.org/presentationml/2006/main">
   <p:cSld>
     <p:spTree>
@@ -8362,9 +9289,16 @@
           <a:p>
             <a:r>
               <a:rPr lang="en-US" dirty="0" smtClean="0"/>
-              <a:t>bio</a:t>
-            </a:r>
-            <a:endParaRPr lang="en-US" dirty="0"/>
+              <a:t>Lambda</a:t>
+            </a:r>
+            <a:br>
+              <a:rPr lang="en-US" dirty="0" smtClean="0"/>
+            </a:br>
+            <a:r>
+              <a:rPr lang="en-US" sz="2400" dirty="0" smtClean="0"/>
+              <a:t>language/runtime support</a:t>
+            </a:r>
+            <a:endParaRPr lang="en-US" sz="2400" dirty="0"/>
           </a:p>
         </p:txBody>
       </p:sp>
@@ -8384,146 +9318,6 @@
           <a:lstStyle/>
           <a:p>
             <a:r>
-              <a:rPr lang="en-US" dirty="0" smtClean="0"/>
-              <a:t>Adrian Pomilio</a:t>
-            </a:r>
-          </a:p>
-          <a:p>
-            <a:r>
-              <a:rPr lang="en-US" dirty="0" err="1" smtClean="0"/>
-              <a:t>Github</a:t>
-            </a:r>
-            <a:r>
-              <a:rPr lang="en-US" dirty="0" smtClean="0"/>
-              <a:t>/Twitter : </a:t>
-            </a:r>
-            <a:r>
-              <a:rPr lang="en-US" dirty="0" err="1" smtClean="0"/>
-              <a:t>adrianpomilio</a:t>
-            </a:r>
-            <a:endParaRPr lang="en-US" dirty="0" smtClean="0"/>
-          </a:p>
-          <a:p>
-            <a:pPr lvl="1">
-              <a:buFont typeface="Arial" panose="020B0604020202020204" pitchFamily="34" charset="0"/>
-              <a:buChar char="•"/>
-            </a:pPr>
-            <a:r>
-              <a:rPr lang="en-US" dirty="0"/>
-              <a:t>20+ years of application </a:t>
-            </a:r>
-            <a:r>
-              <a:rPr lang="en-US" dirty="0" smtClean="0"/>
-              <a:t>design and development</a:t>
-            </a:r>
-            <a:endParaRPr lang="en-US" dirty="0"/>
-          </a:p>
-          <a:p>
-            <a:r>
-              <a:rPr lang="en-US" dirty="0" smtClean="0"/>
-              <a:t>Mapp Digital</a:t>
-            </a:r>
-          </a:p>
-          <a:p>
-            <a:pPr lvl="1"/>
-            <a:r>
-              <a:rPr lang="en-US" dirty="0" smtClean="0"/>
-              <a:t>Opinions and ideas</a:t>
-            </a:r>
-            <a:r>
-              <a:rPr lang="en-US" dirty="0"/>
-              <a:t> expressed are solely my own and do not express the views or opinions of </a:t>
-            </a:r>
-            <a:r>
-              <a:rPr lang="en-US" dirty="0" smtClean="0"/>
-              <a:t>my employer</a:t>
-            </a:r>
-          </a:p>
-          <a:p>
-            <a:r>
-              <a:rPr lang="en-US" dirty="0" smtClean="0"/>
-              <a:t>I’m learning everyday</a:t>
-            </a:r>
-            <a:endParaRPr lang="en-US" dirty="0" smtClean="0"/>
-          </a:p>
-        </p:txBody>
-      </p:sp>
-    </p:spTree>
-    <p:extLst>
-      <p:ext uri="{BB962C8B-B14F-4D97-AF65-F5344CB8AC3E}">
-        <p14:creationId xmlns:p14="http://schemas.microsoft.com/office/powerpoint/2010/main" val="1780265973"/>
-      </p:ext>
-    </p:extLst>
-  </p:cSld>
-  <p:clrMapOvr>
-    <a:masterClrMapping/>
-  </p:clrMapOvr>
-</p:sld>
-</file>
-
-<file path=ppt/slides/slide20.xml><?xml version="1.0" encoding="utf-8"?>
-<p:sld xmlns:a="http://schemas.openxmlformats.org/drawingml/2006/main" xmlns:r="http://schemas.openxmlformats.org/officeDocument/2006/relationships" xmlns:p="http://schemas.openxmlformats.org/presentationml/2006/main">
-  <p:cSld>
-    <p:spTree>
-      <p:nvGrpSpPr>
-        <p:cNvPr id="1" name=""/>
-        <p:cNvGrpSpPr/>
-        <p:nvPr/>
-      </p:nvGrpSpPr>
-      <p:grpSpPr>
-        <a:xfrm>
-          <a:off x="0" y="0"/>
-          <a:ext cx="0" cy="0"/>
-          <a:chOff x="0" y="0"/>
-          <a:chExt cx="0" cy="0"/>
-        </a:xfrm>
-      </p:grpSpPr>
-      <p:sp>
-        <p:nvSpPr>
-          <p:cNvPr id="2" name="Title 1"/>
-          <p:cNvSpPr>
-            <a:spLocks noGrp="1"/>
-          </p:cNvSpPr>
-          <p:nvPr>
-            <p:ph type="title"/>
-          </p:nvPr>
-        </p:nvSpPr>
-        <p:spPr/>
-        <p:txBody>
-          <a:bodyPr/>
-          <a:lstStyle/>
-          <a:p>
-            <a:r>
-              <a:rPr lang="en-US" dirty="0" smtClean="0"/>
-              <a:t>Lambda</a:t>
-            </a:r>
-            <a:br>
-              <a:rPr lang="en-US" dirty="0" smtClean="0"/>
-            </a:br>
-            <a:r>
-              <a:rPr lang="en-US" sz="2400" dirty="0" smtClean="0"/>
-              <a:t>language/runtime support</a:t>
-            </a:r>
-            <a:endParaRPr lang="en-US" sz="2400" dirty="0"/>
-          </a:p>
-        </p:txBody>
-      </p:sp>
-      <p:sp>
-        <p:nvSpPr>
-          <p:cNvPr id="3" name="Content Placeholder 2"/>
-          <p:cNvSpPr>
-            <a:spLocks noGrp="1"/>
-          </p:cNvSpPr>
-          <p:nvPr>
-            <p:ph idx="1"/>
-          </p:nvPr>
-        </p:nvSpPr>
-        <p:spPr/>
-        <p:txBody>
-          <a:bodyPr/>
-          <a:lstStyle/>
-          <a:p>
-            <a:r>
               <a:rPr lang="en-US" dirty="0" err="1" smtClean="0"/>
               <a:t>NodeJS</a:t>
             </a:r>
@@ -8595,14 +9389,10 @@
           <a:p>
             <a:r>
               <a:rPr lang="en-US" dirty="0" smtClean="0"/>
-              <a:t>Pretty much anything </a:t>
-            </a:r>
-            <a:r>
-              <a:rPr lang="en-US" smtClean="0"/>
-              <a:t>within reason </a:t>
-            </a:r>
-            <a:r>
-              <a:rPr lang="en-US" smtClean="0">
+              <a:t>Pretty much anything within reason </a:t>
+            </a:r>
+            <a:r>
+              <a:rPr lang="en-US" dirty="0" smtClean="0">
                 <a:sym typeface="Wingdings"/>
               </a:rPr>
               <a:t></a:t>
@@ -8654,7 +9444,7 @@
 </p:sld>
 </file>
 
-<file path=ppt/slides/slide21.xml><?xml version="1.0" encoding="utf-8"?>
+<file path=ppt/slides/slide22.xml><?xml version="1.0" encoding="utf-8"?>
 <p:sld xmlns:a="http://schemas.openxmlformats.org/drawingml/2006/main" xmlns:r="http://schemas.openxmlformats.org/officeDocument/2006/relationships" xmlns:p="http://schemas.openxmlformats.org/presentationml/2006/main">
   <p:cSld>
     <p:spTree>
@@ -9284,7 +10074,7 @@
 </p:sld>
 </file>
 
-<file path=ppt/slides/slide22.xml><?xml version="1.0" encoding="utf-8"?>
+<file path=ppt/slides/slide23.xml><?xml version="1.0" encoding="utf-8"?>
 <p:sld xmlns:a="http://schemas.openxmlformats.org/drawingml/2006/main" xmlns:r="http://schemas.openxmlformats.org/officeDocument/2006/relationships" xmlns:p="http://schemas.openxmlformats.org/presentationml/2006/main">
   <p:cSld>
     <p:spTree>
@@ -9440,114 +10230,6 @@
 </p:sld>
 </file>
 
-<file path=ppt/slides/slide23.xml><?xml version="1.0" encoding="utf-8"?>
-<p:sld xmlns:a="http://schemas.openxmlformats.org/drawingml/2006/main" xmlns:r="http://schemas.openxmlformats.org/officeDocument/2006/relationships" xmlns:p="http://schemas.openxmlformats.org/presentationml/2006/main">
-  <p:cSld>
-    <p:spTree>
-      <p:nvGrpSpPr>
-        <p:cNvPr id="1" name=""/>
-        <p:cNvGrpSpPr/>
-        <p:nvPr/>
-      </p:nvGrpSpPr>
-      <p:grpSpPr>
-        <a:xfrm>
-          <a:off x="0" y="0"/>
-          <a:ext cx="0" cy="0"/>
-          <a:chOff x="0" y="0"/>
-          <a:chExt cx="0" cy="0"/>
-        </a:xfrm>
-      </p:grpSpPr>
-      <p:sp>
-        <p:nvSpPr>
-          <p:cNvPr id="2" name="Title 1"/>
-          <p:cNvSpPr>
-            <a:spLocks noGrp="1"/>
-          </p:cNvSpPr>
-          <p:nvPr>
-            <p:ph type="title"/>
-          </p:nvPr>
-        </p:nvSpPr>
-        <p:spPr/>
-        <p:txBody>
-          <a:bodyPr/>
-          <a:lstStyle/>
-          <a:p>
-            <a:r>
-              <a:rPr lang="en-US" dirty="0" smtClean="0"/>
-              <a:t>Services</a:t>
-            </a:r>
-            <a:endParaRPr lang="en-US" dirty="0"/>
-          </a:p>
-        </p:txBody>
-      </p:sp>
-      <p:sp>
-        <p:nvSpPr>
-          <p:cNvPr id="3" name="Content Placeholder 2"/>
-          <p:cNvSpPr>
-            <a:spLocks noGrp="1"/>
-          </p:cNvSpPr>
-          <p:nvPr>
-            <p:ph idx="1"/>
-          </p:nvPr>
-        </p:nvSpPr>
-        <p:spPr/>
-        <p:txBody>
-          <a:bodyPr/>
-          <a:lstStyle/>
-          <a:p>
-            <a:r>
-              <a:rPr lang="en-US" dirty="0" smtClean="0"/>
-              <a:t>API-Gateway</a:t>
-            </a:r>
-          </a:p>
-          <a:p>
-            <a:r>
-              <a:rPr lang="en-US" dirty="0" err="1" smtClean="0"/>
-              <a:t>Cognito</a:t>
-            </a:r>
-            <a:endParaRPr lang="en-US" dirty="0" smtClean="0"/>
-          </a:p>
-          <a:p>
-            <a:r>
-              <a:rPr lang="en-US" dirty="0" smtClean="0"/>
-              <a:t>S3</a:t>
-            </a:r>
-          </a:p>
-          <a:p>
-            <a:r>
-              <a:rPr lang="en-US" dirty="0" smtClean="0"/>
-              <a:t>SNS</a:t>
-            </a:r>
-          </a:p>
-          <a:p>
-            <a:r>
-              <a:rPr lang="en-US" dirty="0" err="1" smtClean="0"/>
-              <a:t>Kinises</a:t>
-            </a:r>
-            <a:endParaRPr lang="en-US" dirty="0" smtClean="0"/>
-          </a:p>
-          <a:p>
-            <a:r>
-              <a:rPr lang="en-US" dirty="0" smtClean="0"/>
-              <a:t>Etc..</a:t>
-            </a:r>
-            <a:endParaRPr lang="en-US" dirty="0"/>
-          </a:p>
-        </p:txBody>
-      </p:sp>
-    </p:spTree>
-    <p:extLst>
-      <p:ext uri="{BB962C8B-B14F-4D97-AF65-F5344CB8AC3E}">
-        <p14:creationId xmlns:p14="http://schemas.microsoft.com/office/powerpoint/2010/main" val="2036119871"/>
-      </p:ext>
-    </p:extLst>
-  </p:cSld>
-  <p:clrMapOvr>
-    <a:masterClrMapping/>
-  </p:clrMapOvr>
-</p:sld>
-</file>
-
 <file path=ppt/slides/slide24.xml><?xml version="1.0" encoding="utf-8"?>
 <p:sld xmlns:a="http://schemas.openxmlformats.org/drawingml/2006/main" xmlns:r="http://schemas.openxmlformats.org/officeDocument/2006/relationships" xmlns:p="http://schemas.openxmlformats.org/presentationml/2006/main">
   <p:cSld>
@@ -9582,6 +10264,114 @@
           <a:p>
             <a:r>
               <a:rPr lang="en-US" dirty="0" smtClean="0"/>
+              <a:t>Services</a:t>
+            </a:r>
+            <a:endParaRPr lang="en-US" dirty="0"/>
+          </a:p>
+        </p:txBody>
+      </p:sp>
+      <p:sp>
+        <p:nvSpPr>
+          <p:cNvPr id="3" name="Content Placeholder 2"/>
+          <p:cNvSpPr>
+            <a:spLocks noGrp="1"/>
+          </p:cNvSpPr>
+          <p:nvPr>
+            <p:ph idx="1"/>
+          </p:nvPr>
+        </p:nvSpPr>
+        <p:spPr/>
+        <p:txBody>
+          <a:bodyPr/>
+          <a:lstStyle/>
+          <a:p>
+            <a:r>
+              <a:rPr lang="en-US" dirty="0" smtClean="0"/>
+              <a:t>API-Gateway</a:t>
+            </a:r>
+          </a:p>
+          <a:p>
+            <a:r>
+              <a:rPr lang="en-US" dirty="0" err="1" smtClean="0"/>
+              <a:t>Cognito</a:t>
+            </a:r>
+            <a:endParaRPr lang="en-US" dirty="0" smtClean="0"/>
+          </a:p>
+          <a:p>
+            <a:r>
+              <a:rPr lang="en-US" dirty="0" smtClean="0"/>
+              <a:t>S3</a:t>
+            </a:r>
+          </a:p>
+          <a:p>
+            <a:r>
+              <a:rPr lang="en-US" dirty="0" smtClean="0"/>
+              <a:t>SNS</a:t>
+            </a:r>
+          </a:p>
+          <a:p>
+            <a:r>
+              <a:rPr lang="en-US" dirty="0" err="1" smtClean="0"/>
+              <a:t>Kinises</a:t>
+            </a:r>
+            <a:endParaRPr lang="en-US" dirty="0" smtClean="0"/>
+          </a:p>
+          <a:p>
+            <a:r>
+              <a:rPr lang="en-US" dirty="0" smtClean="0"/>
+              <a:t>Etc..</a:t>
+            </a:r>
+            <a:endParaRPr lang="en-US" dirty="0"/>
+          </a:p>
+        </p:txBody>
+      </p:sp>
+    </p:spTree>
+    <p:extLst>
+      <p:ext uri="{BB962C8B-B14F-4D97-AF65-F5344CB8AC3E}">
+        <p14:creationId xmlns:p14="http://schemas.microsoft.com/office/powerpoint/2010/main" val="2036119871"/>
+      </p:ext>
+    </p:extLst>
+  </p:cSld>
+  <p:clrMapOvr>
+    <a:masterClrMapping/>
+  </p:clrMapOvr>
+</p:sld>
+</file>
+
+<file path=ppt/slides/slide25.xml><?xml version="1.0" encoding="utf-8"?>
+<p:sld xmlns:a="http://schemas.openxmlformats.org/drawingml/2006/main" xmlns:r="http://schemas.openxmlformats.org/officeDocument/2006/relationships" xmlns:p="http://schemas.openxmlformats.org/presentationml/2006/main">
+  <p:cSld>
+    <p:spTree>
+      <p:nvGrpSpPr>
+        <p:cNvPr id="1" name=""/>
+        <p:cNvGrpSpPr/>
+        <p:nvPr/>
+      </p:nvGrpSpPr>
+      <p:grpSpPr>
+        <a:xfrm>
+          <a:off x="0" y="0"/>
+          <a:ext cx="0" cy="0"/>
+          <a:chOff x="0" y="0"/>
+          <a:chExt cx="0" cy="0"/>
+        </a:xfrm>
+      </p:grpSpPr>
+      <p:sp>
+        <p:nvSpPr>
+          <p:cNvPr id="2" name="Title 1"/>
+          <p:cNvSpPr>
+            <a:spLocks noGrp="1"/>
+          </p:cNvSpPr>
+          <p:nvPr>
+            <p:ph type="title"/>
+          </p:nvPr>
+        </p:nvSpPr>
+        <p:spPr/>
+        <p:txBody>
+          <a:bodyPr/>
+          <a:lstStyle/>
+          <a:p>
+            <a:r>
+              <a:rPr lang="en-US" dirty="0" smtClean="0"/>
               <a:t>How to</a:t>
             </a:r>
             <a:endParaRPr lang="en-US" dirty="0"/>
@@ -9635,7 +10425,7 @@
 </p:sld>
 </file>
 
-<file path=ppt/slides/slide25.xml><?xml version="1.0" encoding="utf-8"?>
+<file path=ppt/slides/slide26.xml><?xml version="1.0" encoding="utf-8"?>
 <p:sld xmlns:a="http://schemas.openxmlformats.org/drawingml/2006/main" xmlns:r="http://schemas.openxmlformats.org/officeDocument/2006/relationships" xmlns:p="http://schemas.openxmlformats.org/presentationml/2006/main">
   <p:cSld>
     <p:spTree>
@@ -9725,7 +10515,7 @@
 </p:sld>
 </file>
 
-<file path=ppt/slides/slide26.xml><?xml version="1.0" encoding="utf-8"?>
+<file path=ppt/slides/slide27.xml><?xml version="1.0" encoding="utf-8"?>
 <p:sld xmlns:a="http://schemas.openxmlformats.org/drawingml/2006/main" xmlns:r="http://schemas.openxmlformats.org/officeDocument/2006/relationships" xmlns:p="http://schemas.openxmlformats.org/presentationml/2006/main">
   <p:cSld>
     <p:spTree>
@@ -9809,101 +10599,6 @@
 </p:sld>
 </file>
 
-<file path=ppt/slides/slide27.xml><?xml version="1.0" encoding="utf-8"?>
-<p:sld xmlns:a="http://schemas.openxmlformats.org/drawingml/2006/main" xmlns:r="http://schemas.openxmlformats.org/officeDocument/2006/relationships" xmlns:p="http://schemas.openxmlformats.org/presentationml/2006/main">
-  <p:cSld>
-    <p:spTree>
-      <p:nvGrpSpPr>
-        <p:cNvPr id="1" name=""/>
-        <p:cNvGrpSpPr/>
-        <p:nvPr/>
-      </p:nvGrpSpPr>
-      <p:grpSpPr>
-        <a:xfrm>
-          <a:off x="0" y="0"/>
-          <a:ext cx="0" cy="0"/>
-          <a:chOff x="0" y="0"/>
-          <a:chExt cx="0" cy="0"/>
-        </a:xfrm>
-      </p:grpSpPr>
-      <p:sp>
-        <p:nvSpPr>
-          <p:cNvPr id="2" name="Title 1"/>
-          <p:cNvSpPr>
-            <a:spLocks noGrp="1"/>
-          </p:cNvSpPr>
-          <p:nvPr>
-            <p:ph type="title"/>
-          </p:nvPr>
-        </p:nvSpPr>
-        <p:spPr/>
-        <p:txBody>
-          <a:bodyPr/>
-          <a:lstStyle/>
-          <a:p>
-            <a:r>
-              <a:rPr lang="en-US" dirty="0" smtClean="0"/>
-              <a:t>Frameworks</a:t>
-            </a:r>
-            <a:br>
-              <a:rPr lang="en-US" dirty="0" smtClean="0"/>
-            </a:br>
-            <a:r>
-              <a:rPr lang="en-US" sz="2400" dirty="0" smtClean="0"/>
-              <a:t>now we’re getting somewhere</a:t>
-            </a:r>
-            <a:endParaRPr lang="en-US" sz="2400" dirty="0"/>
-          </a:p>
-        </p:txBody>
-      </p:sp>
-      <p:sp>
-        <p:nvSpPr>
-          <p:cNvPr id="3" name="Content Placeholder 2"/>
-          <p:cNvSpPr>
-            <a:spLocks noGrp="1"/>
-          </p:cNvSpPr>
-          <p:nvPr>
-            <p:ph idx="1"/>
-          </p:nvPr>
-        </p:nvSpPr>
-        <p:spPr/>
-        <p:txBody>
-          <a:bodyPr/>
-          <a:lstStyle/>
-          <a:p>
-            <a:r>
-              <a:rPr lang="en-US" dirty="0" smtClean="0"/>
-              <a:t>Apex</a:t>
-            </a:r>
-          </a:p>
-          <a:p>
-            <a:r>
-              <a:rPr lang="en-US" dirty="0" smtClean="0"/>
-              <a:t>AWS Sam</a:t>
-            </a:r>
-          </a:p>
-          <a:p>
-            <a:r>
-              <a:rPr lang="en-US" dirty="0" err="1" smtClean="0"/>
-              <a:t>Serverless</a:t>
-            </a:r>
-            <a:endParaRPr lang="en-US" dirty="0" smtClean="0"/>
-          </a:p>
-        </p:txBody>
-      </p:sp>
-    </p:spTree>
-    <p:extLst>
-      <p:ext uri="{BB962C8B-B14F-4D97-AF65-F5344CB8AC3E}">
-        <p14:creationId xmlns:p14="http://schemas.microsoft.com/office/powerpoint/2010/main" val="1115277555"/>
-      </p:ext>
-    </p:extLst>
-  </p:cSld>
-  <p:clrMapOvr>
-    <a:masterClrMapping/>
-  </p:clrMapOvr>
-</p:sld>
-</file>
-
 <file path=ppt/slides/slide28.xml><?xml version="1.0" encoding="utf-8"?>
 <p:sld xmlns:a="http://schemas.openxmlformats.org/drawingml/2006/main" xmlns:r="http://schemas.openxmlformats.org/officeDocument/2006/relationships" xmlns:p="http://schemas.openxmlformats.org/presentationml/2006/main">
   <p:cSld>
@@ -9937,100 +10632,59 @@
           <a:lstStyle/>
           <a:p>
             <a:r>
+              <a:rPr lang="en-US" dirty="0" smtClean="0"/>
+              <a:t>Frameworks</a:t>
+            </a:r>
+            <a:br>
+              <a:rPr lang="en-US" dirty="0" smtClean="0"/>
+            </a:br>
+            <a:r>
+              <a:rPr lang="en-US" sz="2400" dirty="0" smtClean="0"/>
+              <a:t>now we’re getting somewhere</a:t>
+            </a:r>
+            <a:endParaRPr lang="en-US" sz="2400" dirty="0"/>
+          </a:p>
+        </p:txBody>
+      </p:sp>
+      <p:sp>
+        <p:nvSpPr>
+          <p:cNvPr id="3" name="Content Placeholder 2"/>
+          <p:cNvSpPr>
+            <a:spLocks noGrp="1"/>
+          </p:cNvSpPr>
+          <p:nvPr>
+            <p:ph idx="1"/>
+          </p:nvPr>
+        </p:nvSpPr>
+        <p:spPr/>
+        <p:txBody>
+          <a:bodyPr/>
+          <a:lstStyle/>
+          <a:p>
+            <a:r>
+              <a:rPr lang="en-US" dirty="0" smtClean="0"/>
+              <a:t>Apex</a:t>
+            </a:r>
+          </a:p>
+          <a:p>
+            <a:r>
+              <a:rPr lang="en-US" dirty="0" smtClean="0"/>
+              <a:t>AWS Sam</a:t>
+            </a:r>
+          </a:p>
+          <a:p>
+            <a:r>
               <a:rPr lang="en-US" dirty="0" err="1" smtClean="0"/>
               <a:t>Serverless</a:t>
             </a:r>
-            <a:r>
-              <a:rPr lang="en-US" dirty="0" smtClean="0"/>
-              <a:t/>
-            </a:r>
-            <a:br>
-              <a:rPr lang="en-US" dirty="0" smtClean="0"/>
-            </a:br>
-            <a:r>
-              <a:rPr lang="en-US" sz="2400" dirty="0" smtClean="0"/>
-              <a:t>the framework</a:t>
-            </a:r>
-            <a:endParaRPr lang="en-US" sz="2400" dirty="0"/>
-          </a:p>
-        </p:txBody>
-      </p:sp>
-      <p:sp>
-        <p:nvSpPr>
-          <p:cNvPr id="3" name="Content Placeholder 2"/>
-          <p:cNvSpPr>
-            <a:spLocks noGrp="1"/>
-          </p:cNvSpPr>
-          <p:nvPr>
-            <p:ph idx="1"/>
-          </p:nvPr>
-        </p:nvSpPr>
-        <p:spPr/>
-        <p:txBody>
-          <a:bodyPr/>
-          <a:lstStyle/>
-          <a:p>
-            <a:r>
-              <a:rPr lang="en-US" dirty="0" err="1" smtClean="0"/>
-              <a:t>Serverless</a:t>
-            </a:r>
-            <a:r>
-              <a:rPr lang="en-US" dirty="0"/>
-              <a:t>: </a:t>
-            </a:r>
-            <a:r>
-              <a:rPr lang="en-US" dirty="0">
-                <a:hlinkClick r:id="rId2"/>
-              </a:rPr>
-              <a:t>https://</a:t>
-            </a:r>
-            <a:r>
-              <a:rPr lang="en-US" dirty="0" err="1">
-                <a:hlinkClick r:id="rId2"/>
-              </a:rPr>
-              <a:t>serverless.com</a:t>
-            </a:r>
             <a:endParaRPr lang="en-US" dirty="0" smtClean="0"/>
-          </a:p>
-          <a:p>
-            <a:r>
-              <a:rPr lang="en-US" dirty="0" smtClean="0"/>
-              <a:t>Works for multiple providers</a:t>
-            </a:r>
-          </a:p>
-          <a:p>
-            <a:r>
-              <a:rPr lang="en-US" dirty="0" smtClean="0"/>
-              <a:t>Works with multiple templates</a:t>
-            </a:r>
-          </a:p>
-          <a:p>
-            <a:r>
-              <a:rPr lang="en-US" dirty="0" smtClean="0"/>
-              <a:t>Very similar to cloud formation templates</a:t>
-            </a:r>
-          </a:p>
-          <a:p>
-            <a:r>
-              <a:rPr lang="en-US" dirty="0" smtClean="0"/>
-              <a:t>Sanity for the developers</a:t>
-            </a:r>
-          </a:p>
-          <a:p>
-            <a:pPr marL="0" indent="0">
-              <a:buNone/>
-            </a:pPr>
-            <a:endParaRPr lang="en-US" dirty="0" smtClean="0"/>
-          </a:p>
-          <a:p>
-            <a:endParaRPr lang="en-US" dirty="0"/>
           </a:p>
         </p:txBody>
       </p:sp>
     </p:spTree>
     <p:extLst>
       <p:ext uri="{BB962C8B-B14F-4D97-AF65-F5344CB8AC3E}">
-        <p14:creationId xmlns:p14="http://schemas.microsoft.com/office/powerpoint/2010/main" val="1124419550"/>
+        <p14:creationId xmlns:p14="http://schemas.microsoft.com/office/powerpoint/2010/main" val="1115277555"/>
       </p:ext>
     </p:extLst>
   </p:cSld>
@@ -10073,10 +10727,21 @@
           <a:lstStyle/>
           <a:p>
             <a:r>
-              <a:rPr lang="en-US" dirty="0" smtClean="0"/>
-              <a:t>Additional resources</a:t>
-            </a:r>
-            <a:endParaRPr lang="en-US" dirty="0"/>
+              <a:rPr lang="en-US" dirty="0" err="1" smtClean="0"/>
+              <a:t>Serverless</a:t>
+            </a:r>
+            <a:r>
+              <a:rPr lang="en-US" dirty="0" smtClean="0"/>
+              <a:t/>
+            </a:r>
+            <a:br>
+              <a:rPr lang="en-US" dirty="0" smtClean="0"/>
+            </a:br>
+            <a:r>
+              <a:rPr lang="en-US" sz="2400" dirty="0" smtClean="0"/>
+              <a:t>the framework</a:t>
+            </a:r>
+            <a:endParaRPr lang="en-US" sz="2400" dirty="0"/>
           </a:p>
         </p:txBody>
       </p:sp>
@@ -10096,93 +10761,55 @@
           <a:lstStyle/>
           <a:p>
             <a:r>
+              <a:rPr lang="en-US" dirty="0" err="1" smtClean="0"/>
+              <a:t>Serverless</a:t>
+            </a:r>
+            <a:r>
               <a:rPr lang="en-US" dirty="0"/>
-              <a:t>Pricing example: </a:t>
+              <a:t>: </a:t>
             </a:r>
             <a:r>
               <a:rPr lang="en-US" dirty="0">
                 <a:hlinkClick r:id="rId2"/>
               </a:rPr>
-              <a:t>https://alestic.com/2016/12/aws-invoice-example</a:t>
-            </a:r>
-            <a:r>
-              <a:rPr lang="en-US" dirty="0" smtClean="0">
+              <a:t>https://</a:t>
+            </a:r>
+            <a:r>
+              <a:rPr lang="en-US" dirty="0" err="1">
                 <a:hlinkClick r:id="rId2"/>
               </a:rPr>
-              <a:t>/</a:t>
+              <a:t>serverless.com</a:t>
             </a:r>
             <a:endParaRPr lang="en-US" dirty="0" smtClean="0"/>
           </a:p>
           <a:p>
             <a:r>
-              <a:rPr lang="en-US" dirty="0"/>
-              <a:t>A Cloud Guru: </a:t>
-            </a:r>
-            <a:r>
-              <a:rPr lang="en-US" dirty="0">
-                <a:hlinkClick r:id="rId3"/>
-              </a:rPr>
-              <a:t>https://acloud.guru</a:t>
-            </a:r>
-            <a:r>
-              <a:rPr lang="en-US" dirty="0" smtClean="0">
-                <a:hlinkClick r:id="rId3"/>
-              </a:rPr>
-              <a:t>/</a:t>
-            </a:r>
-            <a:endParaRPr lang="en-US" dirty="0" smtClean="0"/>
-          </a:p>
-          <a:p>
-            <a:r>
-              <a:rPr lang="en-US" dirty="0" err="1" smtClean="0"/>
-              <a:t>Serverless</a:t>
-            </a:r>
-            <a:r>
-              <a:rPr lang="en-US" dirty="0"/>
-              <a:t>: </a:t>
-            </a:r>
-            <a:r>
-              <a:rPr lang="en-US" dirty="0">
-                <a:hlinkClick r:id="rId4"/>
-              </a:rPr>
-              <a:t>https://serverless.com</a:t>
-            </a:r>
-            <a:r>
-              <a:rPr lang="en-US" dirty="0" smtClean="0">
-                <a:hlinkClick r:id="rId4"/>
-              </a:rPr>
-              <a:t>/</a:t>
-            </a:r>
-            <a:endParaRPr lang="en-US" dirty="0" smtClean="0"/>
-          </a:p>
-          <a:p>
-            <a:r>
-              <a:rPr lang="en-US" dirty="0"/>
-              <a:t>AWS </a:t>
-            </a:r>
-            <a:r>
-              <a:rPr lang="en-US" dirty="0" err="1"/>
-              <a:t>Serverless</a:t>
-            </a:r>
-            <a:r>
-              <a:rPr lang="en-US" dirty="0"/>
-              <a:t>: </a:t>
-            </a:r>
-            <a:r>
-              <a:rPr lang="en-US" dirty="0">
-                <a:hlinkClick r:id="rId5"/>
-              </a:rPr>
-              <a:t>https://aws.amazon.com/serverless</a:t>
-            </a:r>
-            <a:r>
-              <a:rPr lang="en-US" dirty="0" smtClean="0">
-                <a:hlinkClick r:id="rId5"/>
-              </a:rPr>
-              <a:t>/</a:t>
-            </a:r>
-            <a:endParaRPr lang="en-US" dirty="0" smtClean="0"/>
-          </a:p>
-          <a:p>
+              <a:rPr lang="en-US" dirty="0" smtClean="0"/>
+              <a:t>Works for multiple providers</a:t>
+            </a:r>
+          </a:p>
+          <a:p>
+            <a:r>
+              <a:rPr lang="en-US" dirty="0" smtClean="0"/>
+              <a:t>Works with multiple templates</a:t>
+            </a:r>
+          </a:p>
+          <a:p>
+            <a:r>
+              <a:rPr lang="en-US" dirty="0" smtClean="0"/>
+              <a:t>Very similar to cloud formation templates</a:t>
+            </a:r>
+          </a:p>
+          <a:p>
+            <a:r>
+              <a:rPr lang="en-US" dirty="0" smtClean="0"/>
+              <a:t>Sanity for the developers</a:t>
+            </a:r>
+          </a:p>
+          <a:p>
+            <a:pPr marL="0" indent="0">
+              <a:buNone/>
+            </a:pPr>
             <a:endParaRPr lang="en-US" dirty="0" smtClean="0"/>
           </a:p>
           <a:p>
@@ -10193,7 +10820,7 @@
     </p:spTree>
     <p:extLst>
       <p:ext uri="{BB962C8B-B14F-4D97-AF65-F5344CB8AC3E}">
-        <p14:creationId xmlns:p14="http://schemas.microsoft.com/office/powerpoint/2010/main" val="722583454"/>
+        <p14:creationId xmlns:p14="http://schemas.microsoft.com/office/powerpoint/2010/main" val="1124419550"/>
       </p:ext>
     </p:extLst>
   </p:cSld>
@@ -10291,6 +10918,169 @@
 </file>
 
 <file path=ppt/slides/slide30.xml><?xml version="1.0" encoding="utf-8"?>
+<p:sld xmlns:a="http://schemas.openxmlformats.org/drawingml/2006/main" xmlns:r="http://schemas.openxmlformats.org/officeDocument/2006/relationships" xmlns:p="http://schemas.openxmlformats.org/presentationml/2006/main">
+  <p:cSld>
+    <p:spTree>
+      <p:nvGrpSpPr>
+        <p:cNvPr id="1" name=""/>
+        <p:cNvGrpSpPr/>
+        <p:nvPr/>
+      </p:nvGrpSpPr>
+      <p:grpSpPr>
+        <a:xfrm>
+          <a:off x="0" y="0"/>
+          <a:ext cx="0" cy="0"/>
+          <a:chOff x="0" y="0"/>
+          <a:chExt cx="0" cy="0"/>
+        </a:xfrm>
+      </p:grpSpPr>
+      <p:sp>
+        <p:nvSpPr>
+          <p:cNvPr id="2" name="Title 1"/>
+          <p:cNvSpPr>
+            <a:spLocks noGrp="1"/>
+          </p:cNvSpPr>
+          <p:nvPr>
+            <p:ph type="title"/>
+          </p:nvPr>
+        </p:nvSpPr>
+        <p:spPr/>
+        <p:txBody>
+          <a:bodyPr/>
+          <a:lstStyle/>
+          <a:p>
+            <a:r>
+              <a:rPr lang="en-US" dirty="0" smtClean="0"/>
+              <a:t>Additional resources</a:t>
+            </a:r>
+            <a:endParaRPr lang="en-US" dirty="0"/>
+          </a:p>
+        </p:txBody>
+      </p:sp>
+      <p:sp>
+        <p:nvSpPr>
+          <p:cNvPr id="3" name="Content Placeholder 2"/>
+          <p:cNvSpPr>
+            <a:spLocks noGrp="1"/>
+          </p:cNvSpPr>
+          <p:nvPr>
+            <p:ph idx="1"/>
+          </p:nvPr>
+        </p:nvSpPr>
+        <p:spPr/>
+        <p:txBody>
+          <a:bodyPr/>
+          <a:lstStyle/>
+          <a:p>
+            <a:r>
+              <a:rPr lang="en-US" dirty="0"/>
+              <a:t>Pricing example: </a:t>
+            </a:r>
+            <a:r>
+              <a:rPr lang="en-US" dirty="0">
+                <a:hlinkClick r:id="rId2"/>
+              </a:rPr>
+              <a:t>https://alestic.com/2016/12/aws-invoice-example</a:t>
+            </a:r>
+            <a:r>
+              <a:rPr lang="en-US" dirty="0" smtClean="0">
+                <a:hlinkClick r:id="rId2"/>
+              </a:rPr>
+              <a:t>/</a:t>
+            </a:r>
+            <a:endParaRPr lang="en-US" dirty="0" smtClean="0"/>
+          </a:p>
+          <a:p>
+            <a:r>
+              <a:rPr lang="en-US" dirty="0"/>
+              <a:t>A Cloud Guru: </a:t>
+            </a:r>
+            <a:r>
+              <a:rPr lang="en-US" dirty="0">
+                <a:hlinkClick r:id="rId3"/>
+              </a:rPr>
+              <a:t>https://acloud.guru</a:t>
+            </a:r>
+            <a:r>
+              <a:rPr lang="en-US" dirty="0" smtClean="0">
+                <a:hlinkClick r:id="rId3"/>
+              </a:rPr>
+              <a:t>/</a:t>
+            </a:r>
+            <a:endParaRPr lang="en-US" dirty="0" smtClean="0"/>
+          </a:p>
+          <a:p>
+            <a:r>
+              <a:rPr lang="en-US" dirty="0" err="1" smtClean="0"/>
+              <a:t>Serverless</a:t>
+            </a:r>
+            <a:r>
+              <a:rPr lang="en-US" dirty="0"/>
+              <a:t>: </a:t>
+            </a:r>
+            <a:r>
+              <a:rPr lang="en-US" dirty="0">
+                <a:hlinkClick r:id="rId4"/>
+              </a:rPr>
+              <a:t>https://serverless.com</a:t>
+            </a:r>
+            <a:r>
+              <a:rPr lang="en-US" dirty="0" smtClean="0">
+                <a:hlinkClick r:id="rId4"/>
+              </a:rPr>
+              <a:t>/</a:t>
+            </a:r>
+            <a:endParaRPr lang="en-US" dirty="0" smtClean="0"/>
+          </a:p>
+          <a:p>
+            <a:r>
+              <a:rPr lang="en-US" dirty="0"/>
+              <a:t>AWS </a:t>
+            </a:r>
+            <a:r>
+              <a:rPr lang="en-US" dirty="0" err="1"/>
+              <a:t>Serverless</a:t>
+            </a:r>
+            <a:r>
+              <a:rPr lang="en-US" dirty="0"/>
+              <a:t>: </a:t>
+            </a:r>
+            <a:r>
+              <a:rPr lang="en-US" dirty="0">
+                <a:hlinkClick r:id="rId5"/>
+              </a:rPr>
+              <a:t>https://aws.amazon.com/serverless</a:t>
+            </a:r>
+            <a:r>
+              <a:rPr lang="en-US" dirty="0" smtClean="0">
+                <a:hlinkClick r:id="rId5"/>
+              </a:rPr>
+              <a:t>/</a:t>
+            </a:r>
+            <a:endParaRPr lang="en-US" dirty="0" smtClean="0"/>
+          </a:p>
+          <a:p>
+            <a:endParaRPr lang="en-US" dirty="0" smtClean="0"/>
+          </a:p>
+          <a:p>
+            <a:endParaRPr lang="en-US" dirty="0"/>
+          </a:p>
+        </p:txBody>
+      </p:sp>
+    </p:spTree>
+    <p:extLst>
+      <p:ext uri="{BB962C8B-B14F-4D97-AF65-F5344CB8AC3E}">
+        <p14:creationId xmlns:p14="http://schemas.microsoft.com/office/powerpoint/2010/main" val="722583454"/>
+      </p:ext>
+    </p:extLst>
+  </p:cSld>
+  <p:clrMapOvr>
+    <a:masterClrMapping/>
+  </p:clrMapOvr>
+</p:sld>
+</file>
+
+<file path=ppt/slides/slide31.xml><?xml version="1.0" encoding="utf-8"?>
 <p:sld xmlns:a="http://schemas.openxmlformats.org/drawingml/2006/main" xmlns:r="http://schemas.openxmlformats.org/officeDocument/2006/relationships" xmlns:p="http://schemas.openxmlformats.org/presentationml/2006/main">
   <p:cSld>
     <p:spTree>

</xml_diff>

<commit_message>
adding AWS whitepaper resource
</commit_message>
<xml_diff>
--- a/going-serverless-2017.pptx
+++ b/going-serverless-2017.pptx
@@ -4962,6 +4962,13 @@
   <p:clrMapOvr>
     <a:masterClrMapping/>
   </p:clrMapOvr>
+  <p:timing>
+    <p:tnLst>
+      <p:par>
+        <p:cTn id="1" dur="indefinite" restart="never" nodeType="tmRoot"/>
+      </p:par>
+    </p:tnLst>
+  </p:timing>
 </p:sld>
 </file>
 
@@ -5180,6 +5187,13 @@
   <p:clrMapOvr>
     <a:masterClrMapping/>
   </p:clrMapOvr>
+  <p:timing>
+    <p:tnLst>
+      <p:par>
+        <p:cTn id="1" dur="indefinite" restart="never" nodeType="tmRoot"/>
+      </p:par>
+    </p:tnLst>
+  </p:timing>
 </p:sld>
 </file>
 
@@ -6108,6 +6122,13 @@
   <p:clrMapOvr>
     <a:masterClrMapping/>
   </p:clrMapOvr>
+  <p:timing>
+    <p:tnLst>
+      <p:par>
+        <p:cTn id="1" dur="indefinite" restart="never" nodeType="tmRoot"/>
+      </p:par>
+    </p:tnLst>
+  </p:timing>
 </p:sld>
 </file>
 
@@ -6901,6 +6922,13 @@
   <p:clrMapOvr>
     <a:masterClrMapping/>
   </p:clrMapOvr>
+  <p:timing>
+    <p:tnLst>
+      <p:par>
+        <p:cTn id="1" dur="indefinite" restart="never" nodeType="tmRoot"/>
+      </p:par>
+    </p:tnLst>
+  </p:timing>
 </p:sld>
 </file>
 
@@ -7015,6 +7043,13 @@
   <p:clrMapOvr>
     <a:masterClrMapping/>
   </p:clrMapOvr>
+  <p:timing>
+    <p:tnLst>
+      <p:par>
+        <p:cTn id="1" dur="indefinite" restart="never" nodeType="tmRoot"/>
+      </p:par>
+    </p:tnLst>
+  </p:timing>
 </p:sld>
 </file>
 
@@ -9166,6 +9201,13 @@
   <p:clrMapOvr>
     <a:masterClrMapping/>
   </p:clrMapOvr>
+  <p:timing>
+    <p:tnLst>
+      <p:par>
+        <p:cTn id="1" dur="indefinite" restart="never" nodeType="tmRoot"/>
+      </p:par>
+    </p:tnLst>
+  </p:timing>
 </p:sld>
 </file>
 
@@ -10914,6 +10956,13 @@
   <p:clrMapOvr>
     <a:masterClrMapping/>
   </p:clrMapOvr>
+  <p:timing>
+    <p:tnLst>
+      <p:par>
+        <p:cTn id="1" dur="indefinite" restart="never" nodeType="tmRoot"/>
+      </p:par>
+    </p:tnLst>
+  </p:timing>
 </p:sld>
 </file>
 
@@ -11060,10 +11109,47 @@
             <a:endParaRPr lang="en-US" dirty="0" smtClean="0"/>
           </a:p>
           <a:p>
+            <a:r>
+              <a:rPr lang="en-US" dirty="0" smtClean="0"/>
+              <a:t>Optimizing Enterprise Economics for </a:t>
+            </a:r>
+            <a:r>
+              <a:rPr lang="en-US" dirty="0" err="1" smtClean="0"/>
+              <a:t>Serverless</a:t>
+            </a:r>
+            <a:r>
+              <a:rPr lang="en-US" dirty="0" smtClean="0"/>
+              <a:t> </a:t>
+            </a:r>
+            <a:r>
+              <a:rPr lang="en-US" dirty="0"/>
+              <a:t>Architecture: </a:t>
+            </a:r>
+            <a:r>
+              <a:rPr lang="en-US" dirty="0">
+                <a:hlinkClick r:id="rId6"/>
+              </a:rPr>
+              <a:t>https://d0.awsstatic.com/whitepapers/optimizing-enterprise-economics-</a:t>
+            </a:r>
+            <a:r>
+              <a:rPr lang="en-US" dirty="0" err="1">
+                <a:hlinkClick r:id="rId6"/>
+              </a:rPr>
+              <a:t>serverless</a:t>
+            </a:r>
+            <a:r>
+              <a:rPr lang="en-US" dirty="0">
+                <a:hlinkClick r:id="rId6"/>
+              </a:rPr>
+              <a:t>-</a:t>
+            </a:r>
+            <a:r>
+              <a:rPr lang="en-US" dirty="0" err="1">
+                <a:hlinkClick r:id="rId6"/>
+              </a:rPr>
+              <a:t>architectures.pdf</a:t>
+            </a:r>
             <a:endParaRPr lang="en-US" dirty="0" smtClean="0"/>
-          </a:p>
-          <a:p>
-            <a:endParaRPr lang="en-US" dirty="0"/>
           </a:p>
         </p:txBody>
       </p:sp>
@@ -11271,6 +11357,13 @@
   <p:clrMapOvr>
     <a:masterClrMapping/>
   </p:clrMapOvr>
+  <p:timing>
+    <p:tnLst>
+      <p:par>
+        <p:cTn id="1" dur="indefinite" restart="never" nodeType="tmRoot"/>
+      </p:par>
+    </p:tnLst>
+  </p:timing>
 </p:sld>
 </file>
 
@@ -11392,6 +11485,13 @@
   <p:clrMapOvr>
     <a:masterClrMapping/>
   </p:clrMapOvr>
+  <p:timing>
+    <p:tnLst>
+      <p:par>
+        <p:cTn id="1" dur="indefinite" restart="never" nodeType="tmRoot"/>
+      </p:par>
+    </p:tnLst>
+  </p:timing>
 </p:sld>
 </file>
 
@@ -11506,6 +11606,13 @@
   <p:clrMapOvr>
     <a:masterClrMapping/>
   </p:clrMapOvr>
+  <p:timing>
+    <p:tnLst>
+      <p:par>
+        <p:cTn id="1" dur="indefinite" restart="never" nodeType="tmRoot"/>
+      </p:par>
+    </p:tnLst>
+  </p:timing>
 </p:sld>
 </file>
 
@@ -11607,6 +11714,13 @@
   <p:clrMapOvr>
     <a:masterClrMapping/>
   </p:clrMapOvr>
+  <p:timing>
+    <p:tnLst>
+      <p:par>
+        <p:cTn id="1" dur="indefinite" restart="never" nodeType="tmRoot"/>
+      </p:par>
+    </p:tnLst>
+  </p:timing>
 </p:sld>
 </file>
 
@@ -11689,6 +11803,13 @@
   <p:clrMapOvr>
     <a:masterClrMapping/>
   </p:clrMapOvr>
+  <p:timing>
+    <p:tnLst>
+      <p:par>
+        <p:cTn id="1" dur="indefinite" restart="never" nodeType="tmRoot"/>
+      </p:par>
+    </p:tnLst>
+  </p:timing>
 </p:sld>
 </file>
 
@@ -11783,6 +11904,13 @@
   <p:clrMapOvr>
     <a:masterClrMapping/>
   </p:clrMapOvr>
+  <p:timing>
+    <p:tnLst>
+      <p:par>
+        <p:cTn id="1" dur="indefinite" restart="never" nodeType="tmRoot"/>
+      </p:par>
+    </p:tnLst>
+  </p:timing>
 </p:sld>
 </file>
 

</xml_diff>

<commit_message>
changed patterns to use cases in slide 6, show use case patterns in later slide
</commit_message>
<xml_diff>
--- a/going-serverless-2017.pptx
+++ b/going-serverless-2017.pptx
@@ -6966,14 +6966,14 @@
           <a:p>
             <a:r>
               <a:rPr lang="en-US" dirty="0" smtClean="0"/>
-              <a:t>Patterns</a:t>
+              <a:t>Use Case</a:t>
             </a:r>
             <a:br>
               <a:rPr lang="en-US" dirty="0" smtClean="0"/>
             </a:br>
             <a:r>
               <a:rPr lang="en-US" sz="2400" dirty="0" smtClean="0"/>
-              <a:t>again</a:t>
+              <a:t>patterns</a:t>
             </a:r>
             <a:endParaRPr lang="en-US" sz="2400" dirty="0"/>
           </a:p>
@@ -11529,7 +11529,7 @@
           <a:p>
             <a:r>
               <a:rPr lang="en-US" dirty="0" smtClean="0"/>
-              <a:t>Patterns</a:t>
+              <a:t>Use Cases</a:t>
             </a:r>
             <a:br>
               <a:rPr lang="en-US" dirty="0" smtClean="0"/>
@@ -11583,11 +11583,26 @@
           <a:p>
             <a:r>
               <a:rPr lang="en-US" dirty="0" smtClean="0"/>
-              <a:t>And more</a:t>
-            </a:r>
-            <a:r>
-              <a:rPr lang="mr-IN" dirty="0" smtClean="0"/>
-              <a:t>…</a:t>
+              <a:t>Mobile </a:t>
+            </a:r>
+            <a:r>
+              <a:rPr lang="en-US" dirty="0" err="1" smtClean="0"/>
+              <a:t>backends</a:t>
+            </a:r>
+            <a:endParaRPr lang="en-US" dirty="0" smtClean="0"/>
+          </a:p>
+          <a:p>
+            <a:r>
+              <a:rPr lang="en-US" dirty="0" err="1" smtClean="0"/>
+              <a:t>IoT</a:t>
+            </a:r>
+            <a:r>
+              <a:rPr lang="en-US" dirty="0" smtClean="0"/>
+              <a:t> </a:t>
+            </a:r>
+            <a:r>
+              <a:rPr lang="en-US" smtClean="0"/>
+              <a:t>backends</a:t>
             </a:r>
             <a:endParaRPr lang="en-US" dirty="0" smtClean="0"/>
           </a:p>

</xml_diff>

<commit_message>
added lambda definition slide
</commit_message>
<xml_diff>
--- a/going-serverless-2017.pptx
+++ b/going-serverless-2017.pptx
@@ -5,7 +5,7 @@
     <p:sldMasterId id="2147484390" r:id="rId1"/>
   </p:sldMasterIdLst>
   <p:notesMasterIdLst>
-    <p:notesMasterId r:id="rId33"/>
+    <p:notesMasterId r:id="rId32"/>
   </p:notesMasterIdLst>
   <p:sldIdLst>
     <p:sldId id="256" r:id="rId2"/>
@@ -31,14 +31,13 @@
     <p:sldId id="277" r:id="rId22"/>
     <p:sldId id="273" r:id="rId23"/>
     <p:sldId id="297" r:id="rId24"/>
-    <p:sldId id="275" r:id="rId25"/>
-    <p:sldId id="263" r:id="rId26"/>
-    <p:sldId id="269" r:id="rId27"/>
-    <p:sldId id="270" r:id="rId28"/>
-    <p:sldId id="271" r:id="rId29"/>
-    <p:sldId id="291" r:id="rId30"/>
-    <p:sldId id="289" r:id="rId31"/>
-    <p:sldId id="272" r:id="rId32"/>
+    <p:sldId id="263" r:id="rId25"/>
+    <p:sldId id="269" r:id="rId26"/>
+    <p:sldId id="270" r:id="rId27"/>
+    <p:sldId id="271" r:id="rId28"/>
+    <p:sldId id="291" r:id="rId29"/>
+    <p:sldId id="289" r:id="rId30"/>
+    <p:sldId id="272" r:id="rId31"/>
   </p:sldIdLst>
   <p:sldSz cx="12192000" cy="6858000"/>
   <p:notesSz cx="6858000" cy="9144000"/>
@@ -9097,7 +9096,7 @@
         <p:spPr>
           <a:xfrm>
             <a:off x="5181600" y="569066"/>
-            <a:ext cx="6248398" cy="2142050"/>
+            <a:ext cx="6248398" cy="5542976"/>
           </a:xfrm>
         </p:spPr>
         <p:txBody>
@@ -9146,7 +9145,79 @@
             </a:r>
             <a:r>
               <a:rPr lang="en-US" sz="2800" dirty="0"/>
-              <a:t>AWS Documentation</a:t>
+              <a:t>AWS </a:t>
+            </a:r>
+            <a:r>
+              <a:rPr lang="en-US" sz="2800" dirty="0" smtClean="0"/>
+              <a:t>Documentation</a:t>
+            </a:r>
+          </a:p>
+          <a:p>
+            <a:pPr marL="0" lvl="0" indent="0">
+              <a:lnSpc>
+                <a:spcPct val="100000"/>
+              </a:lnSpc>
+              <a:spcBef>
+                <a:spcPts val="0"/>
+              </a:spcBef>
+              <a:buNone/>
+            </a:pPr>
+            <a:endParaRPr lang="en-US" sz="2800" dirty="0"/>
+          </a:p>
+          <a:p>
+            <a:pPr>
+              <a:lnSpc>
+                <a:spcPct val="100000"/>
+              </a:lnSpc>
+              <a:spcBef>
+                <a:spcPts val="0"/>
+              </a:spcBef>
+            </a:pPr>
+            <a:r>
+              <a:rPr lang="en-US" sz="2800" dirty="0" smtClean="0"/>
+              <a:t>Scalable</a:t>
+            </a:r>
+          </a:p>
+          <a:p>
+            <a:pPr>
+              <a:lnSpc>
+                <a:spcPct val="100000"/>
+              </a:lnSpc>
+              <a:spcBef>
+                <a:spcPts val="0"/>
+              </a:spcBef>
+            </a:pPr>
+            <a:r>
+              <a:rPr lang="en-US" sz="2800" dirty="0" smtClean="0"/>
+              <a:t>Pay per use</a:t>
+            </a:r>
+          </a:p>
+          <a:p>
+            <a:pPr>
+              <a:lnSpc>
+                <a:spcPct val="100000"/>
+              </a:lnSpc>
+              <a:spcBef>
+                <a:spcPts val="0"/>
+              </a:spcBef>
+            </a:pPr>
+            <a:r>
+              <a:rPr lang="en-US" sz="2800" dirty="0" smtClean="0"/>
+              <a:t>Managed</a:t>
+            </a:r>
+          </a:p>
+          <a:p>
+            <a:pPr>
+              <a:lnSpc>
+                <a:spcPct val="100000"/>
+              </a:lnSpc>
+              <a:spcBef>
+                <a:spcPts val="0"/>
+              </a:spcBef>
+            </a:pPr>
+            <a:r>
+              <a:rPr lang="en-US" sz="2800" smtClean="0"/>
+              <a:t>No admininstration</a:t>
             </a:r>
           </a:p>
         </p:txBody>
@@ -10362,7 +10433,7 @@
           </a:p>
           <a:p>
             <a:r>
-              <a:rPr lang="en-US" smtClean="0"/>
+              <a:rPr lang="en-US" dirty="0" smtClean="0"/>
               <a:t>Develop efficiently</a:t>
             </a:r>
             <a:endParaRPr lang="en-US" dirty="0"/>
@@ -10416,121 +10487,6 @@
           <a:p>
             <a:r>
               <a:rPr lang="en-US" dirty="0" smtClean="0"/>
-              <a:t>Services</a:t>
-            </a:r>
-            <a:endParaRPr lang="en-US" dirty="0"/>
-          </a:p>
-        </p:txBody>
-      </p:sp>
-      <p:sp>
-        <p:nvSpPr>
-          <p:cNvPr id="3" name="Content Placeholder 2"/>
-          <p:cNvSpPr>
-            <a:spLocks noGrp="1"/>
-          </p:cNvSpPr>
-          <p:nvPr>
-            <p:ph idx="1"/>
-          </p:nvPr>
-        </p:nvSpPr>
-        <p:spPr/>
-        <p:txBody>
-          <a:bodyPr/>
-          <a:lstStyle/>
-          <a:p>
-            <a:r>
-              <a:rPr lang="en-US" dirty="0" smtClean="0"/>
-              <a:t>API-Gateway</a:t>
-            </a:r>
-          </a:p>
-          <a:p>
-            <a:r>
-              <a:rPr lang="en-US" dirty="0" err="1" smtClean="0"/>
-              <a:t>Cognito</a:t>
-            </a:r>
-            <a:endParaRPr lang="en-US" dirty="0" smtClean="0"/>
-          </a:p>
-          <a:p>
-            <a:r>
-              <a:rPr lang="en-US" dirty="0" smtClean="0"/>
-              <a:t>S3</a:t>
-            </a:r>
-          </a:p>
-          <a:p>
-            <a:r>
-              <a:rPr lang="en-US" dirty="0" smtClean="0"/>
-              <a:t>SNS</a:t>
-            </a:r>
-          </a:p>
-          <a:p>
-            <a:r>
-              <a:rPr lang="en-US" dirty="0" err="1" smtClean="0"/>
-              <a:t>Kinises</a:t>
-            </a:r>
-            <a:endParaRPr lang="en-US" dirty="0" smtClean="0"/>
-          </a:p>
-          <a:p>
-            <a:r>
-              <a:rPr lang="en-US" dirty="0" smtClean="0"/>
-              <a:t>Etc..</a:t>
-            </a:r>
-            <a:endParaRPr lang="en-US" dirty="0"/>
-          </a:p>
-        </p:txBody>
-      </p:sp>
-    </p:spTree>
-    <p:extLst>
-      <p:ext uri="{BB962C8B-B14F-4D97-AF65-F5344CB8AC3E}">
-        <p14:creationId xmlns:p14="http://schemas.microsoft.com/office/powerpoint/2010/main" val="2036119871"/>
-      </p:ext>
-    </p:extLst>
-  </p:cSld>
-  <p:clrMapOvr>
-    <a:masterClrMapping/>
-  </p:clrMapOvr>
-  <p:timing>
-    <p:tnLst>
-      <p:par>
-        <p:cTn id="1" dur="indefinite" restart="never" nodeType="tmRoot"/>
-      </p:par>
-    </p:tnLst>
-  </p:timing>
-</p:sld>
-</file>
-
-<file path=ppt/slides/slide25.xml><?xml version="1.0" encoding="utf-8"?>
-<p:sld xmlns:a="http://schemas.openxmlformats.org/drawingml/2006/main" xmlns:r="http://schemas.openxmlformats.org/officeDocument/2006/relationships" xmlns:p="http://schemas.openxmlformats.org/presentationml/2006/main">
-  <p:cSld>
-    <p:spTree>
-      <p:nvGrpSpPr>
-        <p:cNvPr id="1" name=""/>
-        <p:cNvGrpSpPr/>
-        <p:nvPr/>
-      </p:nvGrpSpPr>
-      <p:grpSpPr>
-        <a:xfrm>
-          <a:off x="0" y="0"/>
-          <a:ext cx="0" cy="0"/>
-          <a:chOff x="0" y="0"/>
-          <a:chExt cx="0" cy="0"/>
-        </a:xfrm>
-      </p:grpSpPr>
-      <p:sp>
-        <p:nvSpPr>
-          <p:cNvPr id="2" name="Title 1"/>
-          <p:cNvSpPr>
-            <a:spLocks noGrp="1"/>
-          </p:cNvSpPr>
-          <p:nvPr>
-            <p:ph type="title"/>
-          </p:nvPr>
-        </p:nvSpPr>
-        <p:spPr/>
-        <p:txBody>
-          <a:bodyPr/>
-          <a:lstStyle/>
-          <a:p>
-            <a:r>
-              <a:rPr lang="en-US" dirty="0" smtClean="0"/>
               <a:t>How to</a:t>
             </a:r>
             <a:endParaRPr lang="en-US" dirty="0"/>
@@ -10591,7 +10547,7 @@
 </p:sld>
 </file>
 
-<file path=ppt/slides/slide26.xml><?xml version="1.0" encoding="utf-8"?>
+<file path=ppt/slides/slide25.xml><?xml version="1.0" encoding="utf-8"?>
 <p:sld xmlns:a="http://schemas.openxmlformats.org/drawingml/2006/main" xmlns:r="http://schemas.openxmlformats.org/officeDocument/2006/relationships" xmlns:p="http://schemas.openxmlformats.org/presentationml/2006/main">
   <p:cSld>
     <p:spTree>
@@ -10688,7 +10644,7 @@
 </p:sld>
 </file>
 
-<file path=ppt/slides/slide27.xml><?xml version="1.0" encoding="utf-8"?>
+<file path=ppt/slides/slide26.xml><?xml version="1.0" encoding="utf-8"?>
 <p:sld xmlns:a="http://schemas.openxmlformats.org/drawingml/2006/main" xmlns:r="http://schemas.openxmlformats.org/officeDocument/2006/relationships" xmlns:p="http://schemas.openxmlformats.org/presentationml/2006/main">
   <p:cSld>
     <p:spTree>
@@ -10779,6 +10735,108 @@
 </p:sld>
 </file>
 
+<file path=ppt/slides/slide27.xml><?xml version="1.0" encoding="utf-8"?>
+<p:sld xmlns:a="http://schemas.openxmlformats.org/drawingml/2006/main" xmlns:r="http://schemas.openxmlformats.org/officeDocument/2006/relationships" xmlns:p="http://schemas.openxmlformats.org/presentationml/2006/main">
+  <p:cSld>
+    <p:spTree>
+      <p:nvGrpSpPr>
+        <p:cNvPr id="1" name=""/>
+        <p:cNvGrpSpPr/>
+        <p:nvPr/>
+      </p:nvGrpSpPr>
+      <p:grpSpPr>
+        <a:xfrm>
+          <a:off x="0" y="0"/>
+          <a:ext cx="0" cy="0"/>
+          <a:chOff x="0" y="0"/>
+          <a:chExt cx="0" cy="0"/>
+        </a:xfrm>
+      </p:grpSpPr>
+      <p:sp>
+        <p:nvSpPr>
+          <p:cNvPr id="2" name="Title 1"/>
+          <p:cNvSpPr>
+            <a:spLocks noGrp="1"/>
+          </p:cNvSpPr>
+          <p:nvPr>
+            <p:ph type="title"/>
+          </p:nvPr>
+        </p:nvSpPr>
+        <p:spPr/>
+        <p:txBody>
+          <a:bodyPr/>
+          <a:lstStyle/>
+          <a:p>
+            <a:r>
+              <a:rPr lang="en-US" dirty="0" smtClean="0"/>
+              <a:t>Frameworks</a:t>
+            </a:r>
+            <a:br>
+              <a:rPr lang="en-US" dirty="0" smtClean="0"/>
+            </a:br>
+            <a:r>
+              <a:rPr lang="en-US" sz="2400" dirty="0" smtClean="0"/>
+              <a:t>now we’re getting somewhere</a:t>
+            </a:r>
+            <a:endParaRPr lang="en-US" sz="2400" dirty="0"/>
+          </a:p>
+        </p:txBody>
+      </p:sp>
+      <p:sp>
+        <p:nvSpPr>
+          <p:cNvPr id="3" name="Content Placeholder 2"/>
+          <p:cNvSpPr>
+            <a:spLocks noGrp="1"/>
+          </p:cNvSpPr>
+          <p:nvPr>
+            <p:ph idx="1"/>
+          </p:nvPr>
+        </p:nvSpPr>
+        <p:spPr/>
+        <p:txBody>
+          <a:bodyPr/>
+          <a:lstStyle/>
+          <a:p>
+            <a:r>
+              <a:rPr lang="en-US" dirty="0" smtClean="0"/>
+              <a:t>Apex</a:t>
+            </a:r>
+          </a:p>
+          <a:p>
+            <a:r>
+              <a:rPr lang="en-US" dirty="0" smtClean="0"/>
+              <a:t>AWS Sam</a:t>
+            </a:r>
+          </a:p>
+          <a:p>
+            <a:r>
+              <a:rPr lang="en-US" dirty="0" err="1" smtClean="0"/>
+              <a:t>Serverless</a:t>
+            </a:r>
+            <a:endParaRPr lang="en-US" dirty="0" smtClean="0"/>
+          </a:p>
+        </p:txBody>
+      </p:sp>
+    </p:spTree>
+    <p:extLst>
+      <p:ext uri="{BB962C8B-B14F-4D97-AF65-F5344CB8AC3E}">
+        <p14:creationId xmlns:p14="http://schemas.microsoft.com/office/powerpoint/2010/main" val="1115277555"/>
+      </p:ext>
+    </p:extLst>
+  </p:cSld>
+  <p:clrMapOvr>
+    <a:masterClrMapping/>
+  </p:clrMapOvr>
+  <p:timing>
+    <p:tnLst>
+      <p:par>
+        <p:cTn id="1" dur="indefinite" restart="never" nodeType="tmRoot"/>
+      </p:par>
+    </p:tnLst>
+  </p:timing>
+</p:sld>
+</file>
+
 <file path=ppt/slides/slide28.xml><?xml version="1.0" encoding="utf-8"?>
 <p:sld xmlns:a="http://schemas.openxmlformats.org/drawingml/2006/main" xmlns:r="http://schemas.openxmlformats.org/officeDocument/2006/relationships" xmlns:p="http://schemas.openxmlformats.org/presentationml/2006/main">
   <p:cSld>
@@ -10812,15 +10870,19 @@
           <a:lstStyle/>
           <a:p>
             <a:r>
-              <a:rPr lang="en-US" dirty="0" smtClean="0"/>
-              <a:t>Frameworks</a:t>
+              <a:rPr lang="en-US" dirty="0" err="1" smtClean="0"/>
+              <a:t>Serverless</a:t>
+            </a:r>
+            <a:r>
+              <a:rPr lang="en-US" dirty="0" smtClean="0"/>
+              <a:t/>
             </a:r>
             <a:br>
               <a:rPr lang="en-US" dirty="0" smtClean="0"/>
             </a:br>
             <a:r>
               <a:rPr lang="en-US" sz="2400" dirty="0" smtClean="0"/>
-              <a:t>now we’re getting somewhere</a:t>
+              <a:t>the framework</a:t>
             </a:r>
             <a:endParaRPr lang="en-US" sz="2400" dirty="0"/>
           </a:p>
@@ -10842,29 +10904,66 @@
           <a:lstStyle/>
           <a:p>
             <a:r>
-              <a:rPr lang="en-US" dirty="0" smtClean="0"/>
-              <a:t>Apex</a:t>
-            </a:r>
-          </a:p>
-          <a:p>
-            <a:r>
-              <a:rPr lang="en-US" dirty="0" smtClean="0"/>
-              <a:t>AWS Sam</a:t>
-            </a:r>
-          </a:p>
-          <a:p>
-            <a:r>
               <a:rPr lang="en-US" dirty="0" err="1" smtClean="0"/>
               <a:t>Serverless</a:t>
             </a:r>
+            <a:r>
+              <a:rPr lang="en-US" dirty="0"/>
+              <a:t>: </a:t>
+            </a:r>
+            <a:r>
+              <a:rPr lang="en-US" dirty="0">
+                <a:hlinkClick r:id="rId2"/>
+              </a:rPr>
+              <a:t>https://</a:t>
+            </a:r>
+            <a:r>
+              <a:rPr lang="en-US" dirty="0" err="1">
+                <a:hlinkClick r:id="rId2"/>
+              </a:rPr>
+              <a:t>serverless.com</a:t>
+            </a:r>
             <a:endParaRPr lang="en-US" dirty="0" smtClean="0"/>
+          </a:p>
+          <a:p>
+            <a:r>
+              <a:rPr lang="en-US" dirty="0" smtClean="0"/>
+              <a:t>Works for multiple providers</a:t>
+            </a:r>
+          </a:p>
+          <a:p>
+            <a:r>
+              <a:rPr lang="en-US" dirty="0" smtClean="0"/>
+              <a:t>Works with multiple templates</a:t>
+            </a:r>
+          </a:p>
+          <a:p>
+            <a:r>
+              <a:rPr lang="en-US" dirty="0" smtClean="0"/>
+              <a:t>Very similar to cloud formation templates</a:t>
+            </a:r>
+          </a:p>
+          <a:p>
+            <a:r>
+              <a:rPr lang="en-US" dirty="0" smtClean="0"/>
+              <a:t>Sanity for the developers</a:t>
+            </a:r>
+          </a:p>
+          <a:p>
+            <a:pPr marL="0" indent="0">
+              <a:buNone/>
+            </a:pPr>
+            <a:endParaRPr lang="en-US" dirty="0" smtClean="0"/>
+          </a:p>
+          <a:p>
+            <a:endParaRPr lang="en-US" dirty="0"/>
           </a:p>
         </p:txBody>
       </p:sp>
     </p:spTree>
     <p:extLst>
       <p:ext uri="{BB962C8B-B14F-4D97-AF65-F5344CB8AC3E}">
-        <p14:creationId xmlns:p14="http://schemas.microsoft.com/office/powerpoint/2010/main" val="1115277555"/>
+        <p14:creationId xmlns:p14="http://schemas.microsoft.com/office/powerpoint/2010/main" val="1124419550"/>
       </p:ext>
     </p:extLst>
   </p:cSld>
@@ -10914,21 +11013,10 @@
           <a:lstStyle/>
           <a:p>
             <a:r>
-              <a:rPr lang="en-US" dirty="0" err="1" smtClean="0"/>
-              <a:t>Serverless</a:t>
-            </a:r>
-            <a:r>
-              <a:rPr lang="en-US" dirty="0" smtClean="0"/>
-              <a:t/>
-            </a:r>
-            <a:br>
-              <a:rPr lang="en-US" dirty="0" smtClean="0"/>
-            </a:br>
-            <a:r>
-              <a:rPr lang="en-US" sz="2400" dirty="0" smtClean="0"/>
-              <a:t>the framework</a:t>
-            </a:r>
-            <a:endParaRPr lang="en-US" sz="2400" dirty="0"/>
+              <a:rPr lang="en-US" dirty="0" smtClean="0"/>
+              <a:t>Additional resources</a:t>
+            </a:r>
+            <a:endParaRPr lang="en-US" dirty="0"/>
           </a:p>
         </p:txBody>
       </p:sp>
@@ -10948,66 +11036,141 @@
           <a:lstStyle/>
           <a:p>
             <a:r>
-              <a:rPr lang="en-US" dirty="0" err="1" smtClean="0"/>
-              <a:t>Serverless</a:t>
-            </a:r>
-            <a:r>
               <a:rPr lang="en-US" dirty="0"/>
-              <a:t>: </a:t>
+              <a:t>Pricing example: </a:t>
             </a:r>
             <a:r>
               <a:rPr lang="en-US" dirty="0">
                 <a:hlinkClick r:id="rId2"/>
               </a:rPr>
-              <a:t>https://</a:t>
-            </a:r>
-            <a:r>
-              <a:rPr lang="en-US" dirty="0" err="1">
+              <a:t>https://alestic.com/2016/12/aws-invoice-example</a:t>
+            </a:r>
+            <a:r>
+              <a:rPr lang="en-US" dirty="0" smtClean="0">
                 <a:hlinkClick r:id="rId2"/>
               </a:rPr>
-              <a:t>serverless.com</a:t>
+              <a:t>/</a:t>
             </a:r>
             <a:endParaRPr lang="en-US" dirty="0" smtClean="0"/>
           </a:p>
           <a:p>
             <a:r>
-              <a:rPr lang="en-US" dirty="0" smtClean="0"/>
-              <a:t>Works for multiple providers</a:t>
-            </a:r>
-          </a:p>
-          <a:p>
-            <a:r>
-              <a:rPr lang="en-US" dirty="0" smtClean="0"/>
-              <a:t>Works with multiple templates</a:t>
-            </a:r>
-          </a:p>
-          <a:p>
-            <a:r>
-              <a:rPr lang="en-US" dirty="0" smtClean="0"/>
-              <a:t>Very similar to cloud formation templates</a:t>
-            </a:r>
-          </a:p>
-          <a:p>
-            <a:r>
-              <a:rPr lang="en-US" dirty="0" smtClean="0"/>
-              <a:t>Sanity for the developers</a:t>
-            </a:r>
-          </a:p>
-          <a:p>
-            <a:pPr marL="0" indent="0">
-              <a:buNone/>
-            </a:pPr>
+              <a:rPr lang="en-US" dirty="0"/>
+              <a:t>A Cloud Guru: </a:t>
+            </a:r>
+            <a:r>
+              <a:rPr lang="en-US" dirty="0">
+                <a:hlinkClick r:id="rId3"/>
+              </a:rPr>
+              <a:t>https://acloud.guru</a:t>
+            </a:r>
+            <a:r>
+              <a:rPr lang="en-US" dirty="0" smtClean="0">
+                <a:hlinkClick r:id="rId3"/>
+              </a:rPr>
+              <a:t>/</a:t>
+            </a:r>
             <a:endParaRPr lang="en-US" dirty="0" smtClean="0"/>
           </a:p>
           <a:p>
-            <a:endParaRPr lang="en-US" dirty="0"/>
+            <a:r>
+              <a:rPr lang="en-US" dirty="0" err="1" smtClean="0"/>
+              <a:t>Serverless</a:t>
+            </a:r>
+            <a:r>
+              <a:rPr lang="en-US" dirty="0"/>
+              <a:t>: </a:t>
+            </a:r>
+            <a:r>
+              <a:rPr lang="en-US" dirty="0">
+                <a:hlinkClick r:id="rId4"/>
+              </a:rPr>
+              <a:t>https://serverless.com</a:t>
+            </a:r>
+            <a:r>
+              <a:rPr lang="en-US" dirty="0" smtClean="0">
+                <a:hlinkClick r:id="rId4"/>
+              </a:rPr>
+              <a:t>/</a:t>
+            </a:r>
+            <a:endParaRPr lang="en-US" dirty="0" smtClean="0"/>
+          </a:p>
+          <a:p>
+            <a:r>
+              <a:rPr lang="en-US" dirty="0"/>
+              <a:t>AWS </a:t>
+            </a:r>
+            <a:r>
+              <a:rPr lang="en-US" dirty="0" err="1"/>
+              <a:t>Serverless</a:t>
+            </a:r>
+            <a:r>
+              <a:rPr lang="en-US" dirty="0"/>
+              <a:t>: </a:t>
+            </a:r>
+            <a:r>
+              <a:rPr lang="en-US" dirty="0">
+                <a:hlinkClick r:id="rId5"/>
+              </a:rPr>
+              <a:t>https://aws.amazon.com/serverless</a:t>
+            </a:r>
+            <a:r>
+              <a:rPr lang="en-US" dirty="0" smtClean="0">
+                <a:hlinkClick r:id="rId5"/>
+              </a:rPr>
+              <a:t>/</a:t>
+            </a:r>
+            <a:endParaRPr lang="en-US" dirty="0" smtClean="0"/>
+          </a:p>
+          <a:p>
+            <a:r>
+              <a:rPr lang="en-US" dirty="0" smtClean="0"/>
+              <a:t>Optimizing Enterprise Economics for </a:t>
+            </a:r>
+            <a:r>
+              <a:rPr lang="en-US" dirty="0" err="1" smtClean="0"/>
+              <a:t>Serverless</a:t>
+            </a:r>
+            <a:r>
+              <a:rPr lang="en-US" dirty="0" smtClean="0"/>
+              <a:t> </a:t>
+            </a:r>
+            <a:r>
+              <a:rPr lang="en-US" dirty="0"/>
+              <a:t>Architecture: </a:t>
+            </a:r>
+            <a:r>
+              <a:rPr lang="en-US" dirty="0">
+                <a:hlinkClick r:id="rId6"/>
+              </a:rPr>
+              <a:t>https://d0.awsstatic.com/whitepapers/optimizing-enterprise-economics-</a:t>
+            </a:r>
+            <a:r>
+              <a:rPr lang="en-US" dirty="0" err="1">
+                <a:hlinkClick r:id="rId6"/>
+              </a:rPr>
+              <a:t>serverless</a:t>
+            </a:r>
+            <a:r>
+              <a:rPr lang="en-US" dirty="0">
+                <a:hlinkClick r:id="rId6"/>
+              </a:rPr>
+              <a:t>-</a:t>
+            </a:r>
+            <a:r>
+              <a:rPr lang="en-US" dirty="0" err="1">
+                <a:hlinkClick r:id="rId6"/>
+              </a:rPr>
+              <a:t>architectures.pdf</a:t>
+            </a:r>
+            <a:endParaRPr lang="en-US" dirty="0" smtClean="0"/>
           </a:p>
         </p:txBody>
       </p:sp>
     </p:spTree>
     <p:extLst>
       <p:ext uri="{BB962C8B-B14F-4D97-AF65-F5344CB8AC3E}">
-        <p14:creationId xmlns:p14="http://schemas.microsoft.com/office/powerpoint/2010/main" val="1124419550"/>
+        <p14:creationId xmlns:p14="http://schemas.microsoft.com/office/powerpoint/2010/main" val="722583454"/>
       </p:ext>
     </p:extLst>
   </p:cSld>
@@ -11119,213 +11282,6 @@
 </file>
 
 <file path=ppt/slides/slide30.xml><?xml version="1.0" encoding="utf-8"?>
-<p:sld xmlns:a="http://schemas.openxmlformats.org/drawingml/2006/main" xmlns:r="http://schemas.openxmlformats.org/officeDocument/2006/relationships" xmlns:p="http://schemas.openxmlformats.org/presentationml/2006/main">
-  <p:cSld>
-    <p:spTree>
-      <p:nvGrpSpPr>
-        <p:cNvPr id="1" name=""/>
-        <p:cNvGrpSpPr/>
-        <p:nvPr/>
-      </p:nvGrpSpPr>
-      <p:grpSpPr>
-        <a:xfrm>
-          <a:off x="0" y="0"/>
-          <a:ext cx="0" cy="0"/>
-          <a:chOff x="0" y="0"/>
-          <a:chExt cx="0" cy="0"/>
-        </a:xfrm>
-      </p:grpSpPr>
-      <p:sp>
-        <p:nvSpPr>
-          <p:cNvPr id="2" name="Title 1"/>
-          <p:cNvSpPr>
-            <a:spLocks noGrp="1"/>
-          </p:cNvSpPr>
-          <p:nvPr>
-            <p:ph type="title"/>
-          </p:nvPr>
-        </p:nvSpPr>
-        <p:spPr/>
-        <p:txBody>
-          <a:bodyPr/>
-          <a:lstStyle/>
-          <a:p>
-            <a:r>
-              <a:rPr lang="en-US" dirty="0" smtClean="0"/>
-              <a:t>Additional resources</a:t>
-            </a:r>
-            <a:endParaRPr lang="en-US" dirty="0"/>
-          </a:p>
-        </p:txBody>
-      </p:sp>
-      <p:sp>
-        <p:nvSpPr>
-          <p:cNvPr id="3" name="Content Placeholder 2"/>
-          <p:cNvSpPr>
-            <a:spLocks noGrp="1"/>
-          </p:cNvSpPr>
-          <p:nvPr>
-            <p:ph idx="1"/>
-          </p:nvPr>
-        </p:nvSpPr>
-        <p:spPr/>
-        <p:txBody>
-          <a:bodyPr/>
-          <a:lstStyle/>
-          <a:p>
-            <a:r>
-              <a:rPr lang="en-US" dirty="0"/>
-              <a:t>Pricing example: </a:t>
-            </a:r>
-            <a:r>
-              <a:rPr lang="en-US" dirty="0">
-                <a:hlinkClick r:id="rId2"/>
-              </a:rPr>
-              <a:t>https://alestic.com/2016/12/aws-invoice-example</a:t>
-            </a:r>
-            <a:r>
-              <a:rPr lang="en-US" dirty="0" smtClean="0">
-                <a:hlinkClick r:id="rId2"/>
-              </a:rPr>
-              <a:t>/</a:t>
-            </a:r>
-            <a:endParaRPr lang="en-US" dirty="0" smtClean="0"/>
-          </a:p>
-          <a:p>
-            <a:r>
-              <a:rPr lang="en-US" dirty="0"/>
-              <a:t>A Cloud Guru: </a:t>
-            </a:r>
-            <a:r>
-              <a:rPr lang="en-US" dirty="0">
-                <a:hlinkClick r:id="rId3"/>
-              </a:rPr>
-              <a:t>https://acloud.guru</a:t>
-            </a:r>
-            <a:r>
-              <a:rPr lang="en-US" dirty="0" smtClean="0">
-                <a:hlinkClick r:id="rId3"/>
-              </a:rPr>
-              <a:t>/</a:t>
-            </a:r>
-            <a:endParaRPr lang="en-US" dirty="0" smtClean="0"/>
-          </a:p>
-          <a:p>
-            <a:r>
-              <a:rPr lang="en-US" dirty="0" err="1" smtClean="0"/>
-              <a:t>Serverless</a:t>
-            </a:r>
-            <a:r>
-              <a:rPr lang="en-US" dirty="0"/>
-              <a:t>: </a:t>
-            </a:r>
-            <a:r>
-              <a:rPr lang="en-US" dirty="0">
-                <a:hlinkClick r:id="rId4"/>
-              </a:rPr>
-              <a:t>https://serverless.com</a:t>
-            </a:r>
-            <a:r>
-              <a:rPr lang="en-US" dirty="0" smtClean="0">
-                <a:hlinkClick r:id="rId4"/>
-              </a:rPr>
-              <a:t>/</a:t>
-            </a:r>
-            <a:endParaRPr lang="en-US" dirty="0" smtClean="0"/>
-          </a:p>
-          <a:p>
-            <a:r>
-              <a:rPr lang="en-US" dirty="0"/>
-              <a:t>AWS </a:t>
-            </a:r>
-            <a:r>
-              <a:rPr lang="en-US" dirty="0" err="1"/>
-              <a:t>Serverless</a:t>
-            </a:r>
-            <a:r>
-              <a:rPr lang="en-US" dirty="0"/>
-              <a:t>: </a:t>
-            </a:r>
-            <a:r>
-              <a:rPr lang="en-US" dirty="0">
-                <a:hlinkClick r:id="rId5"/>
-              </a:rPr>
-              <a:t>https://aws.amazon.com/serverless</a:t>
-            </a:r>
-            <a:r>
-              <a:rPr lang="en-US" dirty="0" smtClean="0">
-                <a:hlinkClick r:id="rId5"/>
-              </a:rPr>
-              <a:t>/</a:t>
-            </a:r>
-            <a:endParaRPr lang="en-US" dirty="0" smtClean="0"/>
-          </a:p>
-          <a:p>
-            <a:r>
-              <a:rPr lang="en-US" dirty="0" smtClean="0"/>
-              <a:t>Optimizing Enterprise Economics for </a:t>
-            </a:r>
-            <a:r>
-              <a:rPr lang="en-US" dirty="0" err="1" smtClean="0"/>
-              <a:t>Serverless</a:t>
-            </a:r>
-            <a:r>
-              <a:rPr lang="en-US" dirty="0" smtClean="0"/>
-              <a:t> </a:t>
-            </a:r>
-            <a:r>
-              <a:rPr lang="en-US" dirty="0"/>
-              <a:t>Architecture: </a:t>
-            </a:r>
-            <a:r>
-              <a:rPr lang="en-US" dirty="0">
-                <a:hlinkClick r:id="rId6"/>
-              </a:rPr>
-              <a:t>https://d0.awsstatic.com/whitepapers/optimizing-enterprise-economics-</a:t>
-            </a:r>
-            <a:r>
-              <a:rPr lang="en-US" dirty="0" err="1">
-                <a:hlinkClick r:id="rId6"/>
-              </a:rPr>
-              <a:t>serverless</a:t>
-            </a:r>
-            <a:r>
-              <a:rPr lang="en-US" dirty="0">
-                <a:hlinkClick r:id="rId6"/>
-              </a:rPr>
-              <a:t>-</a:t>
-            </a:r>
-            <a:r>
-              <a:rPr lang="en-US" dirty="0" err="1">
-                <a:hlinkClick r:id="rId6"/>
-              </a:rPr>
-              <a:t>architectures.pdf</a:t>
-            </a:r>
-            <a:endParaRPr lang="en-US" dirty="0" smtClean="0"/>
-          </a:p>
-        </p:txBody>
-      </p:sp>
-    </p:spTree>
-    <p:extLst>
-      <p:ext uri="{BB962C8B-B14F-4D97-AF65-F5344CB8AC3E}">
-        <p14:creationId xmlns:p14="http://schemas.microsoft.com/office/powerpoint/2010/main" val="722583454"/>
-      </p:ext>
-    </p:extLst>
-  </p:cSld>
-  <p:clrMapOvr>
-    <a:masterClrMapping/>
-  </p:clrMapOvr>
-  <p:timing>
-    <p:tnLst>
-      <p:par>
-        <p:cTn id="1" dur="indefinite" restart="never" nodeType="tmRoot"/>
-      </p:par>
-    </p:tnLst>
-  </p:timing>
-</p:sld>
-</file>
-
-<file path=ppt/slides/slide31.xml><?xml version="1.0" encoding="utf-8"?>
 <p:sld xmlns:a="http://schemas.openxmlformats.org/drawingml/2006/main" xmlns:r="http://schemas.openxmlformats.org/officeDocument/2006/relationships" xmlns:p="http://schemas.openxmlformats.org/presentationml/2006/main">
   <p:cSld>
     <p:spTree>

</xml_diff>

<commit_message>
added lambda signature slide
</commit_message>
<xml_diff>
--- a/going-serverless-2017.pptx
+++ b/going-serverless-2017.pptx
@@ -28,8 +28,8 @@
     <p:sldId id="293" r:id="rId19"/>
     <p:sldId id="296" r:id="rId20"/>
     <p:sldId id="278" r:id="rId21"/>
-    <p:sldId id="277" r:id="rId22"/>
-    <p:sldId id="273" r:id="rId23"/>
+    <p:sldId id="298" r:id="rId22"/>
+    <p:sldId id="277" r:id="rId23"/>
     <p:sldId id="297" r:id="rId24"/>
     <p:sldId id="263" r:id="rId25"/>
     <p:sldId id="269" r:id="rId26"/>
@@ -9175,8 +9175,13 @@
             </a:pPr>
             <a:r>
               <a:rPr lang="en-US" sz="2800" dirty="0" smtClean="0"/>
-              <a:t>Scalable</a:t>
-            </a:r>
+              <a:t>The FUNCTION in </a:t>
+            </a:r>
+            <a:r>
+              <a:rPr lang="en-US" sz="2800" dirty="0" err="1" smtClean="0"/>
+              <a:t>FaaS</a:t>
+            </a:r>
+            <a:endParaRPr lang="en-US" sz="2800" dirty="0" smtClean="0"/>
           </a:p>
           <a:p>
             <a:pPr>
@@ -9189,7 +9194,7 @@
             </a:pPr>
             <a:r>
               <a:rPr lang="en-US" sz="2800" dirty="0" smtClean="0"/>
-              <a:t>Pay per use</a:t>
+              <a:t>Scalable</a:t>
             </a:r>
           </a:p>
           <a:p>
@@ -9203,7 +9208,7 @@
             </a:pPr>
             <a:r>
               <a:rPr lang="en-US" sz="2800" dirty="0" smtClean="0"/>
-              <a:t>Managed</a:t>
+              <a:t>Pay per use</a:t>
             </a:r>
           </a:p>
           <a:p>
@@ -9216,9 +9221,28 @@
               </a:spcBef>
             </a:pPr>
             <a:r>
-              <a:rPr lang="en-US" sz="2800" smtClean="0"/>
-              <a:t>No admininstration</a:t>
-            </a:r>
+              <a:rPr lang="en-US" sz="2800" dirty="0" smtClean="0"/>
+              <a:t>Managed</a:t>
+            </a:r>
+          </a:p>
+          <a:p>
+            <a:pPr>
+              <a:lnSpc>
+                <a:spcPct val="100000"/>
+              </a:lnSpc>
+              <a:spcBef>
+                <a:spcPts val="0"/>
+              </a:spcBef>
+            </a:pPr>
+            <a:r>
+              <a:rPr lang="en-US" sz="2800" dirty="0" smtClean="0"/>
+              <a:t>No </a:t>
+            </a:r>
+            <a:r>
+              <a:rPr lang="en-US" sz="2800" dirty="0" err="1" smtClean="0"/>
+              <a:t>admininstration</a:t>
+            </a:r>
+            <a:endParaRPr lang="en-US" sz="2800" dirty="0" smtClean="0"/>
           </a:p>
         </p:txBody>
       </p:sp>
@@ -9562,6 +9586,536 @@
 </file>
 
 <file path=ppt/slides/slide21.xml><?xml version="1.0" encoding="utf-8"?>
+<p:sld xmlns:a="http://schemas.openxmlformats.org/drawingml/2006/main" xmlns:r="http://schemas.openxmlformats.org/officeDocument/2006/relationships" xmlns:p="http://schemas.openxmlformats.org/presentationml/2006/main">
+  <p:cSld>
+    <p:bg>
+      <p:bgPr>
+        <a:solidFill>
+          <a:schemeClr val="bg2"/>
+        </a:solidFill>
+        <a:effectLst/>
+      </p:bgPr>
+    </p:bg>
+    <p:spTree>
+      <p:nvGrpSpPr>
+        <p:cNvPr id="1" name=""/>
+        <p:cNvGrpSpPr/>
+        <p:nvPr/>
+      </p:nvGrpSpPr>
+      <p:grpSpPr>
+        <a:xfrm>
+          <a:off x="0" y="0"/>
+          <a:ext cx="0" cy="0"/>
+          <a:chOff x="0" y="0"/>
+          <a:chExt cx="0" cy="0"/>
+        </a:xfrm>
+      </p:grpSpPr>
+      <p:sp useBgFill="1">
+        <p:nvSpPr>
+          <p:cNvPr id="12" name="Rectangle 11">
+            <a:extLst>
+              <a:ext uri="{FF2B5EF4-FFF2-40B4-BE49-F238E27FC236}">
+                <a16:creationId xmlns:a16="http://schemas.microsoft.com/office/drawing/2014/main" xmlns="" id="{D9FF99B6-0BBC-4955-9A39-545FF77A584B}"/>
+              </a:ext>
+            </a:extLst>
+          </p:cNvPr>
+          <p:cNvSpPr>
+            <a:spLocks noGrp="1" noRot="1" noChangeAspect="1" noMove="1" noResize="1" noEditPoints="1" noAdjustHandles="1" noChangeArrowheads="1" noChangeShapeType="1" noTextEdit="1"/>
+          </p:cNvSpPr>
+          <p:nvPr>
+            <p:extLst>
+              <p:ext uri="{386F3935-93C4-4BCD-93E2-E3B085C9AB24}">
+                <p16:designElem xmlns:p16="http://schemas.microsoft.com/office/powerpoint/2015/main" val="1"/>
+              </p:ext>
+            </p:extLst>
+          </p:nvPr>
+        </p:nvSpPr>
+        <p:spPr>
+          <a:xfrm>
+            <a:off x="0" y="0"/>
+            <a:ext cx="12192000" cy="6858000"/>
+          </a:xfrm>
+          <a:prstGeom prst="rect">
+            <a:avLst/>
+          </a:prstGeom>
+          <a:ln>
+            <a:noFill/>
+          </a:ln>
+        </p:spPr>
+        <p:style>
+          <a:lnRef idx="2">
+            <a:schemeClr val="accent1">
+              <a:shade val="50000"/>
+            </a:schemeClr>
+          </a:lnRef>
+          <a:fillRef idx="1">
+            <a:schemeClr val="accent1"/>
+          </a:fillRef>
+          <a:effectRef idx="0">
+            <a:schemeClr val="accent1"/>
+          </a:effectRef>
+          <a:fontRef idx="minor">
+            <a:schemeClr val="lt1"/>
+          </a:fontRef>
+        </p:style>
+        <p:txBody>
+          <a:bodyPr rtlCol="0" anchor="ctr"/>
+          <a:lstStyle/>
+          <a:p>
+            <a:pPr algn="ctr"/>
+            <a:endParaRPr lang="en-US"/>
+          </a:p>
+        </p:txBody>
+      </p:sp>
+      <p:sp>
+        <p:nvSpPr>
+          <p:cNvPr id="14" name="Freeform 6" title="Page Number Shape">
+            <a:extLst>
+              <a:ext uri="{FF2B5EF4-FFF2-40B4-BE49-F238E27FC236}">
+                <a16:creationId xmlns:a16="http://schemas.microsoft.com/office/drawing/2014/main" xmlns="" id="{EFFCBFD9-BE8B-4513-8B1D-D19F805EA0DF}"/>
+              </a:ext>
+            </a:extLst>
+          </p:cNvPr>
+          <p:cNvSpPr>
+            <a:spLocks noGrp="1" noRot="1" noChangeAspect="1" noMove="1" noResize="1" noEditPoints="1" noAdjustHandles="1" noChangeArrowheads="1" noChangeShapeType="1" noTextEdit="1"/>
+          </p:cNvSpPr>
+          <p:nvPr>
+            <p:extLst>
+              <p:ext uri="{386F3935-93C4-4BCD-93E2-E3B085C9AB24}">
+                <p16:designElem xmlns:p16="http://schemas.microsoft.com/office/powerpoint/2015/main" val="1"/>
+              </p:ext>
+            </p:extLst>
+          </p:nvPr>
+        </p:nvSpPr>
+        <p:spPr bwMode="auto">
+          <a:xfrm>
+            <a:off x="11784011" y="5380580"/>
+            <a:ext cx="407988" cy="819150"/>
+          </a:xfrm>
+          <a:custGeom>
+            <a:avLst/>
+            <a:gdLst/>
+            <a:ahLst/>
+            <a:cxnLst/>
+            <a:rect l="0" t="0" r="r" b="b"/>
+            <a:pathLst>
+              <a:path w="1799" h="3612">
+                <a:moveTo>
+                  <a:pt x="1799" y="0"/>
+                </a:moveTo>
+                <a:lnTo>
+                  <a:pt x="1799" y="3612"/>
+                </a:lnTo>
+                <a:lnTo>
+                  <a:pt x="1686" y="3609"/>
+                </a:lnTo>
+                <a:lnTo>
+                  <a:pt x="1574" y="3598"/>
+                </a:lnTo>
+                <a:lnTo>
+                  <a:pt x="1464" y="3581"/>
+                </a:lnTo>
+                <a:lnTo>
+                  <a:pt x="1357" y="3557"/>
+                </a:lnTo>
+                <a:lnTo>
+                  <a:pt x="1251" y="3527"/>
+                </a:lnTo>
+                <a:lnTo>
+                  <a:pt x="1150" y="3490"/>
+                </a:lnTo>
+                <a:lnTo>
+                  <a:pt x="1050" y="3448"/>
+                </a:lnTo>
+                <a:lnTo>
+                  <a:pt x="953" y="3401"/>
+                </a:lnTo>
+                <a:lnTo>
+                  <a:pt x="860" y="3347"/>
+                </a:lnTo>
+                <a:lnTo>
+                  <a:pt x="771" y="3289"/>
+                </a:lnTo>
+                <a:lnTo>
+                  <a:pt x="686" y="3224"/>
+                </a:lnTo>
+                <a:lnTo>
+                  <a:pt x="604" y="3156"/>
+                </a:lnTo>
+                <a:lnTo>
+                  <a:pt x="527" y="3083"/>
+                </a:lnTo>
+                <a:lnTo>
+                  <a:pt x="454" y="3005"/>
+                </a:lnTo>
+                <a:lnTo>
+                  <a:pt x="386" y="2923"/>
+                </a:lnTo>
+                <a:lnTo>
+                  <a:pt x="323" y="2838"/>
+                </a:lnTo>
+                <a:lnTo>
+                  <a:pt x="265" y="2748"/>
+                </a:lnTo>
+                <a:lnTo>
+                  <a:pt x="211" y="2655"/>
+                </a:lnTo>
+                <a:lnTo>
+                  <a:pt x="163" y="2559"/>
+                </a:lnTo>
+                <a:lnTo>
+                  <a:pt x="121" y="2459"/>
+                </a:lnTo>
+                <a:lnTo>
+                  <a:pt x="85" y="2356"/>
+                </a:lnTo>
+                <a:lnTo>
+                  <a:pt x="55" y="2251"/>
+                </a:lnTo>
+                <a:lnTo>
+                  <a:pt x="32" y="2143"/>
+                </a:lnTo>
+                <a:lnTo>
+                  <a:pt x="14" y="2033"/>
+                </a:lnTo>
+                <a:lnTo>
+                  <a:pt x="4" y="1920"/>
+                </a:lnTo>
+                <a:lnTo>
+                  <a:pt x="0" y="1806"/>
+                </a:lnTo>
+                <a:lnTo>
+                  <a:pt x="4" y="1692"/>
+                </a:lnTo>
+                <a:lnTo>
+                  <a:pt x="14" y="1580"/>
+                </a:lnTo>
+                <a:lnTo>
+                  <a:pt x="32" y="1469"/>
+                </a:lnTo>
+                <a:lnTo>
+                  <a:pt x="55" y="1362"/>
+                </a:lnTo>
+                <a:lnTo>
+                  <a:pt x="85" y="1256"/>
+                </a:lnTo>
+                <a:lnTo>
+                  <a:pt x="121" y="1154"/>
+                </a:lnTo>
+                <a:lnTo>
+                  <a:pt x="163" y="1054"/>
+                </a:lnTo>
+                <a:lnTo>
+                  <a:pt x="211" y="958"/>
+                </a:lnTo>
+                <a:lnTo>
+                  <a:pt x="265" y="864"/>
+                </a:lnTo>
+                <a:lnTo>
+                  <a:pt x="323" y="774"/>
+                </a:lnTo>
+                <a:lnTo>
+                  <a:pt x="386" y="689"/>
+                </a:lnTo>
+                <a:lnTo>
+                  <a:pt x="454" y="607"/>
+                </a:lnTo>
+                <a:lnTo>
+                  <a:pt x="527" y="529"/>
+                </a:lnTo>
+                <a:lnTo>
+                  <a:pt x="604" y="456"/>
+                </a:lnTo>
+                <a:lnTo>
+                  <a:pt x="686" y="388"/>
+                </a:lnTo>
+                <a:lnTo>
+                  <a:pt x="771" y="325"/>
+                </a:lnTo>
+                <a:lnTo>
+                  <a:pt x="860" y="266"/>
+                </a:lnTo>
+                <a:lnTo>
+                  <a:pt x="953" y="212"/>
+                </a:lnTo>
+                <a:lnTo>
+                  <a:pt x="1050" y="164"/>
+                </a:lnTo>
+                <a:lnTo>
+                  <a:pt x="1150" y="122"/>
+                </a:lnTo>
+                <a:lnTo>
+                  <a:pt x="1251" y="85"/>
+                </a:lnTo>
+                <a:lnTo>
+                  <a:pt x="1357" y="55"/>
+                </a:lnTo>
+                <a:lnTo>
+                  <a:pt x="1464" y="32"/>
+                </a:lnTo>
+                <a:lnTo>
+                  <a:pt x="1574" y="14"/>
+                </a:lnTo>
+                <a:lnTo>
+                  <a:pt x="1686" y="5"/>
+                </a:lnTo>
+                <a:lnTo>
+                  <a:pt x="1799" y="0"/>
+                </a:lnTo>
+                <a:close/>
+              </a:path>
+            </a:pathLst>
+          </a:custGeom>
+          <a:solidFill>
+            <a:schemeClr val="tx1">
+              <a:lumMod val="85000"/>
+              <a:lumOff val="15000"/>
+            </a:schemeClr>
+          </a:solidFill>
+          <a:ln w="0">
+            <a:noFill/>
+            <a:prstDash val="solid"/>
+            <a:round/>
+            <a:headEnd/>
+            <a:tailEnd/>
+          </a:ln>
+        </p:spPr>
+      </p:sp>
+      <p:pic>
+        <p:nvPicPr>
+          <p:cNvPr id="7" name="Content Placeholder 3"/>
+          <p:cNvPicPr>
+            <a:picLocks noChangeAspect="1"/>
+          </p:cNvPicPr>
+          <p:nvPr/>
+        </p:nvPicPr>
+        <p:blipFill>
+          <a:blip r:embed="rId2">
+            <a:extLst>
+              <a:ext uri="{28A0092B-C50C-407E-A947-70E740481C1C}">
+                <a14:useLocalDpi xmlns:a14="http://schemas.microsoft.com/office/drawing/2010/main" val="0"/>
+              </a:ext>
+            </a:extLst>
+          </a:blip>
+          <a:stretch>
+            <a:fillRect/>
+          </a:stretch>
+        </p:blipFill>
+        <p:spPr>
+          <a:xfrm>
+            <a:off x="4713404" y="1156729"/>
+            <a:ext cx="6716596" cy="1141820"/>
+          </a:xfrm>
+          <a:prstGeom prst="rect">
+            <a:avLst/>
+          </a:prstGeom>
+        </p:spPr>
+      </p:pic>
+      <p:cxnSp>
+        <p:nvCxnSpPr>
+          <p:cNvPr id="16" name="Straight Connector 15">
+            <a:extLst>
+              <a:ext uri="{FF2B5EF4-FFF2-40B4-BE49-F238E27FC236}">
+                <a16:creationId xmlns:a16="http://schemas.microsoft.com/office/drawing/2014/main" xmlns="" id="{292F8A50-4E5D-40E7-8E9C-0C63722D6F76}"/>
+              </a:ext>
+            </a:extLst>
+          </p:cNvPr>
+          <p:cNvCxnSpPr>
+            <a:cxnSpLocks noGrp="1" noRot="1" noChangeAspect="1" noMove="1" noResize="1" noEditPoints="1" noAdjustHandles="1" noChangeArrowheads="1" noChangeShapeType="1"/>
+          </p:cNvCxnSpPr>
+          <p:nvPr>
+            <p:extLst>
+              <p:ext uri="{386F3935-93C4-4BCD-93E2-E3B085C9AB24}">
+                <p16:designElem xmlns:p16="http://schemas.microsoft.com/office/powerpoint/2015/main" val="1"/>
+              </p:ext>
+            </p:extLst>
+          </p:nvPr>
+        </p:nvCxnSpPr>
+        <p:spPr>
+          <a:xfrm>
+            <a:off x="0" y="6212033"/>
+            <a:ext cx="4062954" cy="0"/>
+          </a:xfrm>
+          <a:prstGeom prst="line">
+            <a:avLst/>
+          </a:prstGeom>
+          <a:ln w="25400">
+            <a:solidFill>
+              <a:schemeClr val="tx1"/>
+            </a:solidFill>
+          </a:ln>
+        </p:spPr>
+        <p:style>
+          <a:lnRef idx="1">
+            <a:schemeClr val="accent1"/>
+          </a:lnRef>
+          <a:fillRef idx="0">
+            <a:schemeClr val="accent1"/>
+          </a:fillRef>
+          <a:effectRef idx="0">
+            <a:schemeClr val="accent1"/>
+          </a:effectRef>
+          <a:fontRef idx="minor">
+            <a:schemeClr val="tx1"/>
+          </a:fontRef>
+        </p:style>
+      </p:cxnSp>
+      <p:sp>
+        <p:nvSpPr>
+          <p:cNvPr id="2" name="Title 1"/>
+          <p:cNvSpPr>
+            <a:spLocks noGrp="1"/>
+          </p:cNvSpPr>
+          <p:nvPr>
+            <p:ph type="title"/>
+          </p:nvPr>
+        </p:nvSpPr>
+        <p:spPr>
+          <a:xfrm>
+            <a:off x="650450" y="559678"/>
+            <a:ext cx="3412504" cy="4952492"/>
+          </a:xfrm>
+        </p:spPr>
+        <p:txBody>
+          <a:bodyPr>
+            <a:normAutofit/>
+          </a:bodyPr>
+          <a:lstStyle/>
+          <a:p>
+            <a:r>
+              <a:rPr lang="en-US" dirty="0"/>
+              <a:t>Lambda</a:t>
+            </a:r>
+            <a:br>
+              <a:rPr lang="en-US" dirty="0"/>
+            </a:br>
+            <a:r>
+              <a:rPr lang="en-US" sz="2400"/>
+              <a:t>function </a:t>
+            </a:r>
+            <a:r>
+              <a:rPr lang="en-US" sz="2400" smtClean="0"/>
+              <a:t>signature</a:t>
+            </a:r>
+            <a:endParaRPr lang="en-US" sz="2400" dirty="0"/>
+          </a:p>
+        </p:txBody>
+      </p:sp>
+      <p:sp>
+        <p:nvSpPr>
+          <p:cNvPr id="9" name="Content Placeholder 8"/>
+          <p:cNvSpPr>
+            <a:spLocks noGrp="1"/>
+          </p:cNvSpPr>
+          <p:nvPr>
+            <p:ph idx="1"/>
+          </p:nvPr>
+        </p:nvSpPr>
+        <p:spPr>
+          <a:xfrm>
+            <a:off x="4713404" y="3124200"/>
+            <a:ext cx="6711884" cy="3087833"/>
+          </a:xfrm>
+        </p:spPr>
+        <p:txBody>
+          <a:bodyPr>
+            <a:normAutofit/>
+          </a:bodyPr>
+          <a:lstStyle/>
+          <a:p>
+            <a:r>
+              <a:rPr lang="en-US" dirty="0" smtClean="0"/>
+              <a:t>Event </a:t>
+            </a:r>
+            <a:r>
+              <a:rPr lang="mr-IN" dirty="0" smtClean="0"/>
+              <a:t>–</a:t>
+            </a:r>
+            <a:r>
+              <a:rPr lang="en-US" dirty="0" smtClean="0"/>
+              <a:t> passes the event data into the handler</a:t>
+            </a:r>
+          </a:p>
+          <a:p>
+            <a:r>
+              <a:rPr lang="en-US" dirty="0" smtClean="0"/>
+              <a:t>Context </a:t>
+            </a:r>
+            <a:r>
+              <a:rPr lang="mr-IN" dirty="0" smtClean="0"/>
+              <a:t>–</a:t>
+            </a:r>
+            <a:r>
+              <a:rPr lang="en-US" dirty="0" smtClean="0"/>
+              <a:t> runtime information </a:t>
+            </a:r>
+          </a:p>
+          <a:p>
+            <a:r>
+              <a:rPr lang="en-US" dirty="0" smtClean="0"/>
+              <a:t>Callback </a:t>
+            </a:r>
+            <a:r>
+              <a:rPr lang="mr-IN" dirty="0" smtClean="0"/>
+              <a:t>–</a:t>
+            </a:r>
+            <a:r>
+              <a:rPr lang="en-US" dirty="0" smtClean="0"/>
+              <a:t> (optional)</a:t>
+            </a:r>
+          </a:p>
+          <a:p>
+            <a:pPr lvl="1"/>
+            <a:r>
+              <a:rPr lang="en-US" dirty="0"/>
+              <a:t>http://</a:t>
+            </a:r>
+            <a:r>
+              <a:rPr lang="en-US" dirty="0" err="1"/>
+              <a:t>docs.aws.amazon.com</a:t>
+            </a:r>
+            <a:r>
+              <a:rPr lang="en-US" dirty="0"/>
+              <a:t>/lambda/latest/dg/</a:t>
+            </a:r>
+            <a:r>
+              <a:rPr lang="en-US" dirty="0" err="1"/>
+              <a:t>nodejs</a:t>
+            </a:r>
+            <a:r>
+              <a:rPr lang="en-US" dirty="0"/>
+              <a:t>-</a:t>
+            </a:r>
+            <a:r>
+              <a:rPr lang="en-US" dirty="0" err="1"/>
+              <a:t>prog</a:t>
+            </a:r>
+            <a:r>
+              <a:rPr lang="en-US" dirty="0"/>
+              <a:t>-model-</a:t>
+            </a:r>
+            <a:r>
+              <a:rPr lang="en-US" dirty="0" err="1"/>
+              <a:t>handler.html</a:t>
+            </a:r>
+            <a:endParaRPr lang="en-US" dirty="0"/>
+          </a:p>
+        </p:txBody>
+      </p:sp>
+    </p:spTree>
+    <p:extLst>
+      <p:ext uri="{BB962C8B-B14F-4D97-AF65-F5344CB8AC3E}">
+        <p14:creationId xmlns:p14="http://schemas.microsoft.com/office/powerpoint/2010/main" val="1103310581"/>
+      </p:ext>
+    </p:extLst>
+  </p:cSld>
+  <p:clrMapOvr>
+    <a:masterClrMapping/>
+  </p:clrMapOvr>
+</p:sld>
+</file>
+
+<file path=ppt/slides/slide22.xml><?xml version="1.0" encoding="utf-8"?>
 <p:sld xmlns:a="http://schemas.openxmlformats.org/drawingml/2006/main" xmlns:r="http://schemas.openxmlformats.org/officeDocument/2006/relationships" xmlns:p="http://schemas.openxmlformats.org/presentationml/2006/main">
   <p:cSld>
     <p:spTree>
@@ -10181,162 +10735,6 @@
             </p:seq>
           </p:childTnLst>
         </p:cTn>
-      </p:par>
-    </p:tnLst>
-  </p:timing>
-</p:sld>
-</file>
-
-<file path=ppt/slides/slide22.xml><?xml version="1.0" encoding="utf-8"?>
-<p:sld xmlns:a="http://schemas.openxmlformats.org/drawingml/2006/main" xmlns:r="http://schemas.openxmlformats.org/officeDocument/2006/relationships" xmlns:p="http://schemas.openxmlformats.org/presentationml/2006/main">
-  <p:cSld>
-    <p:spTree>
-      <p:nvGrpSpPr>
-        <p:cNvPr id="1" name=""/>
-        <p:cNvGrpSpPr/>
-        <p:nvPr/>
-      </p:nvGrpSpPr>
-      <p:grpSpPr>
-        <a:xfrm>
-          <a:off x="0" y="0"/>
-          <a:ext cx="0" cy="0"/>
-          <a:chOff x="0" y="0"/>
-          <a:chExt cx="0" cy="0"/>
-        </a:xfrm>
-      </p:grpSpPr>
-      <p:sp>
-        <p:nvSpPr>
-          <p:cNvPr id="2" name="Title 1"/>
-          <p:cNvSpPr>
-            <a:spLocks noGrp="1"/>
-          </p:cNvSpPr>
-          <p:nvPr>
-            <p:ph type="title"/>
-          </p:nvPr>
-        </p:nvSpPr>
-        <p:spPr/>
-        <p:txBody>
-          <a:bodyPr/>
-          <a:lstStyle/>
-          <a:p>
-            <a:r>
-              <a:rPr lang="en-US" dirty="0" smtClean="0"/>
-              <a:t>Lambda scaling</a:t>
-            </a:r>
-            <a:endParaRPr lang="en-US" dirty="0"/>
-          </a:p>
-        </p:txBody>
-      </p:sp>
-      <p:sp>
-        <p:nvSpPr>
-          <p:cNvPr id="3" name="Content Placeholder 2"/>
-          <p:cNvSpPr>
-            <a:spLocks noGrp="1"/>
-          </p:cNvSpPr>
-          <p:nvPr>
-            <p:ph idx="1"/>
-          </p:nvPr>
-        </p:nvSpPr>
-        <p:spPr/>
-        <p:txBody>
-          <a:bodyPr>
-            <a:normAutofit/>
-          </a:bodyPr>
-          <a:lstStyle/>
-          <a:p>
-            <a:r>
-              <a:rPr lang="en-US" dirty="0" smtClean="0"/>
-              <a:t>Lambda </a:t>
-            </a:r>
-            <a:r>
-              <a:rPr lang="mr-IN" dirty="0" smtClean="0"/>
-              <a:t>–</a:t>
-            </a:r>
-            <a:r>
-              <a:rPr lang="en-US" dirty="0" smtClean="0"/>
-              <a:t> on a unit of work</a:t>
-            </a:r>
-          </a:p>
-          <a:p>
-            <a:pPr lvl="1"/>
-            <a:r>
-              <a:rPr lang="en-US" dirty="0" smtClean="0"/>
-              <a:t>Streaming source types</a:t>
-            </a:r>
-          </a:p>
-          <a:p>
-            <a:pPr lvl="1"/>
-            <a:r>
-              <a:rPr lang="en-US" dirty="0" smtClean="0"/>
-              <a:t>Synchronous source types</a:t>
-            </a:r>
-          </a:p>
-          <a:p>
-            <a:pPr lvl="1"/>
-            <a:r>
-              <a:rPr lang="en-US" dirty="0" smtClean="0"/>
-              <a:t>(</a:t>
-            </a:r>
-            <a:r>
-              <a:rPr lang="en-US" dirty="0" smtClean="0">
-                <a:hlinkClick r:id="rId2"/>
-              </a:rPr>
-              <a:t>https://cloudncode.blog/2017/03/02/best-practices-aws-lambda-function/)</a:t>
-            </a:r>
-            <a:endParaRPr lang="en-US" dirty="0" smtClean="0"/>
-          </a:p>
-          <a:p>
-            <a:pPr lvl="1"/>
-            <a:r>
-              <a:rPr lang="en-US" dirty="0" smtClean="0"/>
-              <a:t>Concurrent Invocations = events (or requests) per second * function duration (in secs)</a:t>
-            </a:r>
-          </a:p>
-          <a:p>
-            <a:pPr lvl="1"/>
-            <a:r>
-              <a:rPr lang="en-US" dirty="0" smtClean="0"/>
-              <a:t>(</a:t>
-            </a:r>
-            <a:r>
-              <a:rPr lang="en-US" dirty="0" smtClean="0">
-                <a:hlinkClick r:id="rId3"/>
-              </a:rPr>
-              <a:t>http://docs.aws.amazon.com/lambda/latest/dg/concurrent-executions.html)</a:t>
-            </a:r>
-            <a:endParaRPr lang="en-US" dirty="0" smtClean="0"/>
-          </a:p>
-          <a:p>
-            <a:pPr lvl="1"/>
-            <a:r>
-              <a:rPr lang="en-US" dirty="0" smtClean="0"/>
-              <a:t>1000 concurrent limit</a:t>
-            </a:r>
-          </a:p>
-          <a:p>
-            <a:pPr lvl="1"/>
-            <a:r>
-              <a:rPr lang="en-US" dirty="0" smtClean="0"/>
-              <a:t>Kinesis work around (pricey)</a:t>
-            </a:r>
-            <a:endParaRPr lang="en-US" dirty="0"/>
-          </a:p>
-        </p:txBody>
-      </p:sp>
-    </p:spTree>
-    <p:extLst>
-      <p:ext uri="{BB962C8B-B14F-4D97-AF65-F5344CB8AC3E}">
-        <p14:creationId xmlns:p14="http://schemas.microsoft.com/office/powerpoint/2010/main" val="1998115011"/>
-      </p:ext>
-    </p:extLst>
-  </p:cSld>
-  <p:clrMapOvr>
-    <a:masterClrMapping/>
-  </p:clrMapOvr>
-  <p:timing>
-    <p:tnLst>
-      <p:par>
-        <p:cTn id="1" dur="indefinite" restart="never" nodeType="tmRoot"/>
       </p:par>
     </p:tnLst>
   </p:timing>

</xml_diff>